<commit_message>
Update Powerpoint til præsentation.pptx
Har tilføjet lidt sejt
</commit_message>
<xml_diff>
--- a/TØ/Powerpoint til præsentation.pptx
+++ b/TØ/Powerpoint til præsentation.pptx
@@ -2,7 +2,7 @@
 <file path=ppt/presentation.xml><?xml version="1.0" encoding="utf-8"?>
 <p:presentation xmlns:a="http://schemas.openxmlformats.org/drawingml/2006/main" xmlns:r="http://schemas.openxmlformats.org/officeDocument/2006/relationships" xmlns:p="http://schemas.openxmlformats.org/presentationml/2006/main" saveSubsetFonts="1" autoCompressPictures="0">
   <p:sldMasterIdLst>
-    <p:sldMasterId id="2147483648" r:id="rId1"/>
+    <p:sldMasterId id="2147483727" r:id="rId1"/>
   </p:sldMasterIdLst>
   <p:sldIdLst>
     <p:sldId id="256" r:id="rId2"/>
@@ -11,7 +11,7 @@
   <p:notesSz cx="6858000" cy="9144000"/>
   <p:defaultTextStyle>
     <a:defPPr>
-      <a:defRPr lang="da-DK"/>
+      <a:defRPr lang="en-US"/>
     </a:defPPr>
     <a:lvl1pPr marL="0" algn="l" defTabSz="914400" rtl="0" eaLnBrk="1" latinLnBrk="0" hangingPunct="1">
       <a:defRPr sz="1800" kern="1200">
@@ -104,12 +104,17 @@
       </a:defRPr>
     </a:lvl9pPr>
   </p:defaultTextStyle>
+  <p:extLst>
+    <p:ext uri="{EFAFB233-063F-42B5-8137-9DF3F51BA10A}">
+      <p15:sldGuideLst xmlns:p15="http://schemas.microsoft.com/office/powerpoint/2012/main"/>
+    </p:ext>
+  </p:extLst>
 </p:presentation>
 </file>
 
 <file path=ppt/slideLayouts/slideLayout1.xml><?xml version="1.0" encoding="utf-8"?>
 <p:sldLayout xmlns:a="http://schemas.openxmlformats.org/drawingml/2006/main" xmlns:r="http://schemas.openxmlformats.org/officeDocument/2006/relationships" xmlns:p="http://schemas.openxmlformats.org/presentationml/2006/main" type="title" preserve="1">
-  <p:cSld name="Titelslide">
+  <p:cSld name="Title Slide">
     <p:spTree>
       <p:nvGrpSpPr>
         <p:cNvPr id="1" name=""/>
@@ -126,10 +131,10 @@
       </p:grpSpPr>
       <p:sp>
         <p:nvSpPr>
-          <p:cNvPr id="2" name="Titel 1">
-            <a:extLst>
-              <a:ext uri="{FF2B5EF4-FFF2-40B4-BE49-F238E27FC236}">
-                <a16:creationId xmlns:a16="http://schemas.microsoft.com/office/drawing/2014/main" id="{426EA0E9-C72E-0C9A-B97F-B892A556746D}"/>
+          <p:cNvPr id="2" name="Title 1">
+            <a:extLst>
+              <a:ext uri="{FF2B5EF4-FFF2-40B4-BE49-F238E27FC236}">
+                <a16:creationId xmlns:a16="http://schemas.microsoft.com/office/drawing/2014/main" id="{E4336E9A-8E96-CD8C-7598-F87632CD81CF}"/>
               </a:ext>
             </a:extLst>
           </p:cNvPr>
@@ -142,31 +147,34 @@
         </p:nvSpPr>
         <p:spPr>
           <a:xfrm>
-            <a:off x="1524000" y="1122363"/>
-            <a:ext cx="9144000" cy="2387600"/>
+            <a:off x="2301923" y="1122363"/>
+            <a:ext cx="7588155" cy="2621154"/>
           </a:xfrm>
         </p:spPr>
         <p:txBody>
-          <a:bodyPr anchor="b"/>
+          <a:bodyPr anchor="b">
+            <a:normAutofit/>
+          </a:bodyPr>
           <a:lstStyle>
             <a:lvl1pPr algn="ctr">
-              <a:defRPr sz="6000"/>
+              <a:defRPr sz="4000"/>
             </a:lvl1pPr>
           </a:lstStyle>
           <a:p>
             <a:r>
-              <a:rPr lang="da-DK"/>
-              <a:t>Klik for at redigere titeltypografien i masteren</a:t>
-            </a:r>
-          </a:p>
-        </p:txBody>
-      </p:sp>
-      <p:sp>
-        <p:nvSpPr>
-          <p:cNvPr id="3" name="Undertitel 2">
-            <a:extLst>
-              <a:ext uri="{FF2B5EF4-FFF2-40B4-BE49-F238E27FC236}">
-                <a16:creationId xmlns:a16="http://schemas.microsoft.com/office/drawing/2014/main" id="{C48B11CD-A7C1-C655-3F95-353B939F12B1}"/>
+              <a:rPr lang="en-US"/>
+              <a:t>Click to edit Master title style</a:t>
+            </a:r>
+            <a:endParaRPr lang="en-US" dirty="0"/>
+          </a:p>
+        </p:txBody>
+      </p:sp>
+      <p:sp>
+        <p:nvSpPr>
+          <p:cNvPr id="3" name="Subtitle 2">
+            <a:extLst>
+              <a:ext uri="{FF2B5EF4-FFF2-40B4-BE49-F238E27FC236}">
+                <a16:creationId xmlns:a16="http://schemas.microsoft.com/office/drawing/2014/main" id="{2BDC76B8-60F6-62D3-9F73-E81662203017}"/>
               </a:ext>
             </a:extLst>
           </p:cNvPr>
@@ -179,16 +187,18 @@
         </p:nvSpPr>
         <p:spPr>
           <a:xfrm>
-            <a:off x="1524000" y="3602038"/>
-            <a:ext cx="9144000" cy="1655762"/>
+            <a:off x="2301923" y="3843708"/>
+            <a:ext cx="7588155" cy="1414091"/>
           </a:xfrm>
         </p:spPr>
         <p:txBody>
-          <a:bodyPr/>
+          <a:bodyPr>
+            <a:normAutofit/>
+          </a:bodyPr>
           <a:lstStyle>
             <a:lvl1pPr marL="0" indent="0" algn="ctr">
               <a:buNone/>
-              <a:defRPr sz="2400"/>
+              <a:defRPr sz="1800"/>
             </a:lvl1pPr>
             <a:lvl2pPr marL="457200" indent="0" algn="ctr">
               <a:buNone/>
@@ -225,18 +235,19 @@
           </a:lstStyle>
           <a:p>
             <a:r>
-              <a:rPr lang="da-DK"/>
-              <a:t>Klik for at redigere undertiteltypografien i masteren</a:t>
-            </a:r>
-          </a:p>
-        </p:txBody>
-      </p:sp>
-      <p:sp>
-        <p:nvSpPr>
-          <p:cNvPr id="4" name="Pladsholder til dato 3">
-            <a:extLst>
-              <a:ext uri="{FF2B5EF4-FFF2-40B4-BE49-F238E27FC236}">
-                <a16:creationId xmlns:a16="http://schemas.microsoft.com/office/drawing/2014/main" id="{C081C0DD-5322-33EC-CBE4-B6D413695826}"/>
+              <a:rPr lang="en-US"/>
+              <a:t>Click to edit Master subtitle style</a:t>
+            </a:r>
+            <a:endParaRPr lang="en-US" dirty="0"/>
+          </a:p>
+        </p:txBody>
+      </p:sp>
+      <p:sp>
+        <p:nvSpPr>
+          <p:cNvPr id="4" name="Date Placeholder 3">
+            <a:extLst>
+              <a:ext uri="{FF2B5EF4-FFF2-40B4-BE49-F238E27FC236}">
+                <a16:creationId xmlns:a16="http://schemas.microsoft.com/office/drawing/2014/main" id="{EAE2DAFA-435E-AAF9-8B67-495E5AFDCD91}"/>
               </a:ext>
             </a:extLst>
           </p:cNvPr>
@@ -252,20 +263,20 @@
           <a:bodyPr/>
           <a:lstStyle/>
           <a:p>
-            <a:fld id="{199947DB-F300-3748-8A76-4E53A500EB2B}" type="datetimeFigureOut">
-              <a:rPr lang="da-DK" smtClean="0"/>
-              <a:t>12.02.2025</a:t>
+            <a:fld id="{C128FA71-3A18-48C0-980F-4B68F7F63042}" type="datetime1">
+              <a:rPr lang="en-US" smtClean="0"/>
+              <a:t>2/12/25</a:t>
             </a:fld>
-            <a:endParaRPr lang="da-DK"/>
-          </a:p>
-        </p:txBody>
-      </p:sp>
-      <p:sp>
-        <p:nvSpPr>
-          <p:cNvPr id="5" name="Pladsholder til sidefod 4">
-            <a:extLst>
-              <a:ext uri="{FF2B5EF4-FFF2-40B4-BE49-F238E27FC236}">
-                <a16:creationId xmlns:a16="http://schemas.microsoft.com/office/drawing/2014/main" id="{24451FE0-1294-34F1-A3AE-BD7D54CF4181}"/>
+            <a:endParaRPr lang="en-US"/>
+          </a:p>
+        </p:txBody>
+      </p:sp>
+      <p:sp>
+        <p:nvSpPr>
+          <p:cNvPr id="5" name="Footer Placeholder 4">
+            <a:extLst>
+              <a:ext uri="{FF2B5EF4-FFF2-40B4-BE49-F238E27FC236}">
+                <a16:creationId xmlns:a16="http://schemas.microsoft.com/office/drawing/2014/main" id="{5B407A58-3351-E479-1A0C-2FF49FA42707}"/>
               </a:ext>
             </a:extLst>
           </p:cNvPr>
@@ -281,16 +292,16 @@
           <a:bodyPr/>
           <a:lstStyle/>
           <a:p>
-            <a:endParaRPr lang="da-DK"/>
-          </a:p>
-        </p:txBody>
-      </p:sp>
-      <p:sp>
-        <p:nvSpPr>
-          <p:cNvPr id="6" name="Pladsholder til slidenummer 5">
-            <a:extLst>
-              <a:ext uri="{FF2B5EF4-FFF2-40B4-BE49-F238E27FC236}">
-                <a16:creationId xmlns:a16="http://schemas.microsoft.com/office/drawing/2014/main" id="{11C1630F-D03C-E648-1D20-FC845CD2B1B7}"/>
+            <a:endParaRPr lang="en-US" dirty="0"/>
+          </a:p>
+        </p:txBody>
+      </p:sp>
+      <p:sp>
+        <p:nvSpPr>
+          <p:cNvPr id="6" name="Slide Number Placeholder 5">
+            <a:extLst>
+              <a:ext uri="{FF2B5EF4-FFF2-40B4-BE49-F238E27FC236}">
+                <a16:creationId xmlns:a16="http://schemas.microsoft.com/office/drawing/2014/main" id="{81789E10-2433-2ECB-9C92-571B583A4CF1}"/>
               </a:ext>
             </a:extLst>
           </p:cNvPr>
@@ -306,18 +317,18 @@
           <a:bodyPr/>
           <a:lstStyle/>
           <a:p>
-            <a:fld id="{9A22B152-B901-C04A-BF3F-3B705CA2CB61}" type="slidenum">
-              <a:rPr lang="da-DK" smtClean="0"/>
+            <a:fld id="{CC057153-B650-4DEB-B370-79DDCFDCE934}" type="slidenum">
+              <a:rPr lang="en-US" smtClean="0"/>
               <a:t>‹nr.›</a:t>
             </a:fld>
-            <a:endParaRPr lang="da-DK"/>
+            <a:endParaRPr lang="en-US"/>
           </a:p>
         </p:txBody>
       </p:sp>
     </p:spTree>
     <p:extLst>
       <p:ext uri="{BB962C8B-B14F-4D97-AF65-F5344CB8AC3E}">
-        <p14:creationId xmlns:p14="http://schemas.microsoft.com/office/powerpoint/2010/main" val="2168384094"/>
+        <p14:creationId xmlns:p14="http://schemas.microsoft.com/office/powerpoint/2010/main" val="3587139452"/>
       </p:ext>
     </p:extLst>
   </p:cSld>
@@ -329,7 +340,7 @@
 
 <file path=ppt/slideLayouts/slideLayout10.xml><?xml version="1.0" encoding="utf-8"?>
 <p:sldLayout xmlns:a="http://schemas.openxmlformats.org/drawingml/2006/main" xmlns:r="http://schemas.openxmlformats.org/officeDocument/2006/relationships" xmlns:p="http://schemas.openxmlformats.org/presentationml/2006/main" type="vertTx" preserve="1">
-  <p:cSld name="Titel og lodret tekst">
+  <p:cSld name="Title and Vertical Text">
     <p:spTree>
       <p:nvGrpSpPr>
         <p:cNvPr id="1" name=""/>
@@ -346,10 +357,10 @@
       </p:grpSpPr>
       <p:sp>
         <p:nvSpPr>
-          <p:cNvPr id="2" name="Titel 1">
-            <a:extLst>
-              <a:ext uri="{FF2B5EF4-FFF2-40B4-BE49-F238E27FC236}">
-                <a16:creationId xmlns:a16="http://schemas.microsoft.com/office/drawing/2014/main" id="{6DC7A9F6-8487-7816-0690-168429190E9F}"/>
+          <p:cNvPr id="2" name="Title 1">
+            <a:extLst>
+              <a:ext uri="{FF2B5EF4-FFF2-40B4-BE49-F238E27FC236}">
+                <a16:creationId xmlns:a16="http://schemas.microsoft.com/office/drawing/2014/main" id="{354E956D-CB73-C986-F100-46487310D11E}"/>
               </a:ext>
             </a:extLst>
           </p:cNvPr>
@@ -360,89 +371,153 @@
             <p:ph type="title"/>
           </p:nvPr>
         </p:nvSpPr>
+        <p:spPr>
+          <a:xfrm>
+            <a:off x="612648" y="548640"/>
+            <a:ext cx="10515600" cy="1132258"/>
+          </a:xfrm>
+        </p:spPr>
+        <p:txBody>
+          <a:bodyPr/>
+          <a:lstStyle/>
+          <a:p>
+            <a:r>
+              <a:rPr lang="en-US"/>
+              <a:t>Click to edit Master title style</a:t>
+            </a:r>
+          </a:p>
+        </p:txBody>
+      </p:sp>
+      <p:sp>
+        <p:nvSpPr>
+          <p:cNvPr id="3" name="Vertical Text Placeholder 2">
+            <a:extLst>
+              <a:ext uri="{FF2B5EF4-FFF2-40B4-BE49-F238E27FC236}">
+                <a16:creationId xmlns:a16="http://schemas.microsoft.com/office/drawing/2014/main" id="{FE423E6A-A07C-BF0D-EA30-9A8A854E48F1}"/>
+              </a:ext>
+            </a:extLst>
+          </p:cNvPr>
+          <p:cNvSpPr>
+            <a:spLocks noGrp="1"/>
+          </p:cNvSpPr>
+          <p:nvPr>
+            <p:ph type="body" orient="vert" idx="1"/>
+          </p:nvPr>
+        </p:nvSpPr>
+        <p:spPr>
+          <a:xfrm>
+            <a:off x="612648" y="1680898"/>
+            <a:ext cx="10515600" cy="4496065"/>
+          </a:xfrm>
+        </p:spPr>
+        <p:txBody>
+          <a:bodyPr vert="eaVert"/>
+          <a:lstStyle/>
+          <a:p>
+            <a:pPr lvl="0"/>
+            <a:r>
+              <a:rPr lang="en-US"/>
+              <a:t>Click to edit Master text styles</a:t>
+            </a:r>
+          </a:p>
+          <a:p>
+            <a:pPr lvl="1"/>
+            <a:r>
+              <a:rPr lang="en-US"/>
+              <a:t>Second level</a:t>
+            </a:r>
+          </a:p>
+          <a:p>
+            <a:pPr lvl="2"/>
+            <a:r>
+              <a:rPr lang="en-US"/>
+              <a:t>Third level</a:t>
+            </a:r>
+          </a:p>
+          <a:p>
+            <a:pPr lvl="3"/>
+            <a:r>
+              <a:rPr lang="en-US"/>
+              <a:t>Fourth level</a:t>
+            </a:r>
+          </a:p>
+          <a:p>
+            <a:pPr lvl="4"/>
+            <a:r>
+              <a:rPr lang="en-US"/>
+              <a:t>Fifth level</a:t>
+            </a:r>
+          </a:p>
+        </p:txBody>
+      </p:sp>
+      <p:sp>
+        <p:nvSpPr>
+          <p:cNvPr id="4" name="Date Placeholder 3">
+            <a:extLst>
+              <a:ext uri="{FF2B5EF4-FFF2-40B4-BE49-F238E27FC236}">
+                <a16:creationId xmlns:a16="http://schemas.microsoft.com/office/drawing/2014/main" id="{EEDC9908-8F95-8DFC-72CC-158552B56735}"/>
+              </a:ext>
+            </a:extLst>
+          </p:cNvPr>
+          <p:cNvSpPr>
+            <a:spLocks noGrp="1"/>
+          </p:cNvSpPr>
+          <p:nvPr>
+            <p:ph type="dt" sz="half" idx="10"/>
+          </p:nvPr>
+        </p:nvSpPr>
         <p:spPr/>
         <p:txBody>
           <a:bodyPr/>
           <a:lstStyle/>
           <a:p>
-            <a:r>
-              <a:rPr lang="da-DK"/>
-              <a:t>Klik for at redigere titeltypografien i masteren</a:t>
-            </a:r>
-          </a:p>
-        </p:txBody>
-      </p:sp>
-      <p:sp>
-        <p:nvSpPr>
-          <p:cNvPr id="3" name="Pladsholder til lodret titel 2">
-            <a:extLst>
-              <a:ext uri="{FF2B5EF4-FFF2-40B4-BE49-F238E27FC236}">
-                <a16:creationId xmlns:a16="http://schemas.microsoft.com/office/drawing/2014/main" id="{75E818D9-3668-9DA4-0E21-C65FAF9A6B85}"/>
-              </a:ext>
-            </a:extLst>
-          </p:cNvPr>
-          <p:cNvSpPr>
-            <a:spLocks noGrp="1"/>
-          </p:cNvSpPr>
-          <p:nvPr>
-            <p:ph type="body" orient="vert" idx="1"/>
+            <a:fld id="{7104EDB3-C0E8-45F8-9E1D-1B6C8D1880C0}" type="datetime1">
+              <a:rPr lang="en-US" smtClean="0"/>
+              <a:t>2/12/25</a:t>
+            </a:fld>
+            <a:endParaRPr lang="en-US"/>
+          </a:p>
+        </p:txBody>
+      </p:sp>
+      <p:sp>
+        <p:nvSpPr>
+          <p:cNvPr id="5" name="Footer Placeholder 4">
+            <a:extLst>
+              <a:ext uri="{FF2B5EF4-FFF2-40B4-BE49-F238E27FC236}">
+                <a16:creationId xmlns:a16="http://schemas.microsoft.com/office/drawing/2014/main" id="{2C26C9BE-9060-50CB-2BB7-07307FF89A7A}"/>
+              </a:ext>
+            </a:extLst>
+          </p:cNvPr>
+          <p:cNvSpPr>
+            <a:spLocks noGrp="1"/>
+          </p:cNvSpPr>
+          <p:nvPr>
+            <p:ph type="ftr" sz="quarter" idx="11"/>
           </p:nvPr>
         </p:nvSpPr>
         <p:spPr/>
         <p:txBody>
-          <a:bodyPr vert="eaVert"/>
-          <a:lstStyle/>
-          <a:p>
-            <a:pPr lvl="0"/>
-            <a:r>
-              <a:rPr lang="da-DK"/>
-              <a:t>Klik for at redigere teksttypografierne i masteren</a:t>
-            </a:r>
-          </a:p>
-          <a:p>
-            <a:pPr lvl="1"/>
-            <a:r>
-              <a:rPr lang="da-DK"/>
-              <a:t>Andet niveau</a:t>
-            </a:r>
-          </a:p>
-          <a:p>
-            <a:pPr lvl="2"/>
-            <a:r>
-              <a:rPr lang="da-DK"/>
-              <a:t>Tredje niveau</a:t>
-            </a:r>
-          </a:p>
-          <a:p>
-            <a:pPr lvl="3"/>
-            <a:r>
-              <a:rPr lang="da-DK"/>
-              <a:t>Fjerde niveau</a:t>
-            </a:r>
-          </a:p>
-          <a:p>
-            <a:pPr lvl="4"/>
-            <a:r>
-              <a:rPr lang="da-DK"/>
-              <a:t>Femte niveau</a:t>
-            </a:r>
-          </a:p>
-        </p:txBody>
-      </p:sp>
-      <p:sp>
-        <p:nvSpPr>
-          <p:cNvPr id="4" name="Pladsholder til dato 3">
-            <a:extLst>
-              <a:ext uri="{FF2B5EF4-FFF2-40B4-BE49-F238E27FC236}">
-                <a16:creationId xmlns:a16="http://schemas.microsoft.com/office/drawing/2014/main" id="{1D588E45-B05A-8534-006B-67D15501B420}"/>
-              </a:ext>
-            </a:extLst>
-          </p:cNvPr>
-          <p:cNvSpPr>
-            <a:spLocks noGrp="1"/>
-          </p:cNvSpPr>
-          <p:nvPr>
-            <p:ph type="dt" sz="half" idx="10"/>
+          <a:bodyPr/>
+          <a:lstStyle/>
+          <a:p>
+            <a:endParaRPr lang="en-US" dirty="0"/>
+          </a:p>
+        </p:txBody>
+      </p:sp>
+      <p:sp>
+        <p:nvSpPr>
+          <p:cNvPr id="6" name="Slide Number Placeholder 5">
+            <a:extLst>
+              <a:ext uri="{FF2B5EF4-FFF2-40B4-BE49-F238E27FC236}">
+                <a16:creationId xmlns:a16="http://schemas.microsoft.com/office/drawing/2014/main" id="{A84A835B-97D3-BC22-F0B8-4986D4636271}"/>
+              </a:ext>
+            </a:extLst>
+          </p:cNvPr>
+          <p:cNvSpPr>
+            <a:spLocks noGrp="1"/>
+          </p:cNvSpPr>
+          <p:nvPr>
+            <p:ph type="sldNum" sz="quarter" idx="12"/>
           </p:nvPr>
         </p:nvSpPr>
         <p:spPr/>
@@ -450,72 +525,18 @@
           <a:bodyPr/>
           <a:lstStyle/>
           <a:p>
-            <a:fld id="{199947DB-F300-3748-8A76-4E53A500EB2B}" type="datetimeFigureOut">
-              <a:rPr lang="da-DK" smtClean="0"/>
-              <a:t>12.02.2025</a:t>
-            </a:fld>
-            <a:endParaRPr lang="da-DK"/>
-          </a:p>
-        </p:txBody>
-      </p:sp>
-      <p:sp>
-        <p:nvSpPr>
-          <p:cNvPr id="5" name="Pladsholder til sidefod 4">
-            <a:extLst>
-              <a:ext uri="{FF2B5EF4-FFF2-40B4-BE49-F238E27FC236}">
-                <a16:creationId xmlns:a16="http://schemas.microsoft.com/office/drawing/2014/main" id="{B5CD48A0-92E8-D760-D174-77D532B19C77}"/>
-              </a:ext>
-            </a:extLst>
-          </p:cNvPr>
-          <p:cNvSpPr>
-            <a:spLocks noGrp="1"/>
-          </p:cNvSpPr>
-          <p:nvPr>
-            <p:ph type="ftr" sz="quarter" idx="11"/>
-          </p:nvPr>
-        </p:nvSpPr>
-        <p:spPr/>
-        <p:txBody>
-          <a:bodyPr/>
-          <a:lstStyle/>
-          <a:p>
-            <a:endParaRPr lang="da-DK"/>
-          </a:p>
-        </p:txBody>
-      </p:sp>
-      <p:sp>
-        <p:nvSpPr>
-          <p:cNvPr id="6" name="Pladsholder til slidenummer 5">
-            <a:extLst>
-              <a:ext uri="{FF2B5EF4-FFF2-40B4-BE49-F238E27FC236}">
-                <a16:creationId xmlns:a16="http://schemas.microsoft.com/office/drawing/2014/main" id="{09323801-A0FA-7C46-A74F-2CA43DE291F5}"/>
-              </a:ext>
-            </a:extLst>
-          </p:cNvPr>
-          <p:cNvSpPr>
-            <a:spLocks noGrp="1"/>
-          </p:cNvSpPr>
-          <p:nvPr>
-            <p:ph type="sldNum" sz="quarter" idx="12"/>
-          </p:nvPr>
-        </p:nvSpPr>
-        <p:spPr/>
-        <p:txBody>
-          <a:bodyPr/>
-          <a:lstStyle/>
-          <a:p>
-            <a:fld id="{9A22B152-B901-C04A-BF3F-3B705CA2CB61}" type="slidenum">
-              <a:rPr lang="da-DK" smtClean="0"/>
+            <a:fld id="{CC057153-B650-4DEB-B370-79DDCFDCE934}" type="slidenum">
+              <a:rPr lang="en-US" smtClean="0"/>
               <a:t>‹nr.›</a:t>
             </a:fld>
-            <a:endParaRPr lang="da-DK"/>
+            <a:endParaRPr lang="en-US"/>
           </a:p>
         </p:txBody>
       </p:sp>
     </p:spTree>
     <p:extLst>
       <p:ext uri="{BB962C8B-B14F-4D97-AF65-F5344CB8AC3E}">
-        <p14:creationId xmlns:p14="http://schemas.microsoft.com/office/powerpoint/2010/main" val="1139270883"/>
+        <p14:creationId xmlns:p14="http://schemas.microsoft.com/office/powerpoint/2010/main" val="2659965735"/>
       </p:ext>
     </p:extLst>
   </p:cSld>
@@ -527,7 +548,7 @@
 
 <file path=ppt/slideLayouts/slideLayout11.xml><?xml version="1.0" encoding="utf-8"?>
 <p:sldLayout xmlns:a="http://schemas.openxmlformats.org/drawingml/2006/main" xmlns:r="http://schemas.openxmlformats.org/officeDocument/2006/relationships" xmlns:p="http://schemas.openxmlformats.org/presentationml/2006/main" type="vertTitleAndTx" preserve="1">
-  <p:cSld name="Lodret titel og tekst">
+  <p:cSld name="Vertical Title and Text">
     <p:spTree>
       <p:nvGrpSpPr>
         <p:cNvPr id="1" name=""/>
@@ -544,10 +565,10 @@
       </p:grpSpPr>
       <p:sp>
         <p:nvSpPr>
-          <p:cNvPr id="2" name="Lodret titel 1">
-            <a:extLst>
-              <a:ext uri="{FF2B5EF4-FFF2-40B4-BE49-F238E27FC236}">
-                <a16:creationId xmlns:a16="http://schemas.microsoft.com/office/drawing/2014/main" id="{0FA508C5-FA8F-9FA3-F7C3-F49CFA47086F}"/>
+          <p:cNvPr id="2" name="Vertical Title 1">
+            <a:extLst>
+              <a:ext uri="{FF2B5EF4-FFF2-40B4-BE49-F238E27FC236}">
+                <a16:creationId xmlns:a16="http://schemas.microsoft.com/office/drawing/2014/main" id="{485B0252-346C-F6F4-3642-19F571550D45}"/>
               </a:ext>
             </a:extLst>
           </p:cNvPr>
@@ -560,8 +581,8 @@
         </p:nvSpPr>
         <p:spPr>
           <a:xfrm>
-            <a:off x="8724900" y="365125"/>
-            <a:ext cx="2628900" cy="5811838"/>
+            <a:off x="9634888" y="578497"/>
+            <a:ext cx="2047037" cy="5598466"/>
           </a:xfrm>
         </p:spPr>
         <p:txBody>
@@ -569,18 +590,19 @@
           <a:lstStyle/>
           <a:p>
             <a:r>
-              <a:rPr lang="da-DK"/>
-              <a:t>Klik for at redigere titeltypografien i masteren</a:t>
-            </a:r>
-          </a:p>
-        </p:txBody>
-      </p:sp>
-      <p:sp>
-        <p:nvSpPr>
-          <p:cNvPr id="3" name="Pladsholder til lodret titel 2">
-            <a:extLst>
-              <a:ext uri="{FF2B5EF4-FFF2-40B4-BE49-F238E27FC236}">
-                <a16:creationId xmlns:a16="http://schemas.microsoft.com/office/drawing/2014/main" id="{E4E77312-EAC3-C963-4B7C-65437BA7E03C}"/>
+              <a:rPr lang="en-US"/>
+              <a:t>Click to edit Master title style</a:t>
+            </a:r>
+            <a:endParaRPr lang="en-US" dirty="0"/>
+          </a:p>
+        </p:txBody>
+      </p:sp>
+      <p:sp>
+        <p:nvSpPr>
+          <p:cNvPr id="3" name="Vertical Text Placeholder 2">
+            <a:extLst>
+              <a:ext uri="{FF2B5EF4-FFF2-40B4-BE49-F238E27FC236}">
+                <a16:creationId xmlns:a16="http://schemas.microsoft.com/office/drawing/2014/main" id="{F798DA36-7351-9D6A-518B-678AB8A507D3}"/>
               </a:ext>
             </a:extLst>
           </p:cNvPr>
@@ -593,8 +615,8 @@
         </p:nvSpPr>
         <p:spPr>
           <a:xfrm>
-            <a:off x="838200" y="365125"/>
-            <a:ext cx="7734300" cy="5811838"/>
+            <a:off x="838200" y="578497"/>
+            <a:ext cx="8796688" cy="5598465"/>
           </a:xfrm>
         </p:spPr>
         <p:txBody>
@@ -603,46 +625,47 @@
           <a:p>
             <a:pPr lvl="0"/>
             <a:r>
-              <a:rPr lang="da-DK"/>
-              <a:t>Klik for at redigere teksttypografierne i masteren</a:t>
+              <a:rPr lang="en-US"/>
+              <a:t>Click to edit Master text styles</a:t>
             </a:r>
           </a:p>
           <a:p>
             <a:pPr lvl="1"/>
             <a:r>
-              <a:rPr lang="da-DK"/>
-              <a:t>Andet niveau</a:t>
+              <a:rPr lang="en-US"/>
+              <a:t>Second level</a:t>
             </a:r>
           </a:p>
           <a:p>
             <a:pPr lvl="2"/>
             <a:r>
-              <a:rPr lang="da-DK"/>
-              <a:t>Tredje niveau</a:t>
+              <a:rPr lang="en-US"/>
+              <a:t>Third level</a:t>
             </a:r>
           </a:p>
           <a:p>
             <a:pPr lvl="3"/>
             <a:r>
-              <a:rPr lang="da-DK"/>
-              <a:t>Fjerde niveau</a:t>
+              <a:rPr lang="en-US"/>
+              <a:t>Fourth level</a:t>
             </a:r>
           </a:p>
           <a:p>
             <a:pPr lvl="4"/>
             <a:r>
-              <a:rPr lang="da-DK"/>
-              <a:t>Femte niveau</a:t>
-            </a:r>
-          </a:p>
-        </p:txBody>
-      </p:sp>
-      <p:sp>
-        <p:nvSpPr>
-          <p:cNvPr id="4" name="Pladsholder til dato 3">
-            <a:extLst>
-              <a:ext uri="{FF2B5EF4-FFF2-40B4-BE49-F238E27FC236}">
-                <a16:creationId xmlns:a16="http://schemas.microsoft.com/office/drawing/2014/main" id="{93CF3A35-4FDA-E0B0-E413-D907994AF4A8}"/>
+              <a:rPr lang="en-US"/>
+              <a:t>Fifth level</a:t>
+            </a:r>
+            <a:endParaRPr lang="en-US" dirty="0"/>
+          </a:p>
+        </p:txBody>
+      </p:sp>
+      <p:sp>
+        <p:nvSpPr>
+          <p:cNvPr id="4" name="Date Placeholder 3">
+            <a:extLst>
+              <a:ext uri="{FF2B5EF4-FFF2-40B4-BE49-F238E27FC236}">
+                <a16:creationId xmlns:a16="http://schemas.microsoft.com/office/drawing/2014/main" id="{8846BDFF-D746-836C-04B8-CA89AD5D1466}"/>
               </a:ext>
             </a:extLst>
           </p:cNvPr>
@@ -658,20 +681,20 @@
           <a:bodyPr/>
           <a:lstStyle/>
           <a:p>
-            <a:fld id="{199947DB-F300-3748-8A76-4E53A500EB2B}" type="datetimeFigureOut">
-              <a:rPr lang="da-DK" smtClean="0"/>
-              <a:t>12.02.2025</a:t>
+            <a:fld id="{9CF0EC4B-54ED-4041-B552-9BA760FA3DBA}" type="datetime1">
+              <a:rPr lang="en-US" smtClean="0"/>
+              <a:t>2/12/25</a:t>
             </a:fld>
-            <a:endParaRPr lang="da-DK"/>
-          </a:p>
-        </p:txBody>
-      </p:sp>
-      <p:sp>
-        <p:nvSpPr>
-          <p:cNvPr id="5" name="Pladsholder til sidefod 4">
-            <a:extLst>
-              <a:ext uri="{FF2B5EF4-FFF2-40B4-BE49-F238E27FC236}">
-                <a16:creationId xmlns:a16="http://schemas.microsoft.com/office/drawing/2014/main" id="{179C727F-3B7F-62A8-DA74-A588D8DD3490}"/>
+            <a:endParaRPr lang="en-US"/>
+          </a:p>
+        </p:txBody>
+      </p:sp>
+      <p:sp>
+        <p:nvSpPr>
+          <p:cNvPr id="5" name="Footer Placeholder 4">
+            <a:extLst>
+              <a:ext uri="{FF2B5EF4-FFF2-40B4-BE49-F238E27FC236}">
+                <a16:creationId xmlns:a16="http://schemas.microsoft.com/office/drawing/2014/main" id="{919AA929-A9E6-FF9C-0C59-177F892D6A69}"/>
               </a:ext>
             </a:extLst>
           </p:cNvPr>
@@ -687,16 +710,16 @@
           <a:bodyPr/>
           <a:lstStyle/>
           <a:p>
-            <a:endParaRPr lang="da-DK"/>
-          </a:p>
-        </p:txBody>
-      </p:sp>
-      <p:sp>
-        <p:nvSpPr>
-          <p:cNvPr id="6" name="Pladsholder til slidenummer 5">
-            <a:extLst>
-              <a:ext uri="{FF2B5EF4-FFF2-40B4-BE49-F238E27FC236}">
-                <a16:creationId xmlns:a16="http://schemas.microsoft.com/office/drawing/2014/main" id="{CBEBC4FF-166F-6B7A-A32A-82C4B71EE385}"/>
+            <a:endParaRPr lang="en-US" dirty="0"/>
+          </a:p>
+        </p:txBody>
+      </p:sp>
+      <p:sp>
+        <p:nvSpPr>
+          <p:cNvPr id="6" name="Slide Number Placeholder 5">
+            <a:extLst>
+              <a:ext uri="{FF2B5EF4-FFF2-40B4-BE49-F238E27FC236}">
+                <a16:creationId xmlns:a16="http://schemas.microsoft.com/office/drawing/2014/main" id="{9316D893-7E81-90DC-4139-7687B39C3AC8}"/>
               </a:ext>
             </a:extLst>
           </p:cNvPr>
@@ -712,18 +735,18 @@
           <a:bodyPr/>
           <a:lstStyle/>
           <a:p>
-            <a:fld id="{9A22B152-B901-C04A-BF3F-3B705CA2CB61}" type="slidenum">
-              <a:rPr lang="da-DK" smtClean="0"/>
+            <a:fld id="{CC057153-B650-4DEB-B370-79DDCFDCE934}" type="slidenum">
+              <a:rPr lang="en-US" smtClean="0"/>
               <a:t>‹nr.›</a:t>
             </a:fld>
-            <a:endParaRPr lang="da-DK"/>
+            <a:endParaRPr lang="en-US"/>
           </a:p>
         </p:txBody>
       </p:sp>
     </p:spTree>
     <p:extLst>
       <p:ext uri="{BB962C8B-B14F-4D97-AF65-F5344CB8AC3E}">
-        <p14:creationId xmlns:p14="http://schemas.microsoft.com/office/powerpoint/2010/main" val="347602090"/>
+        <p14:creationId xmlns:p14="http://schemas.microsoft.com/office/powerpoint/2010/main" val="1393654051"/>
       </p:ext>
     </p:extLst>
   </p:cSld>
@@ -735,7 +758,7 @@
 
 <file path=ppt/slideLayouts/slideLayout2.xml><?xml version="1.0" encoding="utf-8"?>
 <p:sldLayout xmlns:a="http://schemas.openxmlformats.org/drawingml/2006/main" xmlns:r="http://schemas.openxmlformats.org/officeDocument/2006/relationships" xmlns:p="http://schemas.openxmlformats.org/presentationml/2006/main" type="obj" preserve="1">
-  <p:cSld name="Titel og indholdsobjekt">
+  <p:cSld name="Title and Content">
     <p:spTree>
       <p:nvGrpSpPr>
         <p:cNvPr id="1" name=""/>
@@ -752,10 +775,10 @@
       </p:grpSpPr>
       <p:sp>
         <p:nvSpPr>
-          <p:cNvPr id="2" name="Titel 1">
-            <a:extLst>
-              <a:ext uri="{FF2B5EF4-FFF2-40B4-BE49-F238E27FC236}">
-                <a16:creationId xmlns:a16="http://schemas.microsoft.com/office/drawing/2014/main" id="{F3C20C0F-9335-C105-7A96-49F52144C8C8}"/>
+          <p:cNvPr id="2" name="Title 1">
+            <a:extLst>
+              <a:ext uri="{FF2B5EF4-FFF2-40B4-BE49-F238E27FC236}">
+                <a16:creationId xmlns:a16="http://schemas.microsoft.com/office/drawing/2014/main" id="{BC7433D9-FD02-59E2-0F81-A0B7201D2DA0}"/>
               </a:ext>
             </a:extLst>
           </p:cNvPr>
@@ -772,18 +795,18 @@
           <a:lstStyle/>
           <a:p>
             <a:r>
-              <a:rPr lang="da-DK"/>
-              <a:t>Klik for at redigere titeltypografien i masteren</a:t>
-            </a:r>
-          </a:p>
-        </p:txBody>
-      </p:sp>
-      <p:sp>
-        <p:nvSpPr>
-          <p:cNvPr id="3" name="Pladsholder til indhold 2">
-            <a:extLst>
-              <a:ext uri="{FF2B5EF4-FFF2-40B4-BE49-F238E27FC236}">
-                <a16:creationId xmlns:a16="http://schemas.microsoft.com/office/drawing/2014/main" id="{A35E312A-8E89-834C-5136-0DE516370318}"/>
+              <a:rPr lang="en-US"/>
+              <a:t>Click to edit Master title style</a:t>
+            </a:r>
+          </a:p>
+        </p:txBody>
+      </p:sp>
+      <p:sp>
+        <p:nvSpPr>
+          <p:cNvPr id="3" name="Content Placeholder 2">
+            <a:extLst>
+              <a:ext uri="{FF2B5EF4-FFF2-40B4-BE49-F238E27FC236}">
+                <a16:creationId xmlns:a16="http://schemas.microsoft.com/office/drawing/2014/main" id="{6C2DD052-3E45-E789-01F8-33250024ECBD}"/>
               </a:ext>
             </a:extLst>
           </p:cNvPr>
@@ -801,46 +824,46 @@
           <a:p>
             <a:pPr lvl="0"/>
             <a:r>
-              <a:rPr lang="da-DK"/>
-              <a:t>Klik for at redigere teksttypografierne i masteren</a:t>
+              <a:rPr lang="en-US"/>
+              <a:t>Click to edit Master text styles</a:t>
             </a:r>
           </a:p>
           <a:p>
             <a:pPr lvl="1"/>
             <a:r>
-              <a:rPr lang="da-DK"/>
-              <a:t>Andet niveau</a:t>
+              <a:rPr lang="en-US"/>
+              <a:t>Second level</a:t>
             </a:r>
           </a:p>
           <a:p>
             <a:pPr lvl="2"/>
             <a:r>
-              <a:rPr lang="da-DK"/>
-              <a:t>Tredje niveau</a:t>
+              <a:rPr lang="en-US"/>
+              <a:t>Third level</a:t>
             </a:r>
           </a:p>
           <a:p>
             <a:pPr lvl="3"/>
             <a:r>
-              <a:rPr lang="da-DK"/>
-              <a:t>Fjerde niveau</a:t>
+              <a:rPr lang="en-US"/>
+              <a:t>Fourth level</a:t>
             </a:r>
           </a:p>
           <a:p>
             <a:pPr lvl="4"/>
             <a:r>
-              <a:rPr lang="da-DK"/>
-              <a:t>Femte niveau</a:t>
-            </a:r>
-          </a:p>
-        </p:txBody>
-      </p:sp>
-      <p:sp>
-        <p:nvSpPr>
-          <p:cNvPr id="4" name="Pladsholder til dato 3">
-            <a:extLst>
-              <a:ext uri="{FF2B5EF4-FFF2-40B4-BE49-F238E27FC236}">
-                <a16:creationId xmlns:a16="http://schemas.microsoft.com/office/drawing/2014/main" id="{2E8806E4-350D-1491-1044-7E6E30F01622}"/>
+              <a:rPr lang="en-US"/>
+              <a:t>Fifth level</a:t>
+            </a:r>
+          </a:p>
+        </p:txBody>
+      </p:sp>
+      <p:sp>
+        <p:nvSpPr>
+          <p:cNvPr id="4" name="Date Placeholder 3">
+            <a:extLst>
+              <a:ext uri="{FF2B5EF4-FFF2-40B4-BE49-F238E27FC236}">
+                <a16:creationId xmlns:a16="http://schemas.microsoft.com/office/drawing/2014/main" id="{0B9485D1-E172-8F0A-A425-3097B3ABCFB4}"/>
               </a:ext>
             </a:extLst>
           </p:cNvPr>
@@ -856,20 +879,20 @@
           <a:bodyPr/>
           <a:lstStyle/>
           <a:p>
-            <a:fld id="{199947DB-F300-3748-8A76-4E53A500EB2B}" type="datetimeFigureOut">
-              <a:rPr lang="da-DK" smtClean="0"/>
-              <a:t>12.02.2025</a:t>
+            <a:fld id="{51C1210E-201E-4473-82AC-2466F5386C38}" type="datetime1">
+              <a:rPr lang="en-US" smtClean="0"/>
+              <a:t>2/12/25</a:t>
             </a:fld>
-            <a:endParaRPr lang="da-DK"/>
-          </a:p>
-        </p:txBody>
-      </p:sp>
-      <p:sp>
-        <p:nvSpPr>
-          <p:cNvPr id="5" name="Pladsholder til sidefod 4">
-            <a:extLst>
-              <a:ext uri="{FF2B5EF4-FFF2-40B4-BE49-F238E27FC236}">
-                <a16:creationId xmlns:a16="http://schemas.microsoft.com/office/drawing/2014/main" id="{BFE3083B-111E-C097-03AB-1F393C3AE09D}"/>
+            <a:endParaRPr lang="en-US"/>
+          </a:p>
+        </p:txBody>
+      </p:sp>
+      <p:sp>
+        <p:nvSpPr>
+          <p:cNvPr id="5" name="Footer Placeholder 4">
+            <a:extLst>
+              <a:ext uri="{FF2B5EF4-FFF2-40B4-BE49-F238E27FC236}">
+                <a16:creationId xmlns:a16="http://schemas.microsoft.com/office/drawing/2014/main" id="{B17E6B5E-6174-FD5C-41E8-FFC44C650D7E}"/>
               </a:ext>
             </a:extLst>
           </p:cNvPr>
@@ -885,16 +908,16 @@
           <a:bodyPr/>
           <a:lstStyle/>
           <a:p>
-            <a:endParaRPr lang="da-DK"/>
-          </a:p>
-        </p:txBody>
-      </p:sp>
-      <p:sp>
-        <p:nvSpPr>
-          <p:cNvPr id="6" name="Pladsholder til slidenummer 5">
-            <a:extLst>
-              <a:ext uri="{FF2B5EF4-FFF2-40B4-BE49-F238E27FC236}">
-                <a16:creationId xmlns:a16="http://schemas.microsoft.com/office/drawing/2014/main" id="{956426E1-3C82-B621-C0E8-AADAC3213737}"/>
+            <a:endParaRPr lang="en-US" dirty="0"/>
+          </a:p>
+        </p:txBody>
+      </p:sp>
+      <p:sp>
+        <p:nvSpPr>
+          <p:cNvPr id="6" name="Slide Number Placeholder 5">
+            <a:extLst>
+              <a:ext uri="{FF2B5EF4-FFF2-40B4-BE49-F238E27FC236}">
+                <a16:creationId xmlns:a16="http://schemas.microsoft.com/office/drawing/2014/main" id="{4BF72154-F85B-E301-DA57-E314D7315916}"/>
               </a:ext>
             </a:extLst>
           </p:cNvPr>
@@ -910,18 +933,18 @@
           <a:bodyPr/>
           <a:lstStyle/>
           <a:p>
-            <a:fld id="{9A22B152-B901-C04A-BF3F-3B705CA2CB61}" type="slidenum">
-              <a:rPr lang="da-DK" smtClean="0"/>
+            <a:fld id="{CC057153-B650-4DEB-B370-79DDCFDCE934}" type="slidenum">
+              <a:rPr lang="en-US" smtClean="0"/>
               <a:t>‹nr.›</a:t>
             </a:fld>
-            <a:endParaRPr lang="da-DK"/>
+            <a:endParaRPr lang="en-US"/>
           </a:p>
         </p:txBody>
       </p:sp>
     </p:spTree>
     <p:extLst>
       <p:ext uri="{BB962C8B-B14F-4D97-AF65-F5344CB8AC3E}">
-        <p14:creationId xmlns:p14="http://schemas.microsoft.com/office/powerpoint/2010/main" val="1925576279"/>
+        <p14:creationId xmlns:p14="http://schemas.microsoft.com/office/powerpoint/2010/main" val="1381205459"/>
       </p:ext>
     </p:extLst>
   </p:cSld>
@@ -933,7 +956,7 @@
 
 <file path=ppt/slideLayouts/slideLayout3.xml><?xml version="1.0" encoding="utf-8"?>
 <p:sldLayout xmlns:a="http://schemas.openxmlformats.org/drawingml/2006/main" xmlns:r="http://schemas.openxmlformats.org/officeDocument/2006/relationships" xmlns:p="http://schemas.openxmlformats.org/presentationml/2006/main" type="secHead" preserve="1">
-  <p:cSld name="Afsnitsoverskrift">
+  <p:cSld name="Section Header">
     <p:spTree>
       <p:nvGrpSpPr>
         <p:cNvPr id="1" name=""/>
@@ -950,10 +973,10 @@
       </p:grpSpPr>
       <p:sp>
         <p:nvSpPr>
-          <p:cNvPr id="2" name="Titel 1">
-            <a:extLst>
-              <a:ext uri="{FF2B5EF4-FFF2-40B4-BE49-F238E27FC236}">
-                <a16:creationId xmlns:a16="http://schemas.microsoft.com/office/drawing/2014/main" id="{A2CE4941-55C6-E3ED-B0DD-D31CFE8CB160}"/>
+          <p:cNvPr id="2" name="Title 1">
+            <a:extLst>
+              <a:ext uri="{FF2B5EF4-FFF2-40B4-BE49-F238E27FC236}">
+                <a16:creationId xmlns:a16="http://schemas.microsoft.com/office/drawing/2014/main" id="{951D06AF-EF87-8489-2C82-DEB90B7EFE0C}"/>
               </a:ext>
             </a:extLst>
           </p:cNvPr>
@@ -966,31 +989,34 @@
         </p:nvSpPr>
         <p:spPr>
           <a:xfrm>
-            <a:off x="831850" y="1709738"/>
-            <a:ext cx="10515600" cy="2852737"/>
+            <a:off x="603381" y="553616"/>
+            <a:ext cx="8273140" cy="4008859"/>
           </a:xfrm>
         </p:spPr>
         <p:txBody>
-          <a:bodyPr anchor="b"/>
+          <a:bodyPr anchor="t">
+            <a:normAutofit/>
+          </a:bodyPr>
           <a:lstStyle>
             <a:lvl1pPr>
-              <a:defRPr sz="6000"/>
+              <a:defRPr sz="5400" cap="all" baseline="0"/>
             </a:lvl1pPr>
           </a:lstStyle>
           <a:p>
             <a:r>
-              <a:rPr lang="da-DK"/>
-              <a:t>Klik for at redigere titeltypografien i masteren</a:t>
-            </a:r>
-          </a:p>
-        </p:txBody>
-      </p:sp>
-      <p:sp>
-        <p:nvSpPr>
-          <p:cNvPr id="3" name="Pladsholder til tekst 2">
-            <a:extLst>
-              <a:ext uri="{FF2B5EF4-FFF2-40B4-BE49-F238E27FC236}">
-                <a16:creationId xmlns:a16="http://schemas.microsoft.com/office/drawing/2014/main" id="{F3FA4D7C-D20B-B420-65E2-C2CED5256F8E}"/>
+              <a:rPr lang="en-US"/>
+              <a:t>Click to edit Master title style</a:t>
+            </a:r>
+            <a:endParaRPr lang="en-US" dirty="0"/>
+          </a:p>
+        </p:txBody>
+      </p:sp>
+      <p:sp>
+        <p:nvSpPr>
+          <p:cNvPr id="3" name="Text Placeholder 2">
+            <a:extLst>
+              <a:ext uri="{FF2B5EF4-FFF2-40B4-BE49-F238E27FC236}">
+                <a16:creationId xmlns:a16="http://schemas.microsoft.com/office/drawing/2014/main" id="{308E5678-CA38-1318-9EA2-5E0A4F9A59BA}"/>
               </a:ext>
             </a:extLst>
           </p:cNvPr>
@@ -1003,20 +1029,20 @@
         </p:nvSpPr>
         <p:spPr>
           <a:xfrm>
-            <a:off x="831850" y="4589463"/>
-            <a:ext cx="10515600" cy="1500187"/>
+            <a:off x="603380" y="4589463"/>
+            <a:ext cx="8273140" cy="1384617"/>
           </a:xfrm>
         </p:spPr>
         <p:txBody>
-          <a:bodyPr/>
+          <a:bodyPr anchor="b">
+            <a:normAutofit/>
+          </a:bodyPr>
           <a:lstStyle>
             <a:lvl1pPr marL="0" indent="0">
               <a:buNone/>
-              <a:defRPr sz="2400">
+              <a:defRPr sz="2000">
                 <a:solidFill>
-                  <a:schemeClr val="tx1">
-                    <a:tint val="82000"/>
-                  </a:schemeClr>
+                  <a:schemeClr val="tx1"/>
                 </a:solidFill>
               </a:defRPr>
             </a:lvl1pPr>
@@ -1025,7 +1051,7 @@
               <a:defRPr sz="2000">
                 <a:solidFill>
                   <a:schemeClr val="tx1">
-                    <a:tint val="82000"/>
+                    <a:tint val="75000"/>
                   </a:schemeClr>
                 </a:solidFill>
               </a:defRPr>
@@ -1035,7 +1061,7 @@
               <a:defRPr sz="1800">
                 <a:solidFill>
                   <a:schemeClr val="tx1">
-                    <a:tint val="82000"/>
+                    <a:tint val="75000"/>
                   </a:schemeClr>
                 </a:solidFill>
               </a:defRPr>
@@ -1045,7 +1071,7 @@
               <a:defRPr sz="1600">
                 <a:solidFill>
                   <a:schemeClr val="tx1">
-                    <a:tint val="82000"/>
+                    <a:tint val="75000"/>
                   </a:schemeClr>
                 </a:solidFill>
               </a:defRPr>
@@ -1055,7 +1081,7 @@
               <a:defRPr sz="1600">
                 <a:solidFill>
                   <a:schemeClr val="tx1">
-                    <a:tint val="82000"/>
+                    <a:tint val="75000"/>
                   </a:schemeClr>
                 </a:solidFill>
               </a:defRPr>
@@ -1065,7 +1091,7 @@
               <a:defRPr sz="1600">
                 <a:solidFill>
                   <a:schemeClr val="tx1">
-                    <a:tint val="82000"/>
+                    <a:tint val="75000"/>
                   </a:schemeClr>
                 </a:solidFill>
               </a:defRPr>
@@ -1075,7 +1101,7 @@
               <a:defRPr sz="1600">
                 <a:solidFill>
                   <a:schemeClr val="tx1">
-                    <a:tint val="82000"/>
+                    <a:tint val="75000"/>
                   </a:schemeClr>
                 </a:solidFill>
               </a:defRPr>
@@ -1085,7 +1111,7 @@
               <a:defRPr sz="1600">
                 <a:solidFill>
                   <a:schemeClr val="tx1">
-                    <a:tint val="82000"/>
+                    <a:tint val="75000"/>
                   </a:schemeClr>
                 </a:solidFill>
               </a:defRPr>
@@ -1095,7 +1121,7 @@
               <a:defRPr sz="1600">
                 <a:solidFill>
                   <a:schemeClr val="tx1">
-                    <a:tint val="82000"/>
+                    <a:tint val="75000"/>
                   </a:schemeClr>
                 </a:solidFill>
               </a:defRPr>
@@ -1104,18 +1130,18 @@
           <a:p>
             <a:pPr lvl="0"/>
             <a:r>
-              <a:rPr lang="da-DK"/>
-              <a:t>Klik for at redigere teksttypografierne i masteren</a:t>
-            </a:r>
-          </a:p>
-        </p:txBody>
-      </p:sp>
-      <p:sp>
-        <p:nvSpPr>
-          <p:cNvPr id="4" name="Pladsholder til dato 3">
-            <a:extLst>
-              <a:ext uri="{FF2B5EF4-FFF2-40B4-BE49-F238E27FC236}">
-                <a16:creationId xmlns:a16="http://schemas.microsoft.com/office/drawing/2014/main" id="{DA4A1BF8-5A78-855C-F3D6-9BFB9E151181}"/>
+              <a:rPr lang="en-US"/>
+              <a:t>Click to edit Master text styles</a:t>
+            </a:r>
+          </a:p>
+        </p:txBody>
+      </p:sp>
+      <p:sp>
+        <p:nvSpPr>
+          <p:cNvPr id="4" name="Date Placeholder 3">
+            <a:extLst>
+              <a:ext uri="{FF2B5EF4-FFF2-40B4-BE49-F238E27FC236}">
+                <a16:creationId xmlns:a16="http://schemas.microsoft.com/office/drawing/2014/main" id="{44E99186-7E5A-60AF-DE69-5C7DA71611AB}"/>
               </a:ext>
             </a:extLst>
           </p:cNvPr>
@@ -1131,20 +1157,20 @@
           <a:bodyPr/>
           <a:lstStyle/>
           <a:p>
-            <a:fld id="{199947DB-F300-3748-8A76-4E53A500EB2B}" type="datetimeFigureOut">
-              <a:rPr lang="da-DK" smtClean="0"/>
-              <a:t>12.02.2025</a:t>
+            <a:fld id="{B01EA198-6CAB-4B8F-B93F-1F9C8C4B6CE7}" type="datetime1">
+              <a:rPr lang="en-US" smtClean="0"/>
+              <a:t>2/12/25</a:t>
             </a:fld>
-            <a:endParaRPr lang="da-DK"/>
-          </a:p>
-        </p:txBody>
-      </p:sp>
-      <p:sp>
-        <p:nvSpPr>
-          <p:cNvPr id="5" name="Pladsholder til sidefod 4">
-            <a:extLst>
-              <a:ext uri="{FF2B5EF4-FFF2-40B4-BE49-F238E27FC236}">
-                <a16:creationId xmlns:a16="http://schemas.microsoft.com/office/drawing/2014/main" id="{DA4C8F92-39B9-6F9C-A124-9BF252BB2947}"/>
+            <a:endParaRPr lang="en-US"/>
+          </a:p>
+        </p:txBody>
+      </p:sp>
+      <p:sp>
+        <p:nvSpPr>
+          <p:cNvPr id="5" name="Footer Placeholder 4">
+            <a:extLst>
+              <a:ext uri="{FF2B5EF4-FFF2-40B4-BE49-F238E27FC236}">
+                <a16:creationId xmlns:a16="http://schemas.microsoft.com/office/drawing/2014/main" id="{82FA13D1-1FBA-E820-323B-77B41F1A665D}"/>
               </a:ext>
             </a:extLst>
           </p:cNvPr>
@@ -1160,16 +1186,16 @@
           <a:bodyPr/>
           <a:lstStyle/>
           <a:p>
-            <a:endParaRPr lang="da-DK"/>
-          </a:p>
-        </p:txBody>
-      </p:sp>
-      <p:sp>
-        <p:nvSpPr>
-          <p:cNvPr id="6" name="Pladsholder til slidenummer 5">
-            <a:extLst>
-              <a:ext uri="{FF2B5EF4-FFF2-40B4-BE49-F238E27FC236}">
-                <a16:creationId xmlns:a16="http://schemas.microsoft.com/office/drawing/2014/main" id="{8E530C00-30CB-01AC-16F3-F3CBA05B77AD}"/>
+            <a:endParaRPr lang="en-US" dirty="0"/>
+          </a:p>
+        </p:txBody>
+      </p:sp>
+      <p:sp>
+        <p:nvSpPr>
+          <p:cNvPr id="6" name="Slide Number Placeholder 5">
+            <a:extLst>
+              <a:ext uri="{FF2B5EF4-FFF2-40B4-BE49-F238E27FC236}">
+                <a16:creationId xmlns:a16="http://schemas.microsoft.com/office/drawing/2014/main" id="{FB39BE85-85F6-4636-C651-D87CC969A49E}"/>
               </a:ext>
             </a:extLst>
           </p:cNvPr>
@@ -1185,18 +1211,18 @@
           <a:bodyPr/>
           <a:lstStyle/>
           <a:p>
-            <a:fld id="{9A22B152-B901-C04A-BF3F-3B705CA2CB61}" type="slidenum">
-              <a:rPr lang="da-DK" smtClean="0"/>
+            <a:fld id="{CC057153-B650-4DEB-B370-79DDCFDCE934}" type="slidenum">
+              <a:rPr lang="en-US" smtClean="0"/>
               <a:t>‹nr.›</a:t>
             </a:fld>
-            <a:endParaRPr lang="da-DK"/>
+            <a:endParaRPr lang="en-US"/>
           </a:p>
         </p:txBody>
       </p:sp>
     </p:spTree>
     <p:extLst>
       <p:ext uri="{BB962C8B-B14F-4D97-AF65-F5344CB8AC3E}">
-        <p14:creationId xmlns:p14="http://schemas.microsoft.com/office/powerpoint/2010/main" val="4010645178"/>
+        <p14:creationId xmlns:p14="http://schemas.microsoft.com/office/powerpoint/2010/main" val="225886773"/>
       </p:ext>
     </p:extLst>
   </p:cSld>
@@ -1208,7 +1234,7 @@
 
 <file path=ppt/slideLayouts/slideLayout4.xml><?xml version="1.0" encoding="utf-8"?>
 <p:sldLayout xmlns:a="http://schemas.openxmlformats.org/drawingml/2006/main" xmlns:r="http://schemas.openxmlformats.org/officeDocument/2006/relationships" xmlns:p="http://schemas.openxmlformats.org/presentationml/2006/main" type="twoObj" preserve="1">
-  <p:cSld name="To indholdsobjekter">
+  <p:cSld name="Two Content">
     <p:spTree>
       <p:nvGrpSpPr>
         <p:cNvPr id="1" name=""/>
@@ -1225,10 +1251,10 @@
       </p:grpSpPr>
       <p:sp>
         <p:nvSpPr>
-          <p:cNvPr id="2" name="Titel 1">
-            <a:extLst>
-              <a:ext uri="{FF2B5EF4-FFF2-40B4-BE49-F238E27FC236}">
-                <a16:creationId xmlns:a16="http://schemas.microsoft.com/office/drawing/2014/main" id="{EA574536-9BD7-9255-D13A-FB5A4B711067}"/>
+          <p:cNvPr id="2" name="Title 1">
+            <a:extLst>
+              <a:ext uri="{FF2B5EF4-FFF2-40B4-BE49-F238E27FC236}">
+                <a16:creationId xmlns:a16="http://schemas.microsoft.com/office/drawing/2014/main" id="{FAF3BB49-A328-F121-7F27-DEB7C3CC2B0F}"/>
               </a:ext>
             </a:extLst>
           </p:cNvPr>
@@ -1237,39 +1263,45 @@
           </p:cNvSpPr>
           <p:nvPr>
             <p:ph type="title"/>
-          </p:nvPr>
-        </p:nvSpPr>
-        <p:spPr/>
-        <p:txBody>
-          <a:bodyPr/>
-          <a:lstStyle/>
-          <a:p>
-            <a:r>
-              <a:rPr lang="da-DK"/>
-              <a:t>Klik for at redigere titeltypografien i masteren</a:t>
-            </a:r>
-          </a:p>
-        </p:txBody>
-      </p:sp>
-      <p:sp>
-        <p:nvSpPr>
-          <p:cNvPr id="3" name="Pladsholder til indhold 2">
-            <a:extLst>
-              <a:ext uri="{FF2B5EF4-FFF2-40B4-BE49-F238E27FC236}">
-                <a16:creationId xmlns:a16="http://schemas.microsoft.com/office/drawing/2014/main" id="{2FFF3910-E1C4-7E06-6AC1-B4A81B637CBA}"/>
-              </a:ext>
-            </a:extLst>
-          </p:cNvPr>
-          <p:cNvSpPr>
-            <a:spLocks noGrp="1"/>
-          </p:cNvSpPr>
-          <p:nvPr>
-            <p:ph sz="half" idx="1"/>
           </p:nvPr>
         </p:nvSpPr>
         <p:spPr>
           <a:xfrm>
-            <a:off x="838200" y="1825625"/>
+            <a:off x="612648" y="548640"/>
+            <a:ext cx="10741152" cy="1132258"/>
+          </a:xfrm>
+        </p:spPr>
+        <p:txBody>
+          <a:bodyPr/>
+          <a:lstStyle/>
+          <a:p>
+            <a:r>
+              <a:rPr lang="en-US"/>
+              <a:t>Click to edit Master title style</a:t>
+            </a:r>
+            <a:endParaRPr lang="en-US" dirty="0"/>
+          </a:p>
+        </p:txBody>
+      </p:sp>
+      <p:sp>
+        <p:nvSpPr>
+          <p:cNvPr id="3" name="Content Placeholder 2">
+            <a:extLst>
+              <a:ext uri="{FF2B5EF4-FFF2-40B4-BE49-F238E27FC236}">
+                <a16:creationId xmlns:a16="http://schemas.microsoft.com/office/drawing/2014/main" id="{572E861E-DFBA-B4AA-9356-CDE3D3F57C04}"/>
+              </a:ext>
+            </a:extLst>
+          </p:cNvPr>
+          <p:cNvSpPr>
+            <a:spLocks noGrp="1"/>
+          </p:cNvSpPr>
+          <p:nvPr>
+            <p:ph sz="half" idx="1"/>
+          </p:nvPr>
+        </p:nvSpPr>
+        <p:spPr>
+          <a:xfrm>
+            <a:off x="612648" y="1825625"/>
             <a:ext cx="5181600" cy="4351338"/>
           </a:xfrm>
         </p:spPr>
@@ -1279,46 +1311,47 @@
           <a:p>
             <a:pPr lvl="0"/>
             <a:r>
-              <a:rPr lang="da-DK"/>
-              <a:t>Klik for at redigere teksttypografierne i masteren</a:t>
+              <a:rPr lang="en-US"/>
+              <a:t>Click to edit Master text styles</a:t>
             </a:r>
           </a:p>
           <a:p>
             <a:pPr lvl="1"/>
             <a:r>
-              <a:rPr lang="da-DK"/>
-              <a:t>Andet niveau</a:t>
+              <a:rPr lang="en-US"/>
+              <a:t>Second level</a:t>
             </a:r>
           </a:p>
           <a:p>
             <a:pPr lvl="2"/>
             <a:r>
-              <a:rPr lang="da-DK"/>
-              <a:t>Tredje niveau</a:t>
+              <a:rPr lang="en-US"/>
+              <a:t>Third level</a:t>
             </a:r>
           </a:p>
           <a:p>
             <a:pPr lvl="3"/>
             <a:r>
-              <a:rPr lang="da-DK"/>
-              <a:t>Fjerde niveau</a:t>
+              <a:rPr lang="en-US"/>
+              <a:t>Fourth level</a:t>
             </a:r>
           </a:p>
           <a:p>
             <a:pPr lvl="4"/>
             <a:r>
-              <a:rPr lang="da-DK"/>
-              <a:t>Femte niveau</a:t>
-            </a:r>
-          </a:p>
-        </p:txBody>
-      </p:sp>
-      <p:sp>
-        <p:nvSpPr>
-          <p:cNvPr id="4" name="Pladsholder til indhold 3">
-            <a:extLst>
-              <a:ext uri="{FF2B5EF4-FFF2-40B4-BE49-F238E27FC236}">
-                <a16:creationId xmlns:a16="http://schemas.microsoft.com/office/drawing/2014/main" id="{506E3A35-3D90-3CC7-6D07-CAB83B1CA867}"/>
+              <a:rPr lang="en-US"/>
+              <a:t>Fifth level</a:t>
+            </a:r>
+            <a:endParaRPr lang="en-US" dirty="0"/>
+          </a:p>
+        </p:txBody>
+      </p:sp>
+      <p:sp>
+        <p:nvSpPr>
+          <p:cNvPr id="4" name="Content Placeholder 3">
+            <a:extLst>
+              <a:ext uri="{FF2B5EF4-FFF2-40B4-BE49-F238E27FC236}">
+                <a16:creationId xmlns:a16="http://schemas.microsoft.com/office/drawing/2014/main" id="{451D7538-EC5A-3EE7-176F-A58920C50797}"/>
               </a:ext>
             </a:extLst>
           </p:cNvPr>
@@ -1341,46 +1374,46 @@
           <a:p>
             <a:pPr lvl="0"/>
             <a:r>
-              <a:rPr lang="da-DK"/>
-              <a:t>Klik for at redigere teksttypografierne i masteren</a:t>
+              <a:rPr lang="en-US"/>
+              <a:t>Click to edit Master text styles</a:t>
             </a:r>
           </a:p>
           <a:p>
             <a:pPr lvl="1"/>
             <a:r>
-              <a:rPr lang="da-DK"/>
-              <a:t>Andet niveau</a:t>
+              <a:rPr lang="en-US"/>
+              <a:t>Second level</a:t>
             </a:r>
           </a:p>
           <a:p>
             <a:pPr lvl="2"/>
             <a:r>
-              <a:rPr lang="da-DK"/>
-              <a:t>Tredje niveau</a:t>
+              <a:rPr lang="en-US"/>
+              <a:t>Third level</a:t>
             </a:r>
           </a:p>
           <a:p>
             <a:pPr lvl="3"/>
             <a:r>
-              <a:rPr lang="da-DK"/>
-              <a:t>Fjerde niveau</a:t>
+              <a:rPr lang="en-US"/>
+              <a:t>Fourth level</a:t>
             </a:r>
           </a:p>
           <a:p>
             <a:pPr lvl="4"/>
             <a:r>
-              <a:rPr lang="da-DK"/>
-              <a:t>Femte niveau</a:t>
-            </a:r>
-          </a:p>
-        </p:txBody>
-      </p:sp>
-      <p:sp>
-        <p:nvSpPr>
-          <p:cNvPr id="5" name="Pladsholder til dato 4">
-            <a:extLst>
-              <a:ext uri="{FF2B5EF4-FFF2-40B4-BE49-F238E27FC236}">
-                <a16:creationId xmlns:a16="http://schemas.microsoft.com/office/drawing/2014/main" id="{D965E90B-F063-4868-7C68-8CF5C0C8700F}"/>
+              <a:rPr lang="en-US"/>
+              <a:t>Fifth level</a:t>
+            </a:r>
+          </a:p>
+        </p:txBody>
+      </p:sp>
+      <p:sp>
+        <p:nvSpPr>
+          <p:cNvPr id="5" name="Date Placeholder 4">
+            <a:extLst>
+              <a:ext uri="{FF2B5EF4-FFF2-40B4-BE49-F238E27FC236}">
+                <a16:creationId xmlns:a16="http://schemas.microsoft.com/office/drawing/2014/main" id="{897D0B7E-1A60-DA52-6965-92412B1C2F9F}"/>
               </a:ext>
             </a:extLst>
           </p:cNvPr>
@@ -1396,20 +1429,20 @@
           <a:bodyPr/>
           <a:lstStyle/>
           <a:p>
-            <a:fld id="{199947DB-F300-3748-8A76-4E53A500EB2B}" type="datetimeFigureOut">
-              <a:rPr lang="da-DK" smtClean="0"/>
-              <a:t>12.02.2025</a:t>
+            <a:fld id="{CA06041F-4525-44D5-AA4F-332294BF1F56}" type="datetime1">
+              <a:rPr lang="en-US" smtClean="0"/>
+              <a:t>2/12/25</a:t>
             </a:fld>
-            <a:endParaRPr lang="da-DK"/>
-          </a:p>
-        </p:txBody>
-      </p:sp>
-      <p:sp>
-        <p:nvSpPr>
-          <p:cNvPr id="6" name="Pladsholder til sidefod 5">
-            <a:extLst>
-              <a:ext uri="{FF2B5EF4-FFF2-40B4-BE49-F238E27FC236}">
-                <a16:creationId xmlns:a16="http://schemas.microsoft.com/office/drawing/2014/main" id="{DE0047DA-2717-F9FD-492A-B848F5CC81F2}"/>
+            <a:endParaRPr lang="en-US"/>
+          </a:p>
+        </p:txBody>
+      </p:sp>
+      <p:sp>
+        <p:nvSpPr>
+          <p:cNvPr id="6" name="Footer Placeholder 5">
+            <a:extLst>
+              <a:ext uri="{FF2B5EF4-FFF2-40B4-BE49-F238E27FC236}">
+                <a16:creationId xmlns:a16="http://schemas.microsoft.com/office/drawing/2014/main" id="{C2BDD5A2-CE3E-3215-6DAA-F75C0D1229DA}"/>
               </a:ext>
             </a:extLst>
           </p:cNvPr>
@@ -1425,16 +1458,16 @@
           <a:bodyPr/>
           <a:lstStyle/>
           <a:p>
-            <a:endParaRPr lang="da-DK"/>
-          </a:p>
-        </p:txBody>
-      </p:sp>
-      <p:sp>
-        <p:nvSpPr>
-          <p:cNvPr id="7" name="Pladsholder til slidenummer 6">
-            <a:extLst>
-              <a:ext uri="{FF2B5EF4-FFF2-40B4-BE49-F238E27FC236}">
-                <a16:creationId xmlns:a16="http://schemas.microsoft.com/office/drawing/2014/main" id="{33A89F5F-5659-2247-91A2-1B464C27243E}"/>
+            <a:endParaRPr lang="en-US" dirty="0"/>
+          </a:p>
+        </p:txBody>
+      </p:sp>
+      <p:sp>
+        <p:nvSpPr>
+          <p:cNvPr id="7" name="Slide Number Placeholder 6">
+            <a:extLst>
+              <a:ext uri="{FF2B5EF4-FFF2-40B4-BE49-F238E27FC236}">
+                <a16:creationId xmlns:a16="http://schemas.microsoft.com/office/drawing/2014/main" id="{B1B822F1-284A-1786-FAF2-72129E2FE64D}"/>
               </a:ext>
             </a:extLst>
           </p:cNvPr>
@@ -1450,18 +1483,18 @@
           <a:bodyPr/>
           <a:lstStyle/>
           <a:p>
-            <a:fld id="{9A22B152-B901-C04A-BF3F-3B705CA2CB61}" type="slidenum">
-              <a:rPr lang="da-DK" smtClean="0"/>
+            <a:fld id="{CC057153-B650-4DEB-B370-79DDCFDCE934}" type="slidenum">
+              <a:rPr lang="en-US" smtClean="0"/>
               <a:t>‹nr.›</a:t>
             </a:fld>
-            <a:endParaRPr lang="da-DK"/>
+            <a:endParaRPr lang="en-US"/>
           </a:p>
         </p:txBody>
       </p:sp>
     </p:spTree>
     <p:extLst>
       <p:ext uri="{BB962C8B-B14F-4D97-AF65-F5344CB8AC3E}">
-        <p14:creationId xmlns:p14="http://schemas.microsoft.com/office/powerpoint/2010/main" val="322016628"/>
+        <p14:creationId xmlns:p14="http://schemas.microsoft.com/office/powerpoint/2010/main" val="3029742966"/>
       </p:ext>
     </p:extLst>
   </p:cSld>
@@ -1473,7 +1506,7 @@
 
 <file path=ppt/slideLayouts/slideLayout5.xml><?xml version="1.0" encoding="utf-8"?>
 <p:sldLayout xmlns:a="http://schemas.openxmlformats.org/drawingml/2006/main" xmlns:r="http://schemas.openxmlformats.org/officeDocument/2006/relationships" xmlns:p="http://schemas.openxmlformats.org/presentationml/2006/main" type="twoTxTwoObj" preserve="1">
-  <p:cSld name="Sammenligning">
+  <p:cSld name="Comparison">
     <p:spTree>
       <p:nvGrpSpPr>
         <p:cNvPr id="1" name=""/>
@@ -1490,10 +1523,10 @@
       </p:grpSpPr>
       <p:sp>
         <p:nvSpPr>
-          <p:cNvPr id="2" name="Titel 1">
-            <a:extLst>
-              <a:ext uri="{FF2B5EF4-FFF2-40B4-BE49-F238E27FC236}">
-                <a16:creationId xmlns:a16="http://schemas.microsoft.com/office/drawing/2014/main" id="{43B5118E-0558-6F30-7CC1-DB44C3B3E23E}"/>
+          <p:cNvPr id="2" name="Title 1">
+            <a:extLst>
+              <a:ext uri="{FF2B5EF4-FFF2-40B4-BE49-F238E27FC236}">
+                <a16:creationId xmlns:a16="http://schemas.microsoft.com/office/drawing/2014/main" id="{41FEE969-634D-6E32-D227-18E9282C6F9E}"/>
               </a:ext>
             </a:extLst>
           </p:cNvPr>
@@ -1506,8 +1539,8 @@
         </p:nvSpPr>
         <p:spPr>
           <a:xfrm>
-            <a:off x="839788" y="365125"/>
-            <a:ext cx="10515600" cy="1325563"/>
+            <a:off x="609600" y="547396"/>
+            <a:ext cx="10745788" cy="1143292"/>
           </a:xfrm>
         </p:spPr>
         <p:txBody>
@@ -1515,18 +1548,19 @@
           <a:lstStyle/>
           <a:p>
             <a:r>
-              <a:rPr lang="da-DK"/>
-              <a:t>Klik for at redigere titeltypografien i masteren</a:t>
-            </a:r>
-          </a:p>
-        </p:txBody>
-      </p:sp>
-      <p:sp>
-        <p:nvSpPr>
-          <p:cNvPr id="3" name="Pladsholder til tekst 2">
-            <a:extLst>
-              <a:ext uri="{FF2B5EF4-FFF2-40B4-BE49-F238E27FC236}">
-                <a16:creationId xmlns:a16="http://schemas.microsoft.com/office/drawing/2014/main" id="{DE7FA32D-D59A-0D95-3875-FBD98887F135}"/>
+              <a:rPr lang="en-US"/>
+              <a:t>Click to edit Master title style</a:t>
+            </a:r>
+            <a:endParaRPr lang="en-US" dirty="0"/>
+          </a:p>
+        </p:txBody>
+      </p:sp>
+      <p:sp>
+        <p:nvSpPr>
+          <p:cNvPr id="3" name="Text Placeholder 2">
+            <a:extLst>
+              <a:ext uri="{FF2B5EF4-FFF2-40B4-BE49-F238E27FC236}">
+                <a16:creationId xmlns:a16="http://schemas.microsoft.com/office/drawing/2014/main" id="{61CD26D4-290A-F0ED-7D62-41EDA6FEC2B9}"/>
               </a:ext>
             </a:extLst>
           </p:cNvPr>
@@ -1539,16 +1573,21 @@
         </p:nvSpPr>
         <p:spPr>
           <a:xfrm>
-            <a:off x="839788" y="1681163"/>
-            <a:ext cx="5157787" cy="823912"/>
+            <a:off x="609600" y="1685735"/>
+            <a:ext cx="5157787" cy="559834"/>
           </a:xfrm>
         </p:spPr>
         <p:txBody>
-          <a:bodyPr anchor="b"/>
+          <a:bodyPr anchor="b">
+            <a:normAutofit/>
+          </a:bodyPr>
           <a:lstStyle>
             <a:lvl1pPr marL="0" indent="0">
-              <a:buNone/>
-              <a:defRPr sz="2400" b="1"/>
+              <a:lnSpc>
+                <a:spcPct val="90000"/>
+              </a:lnSpc>
+              <a:buNone/>
+              <a:defRPr sz="2000" b="1" cap="all" baseline="0"/>
             </a:lvl1pPr>
             <a:lvl2pPr marL="457200" indent="0">
               <a:buNone/>
@@ -1586,18 +1625,18 @@
           <a:p>
             <a:pPr lvl="0"/>
             <a:r>
-              <a:rPr lang="da-DK"/>
-              <a:t>Klik for at redigere teksttypografierne i masteren</a:t>
-            </a:r>
-          </a:p>
-        </p:txBody>
-      </p:sp>
-      <p:sp>
-        <p:nvSpPr>
-          <p:cNvPr id="4" name="Pladsholder til indhold 3">
-            <a:extLst>
-              <a:ext uri="{FF2B5EF4-FFF2-40B4-BE49-F238E27FC236}">
-                <a16:creationId xmlns:a16="http://schemas.microsoft.com/office/drawing/2014/main" id="{9E9064CF-61F6-D6AC-306F-30B6EF26F078}"/>
+              <a:rPr lang="en-US"/>
+              <a:t>Click to edit Master text styles</a:t>
+            </a:r>
+          </a:p>
+        </p:txBody>
+      </p:sp>
+      <p:sp>
+        <p:nvSpPr>
+          <p:cNvPr id="4" name="Content Placeholder 3">
+            <a:extLst>
+              <a:ext uri="{FF2B5EF4-FFF2-40B4-BE49-F238E27FC236}">
+                <a16:creationId xmlns:a16="http://schemas.microsoft.com/office/drawing/2014/main" id="{94DA52B0-7419-A946-4523-6D34BCAD26D1}"/>
               </a:ext>
             </a:extLst>
           </p:cNvPr>
@@ -1610,8 +1649,8 @@
         </p:nvSpPr>
         <p:spPr>
           <a:xfrm>
-            <a:off x="839788" y="2505075"/>
-            <a:ext cx="5157787" cy="3684588"/>
+            <a:off x="609600" y="2386894"/>
+            <a:ext cx="5157787" cy="3765089"/>
           </a:xfrm>
         </p:spPr>
         <p:txBody>
@@ -1620,46 +1659,47 @@
           <a:p>
             <a:pPr lvl="0"/>
             <a:r>
-              <a:rPr lang="da-DK"/>
-              <a:t>Klik for at redigere teksttypografierne i masteren</a:t>
+              <a:rPr lang="en-US"/>
+              <a:t>Click to edit Master text styles</a:t>
             </a:r>
           </a:p>
           <a:p>
             <a:pPr lvl="1"/>
             <a:r>
-              <a:rPr lang="da-DK"/>
-              <a:t>Andet niveau</a:t>
+              <a:rPr lang="en-US"/>
+              <a:t>Second level</a:t>
             </a:r>
           </a:p>
           <a:p>
             <a:pPr lvl="2"/>
             <a:r>
-              <a:rPr lang="da-DK"/>
-              <a:t>Tredje niveau</a:t>
+              <a:rPr lang="en-US"/>
+              <a:t>Third level</a:t>
             </a:r>
           </a:p>
           <a:p>
             <a:pPr lvl="3"/>
             <a:r>
-              <a:rPr lang="da-DK"/>
-              <a:t>Fjerde niveau</a:t>
+              <a:rPr lang="en-US"/>
+              <a:t>Fourth level</a:t>
             </a:r>
           </a:p>
           <a:p>
             <a:pPr lvl="4"/>
             <a:r>
-              <a:rPr lang="da-DK"/>
-              <a:t>Femte niveau</a:t>
-            </a:r>
-          </a:p>
-        </p:txBody>
-      </p:sp>
-      <p:sp>
-        <p:nvSpPr>
-          <p:cNvPr id="5" name="Pladsholder til tekst 4">
-            <a:extLst>
-              <a:ext uri="{FF2B5EF4-FFF2-40B4-BE49-F238E27FC236}">
-                <a16:creationId xmlns:a16="http://schemas.microsoft.com/office/drawing/2014/main" id="{DE3F92B9-1200-2386-3660-62CEB7C5EB51}"/>
+              <a:rPr lang="en-US"/>
+              <a:t>Fifth level</a:t>
+            </a:r>
+            <a:endParaRPr lang="en-US" dirty="0"/>
+          </a:p>
+        </p:txBody>
+      </p:sp>
+      <p:sp>
+        <p:nvSpPr>
+          <p:cNvPr id="5" name="Text Placeholder 4">
+            <a:extLst>
+              <a:ext uri="{FF2B5EF4-FFF2-40B4-BE49-F238E27FC236}">
+                <a16:creationId xmlns:a16="http://schemas.microsoft.com/office/drawing/2014/main" id="{06536620-C4F3-EEC3-DBF1-05196B1CBB55}"/>
               </a:ext>
             </a:extLst>
           </p:cNvPr>
@@ -1672,16 +1712,21 @@
         </p:nvSpPr>
         <p:spPr>
           <a:xfrm>
-            <a:off x="6172200" y="1681163"/>
-            <a:ext cx="5183188" cy="823912"/>
+            <a:off x="6172200" y="1685735"/>
+            <a:ext cx="5183188" cy="559834"/>
           </a:xfrm>
         </p:spPr>
         <p:txBody>
-          <a:bodyPr anchor="b"/>
+          <a:bodyPr anchor="b">
+            <a:normAutofit/>
+          </a:bodyPr>
           <a:lstStyle>
             <a:lvl1pPr marL="0" indent="0">
-              <a:buNone/>
-              <a:defRPr sz="2400" b="1"/>
+              <a:lnSpc>
+                <a:spcPct val="90000"/>
+              </a:lnSpc>
+              <a:buNone/>
+              <a:defRPr sz="2000" b="1" cap="all" baseline="0"/>
             </a:lvl1pPr>
             <a:lvl2pPr marL="457200" indent="0">
               <a:buNone/>
@@ -1719,18 +1764,18 @@
           <a:p>
             <a:pPr lvl="0"/>
             <a:r>
-              <a:rPr lang="da-DK"/>
-              <a:t>Klik for at redigere teksttypografierne i masteren</a:t>
-            </a:r>
-          </a:p>
-        </p:txBody>
-      </p:sp>
-      <p:sp>
-        <p:nvSpPr>
-          <p:cNvPr id="6" name="Pladsholder til indhold 5">
-            <a:extLst>
-              <a:ext uri="{FF2B5EF4-FFF2-40B4-BE49-F238E27FC236}">
-                <a16:creationId xmlns:a16="http://schemas.microsoft.com/office/drawing/2014/main" id="{61766F0D-7580-92DD-070E-3515F640B9C4}"/>
+              <a:rPr lang="en-US"/>
+              <a:t>Click to edit Master text styles</a:t>
+            </a:r>
+          </a:p>
+        </p:txBody>
+      </p:sp>
+      <p:sp>
+        <p:nvSpPr>
+          <p:cNvPr id="6" name="Content Placeholder 5">
+            <a:extLst>
+              <a:ext uri="{FF2B5EF4-FFF2-40B4-BE49-F238E27FC236}">
+                <a16:creationId xmlns:a16="http://schemas.microsoft.com/office/drawing/2014/main" id="{33BAE980-E611-98B5-04E9-DE4584B0E33F}"/>
               </a:ext>
             </a:extLst>
           </p:cNvPr>
@@ -1743,8 +1788,8 @@
         </p:nvSpPr>
         <p:spPr>
           <a:xfrm>
-            <a:off x="6172200" y="2505075"/>
-            <a:ext cx="5183188" cy="3684588"/>
+            <a:off x="6172199" y="2386894"/>
+            <a:ext cx="5183189" cy="3765089"/>
           </a:xfrm>
         </p:spPr>
         <p:txBody>
@@ -1753,46 +1798,46 @@
           <a:p>
             <a:pPr lvl="0"/>
             <a:r>
-              <a:rPr lang="da-DK"/>
-              <a:t>Klik for at redigere teksttypografierne i masteren</a:t>
+              <a:rPr lang="en-US"/>
+              <a:t>Click to edit Master text styles</a:t>
             </a:r>
           </a:p>
           <a:p>
             <a:pPr lvl="1"/>
             <a:r>
-              <a:rPr lang="da-DK"/>
-              <a:t>Andet niveau</a:t>
+              <a:rPr lang="en-US"/>
+              <a:t>Second level</a:t>
             </a:r>
           </a:p>
           <a:p>
             <a:pPr lvl="2"/>
             <a:r>
-              <a:rPr lang="da-DK"/>
-              <a:t>Tredje niveau</a:t>
+              <a:rPr lang="en-US"/>
+              <a:t>Third level</a:t>
             </a:r>
           </a:p>
           <a:p>
             <a:pPr lvl="3"/>
             <a:r>
-              <a:rPr lang="da-DK"/>
-              <a:t>Fjerde niveau</a:t>
+              <a:rPr lang="en-US"/>
+              <a:t>Fourth level</a:t>
             </a:r>
           </a:p>
           <a:p>
             <a:pPr lvl="4"/>
             <a:r>
-              <a:rPr lang="da-DK"/>
-              <a:t>Femte niveau</a:t>
-            </a:r>
-          </a:p>
-        </p:txBody>
-      </p:sp>
-      <p:sp>
-        <p:nvSpPr>
-          <p:cNvPr id="7" name="Pladsholder til dato 6">
-            <a:extLst>
-              <a:ext uri="{FF2B5EF4-FFF2-40B4-BE49-F238E27FC236}">
-                <a16:creationId xmlns:a16="http://schemas.microsoft.com/office/drawing/2014/main" id="{0CABD81C-7D2B-F016-BC7A-92780EA89950}"/>
+              <a:rPr lang="en-US"/>
+              <a:t>Fifth level</a:t>
+            </a:r>
+          </a:p>
+        </p:txBody>
+      </p:sp>
+      <p:sp>
+        <p:nvSpPr>
+          <p:cNvPr id="7" name="Date Placeholder 6">
+            <a:extLst>
+              <a:ext uri="{FF2B5EF4-FFF2-40B4-BE49-F238E27FC236}">
+                <a16:creationId xmlns:a16="http://schemas.microsoft.com/office/drawing/2014/main" id="{4E3B3581-658A-8487-F9CB-E79F2BFF27E4}"/>
               </a:ext>
             </a:extLst>
           </p:cNvPr>
@@ -1808,20 +1853,20 @@
           <a:bodyPr/>
           <a:lstStyle/>
           <a:p>
-            <a:fld id="{199947DB-F300-3748-8A76-4E53A500EB2B}" type="datetimeFigureOut">
-              <a:rPr lang="da-DK" smtClean="0"/>
-              <a:t>12.02.2025</a:t>
+            <a:fld id="{F9557091-BBDF-4EB9-BA6B-2BB67AC4FC0F}" type="datetime1">
+              <a:rPr lang="en-US" smtClean="0"/>
+              <a:t>2/12/25</a:t>
             </a:fld>
-            <a:endParaRPr lang="da-DK"/>
-          </a:p>
-        </p:txBody>
-      </p:sp>
-      <p:sp>
-        <p:nvSpPr>
-          <p:cNvPr id="8" name="Pladsholder til sidefod 7">
-            <a:extLst>
-              <a:ext uri="{FF2B5EF4-FFF2-40B4-BE49-F238E27FC236}">
-                <a16:creationId xmlns:a16="http://schemas.microsoft.com/office/drawing/2014/main" id="{44426849-A584-DB28-BDA7-CCB81C3C8114}"/>
+            <a:endParaRPr lang="en-US"/>
+          </a:p>
+        </p:txBody>
+      </p:sp>
+      <p:sp>
+        <p:nvSpPr>
+          <p:cNvPr id="8" name="Footer Placeholder 7">
+            <a:extLst>
+              <a:ext uri="{FF2B5EF4-FFF2-40B4-BE49-F238E27FC236}">
+                <a16:creationId xmlns:a16="http://schemas.microsoft.com/office/drawing/2014/main" id="{949D76D8-9033-26CF-BF4C-AECCC685C177}"/>
               </a:ext>
             </a:extLst>
           </p:cNvPr>
@@ -1837,16 +1882,16 @@
           <a:bodyPr/>
           <a:lstStyle/>
           <a:p>
-            <a:endParaRPr lang="da-DK"/>
-          </a:p>
-        </p:txBody>
-      </p:sp>
-      <p:sp>
-        <p:nvSpPr>
-          <p:cNvPr id="9" name="Pladsholder til slidenummer 8">
-            <a:extLst>
-              <a:ext uri="{FF2B5EF4-FFF2-40B4-BE49-F238E27FC236}">
-                <a16:creationId xmlns:a16="http://schemas.microsoft.com/office/drawing/2014/main" id="{A569DD95-9EF4-1797-33E7-7F846BF45066}"/>
+            <a:endParaRPr lang="en-US" dirty="0"/>
+          </a:p>
+        </p:txBody>
+      </p:sp>
+      <p:sp>
+        <p:nvSpPr>
+          <p:cNvPr id="9" name="Slide Number Placeholder 8">
+            <a:extLst>
+              <a:ext uri="{FF2B5EF4-FFF2-40B4-BE49-F238E27FC236}">
+                <a16:creationId xmlns:a16="http://schemas.microsoft.com/office/drawing/2014/main" id="{E02A06B8-CC1D-542F-D8EB-7625046B91D2}"/>
               </a:ext>
             </a:extLst>
           </p:cNvPr>
@@ -1862,18 +1907,18 @@
           <a:bodyPr/>
           <a:lstStyle/>
           <a:p>
-            <a:fld id="{9A22B152-B901-C04A-BF3F-3B705CA2CB61}" type="slidenum">
-              <a:rPr lang="da-DK" smtClean="0"/>
+            <a:fld id="{CC057153-B650-4DEB-B370-79DDCFDCE934}" type="slidenum">
+              <a:rPr lang="en-US" smtClean="0"/>
               <a:t>‹nr.›</a:t>
             </a:fld>
-            <a:endParaRPr lang="da-DK"/>
+            <a:endParaRPr lang="en-US"/>
           </a:p>
         </p:txBody>
       </p:sp>
     </p:spTree>
     <p:extLst>
       <p:ext uri="{BB962C8B-B14F-4D97-AF65-F5344CB8AC3E}">
-        <p14:creationId xmlns:p14="http://schemas.microsoft.com/office/powerpoint/2010/main" val="1219657931"/>
+        <p14:creationId xmlns:p14="http://schemas.microsoft.com/office/powerpoint/2010/main" val="3527515932"/>
       </p:ext>
     </p:extLst>
   </p:cSld>
@@ -1885,7 +1930,7 @@
 
 <file path=ppt/slideLayouts/slideLayout6.xml><?xml version="1.0" encoding="utf-8"?>
 <p:sldLayout xmlns:a="http://schemas.openxmlformats.org/drawingml/2006/main" xmlns:r="http://schemas.openxmlformats.org/officeDocument/2006/relationships" xmlns:p="http://schemas.openxmlformats.org/presentationml/2006/main" type="titleOnly" preserve="1">
-  <p:cSld name="Kun titel">
+  <p:cSld name="Title Only">
     <p:spTree>
       <p:nvGrpSpPr>
         <p:cNvPr id="1" name=""/>
@@ -1902,10 +1947,10 @@
       </p:grpSpPr>
       <p:sp>
         <p:nvSpPr>
-          <p:cNvPr id="2" name="Titel 1">
-            <a:extLst>
-              <a:ext uri="{FF2B5EF4-FFF2-40B4-BE49-F238E27FC236}">
-                <a16:creationId xmlns:a16="http://schemas.microsoft.com/office/drawing/2014/main" id="{17E36474-5743-CEE3-4A83-04E63A6CF57C}"/>
+          <p:cNvPr id="2" name="Title 1">
+            <a:extLst>
+              <a:ext uri="{FF2B5EF4-FFF2-40B4-BE49-F238E27FC236}">
+                <a16:creationId xmlns:a16="http://schemas.microsoft.com/office/drawing/2014/main" id="{666A9F42-7FF7-F803-C075-BC4968D35E34}"/>
               </a:ext>
             </a:extLst>
           </p:cNvPr>
@@ -1922,18 +1967,18 @@
           <a:lstStyle/>
           <a:p>
             <a:r>
-              <a:rPr lang="da-DK"/>
-              <a:t>Klik for at redigere titeltypografien i masteren</a:t>
-            </a:r>
-          </a:p>
-        </p:txBody>
-      </p:sp>
-      <p:sp>
-        <p:nvSpPr>
-          <p:cNvPr id="3" name="Pladsholder til dato 2">
-            <a:extLst>
-              <a:ext uri="{FF2B5EF4-FFF2-40B4-BE49-F238E27FC236}">
-                <a16:creationId xmlns:a16="http://schemas.microsoft.com/office/drawing/2014/main" id="{AE02BD26-4725-16E9-60E6-7506D79A15DA}"/>
+              <a:rPr lang="en-US"/>
+              <a:t>Click to edit Master title style</a:t>
+            </a:r>
+          </a:p>
+        </p:txBody>
+      </p:sp>
+      <p:sp>
+        <p:nvSpPr>
+          <p:cNvPr id="3" name="Date Placeholder 2">
+            <a:extLst>
+              <a:ext uri="{FF2B5EF4-FFF2-40B4-BE49-F238E27FC236}">
+                <a16:creationId xmlns:a16="http://schemas.microsoft.com/office/drawing/2014/main" id="{E89E8268-7232-2944-F1BD-399F9419B563}"/>
               </a:ext>
             </a:extLst>
           </p:cNvPr>
@@ -1949,20 +1994,20 @@
           <a:bodyPr/>
           <a:lstStyle/>
           <a:p>
-            <a:fld id="{199947DB-F300-3748-8A76-4E53A500EB2B}" type="datetimeFigureOut">
-              <a:rPr lang="da-DK" smtClean="0"/>
-              <a:t>12.02.2025</a:t>
+            <a:fld id="{2D6B226B-77A6-410C-9796-083F278E0125}" type="datetime1">
+              <a:rPr lang="en-US" smtClean="0"/>
+              <a:t>2/12/25</a:t>
             </a:fld>
-            <a:endParaRPr lang="da-DK"/>
-          </a:p>
-        </p:txBody>
-      </p:sp>
-      <p:sp>
-        <p:nvSpPr>
-          <p:cNvPr id="4" name="Pladsholder til sidefod 3">
-            <a:extLst>
-              <a:ext uri="{FF2B5EF4-FFF2-40B4-BE49-F238E27FC236}">
-                <a16:creationId xmlns:a16="http://schemas.microsoft.com/office/drawing/2014/main" id="{533D9207-42D2-DCAD-25B3-905481401B50}"/>
+            <a:endParaRPr lang="en-US"/>
+          </a:p>
+        </p:txBody>
+      </p:sp>
+      <p:sp>
+        <p:nvSpPr>
+          <p:cNvPr id="4" name="Footer Placeholder 3">
+            <a:extLst>
+              <a:ext uri="{FF2B5EF4-FFF2-40B4-BE49-F238E27FC236}">
+                <a16:creationId xmlns:a16="http://schemas.microsoft.com/office/drawing/2014/main" id="{6B968DDD-323F-89A1-84E3-DDBA626D9386}"/>
               </a:ext>
             </a:extLst>
           </p:cNvPr>
@@ -1978,16 +2023,16 @@
           <a:bodyPr/>
           <a:lstStyle/>
           <a:p>
-            <a:endParaRPr lang="da-DK"/>
-          </a:p>
-        </p:txBody>
-      </p:sp>
-      <p:sp>
-        <p:nvSpPr>
-          <p:cNvPr id="5" name="Pladsholder til slidenummer 4">
-            <a:extLst>
-              <a:ext uri="{FF2B5EF4-FFF2-40B4-BE49-F238E27FC236}">
-                <a16:creationId xmlns:a16="http://schemas.microsoft.com/office/drawing/2014/main" id="{038C6504-0EF9-8662-1A2D-3F185E18D576}"/>
+            <a:endParaRPr lang="en-US" dirty="0"/>
+          </a:p>
+        </p:txBody>
+      </p:sp>
+      <p:sp>
+        <p:nvSpPr>
+          <p:cNvPr id="5" name="Slide Number Placeholder 4">
+            <a:extLst>
+              <a:ext uri="{FF2B5EF4-FFF2-40B4-BE49-F238E27FC236}">
+                <a16:creationId xmlns:a16="http://schemas.microsoft.com/office/drawing/2014/main" id="{98FBDC76-671D-1671-DCE2-D5658BD40E29}"/>
               </a:ext>
             </a:extLst>
           </p:cNvPr>
@@ -2003,18 +2048,18 @@
           <a:bodyPr/>
           <a:lstStyle/>
           <a:p>
-            <a:fld id="{9A22B152-B901-C04A-BF3F-3B705CA2CB61}" type="slidenum">
-              <a:rPr lang="da-DK" smtClean="0"/>
+            <a:fld id="{CC057153-B650-4DEB-B370-79DDCFDCE934}" type="slidenum">
+              <a:rPr lang="en-US" smtClean="0"/>
               <a:t>‹nr.›</a:t>
             </a:fld>
-            <a:endParaRPr lang="da-DK"/>
+            <a:endParaRPr lang="en-US"/>
           </a:p>
         </p:txBody>
       </p:sp>
     </p:spTree>
     <p:extLst>
       <p:ext uri="{BB962C8B-B14F-4D97-AF65-F5344CB8AC3E}">
-        <p14:creationId xmlns:p14="http://schemas.microsoft.com/office/powerpoint/2010/main" val="4132102854"/>
+        <p14:creationId xmlns:p14="http://schemas.microsoft.com/office/powerpoint/2010/main" val="142691285"/>
       </p:ext>
     </p:extLst>
   </p:cSld>
@@ -2026,7 +2071,7 @@
 
 <file path=ppt/slideLayouts/slideLayout7.xml><?xml version="1.0" encoding="utf-8"?>
 <p:sldLayout xmlns:a="http://schemas.openxmlformats.org/drawingml/2006/main" xmlns:r="http://schemas.openxmlformats.org/officeDocument/2006/relationships" xmlns:p="http://schemas.openxmlformats.org/presentationml/2006/main" type="blank" preserve="1">
-  <p:cSld name="Tom">
+  <p:cSld name="Blank">
     <p:spTree>
       <p:nvGrpSpPr>
         <p:cNvPr id="1" name=""/>
@@ -2043,10 +2088,10 @@
       </p:grpSpPr>
       <p:sp>
         <p:nvSpPr>
-          <p:cNvPr id="2" name="Pladsholder til dato 1">
-            <a:extLst>
-              <a:ext uri="{FF2B5EF4-FFF2-40B4-BE49-F238E27FC236}">
-                <a16:creationId xmlns:a16="http://schemas.microsoft.com/office/drawing/2014/main" id="{97CF1CF5-E847-8706-6BEA-E4C97AAA1B63}"/>
+          <p:cNvPr id="2" name="Date Placeholder 1">
+            <a:extLst>
+              <a:ext uri="{FF2B5EF4-FFF2-40B4-BE49-F238E27FC236}">
+                <a16:creationId xmlns:a16="http://schemas.microsoft.com/office/drawing/2014/main" id="{49BC4D82-0182-501C-9231-46767680476E}"/>
               </a:ext>
             </a:extLst>
           </p:cNvPr>
@@ -2062,20 +2107,20 @@
           <a:bodyPr/>
           <a:lstStyle/>
           <a:p>
-            <a:fld id="{199947DB-F300-3748-8A76-4E53A500EB2B}" type="datetimeFigureOut">
-              <a:rPr lang="da-DK" smtClean="0"/>
-              <a:t>12.02.2025</a:t>
+            <a:fld id="{A23A578B-D289-4C40-8593-3D356C49DA58}" type="datetime1">
+              <a:rPr lang="en-US" smtClean="0"/>
+              <a:t>2/12/25</a:t>
             </a:fld>
-            <a:endParaRPr lang="da-DK"/>
-          </a:p>
-        </p:txBody>
-      </p:sp>
-      <p:sp>
-        <p:nvSpPr>
-          <p:cNvPr id="3" name="Pladsholder til sidefod 2">
-            <a:extLst>
-              <a:ext uri="{FF2B5EF4-FFF2-40B4-BE49-F238E27FC236}">
-                <a16:creationId xmlns:a16="http://schemas.microsoft.com/office/drawing/2014/main" id="{568A4EBA-8A1E-80C4-9D0F-0E628B521B9A}"/>
+            <a:endParaRPr lang="en-US"/>
+          </a:p>
+        </p:txBody>
+      </p:sp>
+      <p:sp>
+        <p:nvSpPr>
+          <p:cNvPr id="3" name="Footer Placeholder 2">
+            <a:extLst>
+              <a:ext uri="{FF2B5EF4-FFF2-40B4-BE49-F238E27FC236}">
+                <a16:creationId xmlns:a16="http://schemas.microsoft.com/office/drawing/2014/main" id="{10EAA6C9-A7F3-19F1-D17C-A1D83FAF553F}"/>
               </a:ext>
             </a:extLst>
           </p:cNvPr>
@@ -2091,16 +2136,16 @@
           <a:bodyPr/>
           <a:lstStyle/>
           <a:p>
-            <a:endParaRPr lang="da-DK"/>
-          </a:p>
-        </p:txBody>
-      </p:sp>
-      <p:sp>
-        <p:nvSpPr>
-          <p:cNvPr id="4" name="Pladsholder til slidenummer 3">
-            <a:extLst>
-              <a:ext uri="{FF2B5EF4-FFF2-40B4-BE49-F238E27FC236}">
-                <a16:creationId xmlns:a16="http://schemas.microsoft.com/office/drawing/2014/main" id="{878FACB6-49E8-B985-73D5-2BCB542697F6}"/>
+            <a:endParaRPr lang="en-US" dirty="0"/>
+          </a:p>
+        </p:txBody>
+      </p:sp>
+      <p:sp>
+        <p:nvSpPr>
+          <p:cNvPr id="4" name="Slide Number Placeholder 3">
+            <a:extLst>
+              <a:ext uri="{FF2B5EF4-FFF2-40B4-BE49-F238E27FC236}">
+                <a16:creationId xmlns:a16="http://schemas.microsoft.com/office/drawing/2014/main" id="{34EBB816-1B94-116F-92D4-6043AE9E0C6B}"/>
               </a:ext>
             </a:extLst>
           </p:cNvPr>
@@ -2116,18 +2161,18 @@
           <a:bodyPr/>
           <a:lstStyle/>
           <a:p>
-            <a:fld id="{9A22B152-B901-C04A-BF3F-3B705CA2CB61}" type="slidenum">
-              <a:rPr lang="da-DK" smtClean="0"/>
+            <a:fld id="{CC057153-B650-4DEB-B370-79DDCFDCE934}" type="slidenum">
+              <a:rPr lang="en-US" smtClean="0"/>
               <a:t>‹nr.›</a:t>
             </a:fld>
-            <a:endParaRPr lang="da-DK"/>
+            <a:endParaRPr lang="en-US"/>
           </a:p>
         </p:txBody>
       </p:sp>
     </p:spTree>
     <p:extLst>
       <p:ext uri="{BB962C8B-B14F-4D97-AF65-F5344CB8AC3E}">
-        <p14:creationId xmlns:p14="http://schemas.microsoft.com/office/powerpoint/2010/main" val="3646273815"/>
+        <p14:creationId xmlns:p14="http://schemas.microsoft.com/office/powerpoint/2010/main" val="1441196897"/>
       </p:ext>
     </p:extLst>
   </p:cSld>
@@ -2139,7 +2184,7 @@
 
 <file path=ppt/slideLayouts/slideLayout8.xml><?xml version="1.0" encoding="utf-8"?>
 <p:sldLayout xmlns:a="http://schemas.openxmlformats.org/drawingml/2006/main" xmlns:r="http://schemas.openxmlformats.org/officeDocument/2006/relationships" xmlns:p="http://schemas.openxmlformats.org/presentationml/2006/main" type="objTx" preserve="1">
-  <p:cSld name="Indhold med billedtekst">
+  <p:cSld name="Content with Caption">
     <p:spTree>
       <p:nvGrpSpPr>
         <p:cNvPr id="1" name=""/>
@@ -2156,10 +2201,10 @@
       </p:grpSpPr>
       <p:sp>
         <p:nvSpPr>
-          <p:cNvPr id="2" name="Titel 1">
-            <a:extLst>
-              <a:ext uri="{FF2B5EF4-FFF2-40B4-BE49-F238E27FC236}">
-                <a16:creationId xmlns:a16="http://schemas.microsoft.com/office/drawing/2014/main" id="{5E741F82-EEEE-6FBA-405B-6EA7B823596E}"/>
+          <p:cNvPr id="2" name="Title 1">
+            <a:extLst>
+              <a:ext uri="{FF2B5EF4-FFF2-40B4-BE49-F238E27FC236}">
+                <a16:creationId xmlns:a16="http://schemas.microsoft.com/office/drawing/2014/main" id="{C350C37F-77BE-E128-4248-D001C39E79C6}"/>
               </a:ext>
             </a:extLst>
           </p:cNvPr>
@@ -2172,31 +2217,34 @@
         </p:nvSpPr>
         <p:spPr>
           <a:xfrm>
-            <a:off x="839788" y="457200"/>
-            <a:ext cx="3932237" cy="1600200"/>
+            <a:off x="597160" y="553616"/>
+            <a:ext cx="3595634" cy="1757505"/>
           </a:xfrm>
         </p:spPr>
         <p:txBody>
-          <a:bodyPr anchor="b"/>
+          <a:bodyPr anchor="t">
+            <a:normAutofit/>
+          </a:bodyPr>
           <a:lstStyle>
             <a:lvl1pPr>
-              <a:defRPr sz="3200"/>
+              <a:defRPr sz="2800"/>
             </a:lvl1pPr>
           </a:lstStyle>
           <a:p>
             <a:r>
-              <a:rPr lang="da-DK"/>
-              <a:t>Klik for at redigere titeltypografien i masteren</a:t>
-            </a:r>
-          </a:p>
-        </p:txBody>
-      </p:sp>
-      <p:sp>
-        <p:nvSpPr>
-          <p:cNvPr id="3" name="Pladsholder til indhold 2">
-            <a:extLst>
-              <a:ext uri="{FF2B5EF4-FFF2-40B4-BE49-F238E27FC236}">
-                <a16:creationId xmlns:a16="http://schemas.microsoft.com/office/drawing/2014/main" id="{A258112C-9889-96FB-FCBA-FB8F8E54DE8C}"/>
+              <a:rPr lang="en-US"/>
+              <a:t>Click to edit Master title style</a:t>
+            </a:r>
+            <a:endParaRPr lang="en-US" dirty="0"/>
+          </a:p>
+        </p:txBody>
+      </p:sp>
+      <p:sp>
+        <p:nvSpPr>
+          <p:cNvPr id="3" name="Content Placeholder 2">
+            <a:extLst>
+              <a:ext uri="{FF2B5EF4-FFF2-40B4-BE49-F238E27FC236}">
+                <a16:creationId xmlns:a16="http://schemas.microsoft.com/office/drawing/2014/main" id="{2F3B20A8-A604-C977-02C0-083BA8663484}"/>
               </a:ext>
             </a:extLst>
           </p:cNvPr>
@@ -2209,27 +2257,29 @@
         </p:nvSpPr>
         <p:spPr>
           <a:xfrm>
-            <a:off x="5183188" y="987425"/>
-            <a:ext cx="6172200" cy="4873625"/>
+            <a:off x="5134708" y="553616"/>
+            <a:ext cx="6279741" cy="5486400"/>
           </a:xfrm>
         </p:spPr>
         <p:txBody>
-          <a:bodyPr/>
+          <a:bodyPr>
+            <a:normAutofit/>
+          </a:bodyPr>
           <a:lstStyle>
             <a:lvl1pPr>
-              <a:defRPr sz="3200"/>
+              <a:defRPr sz="2800"/>
             </a:lvl1pPr>
             <a:lvl2pPr>
-              <a:defRPr sz="2800"/>
+              <a:defRPr sz="2400"/>
             </a:lvl2pPr>
             <a:lvl3pPr>
-              <a:defRPr sz="2400"/>
+              <a:defRPr sz="2000"/>
             </a:lvl3pPr>
             <a:lvl4pPr>
-              <a:defRPr sz="2000"/>
+              <a:defRPr sz="1800"/>
             </a:lvl4pPr>
             <a:lvl5pPr>
-              <a:defRPr sz="2000"/>
+              <a:defRPr sz="1800"/>
             </a:lvl5pPr>
             <a:lvl6pPr>
               <a:defRPr sz="2000"/>
@@ -2247,46 +2297,47 @@
           <a:p>
             <a:pPr lvl="0"/>
             <a:r>
-              <a:rPr lang="da-DK"/>
-              <a:t>Klik for at redigere teksttypografierne i masteren</a:t>
+              <a:rPr lang="en-US"/>
+              <a:t>Click to edit Master text styles</a:t>
             </a:r>
           </a:p>
           <a:p>
             <a:pPr lvl="1"/>
             <a:r>
-              <a:rPr lang="da-DK"/>
-              <a:t>Andet niveau</a:t>
+              <a:rPr lang="en-US"/>
+              <a:t>Second level</a:t>
             </a:r>
           </a:p>
           <a:p>
             <a:pPr lvl="2"/>
             <a:r>
-              <a:rPr lang="da-DK"/>
-              <a:t>Tredje niveau</a:t>
+              <a:rPr lang="en-US"/>
+              <a:t>Third level</a:t>
             </a:r>
           </a:p>
           <a:p>
             <a:pPr lvl="3"/>
             <a:r>
-              <a:rPr lang="da-DK"/>
-              <a:t>Fjerde niveau</a:t>
+              <a:rPr lang="en-US"/>
+              <a:t>Fourth level</a:t>
             </a:r>
           </a:p>
           <a:p>
             <a:pPr lvl="4"/>
             <a:r>
-              <a:rPr lang="da-DK"/>
-              <a:t>Femte niveau</a:t>
-            </a:r>
-          </a:p>
-        </p:txBody>
-      </p:sp>
-      <p:sp>
-        <p:nvSpPr>
-          <p:cNvPr id="4" name="Pladsholder til tekst 3">
-            <a:extLst>
-              <a:ext uri="{FF2B5EF4-FFF2-40B4-BE49-F238E27FC236}">
-                <a16:creationId xmlns:a16="http://schemas.microsoft.com/office/drawing/2014/main" id="{9B2328C9-2050-470A-6FFD-7B0CAB777A90}"/>
+              <a:rPr lang="en-US"/>
+              <a:t>Fifth level</a:t>
+            </a:r>
+            <a:endParaRPr lang="en-US" dirty="0"/>
+          </a:p>
+        </p:txBody>
+      </p:sp>
+      <p:sp>
+        <p:nvSpPr>
+          <p:cNvPr id="4" name="Text Placeholder 3">
+            <a:extLst>
+              <a:ext uri="{FF2B5EF4-FFF2-40B4-BE49-F238E27FC236}">
+                <a16:creationId xmlns:a16="http://schemas.microsoft.com/office/drawing/2014/main" id="{EC0EEBFB-2026-6A35-33ED-F008376B67A0}"/>
               </a:ext>
             </a:extLst>
           </p:cNvPr>
@@ -2299,16 +2350,18 @@
         </p:nvSpPr>
         <p:spPr>
           <a:xfrm>
-            <a:off x="839788" y="2057400"/>
-            <a:ext cx="3932237" cy="3811588"/>
+            <a:off x="597160" y="2311121"/>
+            <a:ext cx="3595634" cy="3728895"/>
           </a:xfrm>
         </p:spPr>
         <p:txBody>
-          <a:bodyPr/>
+          <a:bodyPr anchor="t">
+            <a:normAutofit/>
+          </a:bodyPr>
           <a:lstStyle>
             <a:lvl1pPr marL="0" indent="0">
               <a:buNone/>
-              <a:defRPr sz="1600"/>
+              <a:defRPr sz="1800"/>
             </a:lvl1pPr>
             <a:lvl2pPr marL="457200" indent="0">
               <a:buNone/>
@@ -2346,18 +2399,18 @@
           <a:p>
             <a:pPr lvl="0"/>
             <a:r>
-              <a:rPr lang="da-DK"/>
-              <a:t>Klik for at redigere teksttypografierne i masteren</a:t>
-            </a:r>
-          </a:p>
-        </p:txBody>
-      </p:sp>
-      <p:sp>
-        <p:nvSpPr>
-          <p:cNvPr id="5" name="Pladsholder til dato 4">
-            <a:extLst>
-              <a:ext uri="{FF2B5EF4-FFF2-40B4-BE49-F238E27FC236}">
-                <a16:creationId xmlns:a16="http://schemas.microsoft.com/office/drawing/2014/main" id="{737897C5-3D79-330A-FC60-43588EBE3377}"/>
+              <a:rPr lang="en-US"/>
+              <a:t>Click to edit Master text styles</a:t>
+            </a:r>
+          </a:p>
+        </p:txBody>
+      </p:sp>
+      <p:sp>
+        <p:nvSpPr>
+          <p:cNvPr id="5" name="Date Placeholder 4">
+            <a:extLst>
+              <a:ext uri="{FF2B5EF4-FFF2-40B4-BE49-F238E27FC236}">
+                <a16:creationId xmlns:a16="http://schemas.microsoft.com/office/drawing/2014/main" id="{93F05638-7A56-469A-825A-1DFA600254C8}"/>
               </a:ext>
             </a:extLst>
           </p:cNvPr>
@@ -2373,20 +2426,20 @@
           <a:bodyPr/>
           <a:lstStyle/>
           <a:p>
-            <a:fld id="{199947DB-F300-3748-8A76-4E53A500EB2B}" type="datetimeFigureOut">
-              <a:rPr lang="da-DK" smtClean="0"/>
-              <a:t>12.02.2025</a:t>
+            <a:fld id="{713DFAE3-14DB-48A7-A80F-80DDB072CE3D}" type="datetime1">
+              <a:rPr lang="en-US" smtClean="0"/>
+              <a:t>2/12/25</a:t>
             </a:fld>
-            <a:endParaRPr lang="da-DK"/>
-          </a:p>
-        </p:txBody>
-      </p:sp>
-      <p:sp>
-        <p:nvSpPr>
-          <p:cNvPr id="6" name="Pladsholder til sidefod 5">
-            <a:extLst>
-              <a:ext uri="{FF2B5EF4-FFF2-40B4-BE49-F238E27FC236}">
-                <a16:creationId xmlns:a16="http://schemas.microsoft.com/office/drawing/2014/main" id="{54368049-389E-284D-98A8-42C3AA33530A}"/>
+            <a:endParaRPr lang="en-US"/>
+          </a:p>
+        </p:txBody>
+      </p:sp>
+      <p:sp>
+        <p:nvSpPr>
+          <p:cNvPr id="6" name="Footer Placeholder 5">
+            <a:extLst>
+              <a:ext uri="{FF2B5EF4-FFF2-40B4-BE49-F238E27FC236}">
+                <a16:creationId xmlns:a16="http://schemas.microsoft.com/office/drawing/2014/main" id="{9C85A215-184B-2105-0279-ED02F6445831}"/>
               </a:ext>
             </a:extLst>
           </p:cNvPr>
@@ -2402,16 +2455,16 @@
           <a:bodyPr/>
           <a:lstStyle/>
           <a:p>
-            <a:endParaRPr lang="da-DK"/>
-          </a:p>
-        </p:txBody>
-      </p:sp>
-      <p:sp>
-        <p:nvSpPr>
-          <p:cNvPr id="7" name="Pladsholder til slidenummer 6">
-            <a:extLst>
-              <a:ext uri="{FF2B5EF4-FFF2-40B4-BE49-F238E27FC236}">
-                <a16:creationId xmlns:a16="http://schemas.microsoft.com/office/drawing/2014/main" id="{5D9F33B5-825E-6B21-2C1F-7499FDF0FFE9}"/>
+            <a:endParaRPr lang="en-US" dirty="0"/>
+          </a:p>
+        </p:txBody>
+      </p:sp>
+      <p:sp>
+        <p:nvSpPr>
+          <p:cNvPr id="7" name="Slide Number Placeholder 6">
+            <a:extLst>
+              <a:ext uri="{FF2B5EF4-FFF2-40B4-BE49-F238E27FC236}">
+                <a16:creationId xmlns:a16="http://schemas.microsoft.com/office/drawing/2014/main" id="{32C7CA46-892B-253A-3A28-7414E17B837B}"/>
               </a:ext>
             </a:extLst>
           </p:cNvPr>
@@ -2427,18 +2480,18 @@
           <a:bodyPr/>
           <a:lstStyle/>
           <a:p>
-            <a:fld id="{9A22B152-B901-C04A-BF3F-3B705CA2CB61}" type="slidenum">
-              <a:rPr lang="da-DK" smtClean="0"/>
+            <a:fld id="{CC057153-B650-4DEB-B370-79DDCFDCE934}" type="slidenum">
+              <a:rPr lang="en-US" smtClean="0"/>
               <a:t>‹nr.›</a:t>
             </a:fld>
-            <a:endParaRPr lang="da-DK"/>
+            <a:endParaRPr lang="en-US"/>
           </a:p>
         </p:txBody>
       </p:sp>
     </p:spTree>
     <p:extLst>
       <p:ext uri="{BB962C8B-B14F-4D97-AF65-F5344CB8AC3E}">
-        <p14:creationId xmlns:p14="http://schemas.microsoft.com/office/powerpoint/2010/main" val="2037927408"/>
+        <p14:creationId xmlns:p14="http://schemas.microsoft.com/office/powerpoint/2010/main" val="3515992870"/>
       </p:ext>
     </p:extLst>
   </p:cSld>
@@ -2450,7 +2503,7 @@
 
 <file path=ppt/slideLayouts/slideLayout9.xml><?xml version="1.0" encoding="utf-8"?>
 <p:sldLayout xmlns:a="http://schemas.openxmlformats.org/drawingml/2006/main" xmlns:r="http://schemas.openxmlformats.org/officeDocument/2006/relationships" xmlns:p="http://schemas.openxmlformats.org/presentationml/2006/main" type="picTx" preserve="1">
-  <p:cSld name="Billede med billedtekst">
+  <p:cSld name="Picture with Caption">
     <p:spTree>
       <p:nvGrpSpPr>
         <p:cNvPr id="1" name=""/>
@@ -2467,10 +2520,10 @@
       </p:grpSpPr>
       <p:sp>
         <p:nvSpPr>
-          <p:cNvPr id="2" name="Titel 1">
-            <a:extLst>
-              <a:ext uri="{FF2B5EF4-FFF2-40B4-BE49-F238E27FC236}">
-                <a16:creationId xmlns:a16="http://schemas.microsoft.com/office/drawing/2014/main" id="{C944F2AA-909E-9E4B-5ECB-A3ACA42999DD}"/>
+          <p:cNvPr id="2" name="Title 1">
+            <a:extLst>
+              <a:ext uri="{FF2B5EF4-FFF2-40B4-BE49-F238E27FC236}">
+                <a16:creationId xmlns:a16="http://schemas.microsoft.com/office/drawing/2014/main" id="{EFB06A09-98CF-FAC2-3708-AECC4360C651}"/>
               </a:ext>
             </a:extLst>
           </p:cNvPr>
@@ -2483,31 +2536,34 @@
         </p:nvSpPr>
         <p:spPr>
           <a:xfrm>
-            <a:off x="839788" y="457200"/>
-            <a:ext cx="3932237" cy="1600200"/>
+            <a:off x="594360" y="557784"/>
+            <a:ext cx="3595634" cy="2212313"/>
           </a:xfrm>
         </p:spPr>
         <p:txBody>
-          <a:bodyPr anchor="b"/>
+          <a:bodyPr anchor="t">
+            <a:normAutofit/>
+          </a:bodyPr>
           <a:lstStyle>
             <a:lvl1pPr>
-              <a:defRPr sz="3200"/>
+              <a:defRPr sz="2800"/>
             </a:lvl1pPr>
           </a:lstStyle>
           <a:p>
             <a:r>
-              <a:rPr lang="da-DK"/>
-              <a:t>Klik for at redigere titeltypografien i masteren</a:t>
-            </a:r>
-          </a:p>
-        </p:txBody>
-      </p:sp>
-      <p:sp>
-        <p:nvSpPr>
-          <p:cNvPr id="3" name="Pladsholder til billede 2">
-            <a:extLst>
-              <a:ext uri="{FF2B5EF4-FFF2-40B4-BE49-F238E27FC236}">
-                <a16:creationId xmlns:a16="http://schemas.microsoft.com/office/drawing/2014/main" id="{79141B85-0D3E-8764-4A8D-041BD9FE6D57}"/>
+              <a:rPr lang="en-US"/>
+              <a:t>Click to edit Master title style</a:t>
+            </a:r>
+            <a:endParaRPr lang="en-US" dirty="0"/>
+          </a:p>
+        </p:txBody>
+      </p:sp>
+      <p:sp>
+        <p:nvSpPr>
+          <p:cNvPr id="3" name="Picture Placeholder 2">
+            <a:extLst>
+              <a:ext uri="{FF2B5EF4-FFF2-40B4-BE49-F238E27FC236}">
+                <a16:creationId xmlns:a16="http://schemas.microsoft.com/office/drawing/2014/main" id="{9571C769-CEC8-962A-01E6-15B0E056791E}"/>
               </a:ext>
             </a:extLst>
           </p:cNvPr>
@@ -2520,8 +2576,8 @@
         </p:nvSpPr>
         <p:spPr>
           <a:xfrm>
-            <a:off x="5183188" y="987425"/>
-            <a:ext cx="6172200" cy="4873625"/>
+            <a:off x="5063319" y="657103"/>
+            <a:ext cx="6483687" cy="5555904"/>
           </a:xfrm>
         </p:spPr>
         <p:txBody>
@@ -2565,16 +2621,19 @@
             </a:lvl9pPr>
           </a:lstStyle>
           <a:p>
-            <a:endParaRPr lang="da-DK"/>
-          </a:p>
-        </p:txBody>
-      </p:sp>
-      <p:sp>
-        <p:nvSpPr>
-          <p:cNvPr id="4" name="Pladsholder til tekst 3">
-            <a:extLst>
-              <a:ext uri="{FF2B5EF4-FFF2-40B4-BE49-F238E27FC236}">
-                <a16:creationId xmlns:a16="http://schemas.microsoft.com/office/drawing/2014/main" id="{77AB9268-49D8-2EA0-B8D0-A74086405A54}"/>
+            <a:r>
+              <a:rPr lang="en-US"/>
+              <a:t>Click icon to add picture</a:t>
+            </a:r>
+          </a:p>
+        </p:txBody>
+      </p:sp>
+      <p:sp>
+        <p:nvSpPr>
+          <p:cNvPr id="4" name="Text Placeholder 3">
+            <a:extLst>
+              <a:ext uri="{FF2B5EF4-FFF2-40B4-BE49-F238E27FC236}">
+                <a16:creationId xmlns:a16="http://schemas.microsoft.com/office/drawing/2014/main" id="{F32C4A61-EF2A-C5A5-B150-4448600B3937}"/>
               </a:ext>
             </a:extLst>
           </p:cNvPr>
@@ -2587,12 +2646,12 @@
         </p:nvSpPr>
         <p:spPr>
           <a:xfrm>
-            <a:off x="839788" y="2057400"/>
-            <a:ext cx="3932237" cy="3811588"/>
+            <a:off x="609601" y="2826137"/>
+            <a:ext cx="3585586" cy="3434638"/>
           </a:xfrm>
         </p:spPr>
         <p:txBody>
-          <a:bodyPr/>
+          <a:bodyPr anchor="b"/>
           <a:lstStyle>
             <a:lvl1pPr marL="0" indent="0">
               <a:buNone/>
@@ -2634,18 +2693,18 @@
           <a:p>
             <a:pPr lvl="0"/>
             <a:r>
-              <a:rPr lang="da-DK"/>
-              <a:t>Klik for at redigere teksttypografierne i masteren</a:t>
-            </a:r>
-          </a:p>
-        </p:txBody>
-      </p:sp>
-      <p:sp>
-        <p:nvSpPr>
-          <p:cNvPr id="5" name="Pladsholder til dato 4">
-            <a:extLst>
-              <a:ext uri="{FF2B5EF4-FFF2-40B4-BE49-F238E27FC236}">
-                <a16:creationId xmlns:a16="http://schemas.microsoft.com/office/drawing/2014/main" id="{F920BC5F-1349-068E-EDCF-5AB62174F07C}"/>
+              <a:rPr lang="en-US"/>
+              <a:t>Click to edit Master text styles</a:t>
+            </a:r>
+          </a:p>
+        </p:txBody>
+      </p:sp>
+      <p:sp>
+        <p:nvSpPr>
+          <p:cNvPr id="5" name="Date Placeholder 4">
+            <a:extLst>
+              <a:ext uri="{FF2B5EF4-FFF2-40B4-BE49-F238E27FC236}">
+                <a16:creationId xmlns:a16="http://schemas.microsoft.com/office/drawing/2014/main" id="{920B235E-39C7-4C78-20EF-DB48ECD9CB90}"/>
               </a:ext>
             </a:extLst>
           </p:cNvPr>
@@ -2661,20 +2720,20 @@
           <a:bodyPr/>
           <a:lstStyle/>
           <a:p>
-            <a:fld id="{199947DB-F300-3748-8A76-4E53A500EB2B}" type="datetimeFigureOut">
-              <a:rPr lang="da-DK" smtClean="0"/>
-              <a:t>12.02.2025</a:t>
+            <a:fld id="{92C5EAEF-6478-4102-8F5D-A5FE9FC97ACB}" type="datetime1">
+              <a:rPr lang="en-US" smtClean="0"/>
+              <a:t>2/12/25</a:t>
             </a:fld>
-            <a:endParaRPr lang="da-DK"/>
-          </a:p>
-        </p:txBody>
-      </p:sp>
-      <p:sp>
-        <p:nvSpPr>
-          <p:cNvPr id="6" name="Pladsholder til sidefod 5">
-            <a:extLst>
-              <a:ext uri="{FF2B5EF4-FFF2-40B4-BE49-F238E27FC236}">
-                <a16:creationId xmlns:a16="http://schemas.microsoft.com/office/drawing/2014/main" id="{58FE6017-578C-4D8F-F327-EE3B5A6C970D}"/>
+            <a:endParaRPr lang="en-US"/>
+          </a:p>
+        </p:txBody>
+      </p:sp>
+      <p:sp>
+        <p:nvSpPr>
+          <p:cNvPr id="6" name="Footer Placeholder 5">
+            <a:extLst>
+              <a:ext uri="{FF2B5EF4-FFF2-40B4-BE49-F238E27FC236}">
+                <a16:creationId xmlns:a16="http://schemas.microsoft.com/office/drawing/2014/main" id="{7FDC75DA-9A78-9AB9-7171-95A08CC51C56}"/>
               </a:ext>
             </a:extLst>
           </p:cNvPr>
@@ -2690,16 +2749,16 @@
           <a:bodyPr/>
           <a:lstStyle/>
           <a:p>
-            <a:endParaRPr lang="da-DK"/>
-          </a:p>
-        </p:txBody>
-      </p:sp>
-      <p:sp>
-        <p:nvSpPr>
-          <p:cNvPr id="7" name="Pladsholder til slidenummer 6">
-            <a:extLst>
-              <a:ext uri="{FF2B5EF4-FFF2-40B4-BE49-F238E27FC236}">
-                <a16:creationId xmlns:a16="http://schemas.microsoft.com/office/drawing/2014/main" id="{43708D1B-20F6-2F11-05E6-52655DB53070}"/>
+            <a:endParaRPr lang="en-US" dirty="0"/>
+          </a:p>
+        </p:txBody>
+      </p:sp>
+      <p:sp>
+        <p:nvSpPr>
+          <p:cNvPr id="7" name="Slide Number Placeholder 6">
+            <a:extLst>
+              <a:ext uri="{FF2B5EF4-FFF2-40B4-BE49-F238E27FC236}">
+                <a16:creationId xmlns:a16="http://schemas.microsoft.com/office/drawing/2014/main" id="{5EFE1A03-DCCB-53C7-DBFE-2AD55C90591B}"/>
               </a:ext>
             </a:extLst>
           </p:cNvPr>
@@ -2715,18 +2774,18 @@
           <a:bodyPr/>
           <a:lstStyle/>
           <a:p>
-            <a:fld id="{9A22B152-B901-C04A-BF3F-3B705CA2CB61}" type="slidenum">
-              <a:rPr lang="da-DK" smtClean="0"/>
+            <a:fld id="{CC057153-B650-4DEB-B370-79DDCFDCE934}" type="slidenum">
+              <a:rPr lang="en-US" smtClean="0"/>
               <a:t>‹nr.›</a:t>
             </a:fld>
-            <a:endParaRPr lang="da-DK"/>
+            <a:endParaRPr lang="en-US"/>
           </a:p>
         </p:txBody>
       </p:sp>
     </p:spTree>
     <p:extLst>
       <p:ext uri="{BB962C8B-B14F-4D97-AF65-F5344CB8AC3E}">
-        <p14:creationId xmlns:p14="http://schemas.microsoft.com/office/powerpoint/2010/main" val="3446639252"/>
+        <p14:creationId xmlns:p14="http://schemas.microsoft.com/office/powerpoint/2010/main" val="3830992215"/>
       </p:ext>
     </p:extLst>
   </p:cSld>
@@ -2760,10 +2819,10 @@
       </p:grpSpPr>
       <p:sp>
         <p:nvSpPr>
-          <p:cNvPr id="2" name="Pladsholder til titel 1">
-            <a:extLst>
-              <a:ext uri="{FF2B5EF4-FFF2-40B4-BE49-F238E27FC236}">
-                <a16:creationId xmlns:a16="http://schemas.microsoft.com/office/drawing/2014/main" id="{476F829F-95DE-6F92-FE13-C739224C6D9C}"/>
+          <p:cNvPr id="2" name="Title Placeholder 1">
+            <a:extLst>
+              <a:ext uri="{FF2B5EF4-FFF2-40B4-BE49-F238E27FC236}">
+                <a16:creationId xmlns:a16="http://schemas.microsoft.com/office/drawing/2014/main" id="{475BFB69-9245-EC58-F1DE-FEB625BD336A}"/>
               </a:ext>
             </a:extLst>
           </p:cNvPr>
@@ -2776,32 +2835,33 @@
         </p:nvSpPr>
         <p:spPr>
           <a:xfrm>
-            <a:off x="838200" y="365125"/>
-            <a:ext cx="10515600" cy="1325563"/>
+            <a:off x="612648" y="548640"/>
+            <a:ext cx="10653578" cy="1132258"/>
           </a:xfrm>
           <a:prstGeom prst="rect">
             <a:avLst/>
           </a:prstGeom>
         </p:spPr>
         <p:txBody>
-          <a:bodyPr vert="horz" lIns="91440" tIns="45720" rIns="91440" bIns="45720" rtlCol="0" anchor="ctr">
+          <a:bodyPr vert="horz" lIns="91440" tIns="45720" rIns="91440" bIns="45720" rtlCol="0" anchor="t">
             <a:normAutofit/>
           </a:bodyPr>
           <a:lstStyle/>
           <a:p>
             <a:r>
-              <a:rPr lang="da-DK"/>
-              <a:t>Klik for at redigere titeltypografien i masteren</a:t>
-            </a:r>
-          </a:p>
-        </p:txBody>
-      </p:sp>
-      <p:sp>
-        <p:nvSpPr>
-          <p:cNvPr id="3" name="Pladsholder til tekst 2">
-            <a:extLst>
-              <a:ext uri="{FF2B5EF4-FFF2-40B4-BE49-F238E27FC236}">
-                <a16:creationId xmlns:a16="http://schemas.microsoft.com/office/drawing/2014/main" id="{4C1C65BB-BDCD-B585-2B94-10C897F4EF97}"/>
+              <a:rPr lang="en-US"/>
+              <a:t>Click to edit Master title style</a:t>
+            </a:r>
+            <a:endParaRPr lang="en-US" dirty="0"/>
+          </a:p>
+        </p:txBody>
+      </p:sp>
+      <p:sp>
+        <p:nvSpPr>
+          <p:cNvPr id="3" name="Text Placeholder 2">
+            <a:extLst>
+              <a:ext uri="{FF2B5EF4-FFF2-40B4-BE49-F238E27FC236}">
+                <a16:creationId xmlns:a16="http://schemas.microsoft.com/office/drawing/2014/main" id="{5516AFD5-5144-C460-0CA4-644BC4A93C02}"/>
               </a:ext>
             </a:extLst>
           </p:cNvPr>
@@ -2814,8 +2874,8 @@
         </p:nvSpPr>
         <p:spPr>
           <a:xfrm>
-            <a:off x="838200" y="1825625"/>
-            <a:ext cx="10515600" cy="4351338"/>
+            <a:off x="612647" y="1715532"/>
+            <a:ext cx="10653579" cy="4593828"/>
           </a:xfrm>
           <a:prstGeom prst="rect">
             <a:avLst/>
@@ -2829,46 +2889,47 @@
           <a:p>
             <a:pPr lvl="0"/>
             <a:r>
-              <a:rPr lang="da-DK"/>
-              <a:t>Klik for at redigere teksttypografierne i masteren</a:t>
+              <a:rPr lang="en-US"/>
+              <a:t>Click to edit Master text styles</a:t>
             </a:r>
           </a:p>
           <a:p>
             <a:pPr lvl="1"/>
             <a:r>
-              <a:rPr lang="da-DK"/>
-              <a:t>Andet niveau</a:t>
+              <a:rPr lang="en-US"/>
+              <a:t>Second level</a:t>
             </a:r>
           </a:p>
           <a:p>
             <a:pPr lvl="2"/>
             <a:r>
-              <a:rPr lang="da-DK"/>
-              <a:t>Tredje niveau</a:t>
+              <a:rPr lang="en-US"/>
+              <a:t>Third level</a:t>
             </a:r>
           </a:p>
           <a:p>
             <a:pPr lvl="3"/>
             <a:r>
-              <a:rPr lang="da-DK"/>
-              <a:t>Fjerde niveau</a:t>
+              <a:rPr lang="en-US"/>
+              <a:t>Fourth level</a:t>
             </a:r>
           </a:p>
           <a:p>
             <a:pPr lvl="4"/>
             <a:r>
-              <a:rPr lang="da-DK"/>
-              <a:t>Femte niveau</a:t>
-            </a:r>
-          </a:p>
-        </p:txBody>
-      </p:sp>
-      <p:sp>
-        <p:nvSpPr>
-          <p:cNvPr id="4" name="Pladsholder til dato 3">
-            <a:extLst>
-              <a:ext uri="{FF2B5EF4-FFF2-40B4-BE49-F238E27FC236}">
-                <a16:creationId xmlns:a16="http://schemas.microsoft.com/office/drawing/2014/main" id="{F2802800-15FC-B7B5-53B9-D6A3741748AE}"/>
+              <a:rPr lang="en-US"/>
+              <a:t>Fifth level</a:t>
+            </a:r>
+            <a:endParaRPr lang="en-US" dirty="0"/>
+          </a:p>
+        </p:txBody>
+      </p:sp>
+      <p:sp>
+        <p:nvSpPr>
+          <p:cNvPr id="4" name="Date Placeholder 3">
+            <a:extLst>
+              <a:ext uri="{FF2B5EF4-FFF2-40B4-BE49-F238E27FC236}">
+                <a16:creationId xmlns:a16="http://schemas.microsoft.com/office/drawing/2014/main" id="{3995753E-AF8A-7E04-8A1A-205B755A0215}"/>
               </a:ext>
             </a:extLst>
           </p:cNvPr>
@@ -2881,8 +2942,8 @@
         </p:nvSpPr>
         <p:spPr>
           <a:xfrm>
-            <a:off x="838200" y="6356350"/>
-            <a:ext cx="2743200" cy="365125"/>
+            <a:off x="137160" y="6453002"/>
+            <a:ext cx="3494314" cy="365125"/>
           </a:xfrm>
           <a:prstGeom prst="rect">
             <a:avLst/>
@@ -2892,30 +2953,28 @@
           <a:bodyPr vert="horz" lIns="91440" tIns="45720" rIns="91440" bIns="45720" rtlCol="0" anchor="ctr"/>
           <a:lstStyle>
             <a:lvl1pPr algn="l">
-              <a:defRPr sz="1200">
+              <a:defRPr sz="900">
                 <a:solidFill>
-                  <a:schemeClr val="tx1">
-                    <a:tint val="82000"/>
-                  </a:schemeClr>
+                  <a:schemeClr val="tx1"/>
                 </a:solidFill>
               </a:defRPr>
             </a:lvl1pPr>
           </a:lstStyle>
           <a:p>
-            <a:fld id="{199947DB-F300-3748-8A76-4E53A500EB2B}" type="datetimeFigureOut">
-              <a:rPr lang="da-DK" smtClean="0"/>
-              <a:t>12.02.2025</a:t>
+            <a:fld id="{67F45AC6-C491-4585-A584-9CE2AF7D5500}" type="datetime1">
+              <a:rPr lang="en-US" smtClean="0"/>
+              <a:t>2/12/25</a:t>
             </a:fld>
-            <a:endParaRPr lang="da-DK"/>
-          </a:p>
-        </p:txBody>
-      </p:sp>
-      <p:sp>
-        <p:nvSpPr>
-          <p:cNvPr id="5" name="Pladsholder til sidefod 4">
-            <a:extLst>
-              <a:ext uri="{FF2B5EF4-FFF2-40B4-BE49-F238E27FC236}">
-                <a16:creationId xmlns:a16="http://schemas.microsoft.com/office/drawing/2014/main" id="{D25D7F46-E7CE-302E-F612-CB0144F8C30E}"/>
+            <a:endParaRPr lang="en-US"/>
+          </a:p>
+        </p:txBody>
+      </p:sp>
+      <p:sp>
+        <p:nvSpPr>
+          <p:cNvPr id="5" name="Footer Placeholder 4">
+            <a:extLst>
+              <a:ext uri="{FF2B5EF4-FFF2-40B4-BE49-F238E27FC236}">
+                <a16:creationId xmlns:a16="http://schemas.microsoft.com/office/drawing/2014/main" id="{D4E1B7C8-DA74-800B-EE14-A39E9DB32DE4}"/>
               </a:ext>
             </a:extLst>
           </p:cNvPr>
@@ -2928,8 +2987,8 @@
         </p:nvSpPr>
         <p:spPr>
           <a:xfrm>
-            <a:off x="4038600" y="6356350"/>
-            <a:ext cx="4114800" cy="365125"/>
+            <a:off x="8876521" y="6453002"/>
+            <a:ext cx="2805405" cy="365125"/>
           </a:xfrm>
           <a:prstGeom prst="rect">
             <a:avLst/>
@@ -2938,27 +2997,25 @@
         <p:txBody>
           <a:bodyPr vert="horz" lIns="91440" tIns="45720" rIns="91440" bIns="45720" rtlCol="0" anchor="ctr"/>
           <a:lstStyle>
-            <a:lvl1pPr algn="ctr">
-              <a:defRPr sz="1200">
+            <a:lvl1pPr algn="r">
+              <a:defRPr sz="900">
                 <a:solidFill>
-                  <a:schemeClr val="tx1">
-                    <a:tint val="82000"/>
-                  </a:schemeClr>
+                  <a:schemeClr val="tx1"/>
                 </a:solidFill>
               </a:defRPr>
             </a:lvl1pPr>
           </a:lstStyle>
           <a:p>
-            <a:endParaRPr lang="da-DK"/>
-          </a:p>
-        </p:txBody>
-      </p:sp>
-      <p:sp>
-        <p:nvSpPr>
-          <p:cNvPr id="6" name="Pladsholder til slidenummer 5">
-            <a:extLst>
-              <a:ext uri="{FF2B5EF4-FFF2-40B4-BE49-F238E27FC236}">
-                <a16:creationId xmlns:a16="http://schemas.microsoft.com/office/drawing/2014/main" id="{0913390B-A744-CDD6-97B1-6438309E2C03}"/>
+            <a:endParaRPr lang="en-US" dirty="0"/>
+          </a:p>
+        </p:txBody>
+      </p:sp>
+      <p:sp>
+        <p:nvSpPr>
+          <p:cNvPr id="6" name="Slide Number Placeholder 5">
+            <a:extLst>
+              <a:ext uri="{FF2B5EF4-FFF2-40B4-BE49-F238E27FC236}">
+                <a16:creationId xmlns:a16="http://schemas.microsoft.com/office/drawing/2014/main" id="{7AC1647D-0DF0-CA1B-F723-EF7B8F508DB7}"/>
               </a:ext>
             </a:extLst>
           </p:cNvPr>
@@ -2971,8 +3028,8 @@
         </p:nvSpPr>
         <p:spPr>
           <a:xfrm>
-            <a:off x="8610600" y="6356350"/>
-            <a:ext cx="2743200" cy="365125"/>
+            <a:off x="11632162" y="6453002"/>
+            <a:ext cx="429207" cy="365125"/>
           </a:xfrm>
           <a:prstGeom prst="rect">
             <a:avLst/>
@@ -2982,45 +3039,44 @@
           <a:bodyPr vert="horz" lIns="91440" tIns="45720" rIns="91440" bIns="45720" rtlCol="0" anchor="ctr"/>
           <a:lstStyle>
             <a:lvl1pPr algn="r">
-              <a:defRPr sz="1200">
+              <a:defRPr sz="900">
                 <a:solidFill>
-                  <a:schemeClr val="tx1">
-                    <a:tint val="82000"/>
-                  </a:schemeClr>
+                  <a:schemeClr val="tx1"/>
                 </a:solidFill>
               </a:defRPr>
             </a:lvl1pPr>
           </a:lstStyle>
           <a:p>
-            <a:fld id="{9A22B152-B901-C04A-BF3F-3B705CA2CB61}" type="slidenum">
-              <a:rPr lang="da-DK" smtClean="0"/>
+            <a:fld id="{CC057153-B650-4DEB-B370-79DDCFDCE934}" type="slidenum">
+              <a:rPr lang="en-US" smtClean="0"/>
               <a:t>‹nr.›</a:t>
             </a:fld>
-            <a:endParaRPr lang="da-DK"/>
+            <a:endParaRPr lang="en-US"/>
           </a:p>
         </p:txBody>
       </p:sp>
     </p:spTree>
     <p:extLst>
       <p:ext uri="{BB962C8B-B14F-4D97-AF65-F5344CB8AC3E}">
-        <p14:creationId xmlns:p14="http://schemas.microsoft.com/office/powerpoint/2010/main" val="3839700953"/>
+        <p14:creationId xmlns:p14="http://schemas.microsoft.com/office/powerpoint/2010/main" val="2132017260"/>
       </p:ext>
     </p:extLst>
   </p:cSld>
   <p:clrMap bg1="lt1" tx1="dk1" bg2="lt2" tx2="dk2" accent1="accent1" accent2="accent2" accent3="accent3" accent4="accent4" accent5="accent5" accent6="accent6" hlink="hlink" folHlink="folHlink"/>
   <p:sldLayoutIdLst>
-    <p:sldLayoutId id="2147483649" r:id="rId1"/>
-    <p:sldLayoutId id="2147483650" r:id="rId2"/>
-    <p:sldLayoutId id="2147483651" r:id="rId3"/>
-    <p:sldLayoutId id="2147483652" r:id="rId4"/>
-    <p:sldLayoutId id="2147483653" r:id="rId5"/>
-    <p:sldLayoutId id="2147483654" r:id="rId6"/>
-    <p:sldLayoutId id="2147483655" r:id="rId7"/>
-    <p:sldLayoutId id="2147483656" r:id="rId8"/>
-    <p:sldLayoutId id="2147483657" r:id="rId9"/>
-    <p:sldLayoutId id="2147483658" r:id="rId10"/>
-    <p:sldLayoutId id="2147483659" r:id="rId11"/>
+    <p:sldLayoutId id="2147483716" r:id="rId1"/>
+    <p:sldLayoutId id="2147483717" r:id="rId2"/>
+    <p:sldLayoutId id="2147483718" r:id="rId3"/>
+    <p:sldLayoutId id="2147483719" r:id="rId4"/>
+    <p:sldLayoutId id="2147483720" r:id="rId5"/>
+    <p:sldLayoutId id="2147483726" r:id="rId6"/>
+    <p:sldLayoutId id="2147483721" r:id="rId7"/>
+    <p:sldLayoutId id="2147483722" r:id="rId8"/>
+    <p:sldLayoutId id="2147483723" r:id="rId9"/>
+    <p:sldLayoutId id="2147483725" r:id="rId10"/>
+    <p:sldLayoutId id="2147483724" r:id="rId11"/>
   </p:sldLayoutIdLst>
+  <p:hf sldNum="0" hdr="0" ftr="0" dt="0"/>
   <p:txStyles>
     <p:titleStyle>
       <a:lvl1pPr algn="l" defTabSz="914400" rtl="0" eaLnBrk="1" latinLnBrk="0" hangingPunct="1">
@@ -3031,7 +3087,7 @@
           <a:spcPct val="0"/>
         </a:spcBef>
         <a:buNone/>
-        <a:defRPr sz="4400" kern="1200">
+        <a:defRPr sz="3600" b="1" kern="1200">
           <a:solidFill>
             <a:schemeClr val="tx1"/>
           </a:solidFill>
@@ -3044,46 +3100,10 @@
     <p:bodyStyle>
       <a:lvl1pPr marL="228600" indent="-228600" algn="l" defTabSz="914400" rtl="0" eaLnBrk="1" latinLnBrk="0" hangingPunct="1">
         <a:lnSpc>
-          <a:spcPct val="90000"/>
+          <a:spcPct val="120000"/>
         </a:lnSpc>
         <a:spcBef>
           <a:spcPts val="1000"/>
-        </a:spcBef>
-        <a:buFont typeface="Arial" panose="020B0604020202020204" pitchFamily="34" charset="0"/>
-        <a:buChar char="•"/>
-        <a:defRPr sz="2800" kern="1200">
-          <a:solidFill>
-            <a:schemeClr val="tx1"/>
-          </a:solidFill>
-          <a:latin typeface="+mn-lt"/>
-          <a:ea typeface="+mn-ea"/>
-          <a:cs typeface="+mn-cs"/>
-        </a:defRPr>
-      </a:lvl1pPr>
-      <a:lvl2pPr marL="685800" indent="-228600" algn="l" defTabSz="914400" rtl="0" eaLnBrk="1" latinLnBrk="0" hangingPunct="1">
-        <a:lnSpc>
-          <a:spcPct val="90000"/>
-        </a:lnSpc>
-        <a:spcBef>
-          <a:spcPts val="500"/>
-        </a:spcBef>
-        <a:buFont typeface="Arial" panose="020B0604020202020204" pitchFamily="34" charset="0"/>
-        <a:buChar char="•"/>
-        <a:defRPr sz="2400" kern="1200">
-          <a:solidFill>
-            <a:schemeClr val="tx1"/>
-          </a:solidFill>
-          <a:latin typeface="+mn-lt"/>
-          <a:ea typeface="+mn-ea"/>
-          <a:cs typeface="+mn-cs"/>
-        </a:defRPr>
-      </a:lvl2pPr>
-      <a:lvl3pPr marL="1143000" indent="-228600" algn="l" defTabSz="914400" rtl="0" eaLnBrk="1" latinLnBrk="0" hangingPunct="1">
-        <a:lnSpc>
-          <a:spcPct val="90000"/>
-        </a:lnSpc>
-        <a:spcBef>
-          <a:spcPts val="500"/>
         </a:spcBef>
         <a:buFont typeface="Arial" panose="020B0604020202020204" pitchFamily="34" charset="0"/>
         <a:buChar char="•"/>
@@ -3095,10 +3115,10 @@
           <a:ea typeface="+mn-ea"/>
           <a:cs typeface="+mn-cs"/>
         </a:defRPr>
-      </a:lvl3pPr>
-      <a:lvl4pPr marL="1600200" indent="-228600" algn="l" defTabSz="914400" rtl="0" eaLnBrk="1" latinLnBrk="0" hangingPunct="1">
+      </a:lvl1pPr>
+      <a:lvl2pPr marL="457200" indent="-228600" algn="l" defTabSz="914400" rtl="0" eaLnBrk="1" latinLnBrk="0" hangingPunct="1">
         <a:lnSpc>
-          <a:spcPct val="90000"/>
+          <a:spcPct val="120000"/>
         </a:lnSpc>
         <a:spcBef>
           <a:spcPts val="500"/>
@@ -3113,17 +3133,53 @@
           <a:ea typeface="+mn-ea"/>
           <a:cs typeface="+mn-cs"/>
         </a:defRPr>
-      </a:lvl4pPr>
-      <a:lvl5pPr marL="2057400" indent="-228600" algn="l" defTabSz="914400" rtl="0" eaLnBrk="1" latinLnBrk="0" hangingPunct="1">
+      </a:lvl2pPr>
+      <a:lvl3pPr marL="685800" indent="-228600" algn="l" defTabSz="914400" rtl="0" eaLnBrk="1" latinLnBrk="0" hangingPunct="1">
         <a:lnSpc>
-          <a:spcPct val="90000"/>
+          <a:spcPct val="120000"/>
         </a:lnSpc>
         <a:spcBef>
           <a:spcPts val="500"/>
         </a:spcBef>
         <a:buFont typeface="Arial" panose="020B0604020202020204" pitchFamily="34" charset="0"/>
         <a:buChar char="•"/>
-        <a:defRPr sz="1800" kern="1200">
+        <a:defRPr sz="1600" kern="1200">
+          <a:solidFill>
+            <a:schemeClr val="tx1"/>
+          </a:solidFill>
+          <a:latin typeface="+mn-lt"/>
+          <a:ea typeface="+mn-ea"/>
+          <a:cs typeface="+mn-cs"/>
+        </a:defRPr>
+      </a:lvl3pPr>
+      <a:lvl4pPr marL="914400" indent="-228600" algn="l" defTabSz="914400" rtl="0" eaLnBrk="1" latinLnBrk="0" hangingPunct="1">
+        <a:lnSpc>
+          <a:spcPct val="120000"/>
+        </a:lnSpc>
+        <a:spcBef>
+          <a:spcPts val="500"/>
+        </a:spcBef>
+        <a:buFont typeface="Arial" panose="020B0604020202020204" pitchFamily="34" charset="0"/>
+        <a:buChar char="•"/>
+        <a:defRPr sz="1400" kern="1200">
+          <a:solidFill>
+            <a:schemeClr val="tx1"/>
+          </a:solidFill>
+          <a:latin typeface="+mn-lt"/>
+          <a:ea typeface="+mn-ea"/>
+          <a:cs typeface="+mn-cs"/>
+        </a:defRPr>
+      </a:lvl4pPr>
+      <a:lvl5pPr marL="1143000" indent="-228600" algn="l" defTabSz="914400" rtl="0" eaLnBrk="1" latinLnBrk="0" hangingPunct="1">
+        <a:lnSpc>
+          <a:spcPct val="120000"/>
+        </a:lnSpc>
+        <a:spcBef>
+          <a:spcPts val="500"/>
+        </a:spcBef>
+        <a:buFont typeface="Arial" panose="020B0604020202020204" pitchFamily="34" charset="0"/>
+        <a:buChar char="•"/>
+        <a:defRPr sz="1200" kern="1200">
           <a:solidFill>
             <a:schemeClr val="tx1"/>
           </a:solidFill>
@@ -3207,7 +3263,7 @@
     </p:bodyStyle>
     <p:otherStyle>
       <a:defPPr>
-        <a:defRPr lang="da-DK"/>
+        <a:defRPr lang="en-US"/>
       </a:defPPr>
       <a:lvl1pPr marL="0" algn="l" defTabSz="914400" rtl="0" eaLnBrk="1" latinLnBrk="0" hangingPunct="1">
         <a:defRPr sz="1800" kern="1200">
@@ -3307,6 +3363,14 @@
 <file path=ppt/slides/slide1.xml><?xml version="1.0" encoding="utf-8"?>
 <p:sld xmlns:a="http://schemas.openxmlformats.org/drawingml/2006/main" xmlns:r="http://schemas.openxmlformats.org/officeDocument/2006/relationships" xmlns:p="http://schemas.openxmlformats.org/presentationml/2006/main">
   <p:cSld>
+    <p:bg>
+      <p:bgPr>
+        <a:solidFill>
+          <a:schemeClr val="bg1"/>
+        </a:solidFill>
+        <a:effectLst/>
+      </p:bgPr>
+    </p:bg>
     <p:spTree>
       <p:nvGrpSpPr>
         <p:cNvPr id="1" name=""/>
@@ -3321,6 +3385,176 @@
           <a:chExt cx="0" cy="0"/>
         </a:xfrm>
       </p:grpSpPr>
+      <p:sp useBgFill="1">
+        <p:nvSpPr>
+          <p:cNvPr id="9" name="Rectangle 8">
+            <a:extLst>
+              <a:ext uri="{FF2B5EF4-FFF2-40B4-BE49-F238E27FC236}">
+                <a16:creationId xmlns:a16="http://schemas.microsoft.com/office/drawing/2014/main" id="{7A875D55-4A80-43E9-38F6-27E3664939B0}"/>
+              </a:ext>
+              <a:ext uri="{C183D7F6-B498-43B3-948B-1728B52AA6E4}">
+                <adec:decorative xmlns:adec="http://schemas.microsoft.com/office/drawing/2017/decorative" val="1"/>
+              </a:ext>
+            </a:extLst>
+          </p:cNvPr>
+          <p:cNvSpPr>
+            <a:spLocks noGrp="1" noRot="1" noChangeAspect="1" noMove="1" noResize="1" noEditPoints="1" noAdjustHandles="1" noChangeArrowheads="1" noChangeShapeType="1" noTextEdit="1"/>
+          </p:cNvSpPr>
+          <p:nvPr>
+            <p:extLst>
+              <p:ext uri="{386F3935-93C4-4BCD-93E2-E3B085C9AB24}">
+                <p16:designElem xmlns:p16="http://schemas.microsoft.com/office/powerpoint/2015/main" val="1"/>
+              </p:ext>
+            </p:extLst>
+          </p:nvPr>
+        </p:nvSpPr>
+        <p:spPr>
+          <a:xfrm>
+            <a:off x="0" y="0"/>
+            <a:ext cx="12192000" cy="6858000"/>
+          </a:xfrm>
+          <a:prstGeom prst="rect">
+            <a:avLst/>
+          </a:prstGeom>
+          <a:ln w="12700" cap="flat" cmpd="sng" algn="ctr">
+            <a:noFill/>
+            <a:prstDash val="solid"/>
+            <a:miter lim="800000"/>
+          </a:ln>
+          <a:effectLst/>
+          <a:extLst>
+            <a:ext uri="{91240B29-F687-4F45-9708-019B960494DF}">
+              <a14:hiddenLine xmlns:a14="http://schemas.microsoft.com/office/drawing/2010/main" w="12700" cap="flat" cmpd="sng" algn="ctr">
+                <a:solidFill>
+                  <a:schemeClr val="accent1">
+                    <a:shade val="15000"/>
+                  </a:schemeClr>
+                </a:solidFill>
+                <a:prstDash val="solid"/>
+                <a:miter lim="800000"/>
+              </a14:hiddenLine>
+            </a:ext>
+          </a:extLst>
+        </p:spPr>
+        <p:style>
+          <a:lnRef idx="2">
+            <a:schemeClr val="accent1">
+              <a:shade val="15000"/>
+            </a:schemeClr>
+          </a:lnRef>
+          <a:fillRef idx="1">
+            <a:schemeClr val="accent1"/>
+          </a:fillRef>
+          <a:effectRef idx="0">
+            <a:schemeClr val="accent1"/>
+          </a:effectRef>
+          <a:fontRef idx="minor">
+            <a:schemeClr val="lt1"/>
+          </a:fontRef>
+        </p:style>
+        <p:txBody>
+          <a:bodyPr rtlCol="0" anchor="ctr"/>
+          <a:lstStyle/>
+          <a:p>
+            <a:pPr algn="ctr"/>
+            <a:endParaRPr lang="en-US"/>
+          </a:p>
+        </p:txBody>
+      </p:sp>
+      <p:sp useBgFill="1">
+        <p:nvSpPr>
+          <p:cNvPr id="11" name="Rectangle 10">
+            <a:extLst>
+              <a:ext uri="{FF2B5EF4-FFF2-40B4-BE49-F238E27FC236}">
+                <a16:creationId xmlns:a16="http://schemas.microsoft.com/office/drawing/2014/main" id="{3D572980-FB84-8C29-1FAC-FAC5ECE29A39}"/>
+              </a:ext>
+              <a:ext uri="{C183D7F6-B498-43B3-948B-1728B52AA6E4}">
+                <adec:decorative xmlns:adec="http://schemas.microsoft.com/office/drawing/2017/decorative" val="1"/>
+              </a:ext>
+            </a:extLst>
+          </p:cNvPr>
+          <p:cNvSpPr>
+            <a:spLocks noGrp="1" noRot="1" noChangeAspect="1" noMove="1" noResize="1" noEditPoints="1" noAdjustHandles="1" noChangeArrowheads="1" noChangeShapeType="1" noTextEdit="1"/>
+          </p:cNvSpPr>
+          <p:nvPr>
+            <p:extLst>
+              <p:ext uri="{386F3935-93C4-4BCD-93E2-E3B085C9AB24}">
+                <p16:designElem xmlns:p16="http://schemas.microsoft.com/office/powerpoint/2015/main" val="1"/>
+              </p:ext>
+            </p:extLst>
+          </p:nvPr>
+        </p:nvSpPr>
+        <p:spPr>
+          <a:xfrm>
+            <a:off x="0" y="0"/>
+            <a:ext cx="12192000" cy="6858000"/>
+          </a:xfrm>
+          <a:prstGeom prst="rect">
+            <a:avLst/>
+          </a:prstGeom>
+          <a:ln w="12700" cap="flat" cmpd="sng" algn="ctr">
+            <a:noFill/>
+            <a:prstDash val="solid"/>
+            <a:miter lim="800000"/>
+          </a:ln>
+          <a:effectLst/>
+        </p:spPr>
+        <p:style>
+          <a:lnRef idx="2">
+            <a:schemeClr val="accent1">
+              <a:shade val="50000"/>
+            </a:schemeClr>
+          </a:lnRef>
+          <a:fillRef idx="1">
+            <a:schemeClr val="accent1"/>
+          </a:fillRef>
+          <a:effectRef idx="0">
+            <a:schemeClr val="accent1"/>
+          </a:effectRef>
+          <a:fontRef idx="minor">
+            <a:schemeClr val="lt1"/>
+          </a:fontRef>
+        </p:style>
+        <p:txBody>
+          <a:bodyPr rtlCol="0" anchor="ctr"/>
+          <a:lstStyle/>
+          <a:p>
+            <a:pPr algn="ctr"/>
+            <a:endParaRPr lang="en-US"/>
+          </a:p>
+        </p:txBody>
+      </p:sp>
+      <p:pic>
+        <p:nvPicPr>
+          <p:cNvPr id="4" name="Picture 3">
+            <a:extLst>
+              <a:ext uri="{FF2B5EF4-FFF2-40B4-BE49-F238E27FC236}">
+                <a16:creationId xmlns:a16="http://schemas.microsoft.com/office/drawing/2014/main" id="{884B36BD-D097-F2A2-22D1-3BAB15C40D7A}"/>
+              </a:ext>
+            </a:extLst>
+          </p:cNvPr>
+          <p:cNvPicPr>
+            <a:picLocks noChangeAspect="1"/>
+          </p:cNvPicPr>
+          <p:nvPr/>
+        </p:nvPicPr>
+        <p:blipFill>
+          <a:blip r:embed="rId2">
+            <a:alphaModFix amt="60000"/>
+          </a:blip>
+          <a:srcRect l="3111" r="1" b="1"/>
+          <a:stretch/>
+        </p:blipFill>
+        <p:spPr>
+          <a:xfrm>
+            <a:off x="1" y="1"/>
+            <a:ext cx="12192000" cy="6857999"/>
+          </a:xfrm>
+          <a:prstGeom prst="rect">
+            <a:avLst/>
+          </a:prstGeom>
+        </p:spPr>
+      </p:pic>
       <p:sp>
         <p:nvSpPr>
           <p:cNvPr id="2" name="Titel 1">
@@ -3337,13 +3571,24 @@
             <p:ph type="ctrTitle"/>
           </p:nvPr>
         </p:nvSpPr>
-        <p:spPr/>
-        <p:txBody>
-          <a:bodyPr/>
-          <a:lstStyle/>
-          <a:p>
-            <a:r>
-              <a:rPr lang="da-DK" dirty="0"/>
+        <p:spPr>
+          <a:xfrm>
+            <a:off x="2301923" y="1482602"/>
+            <a:ext cx="7588155" cy="2236264"/>
+          </a:xfrm>
+        </p:spPr>
+        <p:txBody>
+          <a:bodyPr>
+            <a:normAutofit/>
+          </a:bodyPr>
+          <a:lstStyle/>
+          <a:p>
+            <a:r>
+              <a:rPr lang="da-DK" sz="5400">
+                <a:solidFill>
+                  <a:srgbClr val="FFFFFF"/>
+                </a:solidFill>
+              </a:rPr>
               <a:t>Dataprojekt</a:t>
             </a:r>
           </a:p>
@@ -3365,12 +3610,36 @@
             <p:ph type="subTitle" idx="1"/>
           </p:nvPr>
         </p:nvSpPr>
-        <p:spPr/>
-        <p:txBody>
-          <a:bodyPr/>
-          <a:lstStyle/>
-          <a:p>
-            <a:endParaRPr lang="da-DK"/>
+        <p:spPr>
+          <a:xfrm>
+            <a:off x="2301923" y="3793937"/>
+            <a:ext cx="7588155" cy="1414091"/>
+          </a:xfrm>
+        </p:spPr>
+        <p:txBody>
+          <a:bodyPr>
+            <a:normAutofit/>
+          </a:bodyPr>
+          <a:lstStyle/>
+          <a:p>
+            <a:r>
+              <a:rPr lang="da-DK" sz="2200">
+                <a:solidFill>
+                  <a:srgbClr val="FFFFFF"/>
+                </a:solidFill>
+              </a:rPr>
+              <a:t>Emilie, Tue og Casper</a:t>
+            </a:r>
+          </a:p>
+          <a:p>
+            <a:r>
+              <a:rPr lang="da-DK" sz="2200">
+                <a:solidFill>
+                  <a:srgbClr val="FFFFFF"/>
+                </a:solidFill>
+              </a:rPr>
+              <a:t>De Hårde Knapper</a:t>
+            </a:r>
           </a:p>
         </p:txBody>
       </p:sp>
@@ -3382,156 +3651,265 @@
     </p:extLst>
   </p:cSld>
   <p:clrMapOvr>
-    <a:masterClrMapping/>
+    <a:overrideClrMapping bg1="dk1" tx1="lt1" bg2="dk2" tx2="lt2" accent1="accent1" accent2="accent2" accent3="accent3" accent4="accent4" accent5="accent5" accent6="accent6" hlink="hlink" folHlink="folHlink"/>
   </p:clrMapOvr>
+  <p:timing>
+    <p:tnLst>
+      <p:par>
+        <p:cTn id="1" dur="indefinite" restart="never" nodeType="tmRoot">
+          <p:childTnLst>
+            <p:seq concurrent="1" nextAc="seek">
+              <p:cTn id="2" dur="indefinite" nodeType="mainSeq">
+                <p:childTnLst>
+                  <p:par>
+                    <p:cTn id="3" fill="hold">
+                      <p:stCondLst>
+                        <p:cond delay="indefinite"/>
+                        <p:cond evt="onBegin" delay="0">
+                          <p:tn val="2"/>
+                        </p:cond>
+                      </p:stCondLst>
+                      <p:childTnLst>
+                        <p:par>
+                          <p:cTn id="4" fill="hold">
+                            <p:stCondLst>
+                              <p:cond delay="0"/>
+                            </p:stCondLst>
+                            <p:childTnLst>
+                              <p:par>
+                                <p:cTn id="5" presetID="10" presetClass="entr" presetSubtype="0" fill="hold" grpId="0" nodeType="withEffect">
+                                  <p:stCondLst>
+                                    <p:cond delay="1000"/>
+                                  </p:stCondLst>
+                                  <p:iterate>
+                                    <p:tmPct val="10000"/>
+                                  </p:iterate>
+                                  <p:childTnLst>
+                                    <p:set>
+                                      <p:cBhvr>
+                                        <p:cTn id="6" dur="1" fill="hold">
+                                          <p:stCondLst>
+                                            <p:cond delay="0"/>
+                                          </p:stCondLst>
+                                        </p:cTn>
+                                        <p:tgtEl>
+                                          <p:spTgt spid="2"/>
+                                        </p:tgtEl>
+                                        <p:attrNameLst>
+                                          <p:attrName>style.visibility</p:attrName>
+                                        </p:attrNameLst>
+                                      </p:cBhvr>
+                                      <p:to>
+                                        <p:strVal val="visible"/>
+                                      </p:to>
+                                    </p:set>
+                                    <p:animEffect transition="in" filter="fade">
+                                      <p:cBhvr>
+                                        <p:cTn id="7" dur="700"/>
+                                        <p:tgtEl>
+                                          <p:spTgt spid="2"/>
+                                        </p:tgtEl>
+                                      </p:cBhvr>
+                                    </p:animEffect>
+                                  </p:childTnLst>
+                                </p:cTn>
+                              </p:par>
+                              <p:par>
+                                <p:cTn id="8" presetID="10" presetClass="entr" presetSubtype="0" fill="hold" grpId="0" nodeType="withEffect">
+                                  <p:stCondLst>
+                                    <p:cond delay="1500"/>
+                                  </p:stCondLst>
+                                  <p:iterate>
+                                    <p:tmPct val="10000"/>
+                                  </p:iterate>
+                                  <p:childTnLst>
+                                    <p:set>
+                                      <p:cBhvr>
+                                        <p:cTn id="9" dur="1" fill="hold">
+                                          <p:stCondLst>
+                                            <p:cond delay="0"/>
+                                          </p:stCondLst>
+                                        </p:cTn>
+                                        <p:tgtEl>
+                                          <p:spTgt spid="3">
+                                            <p:txEl>
+                                              <p:pRg st="0" end="0"/>
+                                            </p:txEl>
+                                          </p:spTgt>
+                                        </p:tgtEl>
+                                        <p:attrNameLst>
+                                          <p:attrName>style.visibility</p:attrName>
+                                        </p:attrNameLst>
+                                      </p:cBhvr>
+                                      <p:to>
+                                        <p:strVal val="visible"/>
+                                      </p:to>
+                                    </p:set>
+                                    <p:animEffect transition="in" filter="fade">
+                                      <p:cBhvr>
+                                        <p:cTn id="10" dur="700"/>
+                                        <p:tgtEl>
+                                          <p:spTgt spid="3">
+                                            <p:txEl>
+                                              <p:pRg st="0" end="0"/>
+                                            </p:txEl>
+                                          </p:spTgt>
+                                        </p:tgtEl>
+                                      </p:cBhvr>
+                                    </p:animEffect>
+                                  </p:childTnLst>
+                                </p:cTn>
+                              </p:par>
+                            </p:childTnLst>
+                          </p:cTn>
+                        </p:par>
+                      </p:childTnLst>
+                    </p:cTn>
+                  </p:par>
+                  <p:par>
+                    <p:cTn id="11" fill="hold">
+                      <p:stCondLst>
+                        <p:cond delay="indefinite"/>
+                      </p:stCondLst>
+                      <p:childTnLst>
+                        <p:par>
+                          <p:cTn id="12" fill="hold">
+                            <p:stCondLst>
+                              <p:cond delay="0"/>
+                            </p:stCondLst>
+                            <p:childTnLst>
+                              <p:par>
+                                <p:cTn id="13" presetID="10" presetClass="entr" presetSubtype="0" fill="hold" grpId="0" nodeType="clickEffect">
+                                  <p:stCondLst>
+                                    <p:cond delay="1500"/>
+                                  </p:stCondLst>
+                                  <p:iterate>
+                                    <p:tmPct val="10000"/>
+                                  </p:iterate>
+                                  <p:childTnLst>
+                                    <p:set>
+                                      <p:cBhvr>
+                                        <p:cTn id="14" dur="1" fill="hold">
+                                          <p:stCondLst>
+                                            <p:cond delay="0"/>
+                                          </p:stCondLst>
+                                        </p:cTn>
+                                        <p:tgtEl>
+                                          <p:spTgt spid="3">
+                                            <p:txEl>
+                                              <p:pRg st="1" end="1"/>
+                                            </p:txEl>
+                                          </p:spTgt>
+                                        </p:tgtEl>
+                                        <p:attrNameLst>
+                                          <p:attrName>style.visibility</p:attrName>
+                                        </p:attrNameLst>
+                                      </p:cBhvr>
+                                      <p:to>
+                                        <p:strVal val="visible"/>
+                                      </p:to>
+                                    </p:set>
+                                    <p:animEffect transition="in" filter="fade">
+                                      <p:cBhvr>
+                                        <p:cTn id="15" dur="700"/>
+                                        <p:tgtEl>
+                                          <p:spTgt spid="3">
+                                            <p:txEl>
+                                              <p:pRg st="1" end="1"/>
+                                            </p:txEl>
+                                          </p:spTgt>
+                                        </p:tgtEl>
+                                      </p:cBhvr>
+                                    </p:animEffect>
+                                  </p:childTnLst>
+                                </p:cTn>
+                              </p:par>
+                            </p:childTnLst>
+                          </p:cTn>
+                        </p:par>
+                      </p:childTnLst>
+                    </p:cTn>
+                  </p:par>
+                </p:childTnLst>
+              </p:cTn>
+              <p:prevCondLst>
+                <p:cond evt="onPrev" delay="0">
+                  <p:tgtEl>
+                    <p:sldTgt/>
+                  </p:tgtEl>
+                </p:cond>
+              </p:prevCondLst>
+              <p:nextCondLst>
+                <p:cond evt="onNext" delay="0">
+                  <p:tgtEl>
+                    <p:sldTgt/>
+                  </p:tgtEl>
+                </p:cond>
+              </p:nextCondLst>
+            </p:seq>
+          </p:childTnLst>
+        </p:cTn>
+      </p:par>
+    </p:tnLst>
+    <p:bldLst>
+      <p:bldP spid="2" grpId="0"/>
+      <p:bldP spid="3" grpId="0" build="p"/>
+    </p:bldLst>
+  </p:timing>
 </p:sld>
 </file>
 
 <file path=ppt/theme/theme1.xml><?xml version="1.0" encoding="utf-8"?>
-<a:theme xmlns:a="http://schemas.openxmlformats.org/drawingml/2006/main" name="Office-tema">
+<a:theme xmlns:a="http://schemas.openxmlformats.org/drawingml/2006/main" name="VanillaVTI">
   <a:themeElements>
-    <a:clrScheme name="Office">
+    <a:clrScheme name="AnalogousFromRegularSeed_2SEEDS">
       <a:dk1>
-        <a:sysClr val="windowText" lastClr="000000"/>
+        <a:srgbClr val="000000"/>
       </a:dk1>
       <a:lt1>
-        <a:sysClr val="window" lastClr="FFFFFF"/>
+        <a:srgbClr val="FFFFFF"/>
       </a:lt1>
       <a:dk2>
-        <a:srgbClr val="0E2841"/>
+        <a:srgbClr val="1C2F32"/>
       </a:dk2>
       <a:lt2>
-        <a:srgbClr val="E8E8E8"/>
+        <a:srgbClr val="F2F3F0"/>
       </a:lt2>
       <a:accent1>
-        <a:srgbClr val="156082"/>
+        <a:srgbClr val="7D17D5"/>
       </a:accent1>
       <a:accent2>
-        <a:srgbClr val="E97132"/>
+        <a:srgbClr val="4D38E8"/>
       </a:accent2>
       <a:accent3>
-        <a:srgbClr val="196B24"/>
+        <a:srgbClr val="DE29E7"/>
       </a:accent3>
       <a:accent4>
-        <a:srgbClr val="0F9ED5"/>
+        <a:srgbClr val="74BF15"/>
       </a:accent4>
       <a:accent5>
-        <a:srgbClr val="A02B93"/>
+        <a:srgbClr val="3BC723"/>
       </a:accent5>
       <a:accent6>
-        <a:srgbClr val="4EA72E"/>
+        <a:srgbClr val="16C846"/>
       </a:accent6>
       <a:hlink>
-        <a:srgbClr val="467886"/>
+        <a:srgbClr val="639A33"/>
       </a:hlink>
       <a:folHlink>
-        <a:srgbClr val="96607D"/>
+        <a:srgbClr val="7F7F7F"/>
       </a:folHlink>
     </a:clrScheme>
-    <a:fontScheme name="Office">
+    <a:fontScheme name="Neue Haas">
       <a:majorFont>
-        <a:latin typeface="Aptos Display" panose="02110004020202020204"/>
+        <a:latin typeface="Neue Haas Grotesk Text Pro"/>
         <a:ea typeface=""/>
         <a:cs typeface=""/>
-        <a:font script="Jpan" typeface="游ゴシック Light"/>
-        <a:font script="Hang" typeface="맑은 고딕"/>
-        <a:font script="Hans" typeface="等线 Light"/>
-        <a:font script="Hant" typeface="新細明體"/>
-        <a:font script="Arab" typeface="Times New Roman"/>
-        <a:font script="Hebr" typeface="Times New Roman"/>
-        <a:font script="Thai" typeface="Angsana New"/>
-        <a:font script="Ethi" typeface="Nyala"/>
-        <a:font script="Beng" typeface="Vrinda"/>
-        <a:font script="Gujr" typeface="Shruti"/>
-        <a:font script="Khmr" typeface="MoolBoran"/>
-        <a:font script="Knda" typeface="Tunga"/>
-        <a:font script="Guru" typeface="Raavi"/>
-        <a:font script="Cans" typeface="Euphemia"/>
-        <a:font script="Cher" typeface="Plantagenet Cherokee"/>
-        <a:font script="Yiii" typeface="Microsoft Yi Baiti"/>
-        <a:font script="Tibt" typeface="Microsoft Himalaya"/>
-        <a:font script="Thaa" typeface="MV Boli"/>
-        <a:font script="Deva" typeface="Mangal"/>
-        <a:font script="Telu" typeface="Gautami"/>
-        <a:font script="Taml" typeface="Latha"/>
-        <a:font script="Syrc" typeface="Estrangelo Edessa"/>
-        <a:font script="Orya" typeface="Kalinga"/>
-        <a:font script="Mlym" typeface="Kartika"/>
-        <a:font script="Laoo" typeface="DokChampa"/>
-        <a:font script="Sinh" typeface="Iskoola Pota"/>
-        <a:font script="Mong" typeface="Mongolian Baiti"/>
-        <a:font script="Viet" typeface="Times New Roman"/>
-        <a:font script="Uigh" typeface="Microsoft Uighur"/>
-        <a:font script="Geor" typeface="Sylfaen"/>
-        <a:font script="Armn" typeface="Arial"/>
-        <a:font script="Bugi" typeface="Leelawadee UI"/>
-        <a:font script="Bopo" typeface="Microsoft JhengHei"/>
-        <a:font script="Java" typeface="Javanese Text"/>
-        <a:font script="Lisu" typeface="Segoe UI"/>
-        <a:font script="Mymr" typeface="Myanmar Text"/>
-        <a:font script="Nkoo" typeface="Ebrima"/>
-        <a:font script="Olck" typeface="Nirmala UI"/>
-        <a:font script="Osma" typeface="Ebrima"/>
-        <a:font script="Phag" typeface="Phagspa"/>
-        <a:font script="Syrn" typeface="Estrangelo Edessa"/>
-        <a:font script="Syrj" typeface="Estrangelo Edessa"/>
-        <a:font script="Syre" typeface="Estrangelo Edessa"/>
-        <a:font script="Sora" typeface="Nirmala UI"/>
-        <a:font script="Tale" typeface="Microsoft Tai Le"/>
-        <a:font script="Talu" typeface="Microsoft New Tai Lue"/>
-        <a:font script="Tfng" typeface="Ebrima"/>
       </a:majorFont>
       <a:minorFont>
-        <a:latin typeface="Aptos" panose="02110004020202020204"/>
+        <a:latin typeface="Neue Haas Grotesk Text Pro"/>
         <a:ea typeface=""/>
         <a:cs typeface=""/>
-        <a:font script="Jpan" typeface="游ゴシック"/>
-        <a:font script="Hang" typeface="맑은 고딕"/>
-        <a:font script="Hans" typeface="等线"/>
-        <a:font script="Hant" typeface="新細明體"/>
-        <a:font script="Arab" typeface="Arial"/>
-        <a:font script="Hebr" typeface="Arial"/>
-        <a:font script="Thai" typeface="Cordia New"/>
-        <a:font script="Ethi" typeface="Nyala"/>
-        <a:font script="Beng" typeface="Vrinda"/>
-        <a:font script="Gujr" typeface="Shruti"/>
-        <a:font script="Khmr" typeface="DaunPenh"/>
-        <a:font script="Knda" typeface="Tunga"/>
-        <a:font script="Guru" typeface="Raavi"/>
-        <a:font script="Cans" typeface="Euphemia"/>
-        <a:font script="Cher" typeface="Plantagenet Cherokee"/>
-        <a:font script="Yiii" typeface="Microsoft Yi Baiti"/>
-        <a:font script="Tibt" typeface="Microsoft Himalaya"/>
-        <a:font script="Thaa" typeface="MV Boli"/>
-        <a:font script="Deva" typeface="Mangal"/>
-        <a:font script="Telu" typeface="Gautami"/>
-        <a:font script="Taml" typeface="Latha"/>
-        <a:font script="Syrc" typeface="Estrangelo Edessa"/>
-        <a:font script="Orya" typeface="Kalinga"/>
-        <a:font script="Mlym" typeface="Kartika"/>
-        <a:font script="Laoo" typeface="DokChampa"/>
-        <a:font script="Sinh" typeface="Iskoola Pota"/>
-        <a:font script="Mong" typeface="Mongolian Baiti"/>
-        <a:font script="Viet" typeface="Arial"/>
-        <a:font script="Uigh" typeface="Microsoft Uighur"/>
-        <a:font script="Geor" typeface="Sylfaen"/>
-        <a:font script="Armn" typeface="Arial"/>
-        <a:font script="Bugi" typeface="Leelawadee UI"/>
-        <a:font script="Bopo" typeface="Microsoft JhengHei"/>
-        <a:font script="Java" typeface="Javanese Text"/>
-        <a:font script="Lisu" typeface="Segoe UI"/>
-        <a:font script="Mymr" typeface="Myanmar Text"/>
-        <a:font script="Nkoo" typeface="Ebrima"/>
-        <a:font script="Olck" typeface="Nirmala UI"/>
-        <a:font script="Osma" typeface="Ebrima"/>
-        <a:font script="Phag" typeface="Phagspa"/>
-        <a:font script="Syrn" typeface="Estrangelo Edessa"/>
-        <a:font script="Syrj" typeface="Estrangelo Edessa"/>
-        <a:font script="Syre" typeface="Estrangelo Edessa"/>
-        <a:font script="Sora" typeface="Nirmala UI"/>
-        <a:font script="Tale" typeface="Microsoft Tai Le"/>
-        <a:font script="Talu" typeface="Microsoft New Tai Lue"/>
-        <a:font script="Tfng" typeface="Ebrima"/>
       </a:minorFont>
     </a:fontScheme>
     <a:fmtScheme name="Office">
@@ -3593,6 +3971,13 @@
         </a:gradFill>
       </a:fillStyleLst>
       <a:lnStyleLst>
+        <a:ln w="6350" cap="flat" cmpd="sng" algn="ctr">
+          <a:solidFill>
+            <a:schemeClr val="phClr"/>
+          </a:solidFill>
+          <a:prstDash val="solid"/>
+          <a:miter lim="800000"/>
+        </a:ln>
         <a:ln w="12700" cap="flat" cmpd="sng" algn="ctr">
           <a:solidFill>
             <a:schemeClr val="phClr"/>
@@ -3601,13 +3986,6 @@
           <a:miter lim="800000"/>
         </a:ln>
         <a:ln w="19050" cap="flat" cmpd="sng" algn="ctr">
-          <a:solidFill>
-            <a:schemeClr val="phClr"/>
-          </a:solidFill>
-          <a:prstDash val="solid"/>
-          <a:miter lim="800000"/>
-        </a:ln>
-        <a:ln w="25400" cap="flat" cmpd="sng" algn="ctr">
           <a:solidFill>
             <a:schemeClr val="phClr"/>
           </a:solidFill>
@@ -3672,31 +4050,11 @@
       </a:bgFillStyleLst>
     </a:fmtScheme>
   </a:themeElements>
-  <a:objectDefaults>
-    <a:lnDef>
-      <a:spPr/>
-      <a:bodyPr/>
-      <a:lstStyle/>
-      <a:style>
-        <a:lnRef idx="2">
-          <a:schemeClr val="accent1"/>
-        </a:lnRef>
-        <a:fillRef idx="0">
-          <a:schemeClr val="accent1"/>
-        </a:fillRef>
-        <a:effectRef idx="1">
-          <a:schemeClr val="accent1"/>
-        </a:effectRef>
-        <a:fontRef idx="minor">
-          <a:schemeClr val="tx1"/>
-        </a:fontRef>
-      </a:style>
-    </a:lnDef>
-  </a:objectDefaults>
+  <a:objectDefaults/>
   <a:extraClrSchemeLst/>
   <a:extLst>
     <a:ext uri="{05A4C25C-085E-4340-85A3-A5531E510DB2}">
-      <thm15:themeFamily xmlns:thm15="http://schemas.microsoft.com/office/thememl/2012/main" name="Office Theme" id="{2E142A2C-CD16-42D6-873A-C26D2A0506FA}" vid="{1BDDFF52-6CD6-40A5-AB3C-68EB2F1E4D0A}"/>
+      <thm15:themeFamily xmlns:thm15="http://schemas.microsoft.com/office/thememl/2012/main" name="VanillaVTI" id="{54D376C6-1C9B-4C6B-8F3C-483BB307BB05}" vid="{7690D8A9-C071-45EF-BA7A-F7FA9779B11D}"/>
     </a:ext>
   </a:extLst>
 </a:theme>

</xml_diff>

<commit_message>
Slide 3-5 med data
Jeg har lavet data delen, men uden deskriptiv statistik
</commit_message>
<xml_diff>
--- a/TØ/Powerpoint til præsentation.pptx
+++ b/TØ/Powerpoint til præsentation.pptx
@@ -7,6 +7,9 @@
   <p:sldIdLst>
     <p:sldId id="256" r:id="rId2"/>
     <p:sldId id="257" r:id="rId3"/>
+    <p:sldId id="258" r:id="rId4"/>
+    <p:sldId id="259" r:id="rId5"/>
+    <p:sldId id="260" r:id="rId6"/>
   </p:sldIdLst>
   <p:sldSz cx="12192000" cy="6858000"/>
   <p:notesSz cx="6858000" cy="9144000"/>
@@ -111,6 +114,902 @@
     </p:ext>
   </p:extLst>
 </p:presentation>
+</file>
+
+<file path=ppt/ink/ink1.xml><?xml version="1.0" encoding="utf-8"?>
+<inkml:ink xmlns:inkml="http://www.w3.org/2003/InkML">
+  <inkml:definitions>
+    <inkml:context xml:id="ctx0">
+      <inkml:inkSource xml:id="inkSrc0">
+        <inkml:traceFormat>
+          <inkml:channel name="X" type="integer" min="-2.14748E9" max="2.14748E9" units="cm"/>
+          <inkml:channel name="Y" type="integer" min="-2.14748E9" max="2.14748E9" units="cm"/>
+          <inkml:channel name="F" type="integer" max="32767" units="dev"/>
+        </inkml:traceFormat>
+        <inkml:channelProperties>
+          <inkml:channelProperty channel="X" name="resolution" value="1000" units="1/cm"/>
+          <inkml:channelProperty channel="Y" name="resolution" value="1000" units="1/cm"/>
+          <inkml:channelProperty channel="F" name="resolution" value="0" units="1/dev"/>
+        </inkml:channelProperties>
+      </inkml:inkSource>
+      <inkml:timestamp xml:id="ts0" timeString="2025-02-18T16:07:22.967"/>
+    </inkml:context>
+    <inkml:brush xml:id="br0">
+      <inkml:brushProperty name="width" value="0.1" units="cm"/>
+      <inkml:brushProperty name="height" value="0.1" units="cm"/>
+      <inkml:brushProperty name="color" value="#E71225"/>
+    </inkml:brush>
+  </inkml:definitions>
+  <inkml:trace contextRef="#ctx0" brushRef="#br0">1 0 24575,'0'0'0</inkml:trace>
+</inkml:ink>
+</file>
+
+<file path=ppt/ink/ink10.xml><?xml version="1.0" encoding="utf-8"?>
+<inkml:ink xmlns:inkml="http://www.w3.org/2003/InkML">
+  <inkml:definitions>
+    <inkml:context xml:id="ctx0">
+      <inkml:inkSource xml:id="inkSrc0">
+        <inkml:traceFormat>
+          <inkml:channel name="X" type="integer" min="-2.14748E9" max="2.14748E9" units="cm"/>
+          <inkml:channel name="Y" type="integer" min="-2.14748E9" max="2.14748E9" units="cm"/>
+          <inkml:channel name="F" type="integer" max="32767" units="dev"/>
+        </inkml:traceFormat>
+        <inkml:channelProperties>
+          <inkml:channelProperty channel="X" name="resolution" value="1000" units="1/cm"/>
+          <inkml:channelProperty channel="Y" name="resolution" value="1000" units="1/cm"/>
+          <inkml:channelProperty channel="F" name="resolution" value="0" units="1/dev"/>
+        </inkml:channelProperties>
+      </inkml:inkSource>
+      <inkml:timestamp xml:id="ts0" timeString="2025-02-18T16:11:37.970"/>
+    </inkml:context>
+    <inkml:brush xml:id="br0">
+      <inkml:brushProperty name="width" value="0.1" units="cm"/>
+      <inkml:brushProperty name="height" value="0.1" units="cm"/>
+      <inkml:brushProperty name="color" value="#E71225"/>
+    </inkml:brush>
+  </inkml:definitions>
+  <inkml:trace contextRef="#ctx0" brushRef="#br0">1 1 24575,'0'0'0</inkml:trace>
+</inkml:ink>
+</file>
+
+<file path=ppt/ink/ink11.xml><?xml version="1.0" encoding="utf-8"?>
+<inkml:ink xmlns:inkml="http://www.w3.org/2003/InkML">
+  <inkml:definitions>
+    <inkml:context xml:id="ctx0">
+      <inkml:inkSource xml:id="inkSrc0">
+        <inkml:traceFormat>
+          <inkml:channel name="X" type="integer" min="-2.14748E9" max="2.14748E9" units="cm"/>
+          <inkml:channel name="Y" type="integer" min="-2.14748E9" max="2.14748E9" units="cm"/>
+          <inkml:channel name="F" type="integer" max="32767" units="dev"/>
+        </inkml:traceFormat>
+        <inkml:channelProperties>
+          <inkml:channelProperty channel="X" name="resolution" value="1000" units="1/cm"/>
+          <inkml:channelProperty channel="Y" name="resolution" value="1000" units="1/cm"/>
+          <inkml:channelProperty channel="F" name="resolution" value="0" units="1/dev"/>
+        </inkml:channelProperties>
+      </inkml:inkSource>
+      <inkml:timestamp xml:id="ts0" timeString="2025-02-18T16:11:39.777"/>
+    </inkml:context>
+    <inkml:brush xml:id="br0">
+      <inkml:brushProperty name="width" value="0.1" units="cm"/>
+      <inkml:brushProperty name="height" value="0.1" units="cm"/>
+      <inkml:brushProperty name="color" value="#E71225"/>
+    </inkml:brush>
+  </inkml:definitions>
+  <inkml:trace contextRef="#ctx0" brushRef="#br0">1 1 24575,'0'0'0</inkml:trace>
+</inkml:ink>
+</file>
+
+<file path=ppt/ink/ink12.xml><?xml version="1.0" encoding="utf-8"?>
+<inkml:ink xmlns:inkml="http://www.w3.org/2003/InkML">
+  <inkml:definitions>
+    <inkml:context xml:id="ctx0">
+      <inkml:inkSource xml:id="inkSrc0">
+        <inkml:traceFormat>
+          <inkml:channel name="X" type="integer" min="-2.14748E9" max="2.14748E9" units="cm"/>
+          <inkml:channel name="Y" type="integer" min="-2.14748E9" max="2.14748E9" units="cm"/>
+          <inkml:channel name="F" type="integer" max="32767" units="dev"/>
+        </inkml:traceFormat>
+        <inkml:channelProperties>
+          <inkml:channelProperty channel="X" name="resolution" value="1000" units="1/cm"/>
+          <inkml:channelProperty channel="Y" name="resolution" value="1000" units="1/cm"/>
+          <inkml:channelProperty channel="F" name="resolution" value="0" units="1/dev"/>
+        </inkml:channelProperties>
+      </inkml:inkSource>
+      <inkml:timestamp xml:id="ts0" timeString="2025-02-18T16:11:48.309"/>
+    </inkml:context>
+    <inkml:brush xml:id="br0">
+      <inkml:brushProperty name="width" value="0.1" units="cm"/>
+      <inkml:brushProperty name="height" value="0.1" units="cm"/>
+      <inkml:brushProperty name="color" value="#E71225"/>
+    </inkml:brush>
+  </inkml:definitions>
+  <inkml:trace contextRef="#ctx0" brushRef="#br0">1 1 24575,'0'0'0</inkml:trace>
+</inkml:ink>
+</file>
+
+<file path=ppt/ink/ink13.xml><?xml version="1.0" encoding="utf-8"?>
+<inkml:ink xmlns:inkml="http://www.w3.org/2003/InkML">
+  <inkml:definitions>
+    <inkml:context xml:id="ctx0">
+      <inkml:inkSource xml:id="inkSrc0">
+        <inkml:traceFormat>
+          <inkml:channel name="X" type="integer" min="-2.14748E9" max="2.14748E9" units="cm"/>
+          <inkml:channel name="Y" type="integer" min="-2.14748E9" max="2.14748E9" units="cm"/>
+          <inkml:channel name="F" type="integer" max="32767" units="dev"/>
+        </inkml:traceFormat>
+        <inkml:channelProperties>
+          <inkml:channelProperty channel="X" name="resolution" value="1000" units="1/cm"/>
+          <inkml:channelProperty channel="Y" name="resolution" value="1000" units="1/cm"/>
+          <inkml:channelProperty channel="F" name="resolution" value="0" units="1/dev"/>
+        </inkml:channelProperties>
+      </inkml:inkSource>
+      <inkml:timestamp xml:id="ts0" timeString="2025-02-18T16:11:49.113"/>
+    </inkml:context>
+    <inkml:brush xml:id="br0">
+      <inkml:brushProperty name="width" value="0.1" units="cm"/>
+      <inkml:brushProperty name="height" value="0.1" units="cm"/>
+      <inkml:brushProperty name="color" value="#E71225"/>
+    </inkml:brush>
+  </inkml:definitions>
+  <inkml:trace contextRef="#ctx0" brushRef="#br0">1 0 24575,'0'0'0</inkml:trace>
+</inkml:ink>
+</file>
+
+<file path=ppt/ink/ink14.xml><?xml version="1.0" encoding="utf-8"?>
+<inkml:ink xmlns:inkml="http://www.w3.org/2003/InkML">
+  <inkml:definitions>
+    <inkml:context xml:id="ctx0">
+      <inkml:inkSource xml:id="inkSrc0">
+        <inkml:traceFormat>
+          <inkml:channel name="X" type="integer" min="-2.14748E9" max="2.14748E9" units="cm"/>
+          <inkml:channel name="Y" type="integer" min="-2.14748E9" max="2.14748E9" units="cm"/>
+          <inkml:channel name="F" type="integer" max="32767" units="dev"/>
+        </inkml:traceFormat>
+        <inkml:channelProperties>
+          <inkml:channelProperty channel="X" name="resolution" value="1000" units="1/cm"/>
+          <inkml:channelProperty channel="Y" name="resolution" value="1000" units="1/cm"/>
+          <inkml:channelProperty channel="F" name="resolution" value="0" units="1/dev"/>
+        </inkml:channelProperties>
+      </inkml:inkSource>
+      <inkml:timestamp xml:id="ts0" timeString="2025-02-18T16:11:54.812"/>
+    </inkml:context>
+    <inkml:brush xml:id="br0">
+      <inkml:brushProperty name="width" value="0.1" units="cm"/>
+      <inkml:brushProperty name="height" value="0.1" units="cm"/>
+      <inkml:brushProperty name="color" value="#E71225"/>
+    </inkml:brush>
+  </inkml:definitions>
+  <inkml:trace contextRef="#ctx0" brushRef="#br0">0 1 24575,'0'0'0</inkml:trace>
+</inkml:ink>
+</file>
+
+<file path=ppt/ink/ink15.xml><?xml version="1.0" encoding="utf-8"?>
+<inkml:ink xmlns:inkml="http://www.w3.org/2003/InkML">
+  <inkml:definitions>
+    <inkml:context xml:id="ctx0">
+      <inkml:inkSource xml:id="inkSrc0">
+        <inkml:traceFormat>
+          <inkml:channel name="X" type="integer" min="-2.14748E9" max="2.14748E9" units="cm"/>
+          <inkml:channel name="Y" type="integer" min="-2.14748E9" max="2.14748E9" units="cm"/>
+          <inkml:channel name="F" type="integer" max="32767" units="dev"/>
+        </inkml:traceFormat>
+        <inkml:channelProperties>
+          <inkml:channelProperty channel="X" name="resolution" value="1000" units="1/cm"/>
+          <inkml:channelProperty channel="Y" name="resolution" value="1000" units="1/cm"/>
+          <inkml:channelProperty channel="F" name="resolution" value="0" units="1/dev"/>
+        </inkml:channelProperties>
+      </inkml:inkSource>
+      <inkml:timestamp xml:id="ts0" timeString="2025-02-18T16:12:34.793"/>
+    </inkml:context>
+    <inkml:brush xml:id="br0">
+      <inkml:brushProperty name="width" value="0.1" units="cm"/>
+      <inkml:brushProperty name="height" value="0.1" units="cm"/>
+      <inkml:brushProperty name="color" value="#E71225"/>
+    </inkml:brush>
+  </inkml:definitions>
+  <inkml:trace contextRef="#ctx0" brushRef="#br0">1 1 24575,'0'0'0</inkml:trace>
+</inkml:ink>
+</file>
+
+<file path=ppt/ink/ink16.xml><?xml version="1.0" encoding="utf-8"?>
+<inkml:ink xmlns:inkml="http://www.w3.org/2003/InkML">
+  <inkml:definitions>
+    <inkml:context xml:id="ctx0">
+      <inkml:inkSource xml:id="inkSrc0">
+        <inkml:traceFormat>
+          <inkml:channel name="X" type="integer" min="-2.14748E9" max="2.14748E9" units="cm"/>
+          <inkml:channel name="Y" type="integer" min="-2.14748E9" max="2.14748E9" units="cm"/>
+          <inkml:channel name="F" type="integer" max="32767" units="dev"/>
+        </inkml:traceFormat>
+        <inkml:channelProperties>
+          <inkml:channelProperty channel="X" name="resolution" value="1000" units="1/cm"/>
+          <inkml:channelProperty channel="Y" name="resolution" value="1000" units="1/cm"/>
+          <inkml:channelProperty channel="F" name="resolution" value="0" units="1/dev"/>
+        </inkml:channelProperties>
+      </inkml:inkSource>
+      <inkml:timestamp xml:id="ts0" timeString="2025-02-18T16:12:35.999"/>
+    </inkml:context>
+    <inkml:brush xml:id="br0">
+      <inkml:brushProperty name="width" value="0.1" units="cm"/>
+      <inkml:brushProperty name="height" value="0.1" units="cm"/>
+      <inkml:brushProperty name="color" value="#E71225"/>
+    </inkml:brush>
+  </inkml:definitions>
+  <inkml:trace contextRef="#ctx0" brushRef="#br0">0 1 24575,'0'0'0</inkml:trace>
+</inkml:ink>
+</file>
+
+<file path=ppt/ink/ink17.xml><?xml version="1.0" encoding="utf-8"?>
+<inkml:ink xmlns:inkml="http://www.w3.org/2003/InkML">
+  <inkml:definitions>
+    <inkml:context xml:id="ctx0">
+      <inkml:inkSource xml:id="inkSrc0">
+        <inkml:traceFormat>
+          <inkml:channel name="X" type="integer" min="-2.14748E9" max="2.14748E9" units="cm"/>
+          <inkml:channel name="Y" type="integer" min="-2.14748E9" max="2.14748E9" units="cm"/>
+          <inkml:channel name="F" type="integer" max="32767" units="dev"/>
+        </inkml:traceFormat>
+        <inkml:channelProperties>
+          <inkml:channelProperty channel="X" name="resolution" value="1000" units="1/cm"/>
+          <inkml:channelProperty channel="Y" name="resolution" value="1000" units="1/cm"/>
+          <inkml:channelProperty channel="F" name="resolution" value="0" units="1/dev"/>
+        </inkml:channelProperties>
+      </inkml:inkSource>
+      <inkml:timestamp xml:id="ts0" timeString="2025-02-18T16:12:41.523"/>
+    </inkml:context>
+    <inkml:brush xml:id="br0">
+      <inkml:brushProperty name="width" value="0.1" units="cm"/>
+      <inkml:brushProperty name="height" value="0.1" units="cm"/>
+      <inkml:brushProperty name="color" value="#E71225"/>
+    </inkml:brush>
+  </inkml:definitions>
+  <inkml:trace contextRef="#ctx0" brushRef="#br0">0 0 24575,'0'0'0</inkml:trace>
+</inkml:ink>
+</file>
+
+<file path=ppt/ink/ink18.xml><?xml version="1.0" encoding="utf-8"?>
+<inkml:ink xmlns:inkml="http://www.w3.org/2003/InkML">
+  <inkml:definitions>
+    <inkml:context xml:id="ctx0">
+      <inkml:inkSource xml:id="inkSrc0">
+        <inkml:traceFormat>
+          <inkml:channel name="X" type="integer" min="-2.14748E9" max="2.14748E9" units="cm"/>
+          <inkml:channel name="Y" type="integer" min="-2.14748E9" max="2.14748E9" units="cm"/>
+          <inkml:channel name="F" type="integer" max="32767" units="dev"/>
+        </inkml:traceFormat>
+        <inkml:channelProperties>
+          <inkml:channelProperty channel="X" name="resolution" value="1000" units="1/cm"/>
+          <inkml:channelProperty channel="Y" name="resolution" value="1000" units="1/cm"/>
+          <inkml:channelProperty channel="F" name="resolution" value="0" units="1/dev"/>
+        </inkml:channelProperties>
+      </inkml:inkSource>
+      <inkml:timestamp xml:id="ts0" timeString="2025-02-18T16:12:42.566"/>
+    </inkml:context>
+    <inkml:brush xml:id="br0">
+      <inkml:brushProperty name="width" value="0.1" units="cm"/>
+      <inkml:brushProperty name="height" value="0.1" units="cm"/>
+      <inkml:brushProperty name="color" value="#E71225"/>
+    </inkml:brush>
+  </inkml:definitions>
+  <inkml:trace contextRef="#ctx0" brushRef="#br0">1 0 24575,'0'0'0</inkml:trace>
+</inkml:ink>
+</file>
+
+<file path=ppt/ink/ink19.xml><?xml version="1.0" encoding="utf-8"?>
+<inkml:ink xmlns:inkml="http://www.w3.org/2003/InkML">
+  <inkml:definitions>
+    <inkml:context xml:id="ctx0">
+      <inkml:inkSource xml:id="inkSrc0">
+        <inkml:traceFormat>
+          <inkml:channel name="X" type="integer" min="-2.14748E9" max="2.14748E9" units="cm"/>
+          <inkml:channel name="Y" type="integer" min="-2.14748E9" max="2.14748E9" units="cm"/>
+          <inkml:channel name="F" type="integer" max="32767" units="dev"/>
+        </inkml:traceFormat>
+        <inkml:channelProperties>
+          <inkml:channelProperty channel="X" name="resolution" value="1000" units="1/cm"/>
+          <inkml:channelProperty channel="Y" name="resolution" value="1000" units="1/cm"/>
+          <inkml:channelProperty channel="F" name="resolution" value="0" units="1/dev"/>
+        </inkml:channelProperties>
+      </inkml:inkSource>
+      <inkml:timestamp xml:id="ts0" timeString="2025-02-18T16:12:43.618"/>
+    </inkml:context>
+    <inkml:brush xml:id="br0">
+      <inkml:brushProperty name="width" value="0.1" units="cm"/>
+      <inkml:brushProperty name="height" value="0.1" units="cm"/>
+      <inkml:brushProperty name="color" value="#E71225"/>
+    </inkml:brush>
+  </inkml:definitions>
+  <inkml:trace contextRef="#ctx0" brushRef="#br0">1 1 24575,'0'0'0</inkml:trace>
+</inkml:ink>
+</file>
+
+<file path=ppt/ink/ink2.xml><?xml version="1.0" encoding="utf-8"?>
+<inkml:ink xmlns:inkml="http://www.w3.org/2003/InkML">
+  <inkml:definitions>
+    <inkml:context xml:id="ctx0">
+      <inkml:inkSource xml:id="inkSrc0">
+        <inkml:traceFormat>
+          <inkml:channel name="X" type="integer" min="-2.14748E9" max="2.14748E9" units="cm"/>
+          <inkml:channel name="Y" type="integer" min="-2.14748E9" max="2.14748E9" units="cm"/>
+          <inkml:channel name="F" type="integer" max="32767" units="dev"/>
+        </inkml:traceFormat>
+        <inkml:channelProperties>
+          <inkml:channelProperty channel="X" name="resolution" value="1000" units="1/cm"/>
+          <inkml:channelProperty channel="Y" name="resolution" value="1000" units="1/cm"/>
+          <inkml:channelProperty channel="F" name="resolution" value="0" units="1/dev"/>
+        </inkml:channelProperties>
+      </inkml:inkSource>
+      <inkml:timestamp xml:id="ts0" timeString="2025-02-18T16:07:25.760"/>
+    </inkml:context>
+    <inkml:brush xml:id="br0">
+      <inkml:brushProperty name="width" value="0.1" units="cm"/>
+      <inkml:brushProperty name="height" value="0.1" units="cm"/>
+      <inkml:brushProperty name="color" value="#E71225"/>
+    </inkml:brush>
+  </inkml:definitions>
+  <inkml:trace contextRef="#ctx0" brushRef="#br0">0 1 24575,'0'0'0</inkml:trace>
+</inkml:ink>
+</file>
+
+<file path=ppt/ink/ink20.xml><?xml version="1.0" encoding="utf-8"?>
+<inkml:ink xmlns:inkml="http://www.w3.org/2003/InkML">
+  <inkml:definitions>
+    <inkml:context xml:id="ctx0">
+      <inkml:inkSource xml:id="inkSrc0">
+        <inkml:traceFormat>
+          <inkml:channel name="X" type="integer" min="-2.14748E9" max="2.14748E9" units="cm"/>
+          <inkml:channel name="Y" type="integer" min="-2.14748E9" max="2.14748E9" units="cm"/>
+          <inkml:channel name="F" type="integer" max="32767" units="dev"/>
+        </inkml:traceFormat>
+        <inkml:channelProperties>
+          <inkml:channelProperty channel="X" name="resolution" value="1000" units="1/cm"/>
+          <inkml:channelProperty channel="Y" name="resolution" value="1000" units="1/cm"/>
+          <inkml:channelProperty channel="F" name="resolution" value="0" units="1/dev"/>
+        </inkml:channelProperties>
+      </inkml:inkSource>
+      <inkml:timestamp xml:id="ts0" timeString="2025-02-18T16:12:44.733"/>
+    </inkml:context>
+    <inkml:brush xml:id="br0">
+      <inkml:brushProperty name="width" value="0.1" units="cm"/>
+      <inkml:brushProperty name="height" value="0.1" units="cm"/>
+      <inkml:brushProperty name="color" value="#E71225"/>
+    </inkml:brush>
+  </inkml:definitions>
+  <inkml:trace contextRef="#ctx0" brushRef="#br0">0 0 24575,'0'0'0</inkml:trace>
+</inkml:ink>
+</file>
+
+<file path=ppt/ink/ink21.xml><?xml version="1.0" encoding="utf-8"?>
+<inkml:ink xmlns:inkml="http://www.w3.org/2003/InkML">
+  <inkml:definitions>
+    <inkml:context xml:id="ctx0">
+      <inkml:inkSource xml:id="inkSrc0">
+        <inkml:traceFormat>
+          <inkml:channel name="X" type="integer" min="-2.14748E9" max="2.14748E9" units="cm"/>
+          <inkml:channel name="Y" type="integer" min="-2.14748E9" max="2.14748E9" units="cm"/>
+          <inkml:channel name="F" type="integer" max="32767" units="dev"/>
+        </inkml:traceFormat>
+        <inkml:channelProperties>
+          <inkml:channelProperty channel="X" name="resolution" value="1000" units="1/cm"/>
+          <inkml:channelProperty channel="Y" name="resolution" value="1000" units="1/cm"/>
+          <inkml:channelProperty channel="F" name="resolution" value="0" units="1/dev"/>
+        </inkml:channelProperties>
+      </inkml:inkSource>
+      <inkml:timestamp xml:id="ts0" timeString="2025-02-18T16:13:06.715"/>
+    </inkml:context>
+    <inkml:brush xml:id="br0">
+      <inkml:brushProperty name="width" value="0.1" units="cm"/>
+      <inkml:brushProperty name="height" value="0.1" units="cm"/>
+      <inkml:brushProperty name="color" value="#E71225"/>
+    </inkml:brush>
+  </inkml:definitions>
+  <inkml:trace contextRef="#ctx0" brushRef="#br0">1 1 24575,'0'0'0</inkml:trace>
+</inkml:ink>
+</file>
+
+<file path=ppt/ink/ink22.xml><?xml version="1.0" encoding="utf-8"?>
+<inkml:ink xmlns:inkml="http://www.w3.org/2003/InkML">
+  <inkml:definitions>
+    <inkml:context xml:id="ctx0">
+      <inkml:inkSource xml:id="inkSrc0">
+        <inkml:traceFormat>
+          <inkml:channel name="X" type="integer" min="-2.14748E9" max="2.14748E9" units="cm"/>
+          <inkml:channel name="Y" type="integer" min="-2.14748E9" max="2.14748E9" units="cm"/>
+          <inkml:channel name="F" type="integer" max="32767" units="dev"/>
+        </inkml:traceFormat>
+        <inkml:channelProperties>
+          <inkml:channelProperty channel="X" name="resolution" value="1000" units="1/cm"/>
+          <inkml:channelProperty channel="Y" name="resolution" value="1000" units="1/cm"/>
+          <inkml:channelProperty channel="F" name="resolution" value="0" units="1/dev"/>
+        </inkml:channelProperties>
+      </inkml:inkSource>
+      <inkml:timestamp xml:id="ts0" timeString="2025-02-18T16:13:33.536"/>
+    </inkml:context>
+    <inkml:brush xml:id="br0">
+      <inkml:brushProperty name="width" value="0.1" units="cm"/>
+      <inkml:brushProperty name="height" value="0.1" units="cm"/>
+      <inkml:brushProperty name="color" value="#E71225"/>
+    </inkml:brush>
+  </inkml:definitions>
+  <inkml:trace contextRef="#ctx0" brushRef="#br0">1 1 24575,'0'0'0</inkml:trace>
+</inkml:ink>
+</file>
+
+<file path=ppt/ink/ink23.xml><?xml version="1.0" encoding="utf-8"?>
+<inkml:ink xmlns:inkml="http://www.w3.org/2003/InkML">
+  <inkml:definitions>
+    <inkml:context xml:id="ctx0">
+      <inkml:inkSource xml:id="inkSrc0">
+        <inkml:traceFormat>
+          <inkml:channel name="X" type="integer" min="-2.14748E9" max="2.14748E9" units="cm"/>
+          <inkml:channel name="Y" type="integer" min="-2.14748E9" max="2.14748E9" units="cm"/>
+          <inkml:channel name="F" type="integer" max="32767" units="dev"/>
+        </inkml:traceFormat>
+        <inkml:channelProperties>
+          <inkml:channelProperty channel="X" name="resolution" value="1000" units="1/cm"/>
+          <inkml:channelProperty channel="Y" name="resolution" value="1000" units="1/cm"/>
+          <inkml:channelProperty channel="F" name="resolution" value="0" units="1/dev"/>
+        </inkml:channelProperties>
+      </inkml:inkSource>
+      <inkml:timestamp xml:id="ts0" timeString="2025-02-18T16:13:34.532"/>
+    </inkml:context>
+    <inkml:brush xml:id="br0">
+      <inkml:brushProperty name="width" value="0.1" units="cm"/>
+      <inkml:brushProperty name="height" value="0.1" units="cm"/>
+      <inkml:brushProperty name="color" value="#E71225"/>
+    </inkml:brush>
+  </inkml:definitions>
+  <inkml:trace contextRef="#ctx0" brushRef="#br0">0 1 24575,'0'0'0</inkml:trace>
+</inkml:ink>
+</file>
+
+<file path=ppt/ink/ink24.xml><?xml version="1.0" encoding="utf-8"?>
+<inkml:ink xmlns:inkml="http://www.w3.org/2003/InkML">
+  <inkml:definitions>
+    <inkml:context xml:id="ctx0">
+      <inkml:inkSource xml:id="inkSrc0">
+        <inkml:traceFormat>
+          <inkml:channel name="X" type="integer" min="-2.14748E9" max="2.14748E9" units="cm"/>
+          <inkml:channel name="Y" type="integer" min="-2.14748E9" max="2.14748E9" units="cm"/>
+          <inkml:channel name="F" type="integer" max="32767" units="dev"/>
+        </inkml:traceFormat>
+        <inkml:channelProperties>
+          <inkml:channelProperty channel="X" name="resolution" value="1000" units="1/cm"/>
+          <inkml:channelProperty channel="Y" name="resolution" value="1000" units="1/cm"/>
+          <inkml:channelProperty channel="F" name="resolution" value="0" units="1/dev"/>
+        </inkml:channelProperties>
+      </inkml:inkSource>
+      <inkml:timestamp xml:id="ts0" timeString="2025-02-18T16:13:37.502"/>
+    </inkml:context>
+    <inkml:brush xml:id="br0">
+      <inkml:brushProperty name="width" value="0.1" units="cm"/>
+      <inkml:brushProperty name="height" value="0.1" units="cm"/>
+      <inkml:brushProperty name="color" value="#E71225"/>
+    </inkml:brush>
+  </inkml:definitions>
+  <inkml:trace contextRef="#ctx0" brushRef="#br0">0 1 24575,'0'0'0</inkml:trace>
+</inkml:ink>
+</file>
+
+<file path=ppt/ink/ink25.xml><?xml version="1.0" encoding="utf-8"?>
+<inkml:ink xmlns:inkml="http://www.w3.org/2003/InkML">
+  <inkml:definitions>
+    <inkml:context xml:id="ctx0">
+      <inkml:inkSource xml:id="inkSrc0">
+        <inkml:traceFormat>
+          <inkml:channel name="X" type="integer" min="-2.14748E9" max="2.14748E9" units="cm"/>
+          <inkml:channel name="Y" type="integer" min="-2.14748E9" max="2.14748E9" units="cm"/>
+          <inkml:channel name="F" type="integer" max="32767" units="dev"/>
+        </inkml:traceFormat>
+        <inkml:channelProperties>
+          <inkml:channelProperty channel="X" name="resolution" value="1000" units="1/cm"/>
+          <inkml:channelProperty channel="Y" name="resolution" value="1000" units="1/cm"/>
+          <inkml:channelProperty channel="F" name="resolution" value="0" units="1/dev"/>
+        </inkml:channelProperties>
+      </inkml:inkSource>
+      <inkml:timestamp xml:id="ts0" timeString="2025-02-18T16:13:38.345"/>
+    </inkml:context>
+    <inkml:brush xml:id="br0">
+      <inkml:brushProperty name="width" value="0.1" units="cm"/>
+      <inkml:brushProperty name="height" value="0.1" units="cm"/>
+      <inkml:brushProperty name="color" value="#E71225"/>
+    </inkml:brush>
+  </inkml:definitions>
+  <inkml:trace contextRef="#ctx0" brushRef="#br0">1 0 24575,'0'0'0</inkml:trace>
+</inkml:ink>
+</file>
+
+<file path=ppt/ink/ink26.xml><?xml version="1.0" encoding="utf-8"?>
+<inkml:ink xmlns:inkml="http://www.w3.org/2003/InkML">
+  <inkml:definitions>
+    <inkml:context xml:id="ctx0">
+      <inkml:inkSource xml:id="inkSrc0">
+        <inkml:traceFormat>
+          <inkml:channel name="X" type="integer" min="-2.14748E9" max="2.14748E9" units="cm"/>
+          <inkml:channel name="Y" type="integer" min="-2.14748E9" max="2.14748E9" units="cm"/>
+          <inkml:channel name="F" type="integer" max="32767" units="dev"/>
+        </inkml:traceFormat>
+        <inkml:channelProperties>
+          <inkml:channelProperty channel="X" name="resolution" value="1000" units="1/cm"/>
+          <inkml:channelProperty channel="Y" name="resolution" value="1000" units="1/cm"/>
+          <inkml:channelProperty channel="F" name="resolution" value="0" units="1/dev"/>
+        </inkml:channelProperties>
+      </inkml:inkSource>
+      <inkml:timestamp xml:id="ts0" timeString="2025-02-18T16:13:39.709"/>
+    </inkml:context>
+    <inkml:brush xml:id="br0">
+      <inkml:brushProperty name="width" value="0.1" units="cm"/>
+      <inkml:brushProperty name="height" value="0.1" units="cm"/>
+      <inkml:brushProperty name="color" value="#E71225"/>
+    </inkml:brush>
+  </inkml:definitions>
+  <inkml:trace contextRef="#ctx0" brushRef="#br0">0 1 24575,'0'0'0</inkml:trace>
+</inkml:ink>
+</file>
+
+<file path=ppt/ink/ink27.xml><?xml version="1.0" encoding="utf-8"?>
+<inkml:ink xmlns:inkml="http://www.w3.org/2003/InkML">
+  <inkml:definitions>
+    <inkml:context xml:id="ctx0">
+      <inkml:inkSource xml:id="inkSrc0">
+        <inkml:traceFormat>
+          <inkml:channel name="X" type="integer" min="-2.14748E9" max="2.14748E9" units="cm"/>
+          <inkml:channel name="Y" type="integer" min="-2.14748E9" max="2.14748E9" units="cm"/>
+          <inkml:channel name="F" type="integer" max="32767" units="dev"/>
+        </inkml:traceFormat>
+        <inkml:channelProperties>
+          <inkml:channelProperty channel="X" name="resolution" value="1000" units="1/cm"/>
+          <inkml:channelProperty channel="Y" name="resolution" value="1000" units="1/cm"/>
+          <inkml:channelProperty channel="F" name="resolution" value="0" units="1/dev"/>
+        </inkml:channelProperties>
+      </inkml:inkSource>
+      <inkml:timestamp xml:id="ts0" timeString="2025-02-18T16:13:40.994"/>
+    </inkml:context>
+    <inkml:brush xml:id="br0">
+      <inkml:brushProperty name="width" value="0.1" units="cm"/>
+      <inkml:brushProperty name="height" value="0.1" units="cm"/>
+      <inkml:brushProperty name="color" value="#E71225"/>
+    </inkml:brush>
+  </inkml:definitions>
+  <inkml:trace contextRef="#ctx0" brushRef="#br0">1 0 24575,'0'0'0</inkml:trace>
+</inkml:ink>
+</file>
+
+<file path=ppt/ink/ink28.xml><?xml version="1.0" encoding="utf-8"?>
+<inkml:ink xmlns:inkml="http://www.w3.org/2003/InkML">
+  <inkml:definitions>
+    <inkml:context xml:id="ctx0">
+      <inkml:inkSource xml:id="inkSrc0">
+        <inkml:traceFormat>
+          <inkml:channel name="X" type="integer" min="-2.14748E9" max="2.14748E9" units="cm"/>
+          <inkml:channel name="Y" type="integer" min="-2.14748E9" max="2.14748E9" units="cm"/>
+          <inkml:channel name="F" type="integer" max="32767" units="dev"/>
+        </inkml:traceFormat>
+        <inkml:channelProperties>
+          <inkml:channelProperty channel="X" name="resolution" value="1000" units="1/cm"/>
+          <inkml:channelProperty channel="Y" name="resolution" value="1000" units="1/cm"/>
+          <inkml:channelProperty channel="F" name="resolution" value="0" units="1/dev"/>
+        </inkml:channelProperties>
+      </inkml:inkSource>
+      <inkml:timestamp xml:id="ts0" timeString="2025-02-18T16:13:42.544"/>
+    </inkml:context>
+    <inkml:brush xml:id="br0">
+      <inkml:brushProperty name="width" value="0.1" units="cm"/>
+      <inkml:brushProperty name="height" value="0.1" units="cm"/>
+      <inkml:brushProperty name="color" value="#E71225"/>
+    </inkml:brush>
+  </inkml:definitions>
+  <inkml:trace contextRef="#ctx0" brushRef="#br0">0 0 24575,'0'0'0</inkml:trace>
+</inkml:ink>
+</file>
+
+<file path=ppt/ink/ink29.xml><?xml version="1.0" encoding="utf-8"?>
+<inkml:ink xmlns:inkml="http://www.w3.org/2003/InkML">
+  <inkml:definitions>
+    <inkml:context xml:id="ctx0">
+      <inkml:inkSource xml:id="inkSrc0">
+        <inkml:traceFormat>
+          <inkml:channel name="X" type="integer" min="-2.14748E9" max="2.14748E9" units="cm"/>
+          <inkml:channel name="Y" type="integer" min="-2.14748E9" max="2.14748E9" units="cm"/>
+          <inkml:channel name="F" type="integer" max="32767" units="dev"/>
+        </inkml:traceFormat>
+        <inkml:channelProperties>
+          <inkml:channelProperty channel="X" name="resolution" value="1000" units="1/cm"/>
+          <inkml:channelProperty channel="Y" name="resolution" value="1000" units="1/cm"/>
+          <inkml:channelProperty channel="F" name="resolution" value="0" units="1/dev"/>
+        </inkml:channelProperties>
+      </inkml:inkSource>
+      <inkml:timestamp xml:id="ts0" timeString="2025-02-18T16:13:43.627"/>
+    </inkml:context>
+    <inkml:brush xml:id="br0">
+      <inkml:brushProperty name="width" value="0.1" units="cm"/>
+      <inkml:brushProperty name="height" value="0.1" units="cm"/>
+      <inkml:brushProperty name="color" value="#E71225"/>
+    </inkml:brush>
+  </inkml:definitions>
+  <inkml:trace contextRef="#ctx0" brushRef="#br0">1 0 24575,'0'0'0</inkml:trace>
+</inkml:ink>
+</file>
+
+<file path=ppt/ink/ink3.xml><?xml version="1.0" encoding="utf-8"?>
+<inkml:ink xmlns:inkml="http://www.w3.org/2003/InkML">
+  <inkml:definitions>
+    <inkml:context xml:id="ctx0">
+      <inkml:inkSource xml:id="inkSrc0">
+        <inkml:traceFormat>
+          <inkml:channel name="X" type="integer" min="-2.14748E9" max="2.14748E9" units="cm"/>
+          <inkml:channel name="Y" type="integer" min="-2.14748E9" max="2.14748E9" units="cm"/>
+          <inkml:channel name="F" type="integer" max="32767" units="dev"/>
+        </inkml:traceFormat>
+        <inkml:channelProperties>
+          <inkml:channelProperty channel="X" name="resolution" value="1000" units="1/cm"/>
+          <inkml:channelProperty channel="Y" name="resolution" value="1000" units="1/cm"/>
+          <inkml:channelProperty channel="F" name="resolution" value="0" units="1/dev"/>
+        </inkml:channelProperties>
+      </inkml:inkSource>
+      <inkml:timestamp xml:id="ts0" timeString="2025-02-18T16:07:45.534"/>
+    </inkml:context>
+    <inkml:brush xml:id="br0">
+      <inkml:brushProperty name="width" value="0.1" units="cm"/>
+      <inkml:brushProperty name="height" value="0.1" units="cm"/>
+      <inkml:brushProperty name="color" value="#E71225"/>
+    </inkml:brush>
+  </inkml:definitions>
+  <inkml:trace contextRef="#ctx0" brushRef="#br0">1 1 24575,'0'0'0</inkml:trace>
+</inkml:ink>
+</file>
+
+<file path=ppt/ink/ink30.xml><?xml version="1.0" encoding="utf-8"?>
+<inkml:ink xmlns:inkml="http://www.w3.org/2003/InkML">
+  <inkml:definitions>
+    <inkml:context xml:id="ctx0">
+      <inkml:inkSource xml:id="inkSrc0">
+        <inkml:traceFormat>
+          <inkml:channel name="X" type="integer" min="-2.14748E9" max="2.14748E9" units="cm"/>
+          <inkml:channel name="Y" type="integer" min="-2.14748E9" max="2.14748E9" units="cm"/>
+          <inkml:channel name="F" type="integer" max="32767" units="dev"/>
+        </inkml:traceFormat>
+        <inkml:channelProperties>
+          <inkml:channelProperty channel="X" name="resolution" value="1000" units="1/cm"/>
+          <inkml:channelProperty channel="Y" name="resolution" value="1000" units="1/cm"/>
+          <inkml:channelProperty channel="F" name="resolution" value="0" units="1/dev"/>
+        </inkml:channelProperties>
+      </inkml:inkSource>
+      <inkml:timestamp xml:id="ts0" timeString="2025-02-18T16:13:44.696"/>
+    </inkml:context>
+    <inkml:brush xml:id="br0">
+      <inkml:brushProperty name="width" value="0.1" units="cm"/>
+      <inkml:brushProperty name="height" value="0.1" units="cm"/>
+      <inkml:brushProperty name="color" value="#E71225"/>
+    </inkml:brush>
+  </inkml:definitions>
+  <inkml:trace contextRef="#ctx0" brushRef="#br0">1 0 24575,'0'0'0</inkml:trace>
+</inkml:ink>
+</file>
+
+<file path=ppt/ink/ink31.xml><?xml version="1.0" encoding="utf-8"?>
+<inkml:ink xmlns:inkml="http://www.w3.org/2003/InkML">
+  <inkml:definitions>
+    <inkml:context xml:id="ctx0">
+      <inkml:inkSource xml:id="inkSrc0">
+        <inkml:traceFormat>
+          <inkml:channel name="X" type="integer" min="-2.14748E9" max="2.14748E9" units="cm"/>
+          <inkml:channel name="Y" type="integer" min="-2.14748E9" max="2.14748E9" units="cm"/>
+          <inkml:channel name="F" type="integer" max="32767" units="dev"/>
+        </inkml:traceFormat>
+        <inkml:channelProperties>
+          <inkml:channelProperty channel="X" name="resolution" value="1000" units="1/cm"/>
+          <inkml:channelProperty channel="Y" name="resolution" value="1000" units="1/cm"/>
+          <inkml:channelProperty channel="F" name="resolution" value="0" units="1/dev"/>
+        </inkml:channelProperties>
+      </inkml:inkSource>
+      <inkml:timestamp xml:id="ts0" timeString="2025-02-18T16:13:46.156"/>
+    </inkml:context>
+    <inkml:brush xml:id="br0">
+      <inkml:brushProperty name="width" value="0.1" units="cm"/>
+      <inkml:brushProperty name="height" value="0.1" units="cm"/>
+      <inkml:brushProperty name="color" value="#E71225"/>
+    </inkml:brush>
+  </inkml:definitions>
+  <inkml:trace contextRef="#ctx0" brushRef="#br0">1 0 24575,'0'0'0</inkml:trace>
+</inkml:ink>
+</file>
+
+<file path=ppt/ink/ink32.xml><?xml version="1.0" encoding="utf-8"?>
+<inkml:ink xmlns:inkml="http://www.w3.org/2003/InkML">
+  <inkml:definitions>
+    <inkml:context xml:id="ctx0">
+      <inkml:inkSource xml:id="inkSrc0">
+        <inkml:traceFormat>
+          <inkml:channel name="X" type="integer" min="-2.14748E9" max="2.14748E9" units="cm"/>
+          <inkml:channel name="Y" type="integer" min="-2.14748E9" max="2.14748E9" units="cm"/>
+          <inkml:channel name="F" type="integer" max="32767" units="dev"/>
+        </inkml:traceFormat>
+        <inkml:channelProperties>
+          <inkml:channelProperty channel="X" name="resolution" value="1000" units="1/cm"/>
+          <inkml:channelProperty channel="Y" name="resolution" value="1000" units="1/cm"/>
+          <inkml:channelProperty channel="F" name="resolution" value="0" units="1/dev"/>
+        </inkml:channelProperties>
+      </inkml:inkSource>
+      <inkml:timestamp xml:id="ts0" timeString="2025-02-18T16:13:53.221"/>
+    </inkml:context>
+    <inkml:brush xml:id="br0">
+      <inkml:brushProperty name="width" value="0.1" units="cm"/>
+      <inkml:brushProperty name="height" value="0.1" units="cm"/>
+      <inkml:brushProperty name="color" value="#E71225"/>
+    </inkml:brush>
+  </inkml:definitions>
+  <inkml:trace contextRef="#ctx0" brushRef="#br0">0 0 24575,'0'0'0</inkml:trace>
+</inkml:ink>
+</file>
+
+<file path=ppt/ink/ink4.xml><?xml version="1.0" encoding="utf-8"?>
+<inkml:ink xmlns:inkml="http://www.w3.org/2003/InkML">
+  <inkml:definitions>
+    <inkml:context xml:id="ctx0">
+      <inkml:inkSource xml:id="inkSrc0">
+        <inkml:traceFormat>
+          <inkml:channel name="X" type="integer" min="-2.14748E9" max="2.14748E9" units="cm"/>
+          <inkml:channel name="Y" type="integer" min="-2.14748E9" max="2.14748E9" units="cm"/>
+          <inkml:channel name="F" type="integer" max="32767" units="dev"/>
+        </inkml:traceFormat>
+        <inkml:channelProperties>
+          <inkml:channelProperty channel="X" name="resolution" value="1000" units="1/cm"/>
+          <inkml:channelProperty channel="Y" name="resolution" value="1000" units="1/cm"/>
+          <inkml:channelProperty channel="F" name="resolution" value="0" units="1/dev"/>
+        </inkml:channelProperties>
+      </inkml:inkSource>
+      <inkml:timestamp xml:id="ts0" timeString="2025-02-18T16:07:49.708"/>
+    </inkml:context>
+    <inkml:brush xml:id="br0">
+      <inkml:brushProperty name="width" value="0.1" units="cm"/>
+      <inkml:brushProperty name="height" value="0.1" units="cm"/>
+      <inkml:brushProperty name="color" value="#E71225"/>
+    </inkml:brush>
+  </inkml:definitions>
+  <inkml:trace contextRef="#ctx0" brushRef="#br0">0 0 24575,'0'0'0</inkml:trace>
+</inkml:ink>
+</file>
+
+<file path=ppt/ink/ink5.xml><?xml version="1.0" encoding="utf-8"?>
+<inkml:ink xmlns:inkml="http://www.w3.org/2003/InkML">
+  <inkml:definitions>
+    <inkml:context xml:id="ctx0">
+      <inkml:inkSource xml:id="inkSrc0">
+        <inkml:traceFormat>
+          <inkml:channel name="X" type="integer" min="-2.14748E9" max="2.14748E9" units="cm"/>
+          <inkml:channel name="Y" type="integer" min="-2.14748E9" max="2.14748E9" units="cm"/>
+          <inkml:channel name="F" type="integer" max="32767" units="dev"/>
+        </inkml:traceFormat>
+        <inkml:channelProperties>
+          <inkml:channelProperty channel="X" name="resolution" value="1000" units="1/cm"/>
+          <inkml:channelProperty channel="Y" name="resolution" value="1000" units="1/cm"/>
+          <inkml:channelProperty channel="F" name="resolution" value="0" units="1/dev"/>
+        </inkml:channelProperties>
+      </inkml:inkSource>
+      <inkml:timestamp xml:id="ts0" timeString="2025-02-18T16:10:51.272"/>
+    </inkml:context>
+    <inkml:brush xml:id="br0">
+      <inkml:brushProperty name="width" value="0.1" units="cm"/>
+      <inkml:brushProperty name="height" value="0.1" units="cm"/>
+      <inkml:brushProperty name="color" value="#E71225"/>
+    </inkml:brush>
+  </inkml:definitions>
+  <inkml:trace contextRef="#ctx0" brushRef="#br0">1 1 24575,'0'0'0</inkml:trace>
+</inkml:ink>
+</file>
+
+<file path=ppt/ink/ink6.xml><?xml version="1.0" encoding="utf-8"?>
+<inkml:ink xmlns:inkml="http://www.w3.org/2003/InkML">
+  <inkml:definitions>
+    <inkml:context xml:id="ctx0">
+      <inkml:inkSource xml:id="inkSrc0">
+        <inkml:traceFormat>
+          <inkml:channel name="X" type="integer" min="-2.14748E9" max="2.14748E9" units="cm"/>
+          <inkml:channel name="Y" type="integer" min="-2.14748E9" max="2.14748E9" units="cm"/>
+          <inkml:channel name="F" type="integer" max="32767" units="dev"/>
+        </inkml:traceFormat>
+        <inkml:channelProperties>
+          <inkml:channelProperty channel="X" name="resolution" value="1000" units="1/cm"/>
+          <inkml:channelProperty channel="Y" name="resolution" value="1000" units="1/cm"/>
+          <inkml:channelProperty channel="F" name="resolution" value="0" units="1/dev"/>
+        </inkml:channelProperties>
+      </inkml:inkSource>
+      <inkml:timestamp xml:id="ts0" timeString="2025-02-18T16:10:58.625"/>
+    </inkml:context>
+    <inkml:brush xml:id="br0">
+      <inkml:brushProperty name="width" value="0.1" units="cm"/>
+      <inkml:brushProperty name="height" value="0.1" units="cm"/>
+      <inkml:brushProperty name="color" value="#E71225"/>
+    </inkml:brush>
+  </inkml:definitions>
+  <inkml:trace contextRef="#ctx0" brushRef="#br0">0 0 24575,'0'0'0</inkml:trace>
+</inkml:ink>
+</file>
+
+<file path=ppt/ink/ink7.xml><?xml version="1.0" encoding="utf-8"?>
+<inkml:ink xmlns:inkml="http://www.w3.org/2003/InkML">
+  <inkml:definitions>
+    <inkml:context xml:id="ctx0">
+      <inkml:inkSource xml:id="inkSrc0">
+        <inkml:traceFormat>
+          <inkml:channel name="X" type="integer" min="-2.14748E9" max="2.14748E9" units="cm"/>
+          <inkml:channel name="Y" type="integer" min="-2.14748E9" max="2.14748E9" units="cm"/>
+          <inkml:channel name="F" type="integer" max="32767" units="dev"/>
+        </inkml:traceFormat>
+        <inkml:channelProperties>
+          <inkml:channelProperty channel="X" name="resolution" value="1000" units="1/cm"/>
+          <inkml:channelProperty channel="Y" name="resolution" value="1000" units="1/cm"/>
+          <inkml:channelProperty channel="F" name="resolution" value="0" units="1/dev"/>
+        </inkml:channelProperties>
+      </inkml:inkSource>
+      <inkml:timestamp xml:id="ts0" timeString="2025-02-18T16:10:59.830"/>
+    </inkml:context>
+    <inkml:brush xml:id="br0">
+      <inkml:brushProperty name="width" value="0.1" units="cm"/>
+      <inkml:brushProperty name="height" value="0.1" units="cm"/>
+      <inkml:brushProperty name="color" value="#E71225"/>
+    </inkml:brush>
+  </inkml:definitions>
+  <inkml:trace contextRef="#ctx0" brushRef="#br0">1 1 24575,'0'0'0</inkml:trace>
+</inkml:ink>
+</file>
+
+<file path=ppt/ink/ink8.xml><?xml version="1.0" encoding="utf-8"?>
+<inkml:ink xmlns:inkml="http://www.w3.org/2003/InkML">
+  <inkml:definitions>
+    <inkml:context xml:id="ctx0">
+      <inkml:inkSource xml:id="inkSrc0">
+        <inkml:traceFormat>
+          <inkml:channel name="X" type="integer" min="-2.14748E9" max="2.14748E9" units="cm"/>
+          <inkml:channel name="Y" type="integer" min="-2.14748E9" max="2.14748E9" units="cm"/>
+          <inkml:channel name="F" type="integer" max="32767" units="dev"/>
+        </inkml:traceFormat>
+        <inkml:channelProperties>
+          <inkml:channelProperty channel="X" name="resolution" value="1000" units="1/cm"/>
+          <inkml:channelProperty channel="Y" name="resolution" value="1000" units="1/cm"/>
+          <inkml:channelProperty channel="F" name="resolution" value="0" units="1/dev"/>
+        </inkml:channelProperties>
+      </inkml:inkSource>
+      <inkml:timestamp xml:id="ts0" timeString="2025-02-18T16:11:01.853"/>
+    </inkml:context>
+    <inkml:brush xml:id="br0">
+      <inkml:brushProperty name="width" value="0.1" units="cm"/>
+      <inkml:brushProperty name="height" value="0.1" units="cm"/>
+      <inkml:brushProperty name="color" value="#E71225"/>
+    </inkml:brush>
+  </inkml:definitions>
+  <inkml:trace contextRef="#ctx0" brushRef="#br0">0 1 24575,'0'0'0</inkml:trace>
+</inkml:ink>
+</file>
+
+<file path=ppt/ink/ink9.xml><?xml version="1.0" encoding="utf-8"?>
+<inkml:ink xmlns:inkml="http://www.w3.org/2003/InkML">
+  <inkml:definitions>
+    <inkml:context xml:id="ctx0">
+      <inkml:inkSource xml:id="inkSrc0">
+        <inkml:traceFormat>
+          <inkml:channel name="X" type="integer" min="-2.14748E9" max="2.14748E9" units="cm"/>
+          <inkml:channel name="Y" type="integer" min="-2.14748E9" max="2.14748E9" units="cm"/>
+          <inkml:channel name="F" type="integer" max="32767" units="dev"/>
+        </inkml:traceFormat>
+        <inkml:channelProperties>
+          <inkml:channelProperty channel="X" name="resolution" value="1000" units="1/cm"/>
+          <inkml:channelProperty channel="Y" name="resolution" value="1000" units="1/cm"/>
+          <inkml:channelProperty channel="F" name="resolution" value="0" units="1/dev"/>
+        </inkml:channelProperties>
+      </inkml:inkSource>
+      <inkml:timestamp xml:id="ts0" timeString="2025-02-18T16:11:30.568"/>
+    </inkml:context>
+    <inkml:brush xml:id="br0">
+      <inkml:brushProperty name="width" value="0.1" units="cm"/>
+      <inkml:brushProperty name="height" value="0.1" units="cm"/>
+      <inkml:brushProperty name="color" value="#E71225"/>
+    </inkml:brush>
+  </inkml:definitions>
+  <inkml:trace contextRef="#ctx0" brushRef="#br0">1 1 24575,'0'0'0</inkml:trace>
+</inkml:ink>
 </file>
 
 <file path=ppt/slideLayouts/slideLayout1.xml><?xml version="1.0" encoding="utf-8"?>
@@ -575,7 +1474,7 @@
           <a:p>
             <a:fld id="{67F45AC6-C491-4585-A584-9CE2AF7D5500}" type="datetime1">
               <a:rPr lang="en-US" smtClean="0"/>
-              <a:t>2/18/2025</a:t>
+              <a:t>2/18/25</a:t>
             </a:fld>
             <a:endParaRPr lang="en-US"/>
           </a:p>
@@ -778,7 +1677,7 @@
           <a:p>
             <a:fld id="{67F45AC6-C491-4585-A584-9CE2AF7D5500}" type="datetime1">
               <a:rPr lang="en-US" smtClean="0"/>
-              <a:t>2/18/2025</a:t>
+              <a:t>2/18/25</a:t>
             </a:fld>
             <a:endParaRPr lang="en-US"/>
           </a:p>
@@ -959,7 +1858,7 @@
           <a:p>
             <a:fld id="{67F45AC6-C491-4585-A584-9CE2AF7D5500}" type="datetime1">
               <a:rPr lang="en-US" smtClean="0"/>
-              <a:t>2/18/2025</a:t>
+              <a:t>2/18/25</a:t>
             </a:fld>
             <a:endParaRPr lang="en-US"/>
           </a:p>
@@ -1130,7 +2029,7 @@
           <a:p>
             <a:fld id="{67F45AC6-C491-4585-A584-9CE2AF7D5500}" type="datetime1">
               <a:rPr lang="en-US" smtClean="0"/>
-              <a:t>2/18/2025</a:t>
+              <a:t>2/18/25</a:t>
             </a:fld>
             <a:endParaRPr lang="en-US"/>
           </a:p>
@@ -1702,7 +2601,7 @@
           <a:p>
             <a:fld id="{67F45AC6-C491-4585-A584-9CE2AF7D5500}" type="datetime1">
               <a:rPr lang="en-US" smtClean="0"/>
-              <a:t>2/18/2025</a:t>
+              <a:t>2/18/25</a:t>
             </a:fld>
             <a:endParaRPr lang="en-US"/>
           </a:p>
@@ -2005,7 +2904,7 @@
           <a:p>
             <a:fld id="{67F45AC6-C491-4585-A584-9CE2AF7D5500}" type="datetime1">
               <a:rPr lang="en-US" smtClean="0"/>
-              <a:t>2/18/2025</a:t>
+              <a:t>2/18/25</a:t>
             </a:fld>
             <a:endParaRPr lang="en-US"/>
           </a:p>
@@ -2443,7 +3342,7 @@
           <a:p>
             <a:fld id="{67F45AC6-C491-4585-A584-9CE2AF7D5500}" type="datetime1">
               <a:rPr lang="en-US" smtClean="0"/>
-              <a:t>2/18/2025</a:t>
+              <a:t>2/18/25</a:t>
             </a:fld>
             <a:endParaRPr lang="en-US"/>
           </a:p>
@@ -2562,7 +3461,7 @@
           <a:p>
             <a:fld id="{67F45AC6-C491-4585-A584-9CE2AF7D5500}" type="datetime1">
               <a:rPr lang="en-US" smtClean="0"/>
-              <a:t>2/18/2025</a:t>
+              <a:t>2/18/25</a:t>
             </a:fld>
             <a:endParaRPr lang="en-US"/>
           </a:p>
@@ -2658,7 +3557,7 @@
           <a:p>
             <a:fld id="{67F45AC6-C491-4585-A584-9CE2AF7D5500}" type="datetime1">
               <a:rPr lang="en-US" smtClean="0"/>
-              <a:t>2/18/2025</a:t>
+              <a:t>2/18/25</a:t>
             </a:fld>
             <a:endParaRPr lang="en-US"/>
           </a:p>
@@ -3041,7 +3940,7 @@
           <a:p>
             <a:fld id="{67F45AC6-C491-4585-A584-9CE2AF7D5500}" type="datetime1">
               <a:rPr lang="en-US" smtClean="0"/>
-              <a:t>2/18/2025</a:t>
+              <a:t>2/18/25</a:t>
             </a:fld>
             <a:endParaRPr lang="en-US"/>
           </a:p>
@@ -3436,7 +4335,7 @@
           <a:p>
             <a:fld id="{67F45AC6-C491-4585-A584-9CE2AF7D5500}" type="datetime1">
               <a:rPr lang="en-US" smtClean="0"/>
-              <a:t>2/18/2025</a:t>
+              <a:t>2/18/25</a:t>
             </a:fld>
             <a:endParaRPr lang="en-US"/>
           </a:p>
@@ -3750,7 +4649,7 @@
           <a:p>
             <a:fld id="{67F45AC6-C491-4585-A584-9CE2AF7D5500}" type="datetime1">
               <a:rPr lang="en-US" smtClean="0"/>
-              <a:t>2/18/2025</a:t>
+              <a:t>2/18/25</a:t>
             </a:fld>
             <a:endParaRPr lang="en-US"/>
           </a:p>
@@ -4287,13 +5186,53 @@
           <a:lstStyle/>
           <a:p>
             <a:r>
-              <a:rPr lang="da-DK" sz="5400">
+              <a:rPr lang="da-DK" sz="5400" dirty="0">
                 <a:solidFill>
                   <a:srgbClr val="FFFFFF"/>
                 </a:solidFill>
               </a:rPr>
               <a:t>Dataprojekt</a:t>
             </a:r>
+            <a:br>
+              <a:rPr lang="da-DK" sz="5400" dirty="0">
+                <a:solidFill>
+                  <a:srgbClr val="FFFFFF"/>
+                </a:solidFill>
+              </a:rPr>
+            </a:br>
+            <a:r>
+              <a:rPr lang="da-DK" sz="2400" dirty="0" err="1"/>
+              <a:t>Orthodontic</a:t>
+            </a:r>
+            <a:r>
+              <a:rPr lang="da-DK" sz="2400" dirty="0"/>
+              <a:t> </a:t>
+            </a:r>
+            <a:r>
+              <a:rPr lang="da-DK" sz="2400" dirty="0" err="1"/>
+              <a:t>analysis</a:t>
+            </a:r>
+            <a:r>
+              <a:rPr lang="da-DK" sz="2400" dirty="0"/>
+              <a:t> of </a:t>
+            </a:r>
+            <a:r>
+              <a:rPr lang="da-DK" sz="2400" dirty="0" err="1"/>
+              <a:t>intra</a:t>
+            </a:r>
+            <a:r>
+              <a:rPr lang="da-DK" sz="2400" dirty="0"/>
+              <a:t>-oral </a:t>
+            </a:r>
+            <a:r>
+              <a:rPr lang="da-DK" sz="2400" dirty="0" err="1"/>
+              <a:t>scans</a:t>
+            </a:r>
+            <a:endParaRPr lang="da-DK" sz="4800" dirty="0">
+              <a:solidFill>
+                <a:srgbClr val="FFFFFF"/>
+              </a:solidFill>
+            </a:endParaRPr>
           </a:p>
         </p:txBody>
       </p:sp>
@@ -4836,38 +5775,6 @@
           </a:p>
         </p:txBody>
       </p:sp>
-      <p:pic>
-        <p:nvPicPr>
-          <p:cNvPr id="7" name="Pladsholder til indhold 6" descr="Data overblik">
-            <a:extLst>
-              <a:ext uri="{FF2B5EF4-FFF2-40B4-BE49-F238E27FC236}">
-                <a16:creationId xmlns:a16="http://schemas.microsoft.com/office/drawing/2014/main" id="{4153DE91-86B9-373B-7CF7-DB7420C67B2F}"/>
-              </a:ext>
-              <a:ext uri="{C183D7F6-B498-43B3-948B-1728B52AA6E4}">
-                <adec:decorative xmlns:adec="http://schemas.microsoft.com/office/drawing/2017/decorative" val="0"/>
-              </a:ext>
-            </a:extLst>
-          </p:cNvPr>
-          <p:cNvPicPr>
-            <a:picLocks noGrp="1" noChangeAspect="1"/>
-          </p:cNvPicPr>
-          <p:nvPr>
-            <p:ph idx="1"/>
-          </p:nvPr>
-        </p:nvPicPr>
-        <p:blipFill>
-          <a:blip r:embed="rId2"/>
-          <a:stretch>
-            <a:fillRect/>
-          </a:stretch>
-        </p:blipFill>
-        <p:spPr>
-          <a:xfrm>
-            <a:off x="6278798" y="372533"/>
-            <a:ext cx="5471323" cy="1823774"/>
-          </a:xfrm>
-        </p:spPr>
-      </p:pic>
       <p:sp>
         <p:nvSpPr>
           <p:cNvPr id="9" name="Tekstfelt 8">
@@ -4998,170 +5905,6 @@
           </a:p>
         </p:txBody>
       </p:sp>
-      <p:sp>
-        <p:nvSpPr>
-          <p:cNvPr id="11" name="Tekstfelt 10">
-            <a:extLst>
-              <a:ext uri="{FF2B5EF4-FFF2-40B4-BE49-F238E27FC236}">
-                <a16:creationId xmlns:a16="http://schemas.microsoft.com/office/drawing/2014/main" id="{F37E0FD9-F052-DF60-0F59-069B6CFEDBFC}"/>
-              </a:ext>
-            </a:extLst>
-          </p:cNvPr>
-          <p:cNvSpPr txBox="1"/>
-          <p:nvPr/>
-        </p:nvSpPr>
-        <p:spPr>
-          <a:xfrm>
-            <a:off x="6278798" y="1826975"/>
-            <a:ext cx="2179402" cy="369332"/>
-          </a:xfrm>
-          <a:prstGeom prst="rect">
-            <a:avLst/>
-          </a:prstGeom>
-          <a:noFill/>
-        </p:spPr>
-        <p:txBody>
-          <a:bodyPr wrap="square" rtlCol="0">
-            <a:spAutoFit/>
-          </a:bodyPr>
-          <a:lstStyle/>
-          <a:p>
-            <a:r>
-              <a:rPr lang="en-US" dirty="0" err="1">
-                <a:solidFill>
-                  <a:srgbClr val="FF0000"/>
-                </a:solidFill>
-              </a:rPr>
-              <a:t>Opgave</a:t>
-            </a:r>
-            <a:r>
-              <a:rPr lang="en-US" dirty="0">
-                <a:solidFill>
-                  <a:srgbClr val="FF0000"/>
-                </a:solidFill>
-              </a:rPr>
-              <a:t> 1 data</a:t>
-            </a:r>
-            <a:endParaRPr lang="en-DK" dirty="0">
-              <a:solidFill>
-                <a:srgbClr val="FF0000"/>
-              </a:solidFill>
-            </a:endParaRPr>
-          </a:p>
-        </p:txBody>
-      </p:sp>
-      <p:sp>
-        <p:nvSpPr>
-          <p:cNvPr id="13" name="Tekstfelt 12">
-            <a:extLst>
-              <a:ext uri="{FF2B5EF4-FFF2-40B4-BE49-F238E27FC236}">
-                <a16:creationId xmlns:a16="http://schemas.microsoft.com/office/drawing/2014/main" id="{A122C944-0D5F-0402-A1FD-28DE6DE1F1EE}"/>
-              </a:ext>
-            </a:extLst>
-          </p:cNvPr>
-          <p:cNvSpPr txBox="1"/>
-          <p:nvPr/>
-        </p:nvSpPr>
-        <p:spPr>
-          <a:xfrm>
-            <a:off x="8043680" y="391825"/>
-            <a:ext cx="1941557" cy="646331"/>
-          </a:xfrm>
-          <a:prstGeom prst="rect">
-            <a:avLst/>
-          </a:prstGeom>
-          <a:noFill/>
-        </p:spPr>
-        <p:txBody>
-          <a:bodyPr wrap="square" rtlCol="0">
-            <a:spAutoFit/>
-          </a:bodyPr>
-          <a:lstStyle/>
-          <a:p>
-            <a:r>
-              <a:rPr lang="en-US" dirty="0" err="1">
-                <a:solidFill>
-                  <a:srgbClr val="FF0000"/>
-                </a:solidFill>
-              </a:rPr>
-              <a:t>Opgave</a:t>
-            </a:r>
-            <a:r>
-              <a:rPr lang="en-US" dirty="0">
-                <a:solidFill>
-                  <a:srgbClr val="FF0000"/>
-                </a:solidFill>
-              </a:rPr>
-              <a:t> 2 data</a:t>
-            </a:r>
-            <a:endParaRPr lang="en-DK" dirty="0">
-              <a:solidFill>
-                <a:srgbClr val="FF0000"/>
-              </a:solidFill>
-            </a:endParaRPr>
-          </a:p>
-          <a:p>
-            <a:endParaRPr lang="en-DK" dirty="0"/>
-          </a:p>
-        </p:txBody>
-      </p:sp>
-      <p:sp>
-        <p:nvSpPr>
-          <p:cNvPr id="14" name="Tekstfelt 13">
-            <a:extLst>
-              <a:ext uri="{FF2B5EF4-FFF2-40B4-BE49-F238E27FC236}">
-                <a16:creationId xmlns:a16="http://schemas.microsoft.com/office/drawing/2014/main" id="{5A6A842F-C514-3A54-3E7D-4339D4EC4E3F}"/>
-              </a:ext>
-            </a:extLst>
-          </p:cNvPr>
-          <p:cNvSpPr txBox="1">
-            <a:spLocks/>
-          </p:cNvSpPr>
-          <p:nvPr/>
-        </p:nvSpPr>
-        <p:spPr>
-          <a:xfrm>
-            <a:off x="9808564" y="1826975"/>
-            <a:ext cx="1941557" cy="646331"/>
-          </a:xfrm>
-          <a:prstGeom prst="rect">
-            <a:avLst/>
-          </a:prstGeom>
-          <a:noFill/>
-        </p:spPr>
-        <p:txBody>
-          <a:bodyPr wrap="none" rtlCol="0">
-            <a:spAutoFit/>
-          </a:bodyPr>
-          <a:lstStyle/>
-          <a:p>
-            <a:r>
-              <a:rPr lang="en-US" dirty="0" err="1">
-                <a:solidFill>
-                  <a:srgbClr val="FF0000"/>
-                </a:solidFill>
-              </a:rPr>
-              <a:t>Opgave</a:t>
-            </a:r>
-            <a:r>
-              <a:rPr lang="en-US" dirty="0">
-                <a:solidFill>
-                  <a:srgbClr val="FF0000"/>
-                </a:solidFill>
-              </a:rPr>
-              <a:t> 1 data</a:t>
-            </a:r>
-            <a:endParaRPr lang="en-DK" dirty="0">
-              <a:solidFill>
-                <a:srgbClr val="FF0000"/>
-              </a:solidFill>
-            </a:endParaRPr>
-          </a:p>
-          <a:p>
-            <a:endParaRPr lang="en-DK" dirty="0"/>
-          </a:p>
-        </p:txBody>
-      </p:sp>
       <p:pic>
         <p:nvPicPr>
           <p:cNvPr id="1026" name="Picture 2" descr="A diagram of teeth and mouth&#10;&#10;Description automatically generated with medium confidence">
@@ -5177,7 +5920,7 @@
           <p:nvPr/>
         </p:nvPicPr>
         <p:blipFill>
-          <a:blip r:embed="rId3">
+          <a:blip r:embed="rId2">
             <a:extLst>
               <a:ext uri="{28A0092B-C50C-407E-A947-70E740481C1C}">
                 <a14:useLocalDpi xmlns:a14="http://schemas.microsoft.com/office/drawing/2010/main" val="0"/>
@@ -5191,8 +5934,8 @@
         </p:blipFill>
         <p:spPr bwMode="auto">
           <a:xfrm>
-            <a:off x="904411" y="2386301"/>
-            <a:ext cx="3385986" cy="3484388"/>
+            <a:off x="904410" y="2386300"/>
+            <a:ext cx="3707430" cy="3815173"/>
           </a:xfrm>
           <a:prstGeom prst="rect">
             <a:avLst/>
@@ -5223,7 +5966,7 @@
         </p:nvSpPr>
         <p:spPr>
           <a:xfrm>
-            <a:off x="210312" y="6018505"/>
+            <a:off x="301712" y="6139225"/>
             <a:ext cx="2731838" cy="369332"/>
           </a:xfrm>
           <a:prstGeom prst="rect">
@@ -5276,7 +6019,7 @@
           <p:nvPr/>
         </p:nvPicPr>
         <p:blipFill>
-          <a:blip r:embed="rId4"/>
+          <a:blip r:embed="rId3"/>
           <a:stretch>
             <a:fillRect/>
           </a:stretch>
@@ -5306,7 +6049,7 @@
           <p:nvPr/>
         </p:nvPicPr>
         <p:blipFill>
-          <a:blip r:embed="rId5"/>
+          <a:blip r:embed="rId4"/>
           <a:stretch>
             <a:fillRect/>
           </a:stretch>
@@ -5448,10 +6191,2571 @@
           </a:fontRef>
         </p:style>
       </p:cxnSp>
+      <p:sp>
+        <p:nvSpPr>
+          <p:cNvPr id="4" name="Pladsholder til indhold 3">
+            <a:extLst>
+              <a:ext uri="{FF2B5EF4-FFF2-40B4-BE49-F238E27FC236}">
+                <a16:creationId xmlns:a16="http://schemas.microsoft.com/office/drawing/2014/main" id="{B9D4CE6F-CB36-270D-BF4B-78A23420581C}"/>
+              </a:ext>
+            </a:extLst>
+          </p:cNvPr>
+          <p:cNvSpPr>
+            <a:spLocks noGrp="1"/>
+          </p:cNvSpPr>
+          <p:nvPr>
+            <p:ph idx="1"/>
+          </p:nvPr>
+        </p:nvSpPr>
+        <p:spPr/>
+        <p:txBody>
+          <a:bodyPr/>
+          <a:lstStyle/>
+          <a:p>
+            <a:endParaRPr lang="da-DK" dirty="0"/>
+          </a:p>
+        </p:txBody>
+      </p:sp>
     </p:spTree>
     <p:extLst>
       <p:ext uri="{BB962C8B-B14F-4D97-AF65-F5344CB8AC3E}">
         <p14:creationId xmlns:p14="http://schemas.microsoft.com/office/powerpoint/2010/main" val="3763853363"/>
+      </p:ext>
+    </p:extLst>
+  </p:cSld>
+  <p:clrMapOvr>
+    <a:masterClrMapping/>
+  </p:clrMapOvr>
+</p:sld>
+</file>
+
+<file path=ppt/slides/slide3.xml><?xml version="1.0" encoding="utf-8"?>
+<p:sld xmlns:a="http://schemas.openxmlformats.org/drawingml/2006/main" xmlns:r="http://schemas.openxmlformats.org/officeDocument/2006/relationships" xmlns:p="http://schemas.openxmlformats.org/presentationml/2006/main">
+  <p:cSld>
+    <p:spTree>
+      <p:nvGrpSpPr>
+        <p:cNvPr id="1" name=""/>
+        <p:cNvGrpSpPr/>
+        <p:nvPr/>
+      </p:nvGrpSpPr>
+      <p:grpSpPr>
+        <a:xfrm>
+          <a:off x="0" y="0"/>
+          <a:ext cx="0" cy="0"/>
+          <a:chOff x="0" y="0"/>
+          <a:chExt cx="0" cy="0"/>
+        </a:xfrm>
+      </p:grpSpPr>
+      <p:sp>
+        <p:nvSpPr>
+          <p:cNvPr id="2" name="Titel 1">
+            <a:extLst>
+              <a:ext uri="{FF2B5EF4-FFF2-40B4-BE49-F238E27FC236}">
+                <a16:creationId xmlns:a16="http://schemas.microsoft.com/office/drawing/2014/main" id="{8F29C49E-B8F8-2FD6-265D-CA3C865E78D3}"/>
+              </a:ext>
+            </a:extLst>
+          </p:cNvPr>
+          <p:cNvSpPr>
+            <a:spLocks noGrp="1"/>
+          </p:cNvSpPr>
+          <p:nvPr>
+            <p:ph type="title"/>
+          </p:nvPr>
+        </p:nvSpPr>
+        <p:spPr>
+          <a:xfrm>
+            <a:off x="454923" y="444319"/>
+            <a:ext cx="10058400" cy="1371600"/>
+          </a:xfrm>
+        </p:spPr>
+        <p:txBody>
+          <a:bodyPr>
+            <a:normAutofit fontScale="90000"/>
+          </a:bodyPr>
+          <a:lstStyle/>
+          <a:p>
+            <a:br>
+              <a:rPr lang="da-DK" dirty="0"/>
+            </a:br>
+            <a:r>
+              <a:rPr lang="da-DK" dirty="0"/>
+              <a:t>Data</a:t>
+            </a:r>
+          </a:p>
+        </p:txBody>
+      </p:sp>
+      <p:pic>
+        <p:nvPicPr>
+          <p:cNvPr id="4" name="Pladsholder til indhold 6">
+            <a:extLst>
+              <a:ext uri="{FF2B5EF4-FFF2-40B4-BE49-F238E27FC236}">
+                <a16:creationId xmlns:a16="http://schemas.microsoft.com/office/drawing/2014/main" id="{8869AF56-44B9-081A-A621-073A6E11498D}"/>
+              </a:ext>
+              <a:ext uri="{C183D7F6-B498-43B3-948B-1728B52AA6E4}">
+                <adec:decorative xmlns:adec="http://schemas.microsoft.com/office/drawing/2017/decorative" val="0"/>
+              </a:ext>
+            </a:extLst>
+          </p:cNvPr>
+          <p:cNvPicPr>
+            <a:picLocks noGrp="1" noChangeAspect="1"/>
+          </p:cNvPicPr>
+          <p:nvPr>
+            <p:ph idx="1"/>
+          </p:nvPr>
+        </p:nvPicPr>
+        <p:blipFill>
+          <a:blip r:embed="rId2"/>
+          <a:srcRect l="4222" t="9981" r="4817" b="10448"/>
+          <a:stretch/>
+        </p:blipFill>
+        <p:spPr>
+          <a:xfrm>
+            <a:off x="454923" y="2639934"/>
+            <a:ext cx="6413617" cy="1870139"/>
+          </a:xfrm>
+        </p:spPr>
+      </p:pic>
+      <p:sp>
+        <p:nvSpPr>
+          <p:cNvPr id="5" name="Tekstfelt 4">
+            <a:extLst>
+              <a:ext uri="{FF2B5EF4-FFF2-40B4-BE49-F238E27FC236}">
+                <a16:creationId xmlns:a16="http://schemas.microsoft.com/office/drawing/2014/main" id="{73A6ECF3-5EFB-E233-ECD9-F8E17C96F673}"/>
+              </a:ext>
+            </a:extLst>
+          </p:cNvPr>
+          <p:cNvSpPr txBox="1"/>
+          <p:nvPr/>
+        </p:nvSpPr>
+        <p:spPr>
+          <a:xfrm>
+            <a:off x="658073" y="4140741"/>
+            <a:ext cx="2313709" cy="369332"/>
+          </a:xfrm>
+          <a:prstGeom prst="rect">
+            <a:avLst/>
+          </a:prstGeom>
+          <a:noFill/>
+        </p:spPr>
+        <p:txBody>
+          <a:bodyPr wrap="square" rtlCol="0">
+            <a:spAutoFit/>
+          </a:bodyPr>
+          <a:lstStyle/>
+          <a:p>
+            <a:r>
+              <a:rPr lang="da-DK" dirty="0">
+                <a:solidFill>
+                  <a:schemeClr val="bg1"/>
+                </a:solidFill>
+              </a:rPr>
+              <a:t>Opgave 1</a:t>
+            </a:r>
+          </a:p>
+        </p:txBody>
+      </p:sp>
+      <p:sp>
+        <p:nvSpPr>
+          <p:cNvPr id="6" name="Tekstfelt 5">
+            <a:extLst>
+              <a:ext uri="{FF2B5EF4-FFF2-40B4-BE49-F238E27FC236}">
+                <a16:creationId xmlns:a16="http://schemas.microsoft.com/office/drawing/2014/main" id="{6168D770-CF6D-3E20-2F63-B6256F741426}"/>
+              </a:ext>
+            </a:extLst>
+          </p:cNvPr>
+          <p:cNvSpPr txBox="1"/>
+          <p:nvPr/>
+        </p:nvSpPr>
+        <p:spPr>
+          <a:xfrm>
+            <a:off x="5420442" y="4140741"/>
+            <a:ext cx="2313709" cy="369332"/>
+          </a:xfrm>
+          <a:prstGeom prst="rect">
+            <a:avLst/>
+          </a:prstGeom>
+          <a:noFill/>
+        </p:spPr>
+        <p:txBody>
+          <a:bodyPr wrap="square" rtlCol="0">
+            <a:spAutoFit/>
+          </a:bodyPr>
+          <a:lstStyle/>
+          <a:p>
+            <a:r>
+              <a:rPr lang="da-DK" dirty="0">
+                <a:solidFill>
+                  <a:schemeClr val="bg1"/>
+                </a:solidFill>
+              </a:rPr>
+              <a:t>Opgave 1</a:t>
+            </a:r>
+          </a:p>
+        </p:txBody>
+      </p:sp>
+      <p:sp>
+        <p:nvSpPr>
+          <p:cNvPr id="7" name="Tekstfelt 6">
+            <a:extLst>
+              <a:ext uri="{FF2B5EF4-FFF2-40B4-BE49-F238E27FC236}">
+                <a16:creationId xmlns:a16="http://schemas.microsoft.com/office/drawing/2014/main" id="{A1EA431E-C749-E15B-0F0A-4E439A2A7C15}"/>
+              </a:ext>
+            </a:extLst>
+          </p:cNvPr>
+          <p:cNvSpPr txBox="1"/>
+          <p:nvPr/>
+        </p:nvSpPr>
+        <p:spPr>
+          <a:xfrm>
+            <a:off x="2909455" y="4140741"/>
+            <a:ext cx="2313709" cy="369332"/>
+          </a:xfrm>
+          <a:prstGeom prst="rect">
+            <a:avLst/>
+          </a:prstGeom>
+          <a:noFill/>
+        </p:spPr>
+        <p:txBody>
+          <a:bodyPr wrap="square" rtlCol="0">
+            <a:spAutoFit/>
+          </a:bodyPr>
+          <a:lstStyle/>
+          <a:p>
+            <a:r>
+              <a:rPr lang="da-DK" dirty="0">
+                <a:solidFill>
+                  <a:schemeClr val="bg1"/>
+                </a:solidFill>
+              </a:rPr>
+              <a:t>Opgave 2</a:t>
+            </a:r>
+          </a:p>
+        </p:txBody>
+      </p:sp>
+      <p:pic>
+        <p:nvPicPr>
+          <p:cNvPr id="1026" name="Picture 2">
+            <a:extLst>
+              <a:ext uri="{FF2B5EF4-FFF2-40B4-BE49-F238E27FC236}">
+                <a16:creationId xmlns:a16="http://schemas.microsoft.com/office/drawing/2014/main" id="{F0FB5A6C-9389-6466-F492-B6212DFD3821}"/>
+              </a:ext>
+            </a:extLst>
+          </p:cNvPr>
+          <p:cNvPicPr>
+            <a:picLocks noChangeAspect="1" noChangeArrowheads="1"/>
+          </p:cNvPicPr>
+          <p:nvPr/>
+        </p:nvPicPr>
+        <p:blipFill>
+          <a:blip r:embed="rId3">
+            <a:extLst>
+              <a:ext uri="{28A0092B-C50C-407E-A947-70E740481C1C}">
+                <a14:useLocalDpi xmlns:a14="http://schemas.microsoft.com/office/drawing/2010/main" val="0"/>
+              </a:ext>
+            </a:extLst>
+          </a:blip>
+          <a:srcRect/>
+          <a:stretch>
+            <a:fillRect/>
+          </a:stretch>
+        </p:blipFill>
+        <p:spPr bwMode="auto">
+          <a:xfrm>
+            <a:off x="7065818" y="2009449"/>
+            <a:ext cx="4671259" cy="2820383"/>
+          </a:xfrm>
+          <a:prstGeom prst="rect">
+            <a:avLst/>
+          </a:prstGeom>
+          <a:noFill/>
+          <a:extLst>
+            <a:ext uri="{909E8E84-426E-40DD-AFC4-6F175D3DCCD1}">
+              <a14:hiddenFill xmlns:a14="http://schemas.microsoft.com/office/drawing/2010/main">
+                <a:solidFill>
+                  <a:srgbClr val="FFFFFF"/>
+                </a:solidFill>
+              </a14:hiddenFill>
+            </a:ext>
+          </a:extLst>
+        </p:spPr>
+      </p:pic>
+      <p:sp>
+        <p:nvSpPr>
+          <p:cNvPr id="9" name="Tekstfelt 8">
+            <a:extLst>
+              <a:ext uri="{FF2B5EF4-FFF2-40B4-BE49-F238E27FC236}">
+                <a16:creationId xmlns:a16="http://schemas.microsoft.com/office/drawing/2014/main" id="{FAAE0A82-46D0-DC79-2B47-16B3791A7719}"/>
+              </a:ext>
+            </a:extLst>
+          </p:cNvPr>
+          <p:cNvSpPr txBox="1"/>
+          <p:nvPr/>
+        </p:nvSpPr>
+        <p:spPr>
+          <a:xfrm>
+            <a:off x="7523018" y="4919785"/>
+            <a:ext cx="3214255" cy="369332"/>
+          </a:xfrm>
+          <a:prstGeom prst="rect">
+            <a:avLst/>
+          </a:prstGeom>
+          <a:noFill/>
+        </p:spPr>
+        <p:txBody>
+          <a:bodyPr wrap="square" rtlCol="0">
+            <a:spAutoFit/>
+          </a:bodyPr>
+          <a:lstStyle/>
+          <a:p>
+            <a:r>
+              <a:rPr lang="da-DK" dirty="0" err="1"/>
+              <a:t>Mesh</a:t>
+            </a:r>
+            <a:r>
+              <a:rPr lang="da-DK" dirty="0"/>
+              <a:t>-type data fra IOS </a:t>
+            </a:r>
+          </a:p>
+        </p:txBody>
+      </p:sp>
+      <p:sp>
+        <p:nvSpPr>
+          <p:cNvPr id="10" name="Tekstfelt 9">
+            <a:extLst>
+              <a:ext uri="{FF2B5EF4-FFF2-40B4-BE49-F238E27FC236}">
+                <a16:creationId xmlns:a16="http://schemas.microsoft.com/office/drawing/2014/main" id="{8BC2BBF4-42BF-1B13-9EED-DA96754F6275}"/>
+              </a:ext>
+            </a:extLst>
+          </p:cNvPr>
+          <p:cNvSpPr txBox="1"/>
+          <p:nvPr/>
+        </p:nvSpPr>
+        <p:spPr>
+          <a:xfrm>
+            <a:off x="658073" y="4710545"/>
+            <a:ext cx="4329563" cy="369332"/>
+          </a:xfrm>
+          <a:prstGeom prst="rect">
+            <a:avLst/>
+          </a:prstGeom>
+          <a:noFill/>
+        </p:spPr>
+        <p:txBody>
+          <a:bodyPr wrap="square" rtlCol="0">
+            <a:spAutoFit/>
+          </a:bodyPr>
+          <a:lstStyle/>
+          <a:p>
+            <a:r>
+              <a:rPr lang="da-DK" dirty="0"/>
+              <a:t>2D scanning af underkæbe </a:t>
+            </a:r>
+          </a:p>
+        </p:txBody>
+      </p:sp>
+    </p:spTree>
+    <p:extLst>
+      <p:ext uri="{BB962C8B-B14F-4D97-AF65-F5344CB8AC3E}">
+        <p14:creationId xmlns:p14="http://schemas.microsoft.com/office/powerpoint/2010/main" val="2736731199"/>
+      </p:ext>
+    </p:extLst>
+  </p:cSld>
+  <p:clrMapOvr>
+    <a:masterClrMapping/>
+  </p:clrMapOvr>
+</p:sld>
+</file>
+
+<file path=ppt/slides/slide4.xml><?xml version="1.0" encoding="utf-8"?>
+<p:sld xmlns:a="http://schemas.openxmlformats.org/drawingml/2006/main" xmlns:r="http://schemas.openxmlformats.org/officeDocument/2006/relationships" xmlns:p="http://schemas.openxmlformats.org/presentationml/2006/main">
+  <p:cSld>
+    <p:spTree>
+      <p:nvGrpSpPr>
+        <p:cNvPr id="1" name=""/>
+        <p:cNvGrpSpPr/>
+        <p:nvPr/>
+      </p:nvGrpSpPr>
+      <p:grpSpPr>
+        <a:xfrm>
+          <a:off x="0" y="0"/>
+          <a:ext cx="0" cy="0"/>
+          <a:chOff x="0" y="0"/>
+          <a:chExt cx="0" cy="0"/>
+        </a:xfrm>
+      </p:grpSpPr>
+      <p:sp>
+        <p:nvSpPr>
+          <p:cNvPr id="2" name="Titel 1">
+            <a:extLst>
+              <a:ext uri="{FF2B5EF4-FFF2-40B4-BE49-F238E27FC236}">
+                <a16:creationId xmlns:a16="http://schemas.microsoft.com/office/drawing/2014/main" id="{29545198-A47E-4ED4-65CA-24ABA78332F8}"/>
+              </a:ext>
+            </a:extLst>
+          </p:cNvPr>
+          <p:cNvSpPr>
+            <a:spLocks noGrp="1"/>
+          </p:cNvSpPr>
+          <p:nvPr>
+            <p:ph type="title"/>
+          </p:nvPr>
+        </p:nvSpPr>
+        <p:spPr>
+          <a:xfrm>
+            <a:off x="720437" y="491180"/>
+            <a:ext cx="10058400" cy="1371600"/>
+          </a:xfrm>
+        </p:spPr>
+        <p:txBody>
+          <a:bodyPr/>
+          <a:lstStyle/>
+          <a:p>
+            <a:r>
+              <a:rPr lang="da-DK" dirty="0"/>
+              <a:t>Opgave 1</a:t>
+            </a:r>
+          </a:p>
+        </p:txBody>
+      </p:sp>
+      <p:pic>
+        <p:nvPicPr>
+          <p:cNvPr id="4" name="Pladsholder til indhold 3">
+            <a:extLst>
+              <a:ext uri="{FF2B5EF4-FFF2-40B4-BE49-F238E27FC236}">
+                <a16:creationId xmlns:a16="http://schemas.microsoft.com/office/drawing/2014/main" id="{273C816F-6541-56B9-1759-3FFD9D1AE1CC}"/>
+              </a:ext>
+            </a:extLst>
+          </p:cNvPr>
+          <p:cNvPicPr>
+            <a:picLocks noGrp="1" noChangeAspect="1"/>
+          </p:cNvPicPr>
+          <p:nvPr>
+            <p:ph idx="1"/>
+          </p:nvPr>
+        </p:nvPicPr>
+        <p:blipFill>
+          <a:blip r:embed="rId2"/>
+          <a:stretch>
+            <a:fillRect/>
+          </a:stretch>
+        </p:blipFill>
+        <p:spPr>
+          <a:xfrm>
+            <a:off x="982827" y="1679573"/>
+            <a:ext cx="3209556" cy="4818707"/>
+          </a:xfrm>
+          <a:prstGeom prst="rect">
+            <a:avLst/>
+          </a:prstGeom>
+        </p:spPr>
+      </p:pic>
+      <p:pic>
+        <p:nvPicPr>
+          <p:cNvPr id="5" name="Pladsholder til indhold 6">
+            <a:extLst>
+              <a:ext uri="{FF2B5EF4-FFF2-40B4-BE49-F238E27FC236}">
+                <a16:creationId xmlns:a16="http://schemas.microsoft.com/office/drawing/2014/main" id="{F6DCFB45-8D9C-AAEC-F54D-FC90D29CB675}"/>
+              </a:ext>
+              <a:ext uri="{C183D7F6-B498-43B3-948B-1728B52AA6E4}">
+                <adec:decorative xmlns:adec="http://schemas.microsoft.com/office/drawing/2017/decorative" val="0"/>
+              </a:ext>
+            </a:extLst>
+          </p:cNvPr>
+          <p:cNvPicPr>
+            <a:picLocks noChangeAspect="1"/>
+          </p:cNvPicPr>
+          <p:nvPr/>
+        </p:nvPicPr>
+        <p:blipFill>
+          <a:blip r:embed="rId3"/>
+          <a:srcRect t="17878" r="66116" b="13113"/>
+          <a:stretch/>
+        </p:blipFill>
+        <p:spPr>
+          <a:xfrm>
+            <a:off x="4661751" y="4321531"/>
+            <a:ext cx="3408218" cy="2313709"/>
+          </a:xfrm>
+          <a:prstGeom prst="rect">
+            <a:avLst/>
+          </a:prstGeom>
+        </p:spPr>
+      </p:pic>
+      <p:pic>
+        <p:nvPicPr>
+          <p:cNvPr id="7" name="Pladsholder til indhold 6">
+            <a:extLst>
+              <a:ext uri="{FF2B5EF4-FFF2-40B4-BE49-F238E27FC236}">
+                <a16:creationId xmlns:a16="http://schemas.microsoft.com/office/drawing/2014/main" id="{B513E780-52B8-9DFC-5954-54143D859A96}"/>
+              </a:ext>
+              <a:ext uri="{C183D7F6-B498-43B3-948B-1728B52AA6E4}">
+                <adec:decorative xmlns:adec="http://schemas.microsoft.com/office/drawing/2017/decorative" val="0"/>
+              </a:ext>
+            </a:extLst>
+          </p:cNvPr>
+          <p:cNvPicPr>
+            <a:picLocks noChangeAspect="1"/>
+          </p:cNvPicPr>
+          <p:nvPr/>
+        </p:nvPicPr>
+        <p:blipFill>
+          <a:blip r:embed="rId3"/>
+          <a:srcRect l="67631" t="10027" b="20964"/>
+          <a:stretch/>
+        </p:blipFill>
+        <p:spPr>
+          <a:xfrm>
+            <a:off x="8385012" y="4321531"/>
+            <a:ext cx="3255815" cy="2313709"/>
+          </a:xfrm>
+          <a:prstGeom prst="rect">
+            <a:avLst/>
+          </a:prstGeom>
+        </p:spPr>
+      </p:pic>
+      <p:pic>
+        <p:nvPicPr>
+          <p:cNvPr id="9" name="Billede 8" descr="Et billede, der indeholder hvirvelløse dyr, sort-hvid&#10;&#10;Indhold genereret af kunstig intelligens kan være forkert.">
+            <a:extLst>
+              <a:ext uri="{FF2B5EF4-FFF2-40B4-BE49-F238E27FC236}">
+                <a16:creationId xmlns:a16="http://schemas.microsoft.com/office/drawing/2014/main" id="{D996748A-8C34-A0A2-1414-BDE2599885A9}"/>
+              </a:ext>
+            </a:extLst>
+          </p:cNvPr>
+          <p:cNvPicPr>
+            <a:picLocks noChangeAspect="1"/>
+          </p:cNvPicPr>
+          <p:nvPr/>
+        </p:nvPicPr>
+        <p:blipFill>
+          <a:blip r:embed="rId4"/>
+          <a:srcRect t="-483" r="63604" b="10822"/>
+          <a:stretch/>
+        </p:blipFill>
+        <p:spPr>
+          <a:xfrm>
+            <a:off x="4661751" y="874059"/>
+            <a:ext cx="3408218" cy="2798737"/>
+          </a:xfrm>
+          <a:prstGeom prst="rect">
+            <a:avLst/>
+          </a:prstGeom>
+        </p:spPr>
+      </p:pic>
+      <p:pic>
+        <p:nvPicPr>
+          <p:cNvPr id="11" name="Billede 10" descr="Et billede, der indeholder hvirvelløse dyr, sort-hvid&#10;&#10;Indhold genereret af kunstig intelligens kan være forkert.">
+            <a:extLst>
+              <a:ext uri="{FF2B5EF4-FFF2-40B4-BE49-F238E27FC236}">
+                <a16:creationId xmlns:a16="http://schemas.microsoft.com/office/drawing/2014/main" id="{38913961-6A15-3035-643F-4F9D99929EA2}"/>
+              </a:ext>
+            </a:extLst>
+          </p:cNvPr>
+          <p:cNvPicPr>
+            <a:picLocks noChangeAspect="1"/>
+          </p:cNvPicPr>
+          <p:nvPr/>
+        </p:nvPicPr>
+        <p:blipFill>
+          <a:blip r:embed="rId4"/>
+          <a:srcRect l="64240" t="6453" r="1622" b="4243"/>
+          <a:stretch/>
+        </p:blipFill>
+        <p:spPr>
+          <a:xfrm>
+            <a:off x="8385012" y="874059"/>
+            <a:ext cx="3209556" cy="2798737"/>
+          </a:xfrm>
+          <a:prstGeom prst="rect">
+            <a:avLst/>
+          </a:prstGeom>
+        </p:spPr>
+      </p:pic>
+      <p:sp>
+        <p:nvSpPr>
+          <p:cNvPr id="18" name="Tekstfelt 17">
+            <a:extLst>
+              <a:ext uri="{FF2B5EF4-FFF2-40B4-BE49-F238E27FC236}">
+                <a16:creationId xmlns:a16="http://schemas.microsoft.com/office/drawing/2014/main" id="{9429B2FA-0577-AD22-9279-8ABBEF4B4CD2}"/>
+              </a:ext>
+            </a:extLst>
+          </p:cNvPr>
+          <p:cNvSpPr txBox="1"/>
+          <p:nvPr/>
+        </p:nvSpPr>
+        <p:spPr>
+          <a:xfrm>
+            <a:off x="4661751" y="497541"/>
+            <a:ext cx="1775012" cy="376518"/>
+          </a:xfrm>
+          <a:prstGeom prst="rect">
+            <a:avLst/>
+          </a:prstGeom>
+          <a:noFill/>
+        </p:spPr>
+        <p:txBody>
+          <a:bodyPr wrap="square" rtlCol="0">
+            <a:spAutoFit/>
+          </a:bodyPr>
+          <a:lstStyle/>
+          <a:p>
+            <a:r>
+              <a:rPr lang="da-DK" dirty="0"/>
+              <a:t>Upper</a:t>
+            </a:r>
+          </a:p>
+        </p:txBody>
+      </p:sp>
+      <p:sp>
+        <p:nvSpPr>
+          <p:cNvPr id="19" name="Tekstfelt 18">
+            <a:extLst>
+              <a:ext uri="{FF2B5EF4-FFF2-40B4-BE49-F238E27FC236}">
+                <a16:creationId xmlns:a16="http://schemas.microsoft.com/office/drawing/2014/main" id="{C7FFFF5D-6ADB-47AC-9C56-044BBE1B2E02}"/>
+              </a:ext>
+            </a:extLst>
+          </p:cNvPr>
+          <p:cNvSpPr txBox="1"/>
+          <p:nvPr/>
+        </p:nvSpPr>
+        <p:spPr>
+          <a:xfrm>
+            <a:off x="4661751" y="3904261"/>
+            <a:ext cx="1605601" cy="369332"/>
+          </a:xfrm>
+          <a:prstGeom prst="rect">
+            <a:avLst/>
+          </a:prstGeom>
+          <a:noFill/>
+        </p:spPr>
+        <p:txBody>
+          <a:bodyPr wrap="square" rtlCol="0">
+            <a:spAutoFit/>
+          </a:bodyPr>
+          <a:lstStyle/>
+          <a:p>
+            <a:r>
+              <a:rPr lang="da-DK" dirty="0" err="1"/>
+              <a:t>Lower</a:t>
+            </a:r>
+            <a:endParaRPr lang="da-DK" dirty="0"/>
+          </a:p>
+        </p:txBody>
+      </p:sp>
+      <mc:AlternateContent xmlns:mc="http://schemas.openxmlformats.org/markup-compatibility/2006">
+        <mc:Choice xmlns:p14="http://schemas.microsoft.com/office/powerpoint/2010/main" Requires="p14">
+          <p:contentPart p14:bwMode="auto" r:id="rId5">
+            <p14:nvContentPartPr>
+              <p14:cNvPr id="20" name="Håndskrift 19">
+                <a:extLst>
+                  <a:ext uri="{FF2B5EF4-FFF2-40B4-BE49-F238E27FC236}">
+                    <a16:creationId xmlns:a16="http://schemas.microsoft.com/office/drawing/2014/main" id="{F41AC760-F387-6CC9-5112-A0D25E850A6A}"/>
+                  </a:ext>
+                </a:extLst>
+              </p14:cNvPr>
+              <p14:cNvContentPartPr/>
+              <p14:nvPr/>
+            </p14:nvContentPartPr>
+            <p14:xfrm>
+              <a:off x="7166355" y="2019795"/>
+              <a:ext cx="360" cy="360"/>
+            </p14:xfrm>
+          </p:contentPart>
+        </mc:Choice>
+        <mc:Fallback>
+          <p:pic>
+            <p:nvPicPr>
+              <p:cNvPr id="20" name="Håndskrift 19">
+                <a:extLst>
+                  <a:ext uri="{FF2B5EF4-FFF2-40B4-BE49-F238E27FC236}">
+                    <a16:creationId xmlns:a16="http://schemas.microsoft.com/office/drawing/2014/main" id="{F41AC760-F387-6CC9-5112-A0D25E850A6A}"/>
+                  </a:ext>
+                </a:extLst>
+              </p:cNvPr>
+              <p:cNvPicPr/>
+              <p:nvPr/>
+            </p:nvPicPr>
+            <p:blipFill>
+              <a:blip r:embed="rId6"/>
+              <a:stretch>
+                <a:fillRect/>
+              </a:stretch>
+            </p:blipFill>
+            <p:spPr>
+              <a:xfrm>
+                <a:off x="7148715" y="2001795"/>
+                <a:ext cx="36000" cy="36000"/>
+              </a:xfrm>
+              <a:prstGeom prst="rect">
+                <a:avLst/>
+              </a:prstGeom>
+            </p:spPr>
+          </p:pic>
+        </mc:Fallback>
+      </mc:AlternateContent>
+      <mc:AlternateContent xmlns:mc="http://schemas.openxmlformats.org/markup-compatibility/2006">
+        <mc:Choice xmlns:p14="http://schemas.microsoft.com/office/powerpoint/2010/main" Requires="p14">
+          <p:contentPart p14:bwMode="auto" r:id="rId7">
+            <p14:nvContentPartPr>
+              <p14:cNvPr id="21" name="Håndskrift 20">
+                <a:extLst>
+                  <a:ext uri="{FF2B5EF4-FFF2-40B4-BE49-F238E27FC236}">
+                    <a16:creationId xmlns:a16="http://schemas.microsoft.com/office/drawing/2014/main" id="{34D19648-B6FC-BA90-5A77-36EC773FF65B}"/>
+                  </a:ext>
+                </a:extLst>
+              </p14:cNvPr>
+              <p14:cNvContentPartPr/>
+              <p14:nvPr/>
+            </p14:nvContentPartPr>
+            <p14:xfrm>
+              <a:off x="9258855" y="1807395"/>
+              <a:ext cx="360" cy="360"/>
+            </p14:xfrm>
+          </p:contentPart>
+        </mc:Choice>
+        <mc:Fallback>
+          <p:pic>
+            <p:nvPicPr>
+              <p:cNvPr id="21" name="Håndskrift 20">
+                <a:extLst>
+                  <a:ext uri="{FF2B5EF4-FFF2-40B4-BE49-F238E27FC236}">
+                    <a16:creationId xmlns:a16="http://schemas.microsoft.com/office/drawing/2014/main" id="{34D19648-B6FC-BA90-5A77-36EC773FF65B}"/>
+                  </a:ext>
+                </a:extLst>
+              </p:cNvPr>
+              <p:cNvPicPr/>
+              <p:nvPr/>
+            </p:nvPicPr>
+            <p:blipFill>
+              <a:blip r:embed="rId6"/>
+              <a:stretch>
+                <a:fillRect/>
+              </a:stretch>
+            </p:blipFill>
+            <p:spPr>
+              <a:xfrm>
+                <a:off x="9240855" y="1789755"/>
+                <a:ext cx="36000" cy="36000"/>
+              </a:xfrm>
+              <a:prstGeom prst="rect">
+                <a:avLst/>
+              </a:prstGeom>
+            </p:spPr>
+          </p:pic>
+        </mc:Fallback>
+      </mc:AlternateContent>
+      <mc:AlternateContent xmlns:mc="http://schemas.openxmlformats.org/markup-compatibility/2006">
+        <mc:Choice xmlns:p14="http://schemas.microsoft.com/office/powerpoint/2010/main" Requires="p14">
+          <p:contentPart p14:bwMode="auto" r:id="rId8">
+            <p14:nvContentPartPr>
+              <p14:cNvPr id="22" name="Håndskrift 21">
+                <a:extLst>
+                  <a:ext uri="{FF2B5EF4-FFF2-40B4-BE49-F238E27FC236}">
+                    <a16:creationId xmlns:a16="http://schemas.microsoft.com/office/drawing/2014/main" id="{8AACE0DA-D3EC-71E3-1F4A-7463CA25D1F0}"/>
+                  </a:ext>
+                </a:extLst>
+              </p14:cNvPr>
+              <p14:cNvContentPartPr/>
+              <p14:nvPr/>
+            </p14:nvContentPartPr>
+            <p14:xfrm>
+              <a:off x="9117375" y="5578030"/>
+              <a:ext cx="360" cy="360"/>
+            </p14:xfrm>
+          </p:contentPart>
+        </mc:Choice>
+        <mc:Fallback>
+          <p:pic>
+            <p:nvPicPr>
+              <p:cNvPr id="22" name="Håndskrift 21">
+                <a:extLst>
+                  <a:ext uri="{FF2B5EF4-FFF2-40B4-BE49-F238E27FC236}">
+                    <a16:creationId xmlns:a16="http://schemas.microsoft.com/office/drawing/2014/main" id="{8AACE0DA-D3EC-71E3-1F4A-7463CA25D1F0}"/>
+                  </a:ext>
+                </a:extLst>
+              </p:cNvPr>
+              <p:cNvPicPr/>
+              <p:nvPr/>
+            </p:nvPicPr>
+            <p:blipFill>
+              <a:blip r:embed="rId6"/>
+              <a:stretch>
+                <a:fillRect/>
+              </a:stretch>
+            </p:blipFill>
+            <p:spPr>
+              <a:xfrm>
+                <a:off x="9099735" y="5560390"/>
+                <a:ext cx="36000" cy="36000"/>
+              </a:xfrm>
+              <a:prstGeom prst="rect">
+                <a:avLst/>
+              </a:prstGeom>
+            </p:spPr>
+          </p:pic>
+        </mc:Fallback>
+      </mc:AlternateContent>
+      <mc:AlternateContent xmlns:mc="http://schemas.openxmlformats.org/markup-compatibility/2006">
+        <mc:Choice xmlns:p14="http://schemas.microsoft.com/office/powerpoint/2010/main" Requires="p14">
+          <p:contentPart p14:bwMode="auto" r:id="rId9">
+            <p14:nvContentPartPr>
+              <p14:cNvPr id="23" name="Håndskrift 22">
+                <a:extLst>
+                  <a:ext uri="{FF2B5EF4-FFF2-40B4-BE49-F238E27FC236}">
+                    <a16:creationId xmlns:a16="http://schemas.microsoft.com/office/drawing/2014/main" id="{6223E59E-CF46-81DD-48DE-1D975108E5AE}"/>
+                  </a:ext>
+                </a:extLst>
+              </p14:cNvPr>
+              <p14:cNvContentPartPr/>
+              <p14:nvPr/>
+            </p14:nvContentPartPr>
+            <p14:xfrm>
+              <a:off x="7250310" y="5330810"/>
+              <a:ext cx="360" cy="360"/>
+            </p14:xfrm>
+          </p:contentPart>
+        </mc:Choice>
+        <mc:Fallback>
+          <p:pic>
+            <p:nvPicPr>
+              <p:cNvPr id="23" name="Håndskrift 22">
+                <a:extLst>
+                  <a:ext uri="{FF2B5EF4-FFF2-40B4-BE49-F238E27FC236}">
+                    <a16:creationId xmlns:a16="http://schemas.microsoft.com/office/drawing/2014/main" id="{6223E59E-CF46-81DD-48DE-1D975108E5AE}"/>
+                  </a:ext>
+                </a:extLst>
+              </p:cNvPr>
+              <p:cNvPicPr/>
+              <p:nvPr/>
+            </p:nvPicPr>
+            <p:blipFill>
+              <a:blip r:embed="rId6"/>
+              <a:stretch>
+                <a:fillRect/>
+              </a:stretch>
+            </p:blipFill>
+            <p:spPr>
+              <a:xfrm>
+                <a:off x="7232310" y="5312810"/>
+                <a:ext cx="36000" cy="36000"/>
+              </a:xfrm>
+              <a:prstGeom prst="rect">
+                <a:avLst/>
+              </a:prstGeom>
+            </p:spPr>
+          </p:pic>
+        </mc:Fallback>
+      </mc:AlternateContent>
+    </p:spTree>
+    <p:extLst>
+      <p:ext uri="{BB962C8B-B14F-4D97-AF65-F5344CB8AC3E}">
+        <p14:creationId xmlns:p14="http://schemas.microsoft.com/office/powerpoint/2010/main" val="1436928074"/>
+      </p:ext>
+    </p:extLst>
+  </p:cSld>
+  <p:clrMapOvr>
+    <a:masterClrMapping/>
+  </p:clrMapOvr>
+</p:sld>
+</file>
+
+<file path=ppt/slides/slide5.xml><?xml version="1.0" encoding="utf-8"?>
+<p:sld xmlns:a="http://schemas.openxmlformats.org/drawingml/2006/main" xmlns:r="http://schemas.openxmlformats.org/officeDocument/2006/relationships" xmlns:p="http://schemas.openxmlformats.org/presentationml/2006/main">
+  <p:cSld>
+    <p:spTree>
+      <p:nvGrpSpPr>
+        <p:cNvPr id="1" name=""/>
+        <p:cNvGrpSpPr/>
+        <p:nvPr/>
+      </p:nvGrpSpPr>
+      <p:grpSpPr>
+        <a:xfrm>
+          <a:off x="0" y="0"/>
+          <a:ext cx="0" cy="0"/>
+          <a:chOff x="0" y="0"/>
+          <a:chExt cx="0" cy="0"/>
+        </a:xfrm>
+      </p:grpSpPr>
+      <p:sp>
+        <p:nvSpPr>
+          <p:cNvPr id="2" name="Titel 1">
+            <a:extLst>
+              <a:ext uri="{FF2B5EF4-FFF2-40B4-BE49-F238E27FC236}">
+                <a16:creationId xmlns:a16="http://schemas.microsoft.com/office/drawing/2014/main" id="{CD32A17A-FBF2-7A6C-F391-084611B597C7}"/>
+              </a:ext>
+            </a:extLst>
+          </p:cNvPr>
+          <p:cNvSpPr>
+            <a:spLocks noGrp="1"/>
+          </p:cNvSpPr>
+          <p:nvPr>
+            <p:ph type="title"/>
+          </p:nvPr>
+        </p:nvSpPr>
+        <p:spPr>
+          <a:xfrm>
+            <a:off x="764087" y="592491"/>
+            <a:ext cx="10058400" cy="1371600"/>
+          </a:xfrm>
+        </p:spPr>
+        <p:txBody>
+          <a:bodyPr/>
+          <a:lstStyle/>
+          <a:p>
+            <a:r>
+              <a:rPr lang="da-DK" dirty="0"/>
+              <a:t>Opgave 2</a:t>
+            </a:r>
+          </a:p>
+        </p:txBody>
+      </p:sp>
+      <p:pic>
+        <p:nvPicPr>
+          <p:cNvPr id="4" name="Pladsholder til indhold 6">
+            <a:extLst>
+              <a:ext uri="{FF2B5EF4-FFF2-40B4-BE49-F238E27FC236}">
+                <a16:creationId xmlns:a16="http://schemas.microsoft.com/office/drawing/2014/main" id="{0ECEC955-08C3-9766-E13C-449E65240143}"/>
+              </a:ext>
+              <a:ext uri="{C183D7F6-B498-43B3-948B-1728B52AA6E4}">
+                <adec:decorative xmlns:adec="http://schemas.microsoft.com/office/drawing/2017/decorative" val="0"/>
+              </a:ext>
+            </a:extLst>
+          </p:cNvPr>
+          <p:cNvPicPr>
+            <a:picLocks noGrp="1" noChangeAspect="1"/>
+          </p:cNvPicPr>
+          <p:nvPr>
+            <p:ph idx="1"/>
+          </p:nvPr>
+        </p:nvPicPr>
+        <p:blipFill>
+          <a:blip r:embed="rId2"/>
+          <a:srcRect l="30501" t="11333" r="32582" b="10594"/>
+          <a:stretch/>
+        </p:blipFill>
+        <p:spPr>
+          <a:xfrm>
+            <a:off x="2630466" y="1806450"/>
+            <a:ext cx="6325644" cy="4459059"/>
+          </a:xfrm>
+        </p:spPr>
+      </p:pic>
+      <mc:AlternateContent xmlns:mc="http://schemas.openxmlformats.org/markup-compatibility/2006">
+        <mc:Choice xmlns:p14="http://schemas.microsoft.com/office/powerpoint/2010/main" Requires="p14">
+          <p:contentPart p14:bwMode="auto" r:id="rId3">
+            <p14:nvContentPartPr>
+              <p14:cNvPr id="5" name="Håndskrift 4">
+                <a:extLst>
+                  <a:ext uri="{FF2B5EF4-FFF2-40B4-BE49-F238E27FC236}">
+                    <a16:creationId xmlns:a16="http://schemas.microsoft.com/office/drawing/2014/main" id="{7F9E952D-16DA-1679-F36D-0A5DE9FE1445}"/>
+                  </a:ext>
+                </a:extLst>
+              </p14:cNvPr>
+              <p14:cNvContentPartPr/>
+              <p14:nvPr/>
+            </p14:nvContentPartPr>
+            <p14:xfrm>
+              <a:off x="4237092" y="2742057"/>
+              <a:ext cx="360" cy="360"/>
+            </p14:xfrm>
+          </p:contentPart>
+        </mc:Choice>
+        <mc:Fallback>
+          <p:pic>
+            <p:nvPicPr>
+              <p:cNvPr id="5" name="Håndskrift 4">
+                <a:extLst>
+                  <a:ext uri="{FF2B5EF4-FFF2-40B4-BE49-F238E27FC236}">
+                    <a16:creationId xmlns:a16="http://schemas.microsoft.com/office/drawing/2014/main" id="{7F9E952D-16DA-1679-F36D-0A5DE9FE1445}"/>
+                  </a:ext>
+                </a:extLst>
+              </p:cNvPr>
+              <p:cNvPicPr/>
+              <p:nvPr/>
+            </p:nvPicPr>
+            <p:blipFill>
+              <a:blip r:embed="rId4"/>
+              <a:stretch>
+                <a:fillRect/>
+              </a:stretch>
+            </p:blipFill>
+            <p:spPr>
+              <a:xfrm>
+                <a:off x="4219452" y="2724417"/>
+                <a:ext cx="36000" cy="36000"/>
+              </a:xfrm>
+              <a:prstGeom prst="rect">
+                <a:avLst/>
+              </a:prstGeom>
+            </p:spPr>
+          </p:pic>
+        </mc:Fallback>
+      </mc:AlternateContent>
+      <mc:AlternateContent xmlns:mc="http://schemas.openxmlformats.org/markup-compatibility/2006">
+        <mc:Choice xmlns:p14="http://schemas.microsoft.com/office/powerpoint/2010/main" Requires="p14">
+          <p:contentPart p14:bwMode="auto" r:id="rId5">
+            <p14:nvContentPartPr>
+              <p14:cNvPr id="6" name="Håndskrift 5">
+                <a:extLst>
+                  <a:ext uri="{FF2B5EF4-FFF2-40B4-BE49-F238E27FC236}">
+                    <a16:creationId xmlns:a16="http://schemas.microsoft.com/office/drawing/2014/main" id="{7B4AAF22-C011-393E-FD6C-EA0BF7AD59C4}"/>
+                  </a:ext>
+                </a:extLst>
+              </p14:cNvPr>
+              <p14:cNvContentPartPr/>
+              <p14:nvPr/>
+            </p14:nvContentPartPr>
+            <p14:xfrm>
+              <a:off x="4306267" y="3398507"/>
+              <a:ext cx="360" cy="360"/>
+            </p14:xfrm>
+          </p:contentPart>
+        </mc:Choice>
+        <mc:Fallback>
+          <p:pic>
+            <p:nvPicPr>
+              <p:cNvPr id="6" name="Håndskrift 5">
+                <a:extLst>
+                  <a:ext uri="{FF2B5EF4-FFF2-40B4-BE49-F238E27FC236}">
+                    <a16:creationId xmlns:a16="http://schemas.microsoft.com/office/drawing/2014/main" id="{7B4AAF22-C011-393E-FD6C-EA0BF7AD59C4}"/>
+                  </a:ext>
+                </a:extLst>
+              </p:cNvPr>
+              <p:cNvPicPr/>
+              <p:nvPr/>
+            </p:nvPicPr>
+            <p:blipFill>
+              <a:blip r:embed="rId4"/>
+              <a:stretch>
+                <a:fillRect/>
+              </a:stretch>
+            </p:blipFill>
+            <p:spPr>
+              <a:xfrm>
+                <a:off x="4288267" y="3380507"/>
+                <a:ext cx="36000" cy="36000"/>
+              </a:xfrm>
+              <a:prstGeom prst="rect">
+                <a:avLst/>
+              </a:prstGeom>
+            </p:spPr>
+          </p:pic>
+        </mc:Fallback>
+      </mc:AlternateContent>
+      <mc:AlternateContent xmlns:mc="http://schemas.openxmlformats.org/markup-compatibility/2006">
+        <mc:Choice xmlns:p14="http://schemas.microsoft.com/office/powerpoint/2010/main" Requires="p14">
+          <p:contentPart p14:bwMode="auto" r:id="rId6">
+            <p14:nvContentPartPr>
+              <p14:cNvPr id="7" name="Håndskrift 6">
+                <a:extLst>
+                  <a:ext uri="{FF2B5EF4-FFF2-40B4-BE49-F238E27FC236}">
+                    <a16:creationId xmlns:a16="http://schemas.microsoft.com/office/drawing/2014/main" id="{23080AE9-C5CF-D97D-3C44-E8243FC3616D}"/>
+                  </a:ext>
+                </a:extLst>
+              </p14:cNvPr>
+              <p14:cNvContentPartPr/>
+              <p14:nvPr/>
+            </p14:nvContentPartPr>
+            <p14:xfrm>
+              <a:off x="4332547" y="3491387"/>
+              <a:ext cx="360" cy="360"/>
+            </p14:xfrm>
+          </p:contentPart>
+        </mc:Choice>
+        <mc:Fallback>
+          <p:pic>
+            <p:nvPicPr>
+              <p:cNvPr id="7" name="Håndskrift 6">
+                <a:extLst>
+                  <a:ext uri="{FF2B5EF4-FFF2-40B4-BE49-F238E27FC236}">
+                    <a16:creationId xmlns:a16="http://schemas.microsoft.com/office/drawing/2014/main" id="{23080AE9-C5CF-D97D-3C44-E8243FC3616D}"/>
+                  </a:ext>
+                </a:extLst>
+              </p:cNvPr>
+              <p:cNvPicPr/>
+              <p:nvPr/>
+            </p:nvPicPr>
+            <p:blipFill>
+              <a:blip r:embed="rId4"/>
+              <a:stretch>
+                <a:fillRect/>
+              </a:stretch>
+            </p:blipFill>
+            <p:spPr>
+              <a:xfrm>
+                <a:off x="4314907" y="3473747"/>
+                <a:ext cx="36000" cy="36000"/>
+              </a:xfrm>
+              <a:prstGeom prst="rect">
+                <a:avLst/>
+              </a:prstGeom>
+            </p:spPr>
+          </p:pic>
+        </mc:Fallback>
+      </mc:AlternateContent>
+      <mc:AlternateContent xmlns:mc="http://schemas.openxmlformats.org/markup-compatibility/2006">
+        <mc:Choice xmlns:p14="http://schemas.microsoft.com/office/powerpoint/2010/main" Requires="p14">
+          <p:contentPart p14:bwMode="auto" r:id="rId7">
+            <p14:nvContentPartPr>
+              <p14:cNvPr id="8" name="Håndskrift 7">
+                <a:extLst>
+                  <a:ext uri="{FF2B5EF4-FFF2-40B4-BE49-F238E27FC236}">
+                    <a16:creationId xmlns:a16="http://schemas.microsoft.com/office/drawing/2014/main" id="{9E957A0A-9964-CB14-84FE-5DE8EFFE8AAA}"/>
+                  </a:ext>
+                </a:extLst>
+              </p14:cNvPr>
+              <p14:cNvContentPartPr/>
+              <p14:nvPr/>
+            </p14:nvContentPartPr>
+            <p14:xfrm>
+              <a:off x="4558267" y="4117067"/>
+              <a:ext cx="360" cy="360"/>
+            </p14:xfrm>
+          </p:contentPart>
+        </mc:Choice>
+        <mc:Fallback>
+          <p:pic>
+            <p:nvPicPr>
+              <p:cNvPr id="8" name="Håndskrift 7">
+                <a:extLst>
+                  <a:ext uri="{FF2B5EF4-FFF2-40B4-BE49-F238E27FC236}">
+                    <a16:creationId xmlns:a16="http://schemas.microsoft.com/office/drawing/2014/main" id="{9E957A0A-9964-CB14-84FE-5DE8EFFE8AAA}"/>
+                  </a:ext>
+                </a:extLst>
+              </p:cNvPr>
+              <p:cNvPicPr/>
+              <p:nvPr/>
+            </p:nvPicPr>
+            <p:blipFill>
+              <a:blip r:embed="rId4"/>
+              <a:stretch>
+                <a:fillRect/>
+              </a:stretch>
+            </p:blipFill>
+            <p:spPr>
+              <a:xfrm>
+                <a:off x="4540267" y="4099427"/>
+                <a:ext cx="36000" cy="36000"/>
+              </a:xfrm>
+              <a:prstGeom prst="rect">
+                <a:avLst/>
+              </a:prstGeom>
+            </p:spPr>
+          </p:pic>
+        </mc:Fallback>
+      </mc:AlternateContent>
+      <mc:AlternateContent xmlns:mc="http://schemas.openxmlformats.org/markup-compatibility/2006">
+        <mc:Choice xmlns:p14="http://schemas.microsoft.com/office/powerpoint/2010/main" Requires="p14">
+          <p:contentPart p14:bwMode="auto" r:id="rId8">
+            <p14:nvContentPartPr>
+              <p14:cNvPr id="14" name="Håndskrift 13">
+                <a:extLst>
+                  <a:ext uri="{FF2B5EF4-FFF2-40B4-BE49-F238E27FC236}">
+                    <a16:creationId xmlns:a16="http://schemas.microsoft.com/office/drawing/2014/main" id="{B9FA1505-5152-F318-9AFA-8704C4C08CB6}"/>
+                  </a:ext>
+                </a:extLst>
+              </p14:cNvPr>
+              <p14:cNvContentPartPr/>
+              <p14:nvPr/>
+            </p14:nvContentPartPr>
+            <p14:xfrm>
+              <a:off x="4593907" y="4167880"/>
+              <a:ext cx="360" cy="360"/>
+            </p14:xfrm>
+          </p:contentPart>
+        </mc:Choice>
+        <mc:Fallback>
+          <p:pic>
+            <p:nvPicPr>
+              <p:cNvPr id="14" name="Håndskrift 13">
+                <a:extLst>
+                  <a:ext uri="{FF2B5EF4-FFF2-40B4-BE49-F238E27FC236}">
+                    <a16:creationId xmlns:a16="http://schemas.microsoft.com/office/drawing/2014/main" id="{B9FA1505-5152-F318-9AFA-8704C4C08CB6}"/>
+                  </a:ext>
+                </a:extLst>
+              </p:cNvPr>
+              <p:cNvPicPr/>
+              <p:nvPr/>
+            </p:nvPicPr>
+            <p:blipFill>
+              <a:blip r:embed="rId4"/>
+              <a:stretch>
+                <a:fillRect/>
+              </a:stretch>
+            </p:blipFill>
+            <p:spPr>
+              <a:xfrm>
+                <a:off x="4576267" y="4150240"/>
+                <a:ext cx="36000" cy="36000"/>
+              </a:xfrm>
+              <a:prstGeom prst="rect">
+                <a:avLst/>
+              </a:prstGeom>
+            </p:spPr>
+          </p:pic>
+        </mc:Fallback>
+      </mc:AlternateContent>
+      <mc:AlternateContent xmlns:mc="http://schemas.openxmlformats.org/markup-compatibility/2006">
+        <mc:Choice xmlns:p14="http://schemas.microsoft.com/office/powerpoint/2010/main" Requires="p14">
+          <p:contentPart p14:bwMode="auto" r:id="rId9">
+            <p14:nvContentPartPr>
+              <p14:cNvPr id="16" name="Håndskrift 15">
+                <a:extLst>
+                  <a:ext uri="{FF2B5EF4-FFF2-40B4-BE49-F238E27FC236}">
+                    <a16:creationId xmlns:a16="http://schemas.microsoft.com/office/drawing/2014/main" id="{67A3C2F8-9871-3F00-6E93-EEC76C52EE6F}"/>
+                  </a:ext>
+                </a:extLst>
+              </p14:cNvPr>
+              <p14:cNvContentPartPr/>
+              <p14:nvPr/>
+            </p14:nvContentPartPr>
+            <p14:xfrm>
+              <a:off x="4741867" y="4487200"/>
+              <a:ext cx="360" cy="360"/>
+            </p14:xfrm>
+          </p:contentPart>
+        </mc:Choice>
+        <mc:Fallback>
+          <p:pic>
+            <p:nvPicPr>
+              <p:cNvPr id="16" name="Håndskrift 15">
+                <a:extLst>
+                  <a:ext uri="{FF2B5EF4-FFF2-40B4-BE49-F238E27FC236}">
+                    <a16:creationId xmlns:a16="http://schemas.microsoft.com/office/drawing/2014/main" id="{67A3C2F8-9871-3F00-6E93-EEC76C52EE6F}"/>
+                  </a:ext>
+                </a:extLst>
+              </p:cNvPr>
+              <p:cNvPicPr/>
+              <p:nvPr/>
+            </p:nvPicPr>
+            <p:blipFill>
+              <a:blip r:embed="rId4"/>
+              <a:stretch>
+                <a:fillRect/>
+              </a:stretch>
+            </p:blipFill>
+            <p:spPr>
+              <a:xfrm>
+                <a:off x="4724227" y="4469560"/>
+                <a:ext cx="36000" cy="36000"/>
+              </a:xfrm>
+              <a:prstGeom prst="rect">
+                <a:avLst/>
+              </a:prstGeom>
+            </p:spPr>
+          </p:pic>
+        </mc:Fallback>
+      </mc:AlternateContent>
+      <mc:AlternateContent xmlns:mc="http://schemas.openxmlformats.org/markup-compatibility/2006">
+        <mc:Choice xmlns:p14="http://schemas.microsoft.com/office/powerpoint/2010/main" Requires="p14">
+          <p:contentPart p14:bwMode="auto" r:id="rId10">
+            <p14:nvContentPartPr>
+              <p14:cNvPr id="17" name="Håndskrift 16">
+                <a:extLst>
+                  <a:ext uri="{FF2B5EF4-FFF2-40B4-BE49-F238E27FC236}">
+                    <a16:creationId xmlns:a16="http://schemas.microsoft.com/office/drawing/2014/main" id="{B269FF9E-57B6-9EE4-D1F7-724F7093BEAE}"/>
+                  </a:ext>
+                </a:extLst>
+              </p14:cNvPr>
+              <p14:cNvContentPartPr/>
+              <p14:nvPr/>
+            </p14:nvContentPartPr>
+            <p14:xfrm>
+              <a:off x="4773187" y="4537960"/>
+              <a:ext cx="360" cy="360"/>
+            </p14:xfrm>
+          </p:contentPart>
+        </mc:Choice>
+        <mc:Fallback>
+          <p:pic>
+            <p:nvPicPr>
+              <p:cNvPr id="17" name="Håndskrift 16">
+                <a:extLst>
+                  <a:ext uri="{FF2B5EF4-FFF2-40B4-BE49-F238E27FC236}">
+                    <a16:creationId xmlns:a16="http://schemas.microsoft.com/office/drawing/2014/main" id="{B269FF9E-57B6-9EE4-D1F7-724F7093BEAE}"/>
+                  </a:ext>
+                </a:extLst>
+              </p:cNvPr>
+              <p:cNvPicPr/>
+              <p:nvPr/>
+            </p:nvPicPr>
+            <p:blipFill>
+              <a:blip r:embed="rId4"/>
+              <a:stretch>
+                <a:fillRect/>
+              </a:stretch>
+            </p:blipFill>
+            <p:spPr>
+              <a:xfrm>
+                <a:off x="4755547" y="4520320"/>
+                <a:ext cx="36000" cy="36000"/>
+              </a:xfrm>
+              <a:prstGeom prst="rect">
+                <a:avLst/>
+              </a:prstGeom>
+            </p:spPr>
+          </p:pic>
+        </mc:Fallback>
+      </mc:AlternateContent>
+      <p:grpSp>
+        <p:nvGrpSpPr>
+          <p:cNvPr id="22" name="Gruppe 21">
+            <a:extLst>
+              <a:ext uri="{FF2B5EF4-FFF2-40B4-BE49-F238E27FC236}">
+                <a16:creationId xmlns:a16="http://schemas.microsoft.com/office/drawing/2014/main" id="{49EDA66B-4C18-0559-EC54-D2F8D223AA87}"/>
+              </a:ext>
+            </a:extLst>
+          </p:cNvPr>
+          <p:cNvGrpSpPr/>
+          <p:nvPr/>
+        </p:nvGrpSpPr>
+        <p:grpSpPr>
+          <a:xfrm>
+            <a:off x="4889623" y="4914371"/>
+            <a:ext cx="27720" cy="28440"/>
+            <a:chOff x="4901707" y="4925680"/>
+            <a:chExt cx="27720" cy="28440"/>
+          </a:xfrm>
+        </p:grpSpPr>
+        <mc:AlternateContent xmlns:mc="http://schemas.openxmlformats.org/markup-compatibility/2006">
+          <mc:Choice xmlns:p14="http://schemas.microsoft.com/office/powerpoint/2010/main" Requires="p14">
+            <p:contentPart p14:bwMode="auto" r:id="rId11">
+              <p14:nvContentPartPr>
+                <p14:cNvPr id="19" name="Håndskrift 18">
+                  <a:extLst>
+                    <a:ext uri="{FF2B5EF4-FFF2-40B4-BE49-F238E27FC236}">
+                      <a16:creationId xmlns:a16="http://schemas.microsoft.com/office/drawing/2014/main" id="{6D6B5372-727E-D433-EF79-473E923AD6ED}"/>
+                    </a:ext>
+                  </a:extLst>
+                </p14:cNvPr>
+                <p14:cNvContentPartPr/>
+                <p14:nvPr/>
+              </p14:nvContentPartPr>
+              <p14:xfrm>
+                <a:off x="4901707" y="4925680"/>
+                <a:ext cx="360" cy="360"/>
+              </p14:xfrm>
+            </p:contentPart>
+          </mc:Choice>
+          <mc:Fallback>
+            <p:pic>
+              <p:nvPicPr>
+                <p:cNvPr id="19" name="Håndskrift 18">
+                  <a:extLst>
+                    <a:ext uri="{FF2B5EF4-FFF2-40B4-BE49-F238E27FC236}">
+                      <a16:creationId xmlns:a16="http://schemas.microsoft.com/office/drawing/2014/main" id="{6D6B5372-727E-D433-EF79-473E923AD6ED}"/>
+                    </a:ext>
+                  </a:extLst>
+                </p:cNvPr>
+                <p:cNvPicPr/>
+                <p:nvPr/>
+              </p:nvPicPr>
+              <p:blipFill>
+                <a:blip r:embed="rId4"/>
+                <a:stretch>
+                  <a:fillRect/>
+                </a:stretch>
+              </p:blipFill>
+              <p:spPr>
+                <a:xfrm>
+                  <a:off x="4884067" y="4908040"/>
+                  <a:ext cx="36000" cy="36000"/>
+                </a:xfrm>
+                <a:prstGeom prst="rect">
+                  <a:avLst/>
+                </a:prstGeom>
+              </p:spPr>
+            </p:pic>
+          </mc:Fallback>
+        </mc:AlternateContent>
+        <mc:AlternateContent xmlns:mc="http://schemas.openxmlformats.org/markup-compatibility/2006">
+          <mc:Choice xmlns:p14="http://schemas.microsoft.com/office/powerpoint/2010/main" Requires="p14">
+            <p:contentPart p14:bwMode="auto" r:id="rId12">
+              <p14:nvContentPartPr>
+                <p14:cNvPr id="20" name="Håndskrift 19">
+                  <a:extLst>
+                    <a:ext uri="{FF2B5EF4-FFF2-40B4-BE49-F238E27FC236}">
+                      <a16:creationId xmlns:a16="http://schemas.microsoft.com/office/drawing/2014/main" id="{2B4BFBBB-37EE-CAF7-E63F-8C00773C32CF}"/>
+                    </a:ext>
+                  </a:extLst>
+                </p14:cNvPr>
+                <p14:cNvContentPartPr/>
+                <p14:nvPr/>
+              </p14:nvContentPartPr>
+              <p14:xfrm>
+                <a:off x="4929067" y="4953760"/>
+                <a:ext cx="360" cy="360"/>
+              </p14:xfrm>
+            </p:contentPart>
+          </mc:Choice>
+          <mc:Fallback>
+            <p:pic>
+              <p:nvPicPr>
+                <p:cNvPr id="20" name="Håndskrift 19">
+                  <a:extLst>
+                    <a:ext uri="{FF2B5EF4-FFF2-40B4-BE49-F238E27FC236}">
+                      <a16:creationId xmlns:a16="http://schemas.microsoft.com/office/drawing/2014/main" id="{2B4BFBBB-37EE-CAF7-E63F-8C00773C32CF}"/>
+                    </a:ext>
+                  </a:extLst>
+                </p:cNvPr>
+                <p:cNvPicPr/>
+                <p:nvPr/>
+              </p:nvPicPr>
+              <p:blipFill>
+                <a:blip r:embed="rId4"/>
+                <a:stretch>
+                  <a:fillRect/>
+                </a:stretch>
+              </p:blipFill>
+              <p:spPr>
+                <a:xfrm>
+                  <a:off x="4911427" y="4935760"/>
+                  <a:ext cx="36000" cy="36000"/>
+                </a:xfrm>
+                <a:prstGeom prst="rect">
+                  <a:avLst/>
+                </a:prstGeom>
+              </p:spPr>
+            </p:pic>
+          </mc:Fallback>
+        </mc:AlternateContent>
+      </p:grpSp>
+      <mc:AlternateContent xmlns:mc="http://schemas.openxmlformats.org/markup-compatibility/2006">
+        <mc:Choice xmlns:p14="http://schemas.microsoft.com/office/powerpoint/2010/main" Requires="p14">
+          <p:contentPart p14:bwMode="auto" r:id="rId13">
+            <p14:nvContentPartPr>
+              <p14:cNvPr id="23" name="Håndskrift 22">
+                <a:extLst>
+                  <a:ext uri="{FF2B5EF4-FFF2-40B4-BE49-F238E27FC236}">
+                    <a16:creationId xmlns:a16="http://schemas.microsoft.com/office/drawing/2014/main" id="{B62C8C12-E6D9-3E59-77F3-F10C8D68DB6F}"/>
+                  </a:ext>
+                </a:extLst>
+              </p14:cNvPr>
+              <p14:cNvContentPartPr/>
+              <p14:nvPr/>
+            </p14:nvContentPartPr>
+            <p14:xfrm>
+              <a:off x="5088187" y="5235640"/>
+              <a:ext cx="360" cy="360"/>
+            </p14:xfrm>
+          </p:contentPart>
+        </mc:Choice>
+        <mc:Fallback>
+          <p:pic>
+            <p:nvPicPr>
+              <p:cNvPr id="23" name="Håndskrift 22">
+                <a:extLst>
+                  <a:ext uri="{FF2B5EF4-FFF2-40B4-BE49-F238E27FC236}">
+                    <a16:creationId xmlns:a16="http://schemas.microsoft.com/office/drawing/2014/main" id="{B62C8C12-E6D9-3E59-77F3-F10C8D68DB6F}"/>
+                  </a:ext>
+                </a:extLst>
+              </p:cNvPr>
+              <p:cNvPicPr/>
+              <p:nvPr/>
+            </p:nvPicPr>
+            <p:blipFill>
+              <a:blip r:embed="rId4"/>
+              <a:stretch>
+                <a:fillRect/>
+              </a:stretch>
+            </p:blipFill>
+            <p:spPr>
+              <a:xfrm>
+                <a:off x="5070187" y="5218000"/>
+                <a:ext cx="36000" cy="36000"/>
+              </a:xfrm>
+              <a:prstGeom prst="rect">
+                <a:avLst/>
+              </a:prstGeom>
+            </p:spPr>
+          </p:pic>
+        </mc:Fallback>
+      </mc:AlternateContent>
+      <mc:AlternateContent xmlns:mc="http://schemas.openxmlformats.org/markup-compatibility/2006">
+        <mc:Choice xmlns:p14="http://schemas.microsoft.com/office/powerpoint/2010/main" Requires="p14">
+          <p:contentPart p14:bwMode="auto" r:id="rId14">
+            <p14:nvContentPartPr>
+              <p14:cNvPr id="41" name="Håndskrift 40">
+                <a:extLst>
+                  <a:ext uri="{FF2B5EF4-FFF2-40B4-BE49-F238E27FC236}">
+                    <a16:creationId xmlns:a16="http://schemas.microsoft.com/office/drawing/2014/main" id="{B71A7D86-0819-3D3E-B1E6-40E66778E3B0}"/>
+                  </a:ext>
+                </a:extLst>
+              </p14:cNvPr>
+              <p14:cNvContentPartPr/>
+              <p14:nvPr/>
+            </p14:nvContentPartPr>
+            <p14:xfrm>
+              <a:off x="6900059" y="4557673"/>
+              <a:ext cx="360" cy="360"/>
+            </p14:xfrm>
+          </p:contentPart>
+        </mc:Choice>
+        <mc:Fallback>
+          <p:pic>
+            <p:nvPicPr>
+              <p:cNvPr id="41" name="Håndskrift 40">
+                <a:extLst>
+                  <a:ext uri="{FF2B5EF4-FFF2-40B4-BE49-F238E27FC236}">
+                    <a16:creationId xmlns:a16="http://schemas.microsoft.com/office/drawing/2014/main" id="{B71A7D86-0819-3D3E-B1E6-40E66778E3B0}"/>
+                  </a:ext>
+                </a:extLst>
+              </p:cNvPr>
+              <p:cNvPicPr/>
+              <p:nvPr/>
+            </p:nvPicPr>
+            <p:blipFill>
+              <a:blip r:embed="rId4"/>
+              <a:stretch>
+                <a:fillRect/>
+              </a:stretch>
+            </p:blipFill>
+            <p:spPr>
+              <a:xfrm>
+                <a:off x="6882419" y="4540033"/>
+                <a:ext cx="36000" cy="36000"/>
+              </a:xfrm>
+              <a:prstGeom prst="rect">
+                <a:avLst/>
+              </a:prstGeom>
+            </p:spPr>
+          </p:pic>
+        </mc:Fallback>
+      </mc:AlternateContent>
+      <mc:AlternateContent xmlns:mc="http://schemas.openxmlformats.org/markup-compatibility/2006">
+        <mc:Choice xmlns:p14="http://schemas.microsoft.com/office/powerpoint/2010/main" Requires="p14">
+          <p:contentPart p14:bwMode="auto" r:id="rId15">
+            <p14:nvContentPartPr>
+              <p14:cNvPr id="42" name="Håndskrift 41">
+                <a:extLst>
+                  <a:ext uri="{FF2B5EF4-FFF2-40B4-BE49-F238E27FC236}">
+                    <a16:creationId xmlns:a16="http://schemas.microsoft.com/office/drawing/2014/main" id="{EEB26ACD-2CD1-5073-A68A-100DEA84BE9A}"/>
+                  </a:ext>
+                </a:extLst>
+              </p14:cNvPr>
+              <p14:cNvContentPartPr/>
+              <p14:nvPr/>
+            </p14:nvContentPartPr>
+            <p14:xfrm>
+              <a:off x="6929579" y="4510153"/>
+              <a:ext cx="360" cy="360"/>
+            </p14:xfrm>
+          </p:contentPart>
+        </mc:Choice>
+        <mc:Fallback>
+          <p:pic>
+            <p:nvPicPr>
+              <p:cNvPr id="42" name="Håndskrift 41">
+                <a:extLst>
+                  <a:ext uri="{FF2B5EF4-FFF2-40B4-BE49-F238E27FC236}">
+                    <a16:creationId xmlns:a16="http://schemas.microsoft.com/office/drawing/2014/main" id="{EEB26ACD-2CD1-5073-A68A-100DEA84BE9A}"/>
+                  </a:ext>
+                </a:extLst>
+              </p:cNvPr>
+              <p:cNvPicPr/>
+              <p:nvPr/>
+            </p:nvPicPr>
+            <p:blipFill>
+              <a:blip r:embed="rId4"/>
+              <a:stretch>
+                <a:fillRect/>
+              </a:stretch>
+            </p:blipFill>
+            <p:spPr>
+              <a:xfrm>
+                <a:off x="6911579" y="4492513"/>
+                <a:ext cx="36000" cy="36000"/>
+              </a:xfrm>
+              <a:prstGeom prst="rect">
+                <a:avLst/>
+              </a:prstGeom>
+            </p:spPr>
+          </p:pic>
+        </mc:Fallback>
+      </mc:AlternateContent>
+      <mc:AlternateContent xmlns:mc="http://schemas.openxmlformats.org/markup-compatibility/2006">
+        <mc:Choice xmlns:p14="http://schemas.microsoft.com/office/powerpoint/2010/main" Requires="p14">
+          <p:contentPart p14:bwMode="auto" r:id="rId16">
+            <p14:nvContentPartPr>
+              <p14:cNvPr id="43" name="Håndskrift 42">
+                <a:extLst>
+                  <a:ext uri="{FF2B5EF4-FFF2-40B4-BE49-F238E27FC236}">
+                    <a16:creationId xmlns:a16="http://schemas.microsoft.com/office/drawing/2014/main" id="{E3F887E0-1036-C22A-5F48-BF3E5A5CA22C}"/>
+                  </a:ext>
+                </a:extLst>
+              </p14:cNvPr>
+              <p14:cNvContentPartPr/>
+              <p14:nvPr/>
+            </p14:nvContentPartPr>
+            <p14:xfrm>
+              <a:off x="7051259" y="4116673"/>
+              <a:ext cx="360" cy="360"/>
+            </p14:xfrm>
+          </p:contentPart>
+        </mc:Choice>
+        <mc:Fallback>
+          <p:pic>
+            <p:nvPicPr>
+              <p:cNvPr id="43" name="Håndskrift 42">
+                <a:extLst>
+                  <a:ext uri="{FF2B5EF4-FFF2-40B4-BE49-F238E27FC236}">
+                    <a16:creationId xmlns:a16="http://schemas.microsoft.com/office/drawing/2014/main" id="{E3F887E0-1036-C22A-5F48-BF3E5A5CA22C}"/>
+                  </a:ext>
+                </a:extLst>
+              </p:cNvPr>
+              <p:cNvPicPr/>
+              <p:nvPr/>
+            </p:nvPicPr>
+            <p:blipFill>
+              <a:blip r:embed="rId4"/>
+              <a:stretch>
+                <a:fillRect/>
+              </a:stretch>
+            </p:blipFill>
+            <p:spPr>
+              <a:xfrm>
+                <a:off x="7033259" y="4098673"/>
+                <a:ext cx="36000" cy="36000"/>
+              </a:xfrm>
+              <a:prstGeom prst="rect">
+                <a:avLst/>
+              </a:prstGeom>
+            </p:spPr>
+          </p:pic>
+        </mc:Fallback>
+      </mc:AlternateContent>
+      <mc:AlternateContent xmlns:mc="http://schemas.openxmlformats.org/markup-compatibility/2006">
+        <mc:Choice xmlns:p14="http://schemas.microsoft.com/office/powerpoint/2010/main" Requires="p14">
+          <p:contentPart p14:bwMode="auto" r:id="rId17">
+            <p14:nvContentPartPr>
+              <p14:cNvPr id="44" name="Håndskrift 43">
+                <a:extLst>
+                  <a:ext uri="{FF2B5EF4-FFF2-40B4-BE49-F238E27FC236}">
+                    <a16:creationId xmlns:a16="http://schemas.microsoft.com/office/drawing/2014/main" id="{D3B7568F-9D75-998C-AE96-C66C7E9DABB7}"/>
+                  </a:ext>
+                </a:extLst>
+              </p14:cNvPr>
+              <p14:cNvContentPartPr/>
+              <p14:nvPr/>
+            </p14:nvContentPartPr>
+            <p14:xfrm>
+              <a:off x="7076819" y="4064113"/>
+              <a:ext cx="360" cy="360"/>
+            </p14:xfrm>
+          </p:contentPart>
+        </mc:Choice>
+        <mc:Fallback>
+          <p:pic>
+            <p:nvPicPr>
+              <p:cNvPr id="44" name="Håndskrift 43">
+                <a:extLst>
+                  <a:ext uri="{FF2B5EF4-FFF2-40B4-BE49-F238E27FC236}">
+                    <a16:creationId xmlns:a16="http://schemas.microsoft.com/office/drawing/2014/main" id="{D3B7568F-9D75-998C-AE96-C66C7E9DABB7}"/>
+                  </a:ext>
+                </a:extLst>
+              </p:cNvPr>
+              <p:cNvPicPr/>
+              <p:nvPr/>
+            </p:nvPicPr>
+            <p:blipFill>
+              <a:blip r:embed="rId4"/>
+              <a:stretch>
+                <a:fillRect/>
+              </a:stretch>
+            </p:blipFill>
+            <p:spPr>
+              <a:xfrm>
+                <a:off x="7059179" y="4046113"/>
+                <a:ext cx="36000" cy="36000"/>
+              </a:xfrm>
+              <a:prstGeom prst="rect">
+                <a:avLst/>
+              </a:prstGeom>
+            </p:spPr>
+          </p:pic>
+        </mc:Fallback>
+      </mc:AlternateContent>
+      <p:grpSp>
+        <p:nvGrpSpPr>
+          <p:cNvPr id="48" name="Gruppe 47">
+            <a:extLst>
+              <a:ext uri="{FF2B5EF4-FFF2-40B4-BE49-F238E27FC236}">
+                <a16:creationId xmlns:a16="http://schemas.microsoft.com/office/drawing/2014/main" id="{C0D92C15-7927-AB78-5F0D-D7C2C5E78E93}"/>
+              </a:ext>
+            </a:extLst>
+          </p:cNvPr>
+          <p:cNvGrpSpPr/>
+          <p:nvPr/>
+        </p:nvGrpSpPr>
+        <p:grpSpPr>
+          <a:xfrm>
+            <a:off x="7411619" y="3453193"/>
+            <a:ext cx="28080" cy="34560"/>
+            <a:chOff x="7411619" y="3453193"/>
+            <a:chExt cx="28080" cy="34560"/>
+          </a:xfrm>
+        </p:grpSpPr>
+        <mc:AlternateContent xmlns:mc="http://schemas.openxmlformats.org/markup-compatibility/2006">
+          <mc:Choice xmlns:p14="http://schemas.microsoft.com/office/powerpoint/2010/main" Requires="p14">
+            <p:contentPart p14:bwMode="auto" r:id="rId18">
+              <p14:nvContentPartPr>
+                <p14:cNvPr id="45" name="Håndskrift 44">
+                  <a:extLst>
+                    <a:ext uri="{FF2B5EF4-FFF2-40B4-BE49-F238E27FC236}">
+                      <a16:creationId xmlns:a16="http://schemas.microsoft.com/office/drawing/2014/main" id="{7277138E-6477-C355-3706-CFC35C973AA6}"/>
+                    </a:ext>
+                  </a:extLst>
+                </p14:cNvPr>
+                <p14:cNvContentPartPr/>
+                <p14:nvPr/>
+              </p14:nvContentPartPr>
+              <p14:xfrm>
+                <a:off x="7411619" y="3487393"/>
+                <a:ext cx="360" cy="360"/>
+              </p14:xfrm>
+            </p:contentPart>
+          </mc:Choice>
+          <mc:Fallback>
+            <p:pic>
+              <p:nvPicPr>
+                <p:cNvPr id="45" name="Håndskrift 44">
+                  <a:extLst>
+                    <a:ext uri="{FF2B5EF4-FFF2-40B4-BE49-F238E27FC236}">
+                      <a16:creationId xmlns:a16="http://schemas.microsoft.com/office/drawing/2014/main" id="{7277138E-6477-C355-3706-CFC35C973AA6}"/>
+                    </a:ext>
+                  </a:extLst>
+                </p:cNvPr>
+                <p:cNvPicPr/>
+                <p:nvPr/>
+              </p:nvPicPr>
+              <p:blipFill>
+                <a:blip r:embed="rId4"/>
+                <a:stretch>
+                  <a:fillRect/>
+                </a:stretch>
+              </p:blipFill>
+              <p:spPr>
+                <a:xfrm>
+                  <a:off x="7393979" y="3469753"/>
+                  <a:ext cx="36000" cy="36000"/>
+                </a:xfrm>
+                <a:prstGeom prst="rect">
+                  <a:avLst/>
+                </a:prstGeom>
+              </p:spPr>
+            </p:pic>
+          </mc:Fallback>
+        </mc:AlternateContent>
+        <mc:AlternateContent xmlns:mc="http://schemas.openxmlformats.org/markup-compatibility/2006">
+          <mc:Choice xmlns:p14="http://schemas.microsoft.com/office/powerpoint/2010/main" Requires="p14">
+            <p:contentPart p14:bwMode="auto" r:id="rId19">
+              <p14:nvContentPartPr>
+                <p14:cNvPr id="46" name="Håndskrift 45">
+                  <a:extLst>
+                    <a:ext uri="{FF2B5EF4-FFF2-40B4-BE49-F238E27FC236}">
+                      <a16:creationId xmlns:a16="http://schemas.microsoft.com/office/drawing/2014/main" id="{CA04A09F-D751-BAEE-3672-7B881EC85AEB}"/>
+                    </a:ext>
+                  </a:extLst>
+                </p14:cNvPr>
+                <p14:cNvContentPartPr/>
+                <p14:nvPr/>
+              </p14:nvContentPartPr>
+              <p14:xfrm>
+                <a:off x="7439339" y="3453193"/>
+                <a:ext cx="360" cy="360"/>
+              </p14:xfrm>
+            </p:contentPart>
+          </mc:Choice>
+          <mc:Fallback>
+            <p:pic>
+              <p:nvPicPr>
+                <p:cNvPr id="46" name="Håndskrift 45">
+                  <a:extLst>
+                    <a:ext uri="{FF2B5EF4-FFF2-40B4-BE49-F238E27FC236}">
+                      <a16:creationId xmlns:a16="http://schemas.microsoft.com/office/drawing/2014/main" id="{CA04A09F-D751-BAEE-3672-7B881EC85AEB}"/>
+                    </a:ext>
+                  </a:extLst>
+                </p:cNvPr>
+                <p:cNvPicPr/>
+                <p:nvPr/>
+              </p:nvPicPr>
+              <p:blipFill>
+                <a:blip r:embed="rId4"/>
+                <a:stretch>
+                  <a:fillRect/>
+                </a:stretch>
+              </p:blipFill>
+              <p:spPr>
+                <a:xfrm>
+                  <a:off x="7421339" y="3435193"/>
+                  <a:ext cx="36000" cy="36000"/>
+                </a:xfrm>
+                <a:prstGeom prst="rect">
+                  <a:avLst/>
+                </a:prstGeom>
+              </p:spPr>
+            </p:pic>
+          </mc:Fallback>
+        </mc:AlternateContent>
+      </p:grpSp>
+      <mc:AlternateContent xmlns:mc="http://schemas.openxmlformats.org/markup-compatibility/2006">
+        <mc:Choice xmlns:p14="http://schemas.microsoft.com/office/powerpoint/2010/main" Requires="p14">
+          <p:contentPart p14:bwMode="auto" r:id="rId20">
+            <p14:nvContentPartPr>
+              <p14:cNvPr id="49" name="Håndskrift 48">
+                <a:extLst>
+                  <a:ext uri="{FF2B5EF4-FFF2-40B4-BE49-F238E27FC236}">
+                    <a16:creationId xmlns:a16="http://schemas.microsoft.com/office/drawing/2014/main" id="{A583CA6D-8A50-447F-FA12-7D9EAF521C1F}"/>
+                  </a:ext>
+                </a:extLst>
+              </p14:cNvPr>
+              <p14:cNvContentPartPr/>
+              <p14:nvPr/>
+            </p14:nvContentPartPr>
+            <p14:xfrm>
+              <a:off x="5128592" y="5279487"/>
+              <a:ext cx="360" cy="360"/>
+            </p14:xfrm>
+          </p:contentPart>
+        </mc:Choice>
+        <mc:Fallback>
+          <p:pic>
+            <p:nvPicPr>
+              <p:cNvPr id="49" name="Håndskrift 48">
+                <a:extLst>
+                  <a:ext uri="{FF2B5EF4-FFF2-40B4-BE49-F238E27FC236}">
+                    <a16:creationId xmlns:a16="http://schemas.microsoft.com/office/drawing/2014/main" id="{A583CA6D-8A50-447F-FA12-7D9EAF521C1F}"/>
+                  </a:ext>
+                </a:extLst>
+              </p:cNvPr>
+              <p:cNvPicPr/>
+              <p:nvPr/>
+            </p:nvPicPr>
+            <p:blipFill>
+              <a:blip r:embed="rId4"/>
+              <a:stretch>
+                <a:fillRect/>
+              </a:stretch>
+            </p:blipFill>
+            <p:spPr>
+              <a:xfrm>
+                <a:off x="5110952" y="5261847"/>
+                <a:ext cx="36000" cy="36000"/>
+              </a:xfrm>
+              <a:prstGeom prst="rect">
+                <a:avLst/>
+              </a:prstGeom>
+            </p:spPr>
+          </p:pic>
+        </mc:Fallback>
+      </mc:AlternateContent>
+      <p:grpSp>
+        <p:nvGrpSpPr>
+          <p:cNvPr id="53" name="Gruppe 52">
+            <a:extLst>
+              <a:ext uri="{FF2B5EF4-FFF2-40B4-BE49-F238E27FC236}">
+                <a16:creationId xmlns:a16="http://schemas.microsoft.com/office/drawing/2014/main" id="{2A5F36EE-D27D-61CA-8E36-D557E4E2B2A7}"/>
+              </a:ext>
+            </a:extLst>
+          </p:cNvPr>
+          <p:cNvGrpSpPr/>
+          <p:nvPr/>
+        </p:nvGrpSpPr>
+        <p:grpSpPr>
+          <a:xfrm>
+            <a:off x="5429192" y="5448687"/>
+            <a:ext cx="35280" cy="21240"/>
+            <a:chOff x="5429192" y="5448687"/>
+            <a:chExt cx="35280" cy="21240"/>
+          </a:xfrm>
+        </p:grpSpPr>
+        <mc:AlternateContent xmlns:mc="http://schemas.openxmlformats.org/markup-compatibility/2006">
+          <mc:Choice xmlns:p14="http://schemas.microsoft.com/office/powerpoint/2010/main" Requires="p14">
+            <p:contentPart p14:bwMode="auto" r:id="rId21">
+              <p14:nvContentPartPr>
+                <p14:cNvPr id="50" name="Håndskrift 49">
+                  <a:extLst>
+                    <a:ext uri="{FF2B5EF4-FFF2-40B4-BE49-F238E27FC236}">
+                      <a16:creationId xmlns:a16="http://schemas.microsoft.com/office/drawing/2014/main" id="{1BE089DD-9831-C67D-FF72-F41FFD0C22EA}"/>
+                    </a:ext>
+                  </a:extLst>
+                </p14:cNvPr>
+                <p14:cNvContentPartPr/>
+                <p14:nvPr/>
+              </p14:nvContentPartPr>
+              <p14:xfrm>
+                <a:off x="5429192" y="5448687"/>
+                <a:ext cx="360" cy="360"/>
+              </p14:xfrm>
+            </p:contentPart>
+          </mc:Choice>
+          <mc:Fallback>
+            <p:pic>
+              <p:nvPicPr>
+                <p:cNvPr id="50" name="Håndskrift 49">
+                  <a:extLst>
+                    <a:ext uri="{FF2B5EF4-FFF2-40B4-BE49-F238E27FC236}">
+                      <a16:creationId xmlns:a16="http://schemas.microsoft.com/office/drawing/2014/main" id="{1BE089DD-9831-C67D-FF72-F41FFD0C22EA}"/>
+                    </a:ext>
+                  </a:extLst>
+                </p:cNvPr>
+                <p:cNvPicPr/>
+                <p:nvPr/>
+              </p:nvPicPr>
+              <p:blipFill>
+                <a:blip r:embed="rId4"/>
+                <a:stretch>
+                  <a:fillRect/>
+                </a:stretch>
+              </p:blipFill>
+              <p:spPr>
+                <a:xfrm>
+                  <a:off x="5411552" y="5431047"/>
+                  <a:ext cx="36000" cy="36000"/>
+                </a:xfrm>
+                <a:prstGeom prst="rect">
+                  <a:avLst/>
+                </a:prstGeom>
+              </p:spPr>
+            </p:pic>
+          </mc:Fallback>
+        </mc:AlternateContent>
+        <mc:AlternateContent xmlns:mc="http://schemas.openxmlformats.org/markup-compatibility/2006">
+          <mc:Choice xmlns:p14="http://schemas.microsoft.com/office/powerpoint/2010/main" Requires="p14">
+            <p:contentPart p14:bwMode="auto" r:id="rId22">
+              <p14:nvContentPartPr>
+                <p14:cNvPr id="51" name="Håndskrift 50">
+                  <a:extLst>
+                    <a:ext uri="{FF2B5EF4-FFF2-40B4-BE49-F238E27FC236}">
+                      <a16:creationId xmlns:a16="http://schemas.microsoft.com/office/drawing/2014/main" id="{526AB322-7D6A-8B51-52B4-D49ED6DEC1D4}"/>
+                    </a:ext>
+                  </a:extLst>
+                </p14:cNvPr>
+                <p14:cNvContentPartPr/>
+                <p14:nvPr/>
+              </p14:nvContentPartPr>
+              <p14:xfrm>
+                <a:off x="5464112" y="5469567"/>
+                <a:ext cx="360" cy="360"/>
+              </p14:xfrm>
+            </p:contentPart>
+          </mc:Choice>
+          <mc:Fallback>
+            <p:pic>
+              <p:nvPicPr>
+                <p:cNvPr id="51" name="Håndskrift 50">
+                  <a:extLst>
+                    <a:ext uri="{FF2B5EF4-FFF2-40B4-BE49-F238E27FC236}">
+                      <a16:creationId xmlns:a16="http://schemas.microsoft.com/office/drawing/2014/main" id="{526AB322-7D6A-8B51-52B4-D49ED6DEC1D4}"/>
+                    </a:ext>
+                  </a:extLst>
+                </p:cNvPr>
+                <p:cNvPicPr/>
+                <p:nvPr/>
+              </p:nvPicPr>
+              <p:blipFill>
+                <a:blip r:embed="rId4"/>
+                <a:stretch>
+                  <a:fillRect/>
+                </a:stretch>
+              </p:blipFill>
+              <p:spPr>
+                <a:xfrm>
+                  <a:off x="5446112" y="5451927"/>
+                  <a:ext cx="36000" cy="36000"/>
+                </a:xfrm>
+                <a:prstGeom prst="rect">
+                  <a:avLst/>
+                </a:prstGeom>
+              </p:spPr>
+            </p:pic>
+          </mc:Fallback>
+        </mc:AlternateContent>
+      </p:grpSp>
+      <p:grpSp>
+        <p:nvGrpSpPr>
+          <p:cNvPr id="57" name="Gruppe 56">
+            <a:extLst>
+              <a:ext uri="{FF2B5EF4-FFF2-40B4-BE49-F238E27FC236}">
+                <a16:creationId xmlns:a16="http://schemas.microsoft.com/office/drawing/2014/main" id="{6EEC8468-7758-A621-B809-F7160862F6E7}"/>
+              </a:ext>
+            </a:extLst>
+          </p:cNvPr>
+          <p:cNvGrpSpPr/>
+          <p:nvPr/>
+        </p:nvGrpSpPr>
+        <p:grpSpPr>
+          <a:xfrm>
+            <a:off x="5748152" y="5530407"/>
+            <a:ext cx="36720" cy="6840"/>
+            <a:chOff x="5748152" y="5530407"/>
+            <a:chExt cx="36720" cy="6840"/>
+          </a:xfrm>
+        </p:grpSpPr>
+        <mc:AlternateContent xmlns:mc="http://schemas.openxmlformats.org/markup-compatibility/2006">
+          <mc:Choice xmlns:p14="http://schemas.microsoft.com/office/powerpoint/2010/main" Requires="p14">
+            <p:contentPart p14:bwMode="auto" r:id="rId23">
+              <p14:nvContentPartPr>
+                <p14:cNvPr id="54" name="Håndskrift 53">
+                  <a:extLst>
+                    <a:ext uri="{FF2B5EF4-FFF2-40B4-BE49-F238E27FC236}">
+                      <a16:creationId xmlns:a16="http://schemas.microsoft.com/office/drawing/2014/main" id="{5A65A30F-78D2-237A-38D1-449A6FC5F2EE}"/>
+                    </a:ext>
+                  </a:extLst>
+                </p14:cNvPr>
+                <p14:cNvContentPartPr/>
+                <p14:nvPr/>
+              </p14:nvContentPartPr>
+              <p14:xfrm>
+                <a:off x="5748152" y="5536887"/>
+                <a:ext cx="360" cy="360"/>
+              </p14:xfrm>
+            </p:contentPart>
+          </mc:Choice>
+          <mc:Fallback>
+            <p:pic>
+              <p:nvPicPr>
+                <p:cNvPr id="54" name="Håndskrift 53">
+                  <a:extLst>
+                    <a:ext uri="{FF2B5EF4-FFF2-40B4-BE49-F238E27FC236}">
+                      <a16:creationId xmlns:a16="http://schemas.microsoft.com/office/drawing/2014/main" id="{5A65A30F-78D2-237A-38D1-449A6FC5F2EE}"/>
+                    </a:ext>
+                  </a:extLst>
+                </p:cNvPr>
+                <p:cNvPicPr/>
+                <p:nvPr/>
+              </p:nvPicPr>
+              <p:blipFill>
+                <a:blip r:embed="rId4"/>
+                <a:stretch>
+                  <a:fillRect/>
+                </a:stretch>
+              </p:blipFill>
+              <p:spPr>
+                <a:xfrm>
+                  <a:off x="5730152" y="5519247"/>
+                  <a:ext cx="36000" cy="36000"/>
+                </a:xfrm>
+                <a:prstGeom prst="rect">
+                  <a:avLst/>
+                </a:prstGeom>
+              </p:spPr>
+            </p:pic>
+          </mc:Fallback>
+        </mc:AlternateContent>
+        <mc:AlternateContent xmlns:mc="http://schemas.openxmlformats.org/markup-compatibility/2006">
+          <mc:Choice xmlns:p14="http://schemas.microsoft.com/office/powerpoint/2010/main" Requires="p14">
+            <p:contentPart p14:bwMode="auto" r:id="rId24">
+              <p14:nvContentPartPr>
+                <p14:cNvPr id="55" name="Håndskrift 54">
+                  <a:extLst>
+                    <a:ext uri="{FF2B5EF4-FFF2-40B4-BE49-F238E27FC236}">
+                      <a16:creationId xmlns:a16="http://schemas.microsoft.com/office/drawing/2014/main" id="{30A3AB9E-BBD0-4415-DE31-60347C9CC6CE}"/>
+                    </a:ext>
+                  </a:extLst>
+                </p14:cNvPr>
+                <p14:cNvContentPartPr/>
+                <p14:nvPr/>
+              </p14:nvContentPartPr>
+              <p14:xfrm>
+                <a:off x="5784512" y="5530407"/>
+                <a:ext cx="360" cy="360"/>
+              </p14:xfrm>
+            </p:contentPart>
+          </mc:Choice>
+          <mc:Fallback>
+            <p:pic>
+              <p:nvPicPr>
+                <p:cNvPr id="55" name="Håndskrift 54">
+                  <a:extLst>
+                    <a:ext uri="{FF2B5EF4-FFF2-40B4-BE49-F238E27FC236}">
+                      <a16:creationId xmlns:a16="http://schemas.microsoft.com/office/drawing/2014/main" id="{30A3AB9E-BBD0-4415-DE31-60347C9CC6CE}"/>
+                    </a:ext>
+                  </a:extLst>
+                </p:cNvPr>
+                <p:cNvPicPr/>
+                <p:nvPr/>
+              </p:nvPicPr>
+              <p:blipFill>
+                <a:blip r:embed="rId4"/>
+                <a:stretch>
+                  <a:fillRect/>
+                </a:stretch>
+              </p:blipFill>
+              <p:spPr>
+                <a:xfrm>
+                  <a:off x="5766872" y="5512407"/>
+                  <a:ext cx="36000" cy="36000"/>
+                </a:xfrm>
+                <a:prstGeom prst="rect">
+                  <a:avLst/>
+                </a:prstGeom>
+              </p:spPr>
+            </p:pic>
+          </mc:Fallback>
+        </mc:AlternateContent>
+      </p:grpSp>
+      <p:grpSp>
+        <p:nvGrpSpPr>
+          <p:cNvPr id="61" name="Gruppe 60">
+            <a:extLst>
+              <a:ext uri="{FF2B5EF4-FFF2-40B4-BE49-F238E27FC236}">
+                <a16:creationId xmlns:a16="http://schemas.microsoft.com/office/drawing/2014/main" id="{55ECBCFB-58D0-5793-5C6E-6363E7F27EFA}"/>
+              </a:ext>
+            </a:extLst>
+          </p:cNvPr>
+          <p:cNvGrpSpPr/>
+          <p:nvPr/>
+        </p:nvGrpSpPr>
+        <p:grpSpPr>
+          <a:xfrm>
+            <a:off x="6116432" y="5482167"/>
+            <a:ext cx="29520" cy="28080"/>
+            <a:chOff x="6116432" y="5482167"/>
+            <a:chExt cx="29520" cy="28080"/>
+          </a:xfrm>
+        </p:grpSpPr>
+        <mc:AlternateContent xmlns:mc="http://schemas.openxmlformats.org/markup-compatibility/2006">
+          <mc:Choice xmlns:p14="http://schemas.microsoft.com/office/powerpoint/2010/main" Requires="p14">
+            <p:contentPart p14:bwMode="auto" r:id="rId25">
+              <p14:nvContentPartPr>
+                <p14:cNvPr id="58" name="Håndskrift 57">
+                  <a:extLst>
+                    <a:ext uri="{FF2B5EF4-FFF2-40B4-BE49-F238E27FC236}">
+                      <a16:creationId xmlns:a16="http://schemas.microsoft.com/office/drawing/2014/main" id="{D36750B0-3BDF-A225-46AE-8D6B7BB53769}"/>
+                    </a:ext>
+                  </a:extLst>
+                </p14:cNvPr>
+                <p14:cNvContentPartPr/>
+                <p14:nvPr/>
+              </p14:nvContentPartPr>
+              <p14:xfrm>
+                <a:off x="6116432" y="5509887"/>
+                <a:ext cx="360" cy="360"/>
+              </p14:xfrm>
+            </p:contentPart>
+          </mc:Choice>
+          <mc:Fallback>
+            <p:pic>
+              <p:nvPicPr>
+                <p:cNvPr id="58" name="Håndskrift 57">
+                  <a:extLst>
+                    <a:ext uri="{FF2B5EF4-FFF2-40B4-BE49-F238E27FC236}">
+                      <a16:creationId xmlns:a16="http://schemas.microsoft.com/office/drawing/2014/main" id="{D36750B0-3BDF-A225-46AE-8D6B7BB53769}"/>
+                    </a:ext>
+                  </a:extLst>
+                </p:cNvPr>
+                <p:cNvPicPr/>
+                <p:nvPr/>
+              </p:nvPicPr>
+              <p:blipFill>
+                <a:blip r:embed="rId4"/>
+                <a:stretch>
+                  <a:fillRect/>
+                </a:stretch>
+              </p:blipFill>
+              <p:spPr>
+                <a:xfrm>
+                  <a:off x="6098432" y="5492247"/>
+                  <a:ext cx="36000" cy="36000"/>
+                </a:xfrm>
+                <a:prstGeom prst="rect">
+                  <a:avLst/>
+                </a:prstGeom>
+              </p:spPr>
+            </p:pic>
+          </mc:Fallback>
+        </mc:AlternateContent>
+        <mc:AlternateContent xmlns:mc="http://schemas.openxmlformats.org/markup-compatibility/2006">
+          <mc:Choice xmlns:p14="http://schemas.microsoft.com/office/powerpoint/2010/main" Requires="p14">
+            <p:contentPart p14:bwMode="auto" r:id="rId26">
+              <p14:nvContentPartPr>
+                <p14:cNvPr id="59" name="Håndskrift 58">
+                  <a:extLst>
+                    <a:ext uri="{FF2B5EF4-FFF2-40B4-BE49-F238E27FC236}">
+                      <a16:creationId xmlns:a16="http://schemas.microsoft.com/office/drawing/2014/main" id="{26011119-762E-1D97-071D-60419E4EDB0E}"/>
+                    </a:ext>
+                  </a:extLst>
+                </p14:cNvPr>
+                <p14:cNvContentPartPr/>
+                <p14:nvPr/>
+              </p14:nvContentPartPr>
+              <p14:xfrm>
+                <a:off x="6145592" y="5482167"/>
+                <a:ext cx="360" cy="360"/>
+              </p14:xfrm>
+            </p:contentPart>
+          </mc:Choice>
+          <mc:Fallback>
+            <p:pic>
+              <p:nvPicPr>
+                <p:cNvPr id="59" name="Håndskrift 58">
+                  <a:extLst>
+                    <a:ext uri="{FF2B5EF4-FFF2-40B4-BE49-F238E27FC236}">
+                      <a16:creationId xmlns:a16="http://schemas.microsoft.com/office/drawing/2014/main" id="{26011119-762E-1D97-071D-60419E4EDB0E}"/>
+                    </a:ext>
+                  </a:extLst>
+                </p:cNvPr>
+                <p:cNvPicPr/>
+                <p:nvPr/>
+              </p:nvPicPr>
+              <p:blipFill>
+                <a:blip r:embed="rId4"/>
+                <a:stretch>
+                  <a:fillRect/>
+                </a:stretch>
+              </p:blipFill>
+              <p:spPr>
+                <a:xfrm>
+                  <a:off x="6127952" y="5464167"/>
+                  <a:ext cx="36000" cy="36000"/>
+                </a:xfrm>
+                <a:prstGeom prst="rect">
+                  <a:avLst/>
+                </a:prstGeom>
+              </p:spPr>
+            </p:pic>
+          </mc:Fallback>
+        </mc:AlternateContent>
+      </p:grpSp>
+      <p:grpSp>
+        <p:nvGrpSpPr>
+          <p:cNvPr id="65" name="Gruppe 64">
+            <a:extLst>
+              <a:ext uri="{FF2B5EF4-FFF2-40B4-BE49-F238E27FC236}">
+                <a16:creationId xmlns:a16="http://schemas.microsoft.com/office/drawing/2014/main" id="{E8DA8E52-3F8B-0229-B98B-6D03D692AE8F}"/>
+              </a:ext>
+            </a:extLst>
+          </p:cNvPr>
+          <p:cNvGrpSpPr/>
+          <p:nvPr/>
+        </p:nvGrpSpPr>
+        <p:grpSpPr>
+          <a:xfrm>
+            <a:off x="6436472" y="5271567"/>
+            <a:ext cx="32400" cy="24480"/>
+            <a:chOff x="6436472" y="5271567"/>
+            <a:chExt cx="32400" cy="24480"/>
+          </a:xfrm>
+        </p:grpSpPr>
+        <mc:AlternateContent xmlns:mc="http://schemas.openxmlformats.org/markup-compatibility/2006">
+          <mc:Choice xmlns:p14="http://schemas.microsoft.com/office/powerpoint/2010/main" Requires="p14">
+            <p:contentPart p14:bwMode="auto" r:id="rId27">
+              <p14:nvContentPartPr>
+                <p14:cNvPr id="62" name="Håndskrift 61">
+                  <a:extLst>
+                    <a:ext uri="{FF2B5EF4-FFF2-40B4-BE49-F238E27FC236}">
+                      <a16:creationId xmlns:a16="http://schemas.microsoft.com/office/drawing/2014/main" id="{0F83C80B-E80F-44FA-6CA3-0AA734354141}"/>
+                    </a:ext>
+                  </a:extLst>
+                </p14:cNvPr>
+                <p14:cNvContentPartPr/>
+                <p14:nvPr/>
+              </p14:nvContentPartPr>
+              <p14:xfrm>
+                <a:off x="6436472" y="5295687"/>
+                <a:ext cx="360" cy="360"/>
+              </p14:xfrm>
+            </p:contentPart>
+          </mc:Choice>
+          <mc:Fallback>
+            <p:pic>
+              <p:nvPicPr>
+                <p:cNvPr id="62" name="Håndskrift 61">
+                  <a:extLst>
+                    <a:ext uri="{FF2B5EF4-FFF2-40B4-BE49-F238E27FC236}">
+                      <a16:creationId xmlns:a16="http://schemas.microsoft.com/office/drawing/2014/main" id="{0F83C80B-E80F-44FA-6CA3-0AA734354141}"/>
+                    </a:ext>
+                  </a:extLst>
+                </p:cNvPr>
+                <p:cNvPicPr/>
+                <p:nvPr/>
+              </p:nvPicPr>
+              <p:blipFill>
+                <a:blip r:embed="rId4"/>
+                <a:stretch>
+                  <a:fillRect/>
+                </a:stretch>
+              </p:blipFill>
+              <p:spPr>
+                <a:xfrm>
+                  <a:off x="6418472" y="5277687"/>
+                  <a:ext cx="36000" cy="36000"/>
+                </a:xfrm>
+                <a:prstGeom prst="rect">
+                  <a:avLst/>
+                </a:prstGeom>
+              </p:spPr>
+            </p:pic>
+          </mc:Fallback>
+        </mc:AlternateContent>
+        <mc:AlternateContent xmlns:mc="http://schemas.openxmlformats.org/markup-compatibility/2006">
+          <mc:Choice xmlns:p14="http://schemas.microsoft.com/office/powerpoint/2010/main" Requires="p14">
+            <p:contentPart p14:bwMode="auto" r:id="rId28">
+              <p14:nvContentPartPr>
+                <p14:cNvPr id="63" name="Håndskrift 62">
+                  <a:extLst>
+                    <a:ext uri="{FF2B5EF4-FFF2-40B4-BE49-F238E27FC236}">
+                      <a16:creationId xmlns:a16="http://schemas.microsoft.com/office/drawing/2014/main" id="{098BD492-76AE-D958-4619-19E56A669881}"/>
+                    </a:ext>
+                  </a:extLst>
+                </p14:cNvPr>
+                <p14:cNvContentPartPr/>
+                <p14:nvPr/>
+              </p14:nvContentPartPr>
+              <p14:xfrm>
+                <a:off x="6468512" y="5271567"/>
+                <a:ext cx="360" cy="360"/>
+              </p14:xfrm>
+            </p:contentPart>
+          </mc:Choice>
+          <mc:Fallback>
+            <p:pic>
+              <p:nvPicPr>
+                <p:cNvPr id="63" name="Håndskrift 62">
+                  <a:extLst>
+                    <a:ext uri="{FF2B5EF4-FFF2-40B4-BE49-F238E27FC236}">
+                      <a16:creationId xmlns:a16="http://schemas.microsoft.com/office/drawing/2014/main" id="{098BD492-76AE-D958-4619-19E56A669881}"/>
+                    </a:ext>
+                  </a:extLst>
+                </p:cNvPr>
+                <p:cNvPicPr/>
+                <p:nvPr/>
+              </p:nvPicPr>
+              <p:blipFill>
+                <a:blip r:embed="rId4"/>
+                <a:stretch>
+                  <a:fillRect/>
+                </a:stretch>
+              </p:blipFill>
+              <p:spPr>
+                <a:xfrm>
+                  <a:off x="6450872" y="5253567"/>
+                  <a:ext cx="36000" cy="36000"/>
+                </a:xfrm>
+                <a:prstGeom prst="rect">
+                  <a:avLst/>
+                </a:prstGeom>
+              </p:spPr>
+            </p:pic>
+          </mc:Fallback>
+        </mc:AlternateContent>
+      </p:grpSp>
+      <mc:AlternateContent xmlns:mc="http://schemas.openxmlformats.org/markup-compatibility/2006">
+        <mc:Choice xmlns:p14="http://schemas.microsoft.com/office/powerpoint/2010/main" Requires="p14">
+          <p:contentPart p14:bwMode="auto" r:id="rId29">
+            <p14:nvContentPartPr>
+              <p14:cNvPr id="66" name="Håndskrift 65">
+                <a:extLst>
+                  <a:ext uri="{FF2B5EF4-FFF2-40B4-BE49-F238E27FC236}">
+                    <a16:creationId xmlns:a16="http://schemas.microsoft.com/office/drawing/2014/main" id="{8F0E8ECD-5B80-8947-888D-B547A75185FA}"/>
+                  </a:ext>
+                </a:extLst>
+              </p14:cNvPr>
+              <p14:cNvContentPartPr/>
+              <p14:nvPr/>
+            </p14:nvContentPartPr>
+            <p14:xfrm>
+              <a:off x="6636992" y="4942527"/>
+              <a:ext cx="360" cy="360"/>
+            </p14:xfrm>
+          </p:contentPart>
+        </mc:Choice>
+        <mc:Fallback>
+          <p:pic>
+            <p:nvPicPr>
+              <p:cNvPr id="66" name="Håndskrift 65">
+                <a:extLst>
+                  <a:ext uri="{FF2B5EF4-FFF2-40B4-BE49-F238E27FC236}">
+                    <a16:creationId xmlns:a16="http://schemas.microsoft.com/office/drawing/2014/main" id="{8F0E8ECD-5B80-8947-888D-B547A75185FA}"/>
+                  </a:ext>
+                </a:extLst>
+              </p:cNvPr>
+              <p:cNvPicPr/>
+              <p:nvPr/>
+            </p:nvPicPr>
+            <p:blipFill>
+              <a:blip r:embed="rId4"/>
+              <a:stretch>
+                <a:fillRect/>
+              </a:stretch>
+            </p:blipFill>
+            <p:spPr>
+              <a:xfrm>
+                <a:off x="6619352" y="4924527"/>
+                <a:ext cx="36000" cy="36000"/>
+              </a:xfrm>
+              <a:prstGeom prst="rect">
+                <a:avLst/>
+              </a:prstGeom>
+            </p:spPr>
+          </p:pic>
+        </mc:Fallback>
+      </mc:AlternateContent>
+      <mc:AlternateContent xmlns:mc="http://schemas.openxmlformats.org/markup-compatibility/2006">
+        <mc:Choice xmlns:p14="http://schemas.microsoft.com/office/powerpoint/2010/main" Requires="p14">
+          <p:contentPart p14:bwMode="auto" r:id="rId30">
+            <p14:nvContentPartPr>
+              <p14:cNvPr id="67" name="Håndskrift 66">
+                <a:extLst>
+                  <a:ext uri="{FF2B5EF4-FFF2-40B4-BE49-F238E27FC236}">
+                    <a16:creationId xmlns:a16="http://schemas.microsoft.com/office/drawing/2014/main" id="{C01731F1-2083-E3B1-DED5-00DC7B78A4A1}"/>
+                  </a:ext>
+                </a:extLst>
+              </p14:cNvPr>
+              <p14:cNvContentPartPr/>
+              <p14:nvPr/>
+            </p14:nvContentPartPr>
+            <p14:xfrm>
+              <a:off x="6657152" y="4901847"/>
+              <a:ext cx="360" cy="360"/>
+            </p14:xfrm>
+          </p:contentPart>
+        </mc:Choice>
+        <mc:Fallback>
+          <p:pic>
+            <p:nvPicPr>
+              <p:cNvPr id="67" name="Håndskrift 66">
+                <a:extLst>
+                  <a:ext uri="{FF2B5EF4-FFF2-40B4-BE49-F238E27FC236}">
+                    <a16:creationId xmlns:a16="http://schemas.microsoft.com/office/drawing/2014/main" id="{C01731F1-2083-E3B1-DED5-00DC7B78A4A1}"/>
+                  </a:ext>
+                </a:extLst>
+              </p:cNvPr>
+              <p:cNvPicPr/>
+              <p:nvPr/>
+            </p:nvPicPr>
+            <p:blipFill>
+              <a:blip r:embed="rId4"/>
+              <a:stretch>
+                <a:fillRect/>
+              </a:stretch>
+            </p:blipFill>
+            <p:spPr>
+              <a:xfrm>
+                <a:off x="6639512" y="4883847"/>
+                <a:ext cx="36000" cy="36000"/>
+              </a:xfrm>
+              <a:prstGeom prst="rect">
+                <a:avLst/>
+              </a:prstGeom>
+            </p:spPr>
+          </p:pic>
+        </mc:Fallback>
+      </mc:AlternateContent>
+      <mc:AlternateContent xmlns:mc="http://schemas.openxmlformats.org/markup-compatibility/2006">
+        <mc:Choice xmlns:p14="http://schemas.microsoft.com/office/powerpoint/2010/main" Requires="p14">
+          <p:contentPart p14:bwMode="auto" r:id="rId31">
+            <p14:nvContentPartPr>
+              <p14:cNvPr id="68" name="Håndskrift 67">
+                <a:extLst>
+                  <a:ext uri="{FF2B5EF4-FFF2-40B4-BE49-F238E27FC236}">
+                    <a16:creationId xmlns:a16="http://schemas.microsoft.com/office/drawing/2014/main" id="{EA121AFF-7224-60DE-CA14-B091735C8D1D}"/>
+                  </a:ext>
+                </a:extLst>
+              </p14:cNvPr>
+              <p14:cNvContentPartPr/>
+              <p14:nvPr/>
+            </p14:nvContentPartPr>
+            <p14:xfrm>
+              <a:off x="7717699" y="2851225"/>
+              <a:ext cx="360" cy="360"/>
+            </p14:xfrm>
+          </p:contentPart>
+        </mc:Choice>
+        <mc:Fallback>
+          <p:pic>
+            <p:nvPicPr>
+              <p:cNvPr id="68" name="Håndskrift 67">
+                <a:extLst>
+                  <a:ext uri="{FF2B5EF4-FFF2-40B4-BE49-F238E27FC236}">
+                    <a16:creationId xmlns:a16="http://schemas.microsoft.com/office/drawing/2014/main" id="{EA121AFF-7224-60DE-CA14-B091735C8D1D}"/>
+                  </a:ext>
+                </a:extLst>
+              </p:cNvPr>
+              <p:cNvPicPr/>
+              <p:nvPr/>
+            </p:nvPicPr>
+            <p:blipFill>
+              <a:blip r:embed="rId4"/>
+              <a:stretch>
+                <a:fillRect/>
+              </a:stretch>
+            </p:blipFill>
+            <p:spPr>
+              <a:xfrm>
+                <a:off x="7699699" y="2833225"/>
+                <a:ext cx="36000" cy="36000"/>
+              </a:xfrm>
+              <a:prstGeom prst="rect">
+                <a:avLst/>
+              </a:prstGeom>
+            </p:spPr>
+          </p:pic>
+        </mc:Fallback>
+      </mc:AlternateContent>
+      <p:sp>
+        <p:nvSpPr>
+          <p:cNvPr id="69" name="Tekstfelt 68">
+            <a:extLst>
+              <a:ext uri="{FF2B5EF4-FFF2-40B4-BE49-F238E27FC236}">
+                <a16:creationId xmlns:a16="http://schemas.microsoft.com/office/drawing/2014/main" id="{463F3CD8-ED00-0D43-BE66-AAE3E322233D}"/>
+              </a:ext>
+            </a:extLst>
+          </p:cNvPr>
+          <p:cNvSpPr txBox="1"/>
+          <p:nvPr/>
+        </p:nvSpPr>
+        <p:spPr>
+          <a:xfrm>
+            <a:off x="8956110" y="1806450"/>
+            <a:ext cx="3062057" cy="1477328"/>
+          </a:xfrm>
+          <a:prstGeom prst="rect">
+            <a:avLst/>
+          </a:prstGeom>
+          <a:noFill/>
+        </p:spPr>
+        <p:txBody>
+          <a:bodyPr wrap="none" rtlCol="0">
+            <a:spAutoFit/>
+          </a:bodyPr>
+          <a:lstStyle/>
+          <a:p>
+            <a:r>
+              <a:rPr lang="da-DK" dirty="0"/>
+              <a:t>Modellen skal kunne </a:t>
+            </a:r>
+          </a:p>
+          <a:p>
+            <a:r>
+              <a:rPr lang="da-DK" dirty="0"/>
+              <a:t>detektere kanterne og</a:t>
+            </a:r>
+          </a:p>
+          <a:p>
+            <a:r>
+              <a:rPr lang="da-DK" dirty="0"/>
+              <a:t>størrelsen på tænderne, </a:t>
+            </a:r>
+          </a:p>
+          <a:p>
+            <a:r>
+              <a:rPr lang="da-DK" dirty="0"/>
+              <a:t>og dermed kan den lave </a:t>
+            </a:r>
+          </a:p>
+          <a:p>
+            <a:r>
+              <a:rPr lang="da-DK" dirty="0"/>
+              <a:t>en Bolton analyse  </a:t>
+            </a:r>
+          </a:p>
+        </p:txBody>
+      </p:sp>
+    </p:spTree>
+    <p:extLst>
+      <p:ext uri="{BB962C8B-B14F-4D97-AF65-F5344CB8AC3E}">
+        <p14:creationId xmlns:p14="http://schemas.microsoft.com/office/powerpoint/2010/main" val="3506500611"/>
       </p:ext>
     </p:extLst>
   </p:cSld>

</xml_diff>

<commit_message>
Tilføjet 2 nye slides
Præsentationen burde være tilstrækkelig nu.
</commit_message>
<xml_diff>
--- a/TØ/Powerpoint til præsentation.pptx
+++ b/TØ/Powerpoint til præsentation.pptx
@@ -10,6 +10,8 @@
     <p:sldId id="258" r:id="rId4"/>
     <p:sldId id="259" r:id="rId5"/>
     <p:sldId id="260" r:id="rId6"/>
+    <p:sldId id="261" r:id="rId7"/>
+    <p:sldId id="262" r:id="rId8"/>
   </p:sldIdLst>
   <p:sldSz cx="12192000" cy="6858000"/>
   <p:notesSz cx="6858000" cy="9144000"/>
@@ -1474,7 +1476,7 @@
           <a:p>
             <a:fld id="{67F45AC6-C491-4585-A584-9CE2AF7D5500}" type="datetime1">
               <a:rPr lang="en-US" smtClean="0"/>
-              <a:t>2/18/25</a:t>
+              <a:t>2/19/25</a:t>
             </a:fld>
             <a:endParaRPr lang="en-US"/>
           </a:p>
@@ -1677,7 +1679,7 @@
           <a:p>
             <a:fld id="{67F45AC6-C491-4585-A584-9CE2AF7D5500}" type="datetime1">
               <a:rPr lang="en-US" smtClean="0"/>
-              <a:t>2/18/25</a:t>
+              <a:t>2/19/25</a:t>
             </a:fld>
             <a:endParaRPr lang="en-US"/>
           </a:p>
@@ -1858,7 +1860,7 @@
           <a:p>
             <a:fld id="{67F45AC6-C491-4585-A584-9CE2AF7D5500}" type="datetime1">
               <a:rPr lang="en-US" smtClean="0"/>
-              <a:t>2/18/25</a:t>
+              <a:t>2/19/25</a:t>
             </a:fld>
             <a:endParaRPr lang="en-US"/>
           </a:p>
@@ -2029,7 +2031,7 @@
           <a:p>
             <a:fld id="{67F45AC6-C491-4585-A584-9CE2AF7D5500}" type="datetime1">
               <a:rPr lang="en-US" smtClean="0"/>
-              <a:t>2/18/25</a:t>
+              <a:t>2/19/25</a:t>
             </a:fld>
             <a:endParaRPr lang="en-US"/>
           </a:p>
@@ -2601,7 +2603,7 @@
           <a:p>
             <a:fld id="{67F45AC6-C491-4585-A584-9CE2AF7D5500}" type="datetime1">
               <a:rPr lang="en-US" smtClean="0"/>
-              <a:t>2/18/25</a:t>
+              <a:t>2/19/25</a:t>
             </a:fld>
             <a:endParaRPr lang="en-US"/>
           </a:p>
@@ -2904,7 +2906,7 @@
           <a:p>
             <a:fld id="{67F45AC6-C491-4585-A584-9CE2AF7D5500}" type="datetime1">
               <a:rPr lang="en-US" smtClean="0"/>
-              <a:t>2/18/25</a:t>
+              <a:t>2/19/25</a:t>
             </a:fld>
             <a:endParaRPr lang="en-US"/>
           </a:p>
@@ -3342,7 +3344,7 @@
           <a:p>
             <a:fld id="{67F45AC6-C491-4585-A584-9CE2AF7D5500}" type="datetime1">
               <a:rPr lang="en-US" smtClean="0"/>
-              <a:t>2/18/25</a:t>
+              <a:t>2/19/25</a:t>
             </a:fld>
             <a:endParaRPr lang="en-US"/>
           </a:p>
@@ -3461,7 +3463,7 @@
           <a:p>
             <a:fld id="{67F45AC6-C491-4585-A584-9CE2AF7D5500}" type="datetime1">
               <a:rPr lang="en-US" smtClean="0"/>
-              <a:t>2/18/25</a:t>
+              <a:t>2/19/25</a:t>
             </a:fld>
             <a:endParaRPr lang="en-US"/>
           </a:p>
@@ -3557,7 +3559,7 @@
           <a:p>
             <a:fld id="{67F45AC6-C491-4585-A584-9CE2AF7D5500}" type="datetime1">
               <a:rPr lang="en-US" smtClean="0"/>
-              <a:t>2/18/25</a:t>
+              <a:t>2/19/25</a:t>
             </a:fld>
             <a:endParaRPr lang="en-US"/>
           </a:p>
@@ -3940,7 +3942,7 @@
           <a:p>
             <a:fld id="{67F45AC6-C491-4585-A584-9CE2AF7D5500}" type="datetime1">
               <a:rPr lang="en-US" smtClean="0"/>
-              <a:t>2/18/25</a:t>
+              <a:t>2/19/25</a:t>
             </a:fld>
             <a:endParaRPr lang="en-US"/>
           </a:p>
@@ -4335,7 +4337,7 @@
           <a:p>
             <a:fld id="{67F45AC6-C491-4585-A584-9CE2AF7D5500}" type="datetime1">
               <a:rPr lang="en-US" smtClean="0"/>
-              <a:t>2/18/25</a:t>
+              <a:t>2/19/25</a:t>
             </a:fld>
             <a:endParaRPr lang="en-US"/>
           </a:p>
@@ -4649,7 +4651,7 @@
           <a:p>
             <a:fld id="{67F45AC6-C491-4585-A584-9CE2AF7D5500}" type="datetime1">
               <a:rPr lang="en-US" smtClean="0"/>
-              <a:t>2/18/25</a:t>
+              <a:t>2/19/25</a:t>
             </a:fld>
             <a:endParaRPr lang="en-US"/>
           </a:p>
@@ -6191,31 +6193,6 @@
           </a:fontRef>
         </p:style>
       </p:cxnSp>
-      <p:sp>
-        <p:nvSpPr>
-          <p:cNvPr id="4" name="Pladsholder til indhold 3">
-            <a:extLst>
-              <a:ext uri="{FF2B5EF4-FFF2-40B4-BE49-F238E27FC236}">
-                <a16:creationId xmlns:a16="http://schemas.microsoft.com/office/drawing/2014/main" id="{B9D4CE6F-CB36-270D-BF4B-78A23420581C}"/>
-              </a:ext>
-            </a:extLst>
-          </p:cNvPr>
-          <p:cNvSpPr>
-            <a:spLocks noGrp="1"/>
-          </p:cNvSpPr>
-          <p:nvPr>
-            <p:ph idx="1"/>
-          </p:nvPr>
-        </p:nvSpPr>
-        <p:spPr/>
-        <p:txBody>
-          <a:bodyPr/>
-          <a:lstStyle/>
-          <a:p>
-            <a:endParaRPr lang="da-DK" dirty="0"/>
-          </a:p>
-        </p:txBody>
-      </p:sp>
     </p:spTree>
     <p:extLst>
       <p:ext uri="{BB962C8B-B14F-4D97-AF65-F5344CB8AC3E}">
@@ -6841,8 +6818,8 @@
           </a:p>
         </p:txBody>
       </p:sp>
-      <mc:AlternateContent xmlns:mc="http://schemas.openxmlformats.org/markup-compatibility/2006">
-        <mc:Choice xmlns:p14="http://schemas.microsoft.com/office/powerpoint/2010/main" Requires="p14">
+      <mc:AlternateContent xmlns:mc="http://schemas.openxmlformats.org/markup-compatibility/2006" xmlns:p14="http://schemas.microsoft.com/office/powerpoint/2010/main">
+        <mc:Choice Requires="p14">
           <p:contentPart p14:bwMode="auto" r:id="rId5">
             <p14:nvContentPartPr>
               <p14:cNvPr id="20" name="Håndskrift 19">
@@ -6861,7 +6838,7 @@
             </p14:xfrm>
           </p:contentPart>
         </mc:Choice>
-        <mc:Fallback>
+        <mc:Fallback xmlns="">
           <p:pic>
             <p:nvPicPr>
               <p:cNvPr id="20" name="Håndskrift 19">
@@ -6892,8 +6869,8 @@
           </p:pic>
         </mc:Fallback>
       </mc:AlternateContent>
-      <mc:AlternateContent xmlns:mc="http://schemas.openxmlformats.org/markup-compatibility/2006">
-        <mc:Choice xmlns:p14="http://schemas.microsoft.com/office/powerpoint/2010/main" Requires="p14">
+      <mc:AlternateContent xmlns:mc="http://schemas.openxmlformats.org/markup-compatibility/2006" xmlns:p14="http://schemas.microsoft.com/office/powerpoint/2010/main">
+        <mc:Choice Requires="p14">
           <p:contentPart p14:bwMode="auto" r:id="rId7">
             <p14:nvContentPartPr>
               <p14:cNvPr id="21" name="Håndskrift 20">
@@ -6912,7 +6889,7 @@
             </p14:xfrm>
           </p:contentPart>
         </mc:Choice>
-        <mc:Fallback>
+        <mc:Fallback xmlns="">
           <p:pic>
             <p:nvPicPr>
               <p:cNvPr id="21" name="Håndskrift 20">
@@ -6943,8 +6920,8 @@
           </p:pic>
         </mc:Fallback>
       </mc:AlternateContent>
-      <mc:AlternateContent xmlns:mc="http://schemas.openxmlformats.org/markup-compatibility/2006">
-        <mc:Choice xmlns:p14="http://schemas.microsoft.com/office/powerpoint/2010/main" Requires="p14">
+      <mc:AlternateContent xmlns:mc="http://schemas.openxmlformats.org/markup-compatibility/2006" xmlns:p14="http://schemas.microsoft.com/office/powerpoint/2010/main">
+        <mc:Choice Requires="p14">
           <p:contentPart p14:bwMode="auto" r:id="rId8">
             <p14:nvContentPartPr>
               <p14:cNvPr id="22" name="Håndskrift 21">
@@ -6963,7 +6940,7 @@
             </p14:xfrm>
           </p:contentPart>
         </mc:Choice>
-        <mc:Fallback>
+        <mc:Fallback xmlns="">
           <p:pic>
             <p:nvPicPr>
               <p:cNvPr id="22" name="Håndskrift 21">
@@ -6994,8 +6971,8 @@
           </p:pic>
         </mc:Fallback>
       </mc:AlternateContent>
-      <mc:AlternateContent xmlns:mc="http://schemas.openxmlformats.org/markup-compatibility/2006">
-        <mc:Choice xmlns:p14="http://schemas.microsoft.com/office/powerpoint/2010/main" Requires="p14">
+      <mc:AlternateContent xmlns:mc="http://schemas.openxmlformats.org/markup-compatibility/2006" xmlns:p14="http://schemas.microsoft.com/office/powerpoint/2010/main">
+        <mc:Choice Requires="p14">
           <p:contentPart p14:bwMode="auto" r:id="rId9">
             <p14:nvContentPartPr>
               <p14:cNvPr id="23" name="Håndskrift 22">
@@ -7014,7 +6991,7 @@
             </p14:xfrm>
           </p:contentPart>
         </mc:Choice>
-        <mc:Fallback>
+        <mc:Fallback xmlns="">
           <p:pic>
             <p:nvPicPr>
               <p:cNvPr id="23" name="Håndskrift 22">
@@ -7139,8 +7116,8 @@
           </a:xfrm>
         </p:spPr>
       </p:pic>
-      <mc:AlternateContent xmlns:mc="http://schemas.openxmlformats.org/markup-compatibility/2006">
-        <mc:Choice xmlns:p14="http://schemas.microsoft.com/office/powerpoint/2010/main" Requires="p14">
+      <mc:AlternateContent xmlns:mc="http://schemas.openxmlformats.org/markup-compatibility/2006" xmlns:p14="http://schemas.microsoft.com/office/powerpoint/2010/main">
+        <mc:Choice Requires="p14">
           <p:contentPart p14:bwMode="auto" r:id="rId3">
             <p14:nvContentPartPr>
               <p14:cNvPr id="5" name="Håndskrift 4">
@@ -7159,7 +7136,7 @@
             </p14:xfrm>
           </p:contentPart>
         </mc:Choice>
-        <mc:Fallback>
+        <mc:Fallback xmlns="">
           <p:pic>
             <p:nvPicPr>
               <p:cNvPr id="5" name="Håndskrift 4">
@@ -7190,8 +7167,8 @@
           </p:pic>
         </mc:Fallback>
       </mc:AlternateContent>
-      <mc:AlternateContent xmlns:mc="http://schemas.openxmlformats.org/markup-compatibility/2006">
-        <mc:Choice xmlns:p14="http://schemas.microsoft.com/office/powerpoint/2010/main" Requires="p14">
+      <mc:AlternateContent xmlns:mc="http://schemas.openxmlformats.org/markup-compatibility/2006" xmlns:p14="http://schemas.microsoft.com/office/powerpoint/2010/main">
+        <mc:Choice Requires="p14">
           <p:contentPart p14:bwMode="auto" r:id="rId5">
             <p14:nvContentPartPr>
               <p14:cNvPr id="6" name="Håndskrift 5">
@@ -7210,7 +7187,7 @@
             </p14:xfrm>
           </p:contentPart>
         </mc:Choice>
-        <mc:Fallback>
+        <mc:Fallback xmlns="">
           <p:pic>
             <p:nvPicPr>
               <p:cNvPr id="6" name="Håndskrift 5">
@@ -7241,8 +7218,8 @@
           </p:pic>
         </mc:Fallback>
       </mc:AlternateContent>
-      <mc:AlternateContent xmlns:mc="http://schemas.openxmlformats.org/markup-compatibility/2006">
-        <mc:Choice xmlns:p14="http://schemas.microsoft.com/office/powerpoint/2010/main" Requires="p14">
+      <mc:AlternateContent xmlns:mc="http://schemas.openxmlformats.org/markup-compatibility/2006" xmlns:p14="http://schemas.microsoft.com/office/powerpoint/2010/main">
+        <mc:Choice Requires="p14">
           <p:contentPart p14:bwMode="auto" r:id="rId6">
             <p14:nvContentPartPr>
               <p14:cNvPr id="7" name="Håndskrift 6">
@@ -7261,7 +7238,7 @@
             </p14:xfrm>
           </p:contentPart>
         </mc:Choice>
-        <mc:Fallback>
+        <mc:Fallback xmlns="">
           <p:pic>
             <p:nvPicPr>
               <p:cNvPr id="7" name="Håndskrift 6">
@@ -7292,8 +7269,8 @@
           </p:pic>
         </mc:Fallback>
       </mc:AlternateContent>
-      <mc:AlternateContent xmlns:mc="http://schemas.openxmlformats.org/markup-compatibility/2006">
-        <mc:Choice xmlns:p14="http://schemas.microsoft.com/office/powerpoint/2010/main" Requires="p14">
+      <mc:AlternateContent xmlns:mc="http://schemas.openxmlformats.org/markup-compatibility/2006" xmlns:p14="http://schemas.microsoft.com/office/powerpoint/2010/main">
+        <mc:Choice Requires="p14">
           <p:contentPart p14:bwMode="auto" r:id="rId7">
             <p14:nvContentPartPr>
               <p14:cNvPr id="8" name="Håndskrift 7">
@@ -7312,7 +7289,7 @@
             </p14:xfrm>
           </p:contentPart>
         </mc:Choice>
-        <mc:Fallback>
+        <mc:Fallback xmlns="">
           <p:pic>
             <p:nvPicPr>
               <p:cNvPr id="8" name="Håndskrift 7">
@@ -7343,8 +7320,8 @@
           </p:pic>
         </mc:Fallback>
       </mc:AlternateContent>
-      <mc:AlternateContent xmlns:mc="http://schemas.openxmlformats.org/markup-compatibility/2006">
-        <mc:Choice xmlns:p14="http://schemas.microsoft.com/office/powerpoint/2010/main" Requires="p14">
+      <mc:AlternateContent xmlns:mc="http://schemas.openxmlformats.org/markup-compatibility/2006" xmlns:p14="http://schemas.microsoft.com/office/powerpoint/2010/main">
+        <mc:Choice Requires="p14">
           <p:contentPart p14:bwMode="auto" r:id="rId8">
             <p14:nvContentPartPr>
               <p14:cNvPr id="14" name="Håndskrift 13">
@@ -7363,7 +7340,7 @@
             </p14:xfrm>
           </p:contentPart>
         </mc:Choice>
-        <mc:Fallback>
+        <mc:Fallback xmlns="">
           <p:pic>
             <p:nvPicPr>
               <p:cNvPr id="14" name="Håndskrift 13">
@@ -7394,8 +7371,8 @@
           </p:pic>
         </mc:Fallback>
       </mc:AlternateContent>
-      <mc:AlternateContent xmlns:mc="http://schemas.openxmlformats.org/markup-compatibility/2006">
-        <mc:Choice xmlns:p14="http://schemas.microsoft.com/office/powerpoint/2010/main" Requires="p14">
+      <mc:AlternateContent xmlns:mc="http://schemas.openxmlformats.org/markup-compatibility/2006" xmlns:p14="http://schemas.microsoft.com/office/powerpoint/2010/main">
+        <mc:Choice Requires="p14">
           <p:contentPart p14:bwMode="auto" r:id="rId9">
             <p14:nvContentPartPr>
               <p14:cNvPr id="16" name="Håndskrift 15">
@@ -7414,7 +7391,7 @@
             </p14:xfrm>
           </p:contentPart>
         </mc:Choice>
-        <mc:Fallback>
+        <mc:Fallback xmlns="">
           <p:pic>
             <p:nvPicPr>
               <p:cNvPr id="16" name="Håndskrift 15">
@@ -7445,8 +7422,8 @@
           </p:pic>
         </mc:Fallback>
       </mc:AlternateContent>
-      <mc:AlternateContent xmlns:mc="http://schemas.openxmlformats.org/markup-compatibility/2006">
-        <mc:Choice xmlns:p14="http://schemas.microsoft.com/office/powerpoint/2010/main" Requires="p14">
+      <mc:AlternateContent xmlns:mc="http://schemas.openxmlformats.org/markup-compatibility/2006" xmlns:p14="http://schemas.microsoft.com/office/powerpoint/2010/main">
+        <mc:Choice Requires="p14">
           <p:contentPart p14:bwMode="auto" r:id="rId10">
             <p14:nvContentPartPr>
               <p14:cNvPr id="17" name="Håndskrift 16">
@@ -7465,7 +7442,7 @@
             </p14:xfrm>
           </p:contentPart>
         </mc:Choice>
-        <mc:Fallback>
+        <mc:Fallback xmlns="">
           <p:pic>
             <p:nvPicPr>
               <p:cNvPr id="17" name="Håndskrift 16">
@@ -7516,8 +7493,8 @@
             <a:chExt cx="27720" cy="28440"/>
           </a:xfrm>
         </p:grpSpPr>
-        <mc:AlternateContent xmlns:mc="http://schemas.openxmlformats.org/markup-compatibility/2006">
-          <mc:Choice xmlns:p14="http://schemas.microsoft.com/office/powerpoint/2010/main" Requires="p14">
+        <mc:AlternateContent xmlns:mc="http://schemas.openxmlformats.org/markup-compatibility/2006" xmlns:p14="http://schemas.microsoft.com/office/powerpoint/2010/main">
+          <mc:Choice Requires="p14">
             <p:contentPart p14:bwMode="auto" r:id="rId11">
               <p14:nvContentPartPr>
                 <p14:cNvPr id="19" name="Håndskrift 18">
@@ -7536,7 +7513,7 @@
               </p14:xfrm>
             </p:contentPart>
           </mc:Choice>
-          <mc:Fallback>
+          <mc:Fallback xmlns="">
             <p:pic>
               <p:nvPicPr>
                 <p:cNvPr id="19" name="Håndskrift 18">
@@ -7567,8 +7544,8 @@
             </p:pic>
           </mc:Fallback>
         </mc:AlternateContent>
-        <mc:AlternateContent xmlns:mc="http://schemas.openxmlformats.org/markup-compatibility/2006">
-          <mc:Choice xmlns:p14="http://schemas.microsoft.com/office/powerpoint/2010/main" Requires="p14">
+        <mc:AlternateContent xmlns:mc="http://schemas.openxmlformats.org/markup-compatibility/2006" xmlns:p14="http://schemas.microsoft.com/office/powerpoint/2010/main">
+          <mc:Choice Requires="p14">
             <p:contentPart p14:bwMode="auto" r:id="rId12">
               <p14:nvContentPartPr>
                 <p14:cNvPr id="20" name="Håndskrift 19">
@@ -7587,7 +7564,7 @@
               </p14:xfrm>
             </p:contentPart>
           </mc:Choice>
-          <mc:Fallback>
+          <mc:Fallback xmlns="">
             <p:pic>
               <p:nvPicPr>
                 <p:cNvPr id="20" name="Håndskrift 19">
@@ -7619,8 +7596,8 @@
           </mc:Fallback>
         </mc:AlternateContent>
       </p:grpSp>
-      <mc:AlternateContent xmlns:mc="http://schemas.openxmlformats.org/markup-compatibility/2006">
-        <mc:Choice xmlns:p14="http://schemas.microsoft.com/office/powerpoint/2010/main" Requires="p14">
+      <mc:AlternateContent xmlns:mc="http://schemas.openxmlformats.org/markup-compatibility/2006" xmlns:p14="http://schemas.microsoft.com/office/powerpoint/2010/main">
+        <mc:Choice Requires="p14">
           <p:contentPart p14:bwMode="auto" r:id="rId13">
             <p14:nvContentPartPr>
               <p14:cNvPr id="23" name="Håndskrift 22">
@@ -7639,7 +7616,7 @@
             </p14:xfrm>
           </p:contentPart>
         </mc:Choice>
-        <mc:Fallback>
+        <mc:Fallback xmlns="">
           <p:pic>
             <p:nvPicPr>
               <p:cNvPr id="23" name="Håndskrift 22">
@@ -7670,8 +7647,8 @@
           </p:pic>
         </mc:Fallback>
       </mc:AlternateContent>
-      <mc:AlternateContent xmlns:mc="http://schemas.openxmlformats.org/markup-compatibility/2006">
-        <mc:Choice xmlns:p14="http://schemas.microsoft.com/office/powerpoint/2010/main" Requires="p14">
+      <mc:AlternateContent xmlns:mc="http://schemas.openxmlformats.org/markup-compatibility/2006" xmlns:p14="http://schemas.microsoft.com/office/powerpoint/2010/main">
+        <mc:Choice Requires="p14">
           <p:contentPart p14:bwMode="auto" r:id="rId14">
             <p14:nvContentPartPr>
               <p14:cNvPr id="41" name="Håndskrift 40">
@@ -7690,7 +7667,7 @@
             </p14:xfrm>
           </p:contentPart>
         </mc:Choice>
-        <mc:Fallback>
+        <mc:Fallback xmlns="">
           <p:pic>
             <p:nvPicPr>
               <p:cNvPr id="41" name="Håndskrift 40">
@@ -7721,8 +7698,8 @@
           </p:pic>
         </mc:Fallback>
       </mc:AlternateContent>
-      <mc:AlternateContent xmlns:mc="http://schemas.openxmlformats.org/markup-compatibility/2006">
-        <mc:Choice xmlns:p14="http://schemas.microsoft.com/office/powerpoint/2010/main" Requires="p14">
+      <mc:AlternateContent xmlns:mc="http://schemas.openxmlformats.org/markup-compatibility/2006" xmlns:p14="http://schemas.microsoft.com/office/powerpoint/2010/main">
+        <mc:Choice Requires="p14">
           <p:contentPart p14:bwMode="auto" r:id="rId15">
             <p14:nvContentPartPr>
               <p14:cNvPr id="42" name="Håndskrift 41">
@@ -7741,7 +7718,7 @@
             </p14:xfrm>
           </p:contentPart>
         </mc:Choice>
-        <mc:Fallback>
+        <mc:Fallback xmlns="">
           <p:pic>
             <p:nvPicPr>
               <p:cNvPr id="42" name="Håndskrift 41">
@@ -7772,8 +7749,8 @@
           </p:pic>
         </mc:Fallback>
       </mc:AlternateContent>
-      <mc:AlternateContent xmlns:mc="http://schemas.openxmlformats.org/markup-compatibility/2006">
-        <mc:Choice xmlns:p14="http://schemas.microsoft.com/office/powerpoint/2010/main" Requires="p14">
+      <mc:AlternateContent xmlns:mc="http://schemas.openxmlformats.org/markup-compatibility/2006" xmlns:p14="http://schemas.microsoft.com/office/powerpoint/2010/main">
+        <mc:Choice Requires="p14">
           <p:contentPart p14:bwMode="auto" r:id="rId16">
             <p14:nvContentPartPr>
               <p14:cNvPr id="43" name="Håndskrift 42">
@@ -7792,7 +7769,7 @@
             </p14:xfrm>
           </p:contentPart>
         </mc:Choice>
-        <mc:Fallback>
+        <mc:Fallback xmlns="">
           <p:pic>
             <p:nvPicPr>
               <p:cNvPr id="43" name="Håndskrift 42">
@@ -7823,8 +7800,8 @@
           </p:pic>
         </mc:Fallback>
       </mc:AlternateContent>
-      <mc:AlternateContent xmlns:mc="http://schemas.openxmlformats.org/markup-compatibility/2006">
-        <mc:Choice xmlns:p14="http://schemas.microsoft.com/office/powerpoint/2010/main" Requires="p14">
+      <mc:AlternateContent xmlns:mc="http://schemas.openxmlformats.org/markup-compatibility/2006" xmlns:p14="http://schemas.microsoft.com/office/powerpoint/2010/main">
+        <mc:Choice Requires="p14">
           <p:contentPart p14:bwMode="auto" r:id="rId17">
             <p14:nvContentPartPr>
               <p14:cNvPr id="44" name="Håndskrift 43">
@@ -7843,7 +7820,7 @@
             </p14:xfrm>
           </p:contentPart>
         </mc:Choice>
-        <mc:Fallback>
+        <mc:Fallback xmlns="">
           <p:pic>
             <p:nvPicPr>
               <p:cNvPr id="44" name="Håndskrift 43">
@@ -7894,8 +7871,8 @@
             <a:chExt cx="28080" cy="34560"/>
           </a:xfrm>
         </p:grpSpPr>
-        <mc:AlternateContent xmlns:mc="http://schemas.openxmlformats.org/markup-compatibility/2006">
-          <mc:Choice xmlns:p14="http://schemas.microsoft.com/office/powerpoint/2010/main" Requires="p14">
+        <mc:AlternateContent xmlns:mc="http://schemas.openxmlformats.org/markup-compatibility/2006" xmlns:p14="http://schemas.microsoft.com/office/powerpoint/2010/main">
+          <mc:Choice Requires="p14">
             <p:contentPart p14:bwMode="auto" r:id="rId18">
               <p14:nvContentPartPr>
                 <p14:cNvPr id="45" name="Håndskrift 44">
@@ -7914,7 +7891,7 @@
               </p14:xfrm>
             </p:contentPart>
           </mc:Choice>
-          <mc:Fallback>
+          <mc:Fallback xmlns="">
             <p:pic>
               <p:nvPicPr>
                 <p:cNvPr id="45" name="Håndskrift 44">
@@ -7945,8 +7922,8 @@
             </p:pic>
           </mc:Fallback>
         </mc:AlternateContent>
-        <mc:AlternateContent xmlns:mc="http://schemas.openxmlformats.org/markup-compatibility/2006">
-          <mc:Choice xmlns:p14="http://schemas.microsoft.com/office/powerpoint/2010/main" Requires="p14">
+        <mc:AlternateContent xmlns:mc="http://schemas.openxmlformats.org/markup-compatibility/2006" xmlns:p14="http://schemas.microsoft.com/office/powerpoint/2010/main">
+          <mc:Choice Requires="p14">
             <p:contentPart p14:bwMode="auto" r:id="rId19">
               <p14:nvContentPartPr>
                 <p14:cNvPr id="46" name="Håndskrift 45">
@@ -7965,7 +7942,7 @@
               </p14:xfrm>
             </p:contentPart>
           </mc:Choice>
-          <mc:Fallback>
+          <mc:Fallback xmlns="">
             <p:pic>
               <p:nvPicPr>
                 <p:cNvPr id="46" name="Håndskrift 45">
@@ -7997,8 +7974,8 @@
           </mc:Fallback>
         </mc:AlternateContent>
       </p:grpSp>
-      <mc:AlternateContent xmlns:mc="http://schemas.openxmlformats.org/markup-compatibility/2006">
-        <mc:Choice xmlns:p14="http://schemas.microsoft.com/office/powerpoint/2010/main" Requires="p14">
+      <mc:AlternateContent xmlns:mc="http://schemas.openxmlformats.org/markup-compatibility/2006" xmlns:p14="http://schemas.microsoft.com/office/powerpoint/2010/main">
+        <mc:Choice Requires="p14">
           <p:contentPart p14:bwMode="auto" r:id="rId20">
             <p14:nvContentPartPr>
               <p14:cNvPr id="49" name="Håndskrift 48">
@@ -8017,7 +7994,7 @@
             </p14:xfrm>
           </p:contentPart>
         </mc:Choice>
-        <mc:Fallback>
+        <mc:Fallback xmlns="">
           <p:pic>
             <p:nvPicPr>
               <p:cNvPr id="49" name="Håndskrift 48">
@@ -8068,8 +8045,8 @@
             <a:chExt cx="35280" cy="21240"/>
           </a:xfrm>
         </p:grpSpPr>
-        <mc:AlternateContent xmlns:mc="http://schemas.openxmlformats.org/markup-compatibility/2006">
-          <mc:Choice xmlns:p14="http://schemas.microsoft.com/office/powerpoint/2010/main" Requires="p14">
+        <mc:AlternateContent xmlns:mc="http://schemas.openxmlformats.org/markup-compatibility/2006" xmlns:p14="http://schemas.microsoft.com/office/powerpoint/2010/main">
+          <mc:Choice Requires="p14">
             <p:contentPart p14:bwMode="auto" r:id="rId21">
               <p14:nvContentPartPr>
                 <p14:cNvPr id="50" name="Håndskrift 49">
@@ -8088,7 +8065,7 @@
               </p14:xfrm>
             </p:contentPart>
           </mc:Choice>
-          <mc:Fallback>
+          <mc:Fallback xmlns="">
             <p:pic>
               <p:nvPicPr>
                 <p:cNvPr id="50" name="Håndskrift 49">
@@ -8119,8 +8096,8 @@
             </p:pic>
           </mc:Fallback>
         </mc:AlternateContent>
-        <mc:AlternateContent xmlns:mc="http://schemas.openxmlformats.org/markup-compatibility/2006">
-          <mc:Choice xmlns:p14="http://schemas.microsoft.com/office/powerpoint/2010/main" Requires="p14">
+        <mc:AlternateContent xmlns:mc="http://schemas.openxmlformats.org/markup-compatibility/2006" xmlns:p14="http://schemas.microsoft.com/office/powerpoint/2010/main">
+          <mc:Choice Requires="p14">
             <p:contentPart p14:bwMode="auto" r:id="rId22">
               <p14:nvContentPartPr>
                 <p14:cNvPr id="51" name="Håndskrift 50">
@@ -8139,7 +8116,7 @@
               </p14:xfrm>
             </p:contentPart>
           </mc:Choice>
-          <mc:Fallback>
+          <mc:Fallback xmlns="">
             <p:pic>
               <p:nvPicPr>
                 <p:cNvPr id="51" name="Håndskrift 50">
@@ -8191,8 +8168,8 @@
             <a:chExt cx="36720" cy="6840"/>
           </a:xfrm>
         </p:grpSpPr>
-        <mc:AlternateContent xmlns:mc="http://schemas.openxmlformats.org/markup-compatibility/2006">
-          <mc:Choice xmlns:p14="http://schemas.microsoft.com/office/powerpoint/2010/main" Requires="p14">
+        <mc:AlternateContent xmlns:mc="http://schemas.openxmlformats.org/markup-compatibility/2006" xmlns:p14="http://schemas.microsoft.com/office/powerpoint/2010/main">
+          <mc:Choice Requires="p14">
             <p:contentPart p14:bwMode="auto" r:id="rId23">
               <p14:nvContentPartPr>
                 <p14:cNvPr id="54" name="Håndskrift 53">
@@ -8211,7 +8188,7 @@
               </p14:xfrm>
             </p:contentPart>
           </mc:Choice>
-          <mc:Fallback>
+          <mc:Fallback xmlns="">
             <p:pic>
               <p:nvPicPr>
                 <p:cNvPr id="54" name="Håndskrift 53">
@@ -8242,8 +8219,8 @@
             </p:pic>
           </mc:Fallback>
         </mc:AlternateContent>
-        <mc:AlternateContent xmlns:mc="http://schemas.openxmlformats.org/markup-compatibility/2006">
-          <mc:Choice xmlns:p14="http://schemas.microsoft.com/office/powerpoint/2010/main" Requires="p14">
+        <mc:AlternateContent xmlns:mc="http://schemas.openxmlformats.org/markup-compatibility/2006" xmlns:p14="http://schemas.microsoft.com/office/powerpoint/2010/main">
+          <mc:Choice Requires="p14">
             <p:contentPart p14:bwMode="auto" r:id="rId24">
               <p14:nvContentPartPr>
                 <p14:cNvPr id="55" name="Håndskrift 54">
@@ -8262,7 +8239,7 @@
               </p14:xfrm>
             </p:contentPart>
           </mc:Choice>
-          <mc:Fallback>
+          <mc:Fallback xmlns="">
             <p:pic>
               <p:nvPicPr>
                 <p:cNvPr id="55" name="Håndskrift 54">
@@ -8314,8 +8291,8 @@
             <a:chExt cx="29520" cy="28080"/>
           </a:xfrm>
         </p:grpSpPr>
-        <mc:AlternateContent xmlns:mc="http://schemas.openxmlformats.org/markup-compatibility/2006">
-          <mc:Choice xmlns:p14="http://schemas.microsoft.com/office/powerpoint/2010/main" Requires="p14">
+        <mc:AlternateContent xmlns:mc="http://schemas.openxmlformats.org/markup-compatibility/2006" xmlns:p14="http://schemas.microsoft.com/office/powerpoint/2010/main">
+          <mc:Choice Requires="p14">
             <p:contentPart p14:bwMode="auto" r:id="rId25">
               <p14:nvContentPartPr>
                 <p14:cNvPr id="58" name="Håndskrift 57">
@@ -8334,7 +8311,7 @@
               </p14:xfrm>
             </p:contentPart>
           </mc:Choice>
-          <mc:Fallback>
+          <mc:Fallback xmlns="">
             <p:pic>
               <p:nvPicPr>
                 <p:cNvPr id="58" name="Håndskrift 57">
@@ -8365,8 +8342,8 @@
             </p:pic>
           </mc:Fallback>
         </mc:AlternateContent>
-        <mc:AlternateContent xmlns:mc="http://schemas.openxmlformats.org/markup-compatibility/2006">
-          <mc:Choice xmlns:p14="http://schemas.microsoft.com/office/powerpoint/2010/main" Requires="p14">
+        <mc:AlternateContent xmlns:mc="http://schemas.openxmlformats.org/markup-compatibility/2006" xmlns:p14="http://schemas.microsoft.com/office/powerpoint/2010/main">
+          <mc:Choice Requires="p14">
             <p:contentPart p14:bwMode="auto" r:id="rId26">
               <p14:nvContentPartPr>
                 <p14:cNvPr id="59" name="Håndskrift 58">
@@ -8385,7 +8362,7 @@
               </p14:xfrm>
             </p:contentPart>
           </mc:Choice>
-          <mc:Fallback>
+          <mc:Fallback xmlns="">
             <p:pic>
               <p:nvPicPr>
                 <p:cNvPr id="59" name="Håndskrift 58">
@@ -8437,8 +8414,8 @@
             <a:chExt cx="32400" cy="24480"/>
           </a:xfrm>
         </p:grpSpPr>
-        <mc:AlternateContent xmlns:mc="http://schemas.openxmlformats.org/markup-compatibility/2006">
-          <mc:Choice xmlns:p14="http://schemas.microsoft.com/office/powerpoint/2010/main" Requires="p14">
+        <mc:AlternateContent xmlns:mc="http://schemas.openxmlformats.org/markup-compatibility/2006" xmlns:p14="http://schemas.microsoft.com/office/powerpoint/2010/main">
+          <mc:Choice Requires="p14">
             <p:contentPart p14:bwMode="auto" r:id="rId27">
               <p14:nvContentPartPr>
                 <p14:cNvPr id="62" name="Håndskrift 61">
@@ -8457,7 +8434,7 @@
               </p14:xfrm>
             </p:contentPart>
           </mc:Choice>
-          <mc:Fallback>
+          <mc:Fallback xmlns="">
             <p:pic>
               <p:nvPicPr>
                 <p:cNvPr id="62" name="Håndskrift 61">
@@ -8488,8 +8465,8 @@
             </p:pic>
           </mc:Fallback>
         </mc:AlternateContent>
-        <mc:AlternateContent xmlns:mc="http://schemas.openxmlformats.org/markup-compatibility/2006">
-          <mc:Choice xmlns:p14="http://schemas.microsoft.com/office/powerpoint/2010/main" Requires="p14">
+        <mc:AlternateContent xmlns:mc="http://schemas.openxmlformats.org/markup-compatibility/2006" xmlns:p14="http://schemas.microsoft.com/office/powerpoint/2010/main">
+          <mc:Choice Requires="p14">
             <p:contentPart p14:bwMode="auto" r:id="rId28">
               <p14:nvContentPartPr>
                 <p14:cNvPr id="63" name="Håndskrift 62">
@@ -8508,7 +8485,7 @@
               </p14:xfrm>
             </p:contentPart>
           </mc:Choice>
-          <mc:Fallback>
+          <mc:Fallback xmlns="">
             <p:pic>
               <p:nvPicPr>
                 <p:cNvPr id="63" name="Håndskrift 62">
@@ -8540,8 +8517,8 @@
           </mc:Fallback>
         </mc:AlternateContent>
       </p:grpSp>
-      <mc:AlternateContent xmlns:mc="http://schemas.openxmlformats.org/markup-compatibility/2006">
-        <mc:Choice xmlns:p14="http://schemas.microsoft.com/office/powerpoint/2010/main" Requires="p14">
+      <mc:AlternateContent xmlns:mc="http://schemas.openxmlformats.org/markup-compatibility/2006" xmlns:p14="http://schemas.microsoft.com/office/powerpoint/2010/main">
+        <mc:Choice Requires="p14">
           <p:contentPart p14:bwMode="auto" r:id="rId29">
             <p14:nvContentPartPr>
               <p14:cNvPr id="66" name="Håndskrift 65">
@@ -8560,7 +8537,7 @@
             </p14:xfrm>
           </p:contentPart>
         </mc:Choice>
-        <mc:Fallback>
+        <mc:Fallback xmlns="">
           <p:pic>
             <p:nvPicPr>
               <p:cNvPr id="66" name="Håndskrift 65">
@@ -8591,8 +8568,8 @@
           </p:pic>
         </mc:Fallback>
       </mc:AlternateContent>
-      <mc:AlternateContent xmlns:mc="http://schemas.openxmlformats.org/markup-compatibility/2006">
-        <mc:Choice xmlns:p14="http://schemas.microsoft.com/office/powerpoint/2010/main" Requires="p14">
+      <mc:AlternateContent xmlns:mc="http://schemas.openxmlformats.org/markup-compatibility/2006" xmlns:p14="http://schemas.microsoft.com/office/powerpoint/2010/main">
+        <mc:Choice Requires="p14">
           <p:contentPart p14:bwMode="auto" r:id="rId30">
             <p14:nvContentPartPr>
               <p14:cNvPr id="67" name="Håndskrift 66">
@@ -8611,7 +8588,7 @@
             </p14:xfrm>
           </p:contentPart>
         </mc:Choice>
-        <mc:Fallback>
+        <mc:Fallback xmlns="">
           <p:pic>
             <p:nvPicPr>
               <p:cNvPr id="67" name="Håndskrift 66">
@@ -8642,8 +8619,8 @@
           </p:pic>
         </mc:Fallback>
       </mc:AlternateContent>
-      <mc:AlternateContent xmlns:mc="http://schemas.openxmlformats.org/markup-compatibility/2006">
-        <mc:Choice xmlns:p14="http://schemas.microsoft.com/office/powerpoint/2010/main" Requires="p14">
+      <mc:AlternateContent xmlns:mc="http://schemas.openxmlformats.org/markup-compatibility/2006" xmlns:p14="http://schemas.microsoft.com/office/powerpoint/2010/main">
+        <mc:Choice Requires="p14">
           <p:contentPart p14:bwMode="auto" r:id="rId31">
             <p14:nvContentPartPr>
               <p14:cNvPr id="68" name="Håndskrift 67">
@@ -8662,7 +8639,7 @@
             </p14:xfrm>
           </p:contentPart>
         </mc:Choice>
-        <mc:Fallback>
+        <mc:Fallback xmlns="">
           <p:pic>
             <p:nvPicPr>
               <p:cNvPr id="68" name="Håndskrift 67">
@@ -8708,7 +8685,7 @@
         <p:spPr>
           <a:xfrm>
             <a:off x="8956110" y="1806450"/>
-            <a:ext cx="3062057" cy="1477328"/>
+            <a:ext cx="2937022" cy="2031325"/>
           </a:xfrm>
           <a:prstGeom prst="rect">
             <a:avLst/>
@@ -8729,25 +8706,37 @@
           <a:p>
             <a:r>
               <a:rPr lang="da-DK" dirty="0"/>
-              <a:t>detektere kanterne og</a:t>
+              <a:t>detektere kanterne, </a:t>
             </a:r>
           </a:p>
           <a:p>
             <a:r>
               <a:rPr lang="da-DK" dirty="0"/>
-              <a:t>størrelsen på tænderne, </a:t>
+              <a:t>hvilket kan bruges til at </a:t>
             </a:r>
           </a:p>
           <a:p>
             <a:r>
               <a:rPr lang="da-DK" dirty="0"/>
-              <a:t>og dermed kan den lave </a:t>
+              <a:t>bestemme størrelsen på </a:t>
             </a:r>
           </a:p>
           <a:p>
             <a:r>
               <a:rPr lang="da-DK" dirty="0"/>
-              <a:t>en Bolton analyse  </a:t>
+              <a:t>tænderne, og dermed </a:t>
+            </a:r>
+          </a:p>
+          <a:p>
+            <a:r>
+              <a:rPr lang="da-DK" dirty="0"/>
+              <a:t>kan den lave en Bolton </a:t>
+            </a:r>
+          </a:p>
+          <a:p>
+            <a:r>
+              <a:rPr lang="da-DK" dirty="0"/>
+              <a:t>analyse.  </a:t>
             </a:r>
           </a:p>
         </p:txBody>
@@ -8756,6 +8745,195 @@
     <p:extLst>
       <p:ext uri="{BB962C8B-B14F-4D97-AF65-F5344CB8AC3E}">
         <p14:creationId xmlns:p14="http://schemas.microsoft.com/office/powerpoint/2010/main" val="3506500611"/>
+      </p:ext>
+    </p:extLst>
+  </p:cSld>
+  <p:clrMapOvr>
+    <a:masterClrMapping/>
+  </p:clrMapOvr>
+</p:sld>
+</file>
+
+<file path=ppt/slides/slide6.xml><?xml version="1.0" encoding="utf-8"?>
+<p:sld xmlns:a="http://schemas.openxmlformats.org/drawingml/2006/main" xmlns:r="http://schemas.openxmlformats.org/officeDocument/2006/relationships" xmlns:p="http://schemas.openxmlformats.org/presentationml/2006/main">
+  <p:cSld>
+    <p:spTree>
+      <p:nvGrpSpPr>
+        <p:cNvPr id="1" name=""/>
+        <p:cNvGrpSpPr/>
+        <p:nvPr/>
+      </p:nvGrpSpPr>
+      <p:grpSpPr>
+        <a:xfrm>
+          <a:off x="0" y="0"/>
+          <a:ext cx="0" cy="0"/>
+          <a:chOff x="0" y="0"/>
+          <a:chExt cx="0" cy="0"/>
+        </a:xfrm>
+      </p:grpSpPr>
+      <p:sp>
+        <p:nvSpPr>
+          <p:cNvPr id="2" name="Titel 1">
+            <a:extLst>
+              <a:ext uri="{FF2B5EF4-FFF2-40B4-BE49-F238E27FC236}">
+                <a16:creationId xmlns:a16="http://schemas.microsoft.com/office/drawing/2014/main" id="{ADB418C0-75E2-359D-D79B-B2627A32B44F}"/>
+              </a:ext>
+            </a:extLst>
+          </p:cNvPr>
+          <p:cNvSpPr>
+            <a:spLocks noGrp="1"/>
+          </p:cNvSpPr>
+          <p:nvPr>
+            <p:ph type="title"/>
+          </p:nvPr>
+        </p:nvSpPr>
+        <p:spPr>
+          <a:xfrm>
+            <a:off x="769973" y="350653"/>
+            <a:ext cx="5326027" cy="665104"/>
+          </a:xfrm>
+        </p:spPr>
+        <p:txBody>
+          <a:bodyPr>
+            <a:normAutofit/>
+          </a:bodyPr>
+          <a:lstStyle/>
+          <a:p>
+            <a:r>
+              <a:rPr lang="da-DK" sz="3600" dirty="0"/>
+              <a:t>Sample label data plot</a:t>
+            </a:r>
+          </a:p>
+        </p:txBody>
+      </p:sp>
+      <p:pic>
+        <p:nvPicPr>
+          <p:cNvPr id="5" name="Pladsholder til indhold 4" descr="Et billede, der indeholder skærmbillede, tekst, Kurve, diagram&#10;&#10;Indhold genereret af kunstig intelligens kan være forkert.">
+            <a:extLst>
+              <a:ext uri="{FF2B5EF4-FFF2-40B4-BE49-F238E27FC236}">
+                <a16:creationId xmlns:a16="http://schemas.microsoft.com/office/drawing/2014/main" id="{BD29626B-8812-2F3B-57E1-885F41B3072D}"/>
+              </a:ext>
+            </a:extLst>
+          </p:cNvPr>
+          <p:cNvPicPr>
+            <a:picLocks noGrp="1" noChangeAspect="1"/>
+          </p:cNvPicPr>
+          <p:nvPr>
+            <p:ph idx="1"/>
+          </p:nvPr>
+        </p:nvPicPr>
+        <p:blipFill>
+          <a:blip r:embed="rId2"/>
+          <a:stretch>
+            <a:fillRect/>
+          </a:stretch>
+        </p:blipFill>
+        <p:spPr>
+          <a:xfrm>
+            <a:off x="2546601" y="1015757"/>
+            <a:ext cx="7098797" cy="5402460"/>
+          </a:xfrm>
+        </p:spPr>
+      </p:pic>
+    </p:spTree>
+    <p:extLst>
+      <p:ext uri="{BB962C8B-B14F-4D97-AF65-F5344CB8AC3E}">
+        <p14:creationId xmlns:p14="http://schemas.microsoft.com/office/powerpoint/2010/main" val="2000174480"/>
+      </p:ext>
+    </p:extLst>
+  </p:cSld>
+  <p:clrMapOvr>
+    <a:masterClrMapping/>
+  </p:clrMapOvr>
+</p:sld>
+</file>
+
+<file path=ppt/slides/slide7.xml><?xml version="1.0" encoding="utf-8"?>
+<p:sld xmlns:a="http://schemas.openxmlformats.org/drawingml/2006/main" xmlns:r="http://schemas.openxmlformats.org/officeDocument/2006/relationships" xmlns:p="http://schemas.openxmlformats.org/presentationml/2006/main">
+  <p:cSld>
+    <p:spTree>
+      <p:nvGrpSpPr>
+        <p:cNvPr id="1" name=""/>
+        <p:cNvGrpSpPr/>
+        <p:nvPr/>
+      </p:nvGrpSpPr>
+      <p:grpSpPr>
+        <a:xfrm>
+          <a:off x="0" y="0"/>
+          <a:ext cx="0" cy="0"/>
+          <a:chOff x="0" y="0"/>
+          <a:chExt cx="0" cy="0"/>
+        </a:xfrm>
+      </p:grpSpPr>
+      <p:sp>
+        <p:nvSpPr>
+          <p:cNvPr id="2" name="Titel 1">
+            <a:extLst>
+              <a:ext uri="{FF2B5EF4-FFF2-40B4-BE49-F238E27FC236}">
+                <a16:creationId xmlns:a16="http://schemas.microsoft.com/office/drawing/2014/main" id="{B1AB4946-345D-BC46-A984-1D0D589B6D86}"/>
+              </a:ext>
+            </a:extLst>
+          </p:cNvPr>
+          <p:cNvSpPr>
+            <a:spLocks noGrp="1"/>
+          </p:cNvSpPr>
+          <p:nvPr>
+            <p:ph type="title"/>
+          </p:nvPr>
+        </p:nvSpPr>
+        <p:spPr/>
+        <p:txBody>
+          <a:bodyPr/>
+          <a:lstStyle/>
+          <a:p>
+            <a:r>
+              <a:rPr lang="da-DK" dirty="0"/>
+              <a:t>Hvad skal der ske nu?</a:t>
+            </a:r>
+          </a:p>
+        </p:txBody>
+      </p:sp>
+      <p:sp>
+        <p:nvSpPr>
+          <p:cNvPr id="3" name="Pladsholder til indhold 2">
+            <a:extLst>
+              <a:ext uri="{FF2B5EF4-FFF2-40B4-BE49-F238E27FC236}">
+                <a16:creationId xmlns:a16="http://schemas.microsoft.com/office/drawing/2014/main" id="{2B7AD7C0-46D2-AA22-D287-0F5491B8309F}"/>
+              </a:ext>
+            </a:extLst>
+          </p:cNvPr>
+          <p:cNvSpPr>
+            <a:spLocks noGrp="1"/>
+          </p:cNvSpPr>
+          <p:nvPr>
+            <p:ph idx="1"/>
+          </p:nvPr>
+        </p:nvSpPr>
+        <p:spPr/>
+        <p:txBody>
+          <a:bodyPr/>
+          <a:lstStyle/>
+          <a:p>
+            <a:r>
+              <a:rPr lang="da-DK" dirty="0"/>
+              <a:t>Databehandling: De øvre tænder skal vendes om</a:t>
+            </a:r>
+          </a:p>
+          <a:p>
+            <a:r>
+              <a:rPr lang="da-DK" dirty="0"/>
+              <a:t>Modelkendskab: Vi skal blive bekendt med Mask R-CNN</a:t>
+            </a:r>
+          </a:p>
+          <a:p>
+            <a:endParaRPr lang="da-DK" dirty="0"/>
+          </a:p>
+        </p:txBody>
+      </p:sp>
+    </p:spTree>
+    <p:extLst>
+      <p:ext uri="{BB962C8B-B14F-4D97-AF65-F5344CB8AC3E}">
+        <p14:creationId xmlns:p14="http://schemas.microsoft.com/office/powerpoint/2010/main" val="1687377691"/>
       </p:ext>
     </p:extLst>
   </p:cSld>

</xml_diff>